<commit_message>
Add correct CR-code and shot URL
</commit_message>
<xml_diff>
--- a/cpp_software_engineering.pptx
+++ b/cpp_software_engineering.pptx
@@ -338,7 +338,7 @@
           <a:p>
             <a:fld id="{9ABE1DF9-2622-487B-8511-7077A12324DC}" type="datetimeFigureOut">
               <a:rPr lang="LID4096" smtClean="0"/>
-              <a:t>05/16/2024</a:t>
+              <a:t>05/17/2024</a:t>
             </a:fld>
             <a:endParaRPr lang="LID4096"/>
           </a:p>
@@ -538,7 +538,7 @@
           <a:p>
             <a:fld id="{9ABE1DF9-2622-487B-8511-7077A12324DC}" type="datetimeFigureOut">
               <a:rPr lang="LID4096" smtClean="0"/>
-              <a:t>05/16/2024</a:t>
+              <a:t>05/17/2024</a:t>
             </a:fld>
             <a:endParaRPr lang="LID4096"/>
           </a:p>
@@ -748,7 +748,7 @@
           <a:p>
             <a:fld id="{9ABE1DF9-2622-487B-8511-7077A12324DC}" type="datetimeFigureOut">
               <a:rPr lang="LID4096" smtClean="0"/>
-              <a:t>05/16/2024</a:t>
+              <a:t>05/17/2024</a:t>
             </a:fld>
             <a:endParaRPr lang="LID4096"/>
           </a:p>
@@ -948,7 +948,7 @@
           <a:p>
             <a:fld id="{9ABE1DF9-2622-487B-8511-7077A12324DC}" type="datetimeFigureOut">
               <a:rPr lang="LID4096" smtClean="0"/>
-              <a:t>05/16/2024</a:t>
+              <a:t>05/17/2024</a:t>
             </a:fld>
             <a:endParaRPr lang="LID4096"/>
           </a:p>
@@ -1224,7 +1224,7 @@
           <a:p>
             <a:fld id="{9ABE1DF9-2622-487B-8511-7077A12324DC}" type="datetimeFigureOut">
               <a:rPr lang="LID4096" smtClean="0"/>
-              <a:t>05/16/2024</a:t>
+              <a:t>05/17/2024</a:t>
             </a:fld>
             <a:endParaRPr lang="LID4096"/>
           </a:p>
@@ -1492,7 +1492,7 @@
           <a:p>
             <a:fld id="{9ABE1DF9-2622-487B-8511-7077A12324DC}" type="datetimeFigureOut">
               <a:rPr lang="LID4096" smtClean="0"/>
-              <a:t>05/16/2024</a:t>
+              <a:t>05/17/2024</a:t>
             </a:fld>
             <a:endParaRPr lang="LID4096"/>
           </a:p>
@@ -1907,7 +1907,7 @@
           <a:p>
             <a:fld id="{9ABE1DF9-2622-487B-8511-7077A12324DC}" type="datetimeFigureOut">
               <a:rPr lang="LID4096" smtClean="0"/>
-              <a:t>05/16/2024</a:t>
+              <a:t>05/17/2024</a:t>
             </a:fld>
             <a:endParaRPr lang="LID4096"/>
           </a:p>
@@ -2049,7 +2049,7 @@
           <a:p>
             <a:fld id="{9ABE1DF9-2622-487B-8511-7077A12324DC}" type="datetimeFigureOut">
               <a:rPr lang="LID4096" smtClean="0"/>
-              <a:t>05/16/2024</a:t>
+              <a:t>05/17/2024</a:t>
             </a:fld>
             <a:endParaRPr lang="LID4096"/>
           </a:p>
@@ -2162,7 +2162,7 @@
           <a:p>
             <a:fld id="{9ABE1DF9-2622-487B-8511-7077A12324DC}" type="datetimeFigureOut">
               <a:rPr lang="LID4096" smtClean="0"/>
-              <a:t>05/16/2024</a:t>
+              <a:t>05/17/2024</a:t>
             </a:fld>
             <a:endParaRPr lang="LID4096"/>
           </a:p>
@@ -2475,7 +2475,7 @@
           <a:p>
             <a:fld id="{9ABE1DF9-2622-487B-8511-7077A12324DC}" type="datetimeFigureOut">
               <a:rPr lang="LID4096" smtClean="0"/>
-              <a:t>05/16/2024</a:t>
+              <a:t>05/17/2024</a:t>
             </a:fld>
             <a:endParaRPr lang="LID4096"/>
           </a:p>
@@ -2764,7 +2764,7 @@
           <a:p>
             <a:fld id="{9ABE1DF9-2622-487B-8511-7077A12324DC}" type="datetimeFigureOut">
               <a:rPr lang="LID4096" smtClean="0"/>
-              <a:t>05/16/2024</a:t>
+              <a:t>05/17/2024</a:t>
             </a:fld>
             <a:endParaRPr lang="LID4096"/>
           </a:p>
@@ -3007,7 +3007,7 @@
           <a:p>
             <a:fld id="{9ABE1DF9-2622-487B-8511-7077A12324DC}" type="datetimeFigureOut">
               <a:rPr lang="LID4096" smtClean="0"/>
-              <a:t>05/16/2024</a:t>
+              <a:t>05/17/2024</a:t>
             </a:fld>
             <a:endParaRPr lang="LID4096"/>
           </a:p>
@@ -3798,7 +3798,7 @@
         <p:spPr>
           <a:xfrm>
             <a:off x="3860836" y="5445224"/>
-            <a:ext cx="4779963" cy="707886"/>
+            <a:ext cx="5288948" cy="707886"/>
           </a:xfrm>
           <a:prstGeom prst="rect">
             <a:avLst/>
@@ -3815,21 +3815,21 @@
               <a:rPr lang="en-US" sz="4000" dirty="0">
                 <a:hlinkClick r:id="rId2"/>
               </a:rPr>
-              <a:t>http://bit.ly/33Vx1T9</a:t>
+              <a:t>https://bit.ly/3ywlOx0</a:t>
             </a:r>
             <a:r>
               <a:rPr lang="en-US" sz="4000" dirty="0"/>
-              <a:t> </a:t>
+              <a:t>  </a:t>
             </a:r>
           </a:p>
         </p:txBody>
       </p:sp>
       <p:pic>
         <p:nvPicPr>
-          <p:cNvPr id="5" name="Picture 4">
-            <a:extLst>
-              <a:ext uri="{FF2B5EF4-FFF2-40B4-BE49-F238E27FC236}">
-                <a16:creationId xmlns:a16="http://schemas.microsoft.com/office/drawing/2014/main" id="{3D905B4A-0AEC-4423-BF6A-5561652C3F29}"/>
+          <p:cNvPr id="3" name="Picture 2">
+            <a:extLst>
+              <a:ext uri="{FF2B5EF4-FFF2-40B4-BE49-F238E27FC236}">
+                <a16:creationId xmlns:a16="http://schemas.microsoft.com/office/drawing/2014/main" id="{927BA2FD-AA6F-D743-C133-F4F10A2AAD1F}"/>
               </a:ext>
             </a:extLst>
           </p:cNvPr>
@@ -3839,21 +3839,15 @@
           <p:nvPr/>
         </p:nvPicPr>
         <p:blipFill>
-          <a:blip r:embed="rId3">
-            <a:extLst>
-              <a:ext uri="{28A0092B-C50C-407E-A947-70E740481C1C}">
-                <a14:useLocalDpi xmlns:a14="http://schemas.microsoft.com/office/drawing/2010/main" val="0"/>
-              </a:ext>
-            </a:extLst>
-          </a:blip>
+          <a:blip r:embed="rId3"/>
           <a:stretch>
             <a:fillRect/>
           </a:stretch>
         </p:blipFill>
         <p:spPr>
           <a:xfrm>
-            <a:off x="4049477" y="980729"/>
-            <a:ext cx="4093046" cy="4093046"/>
+            <a:off x="3952875" y="1285875"/>
+            <a:ext cx="4286250" cy="4286250"/>
           </a:xfrm>
           <a:prstGeom prst="rect">
             <a:avLst/>

</xml_diff>

<commit_message>
Add sections on static analysis, testing
</commit_message>
<xml_diff>
--- a/cpp_software_engineering.pptx
+++ b/cpp_software_engineering.pptx
@@ -5,7 +5,7 @@
     <p:sldMasterId id="2147483648" r:id="rId1"/>
   </p:sldMasterIdLst>
   <p:notesMasterIdLst>
-    <p:notesMasterId r:id="rId20"/>
+    <p:notesMasterId r:id="rId30"/>
   </p:notesMasterIdLst>
   <p:sldIdLst>
     <p:sldId id="257" r:id="rId2"/>
@@ -26,6 +26,16 @@
     <p:sldId id="370" r:id="rId17"/>
     <p:sldId id="371" r:id="rId18"/>
     <p:sldId id="372" r:id="rId19"/>
+    <p:sldId id="373" r:id="rId20"/>
+    <p:sldId id="374" r:id="rId21"/>
+    <p:sldId id="375" r:id="rId22"/>
+    <p:sldId id="376" r:id="rId23"/>
+    <p:sldId id="377" r:id="rId24"/>
+    <p:sldId id="304" r:id="rId25"/>
+    <p:sldId id="379" r:id="rId26"/>
+    <p:sldId id="378" r:id="rId27"/>
+    <p:sldId id="380" r:id="rId28"/>
+    <p:sldId id="381" r:id="rId29"/>
   </p:sldIdLst>
   <p:sldSz cx="12192000" cy="6858000"/>
   <p:notesSz cx="6858000" cy="9144000"/>
@@ -155,6 +165,28 @@
             <p14:sldId id="370"/>
             <p14:sldId id="371"/>
             <p14:sldId id="372"/>
+          </p14:sldIdLst>
+        </p14:section>
+        <p14:section name="Static code analysis" id="{7E2168B1-3151-45FE-95B5-60C458E6EA14}">
+          <p14:sldIdLst>
+            <p14:sldId id="373"/>
+            <p14:sldId id="374"/>
+            <p14:sldId id="375"/>
+          </p14:sldIdLst>
+        </p14:section>
+        <p14:section name="Testing" id="{7E5DC78A-CBFE-4668-B154-057392F09201}">
+          <p14:sldIdLst>
+            <p14:sldId id="376"/>
+            <p14:sldId id="377"/>
+            <p14:sldId id="304"/>
+            <p14:sldId id="379"/>
+            <p14:sldId id="378"/>
+          </p14:sldIdLst>
+        </p14:section>
+        <p14:section name="Dependency maangement" id="{E98903FD-FEF5-43E0-9A24-6760A06D0647}">
+          <p14:sldIdLst>
+            <p14:sldId id="380"/>
+            <p14:sldId id="381"/>
           </p14:sldIdLst>
         </p14:section>
       </p14:sectionLst>
@@ -9345,6 +9377,119 @@
 </p:sld>
 </file>
 
+<file path=ppt/slides/slide19.xml><?xml version="1.0" encoding="utf-8"?>
+<p:sld xmlns:a="http://schemas.openxmlformats.org/drawingml/2006/main" xmlns:r="http://schemas.openxmlformats.org/officeDocument/2006/relationships" xmlns:p="http://schemas.openxmlformats.org/presentationml/2006/main">
+  <p:cSld>
+    <p:spTree>
+      <p:nvGrpSpPr>
+        <p:cNvPr id="1" name=""/>
+        <p:cNvGrpSpPr/>
+        <p:nvPr/>
+      </p:nvGrpSpPr>
+      <p:grpSpPr>
+        <a:xfrm>
+          <a:off x="0" y="0"/>
+          <a:ext cx="0" cy="0"/>
+          <a:chOff x="0" y="0"/>
+          <a:chExt cx="0" cy="0"/>
+        </a:xfrm>
+      </p:grpSpPr>
+      <p:sp>
+        <p:nvSpPr>
+          <p:cNvPr id="2" name="Title 1">
+            <a:extLst>
+              <a:ext uri="{FF2B5EF4-FFF2-40B4-BE49-F238E27FC236}">
+                <a16:creationId xmlns:a16="http://schemas.microsoft.com/office/drawing/2014/main" id="{0A9A4F0A-2A84-7AF9-7709-87E9D11D58BC}"/>
+              </a:ext>
+            </a:extLst>
+          </p:cNvPr>
+          <p:cNvSpPr>
+            <a:spLocks noGrp="1"/>
+          </p:cNvSpPr>
+          <p:nvPr>
+            <p:ph type="title"/>
+          </p:nvPr>
+        </p:nvSpPr>
+        <p:spPr/>
+        <p:txBody>
+          <a:bodyPr/>
+          <a:lstStyle/>
+          <a:p>
+            <a:r>
+              <a:rPr lang="en-US" dirty="0"/>
+              <a:t>Static code analysis</a:t>
+            </a:r>
+            <a:endParaRPr lang="LID4096" dirty="0"/>
+          </a:p>
+        </p:txBody>
+      </p:sp>
+      <p:sp>
+        <p:nvSpPr>
+          <p:cNvPr id="3" name="Text Placeholder 2">
+            <a:extLst>
+              <a:ext uri="{FF2B5EF4-FFF2-40B4-BE49-F238E27FC236}">
+                <a16:creationId xmlns:a16="http://schemas.microsoft.com/office/drawing/2014/main" id="{BD39A529-FC28-9BA3-DB34-576128C290AF}"/>
+              </a:ext>
+            </a:extLst>
+          </p:cNvPr>
+          <p:cNvSpPr>
+            <a:spLocks noGrp="1"/>
+          </p:cNvSpPr>
+          <p:nvPr>
+            <p:ph type="body" idx="1"/>
+          </p:nvPr>
+        </p:nvSpPr>
+        <p:spPr/>
+        <p:txBody>
+          <a:bodyPr/>
+          <a:lstStyle/>
+          <a:p>
+            <a:endParaRPr lang="LID4096"/>
+          </a:p>
+        </p:txBody>
+      </p:sp>
+      <p:sp>
+        <p:nvSpPr>
+          <p:cNvPr id="4" name="Slide Number Placeholder 3">
+            <a:extLst>
+              <a:ext uri="{FF2B5EF4-FFF2-40B4-BE49-F238E27FC236}">
+                <a16:creationId xmlns:a16="http://schemas.microsoft.com/office/drawing/2014/main" id="{85BD80E7-7B5E-E5E8-E17C-8EEEC1B251D1}"/>
+              </a:ext>
+            </a:extLst>
+          </p:cNvPr>
+          <p:cNvSpPr>
+            <a:spLocks noGrp="1"/>
+          </p:cNvSpPr>
+          <p:nvPr>
+            <p:ph type="sldNum" sz="quarter" idx="12"/>
+          </p:nvPr>
+        </p:nvSpPr>
+        <p:spPr/>
+        <p:txBody>
+          <a:bodyPr/>
+          <a:lstStyle/>
+          <a:p>
+            <a:fld id="{FDB1AA33-DFBB-49AC-8CEE-23FFECEB5648}" type="slidenum">
+              <a:rPr lang="LID4096" smtClean="0"/>
+              <a:t>19</a:t>
+            </a:fld>
+            <a:endParaRPr lang="LID4096"/>
+          </a:p>
+        </p:txBody>
+      </p:sp>
+    </p:spTree>
+    <p:extLst>
+      <p:ext uri="{BB962C8B-B14F-4D97-AF65-F5344CB8AC3E}">
+        <p14:creationId xmlns:p14="http://schemas.microsoft.com/office/powerpoint/2010/main" val="1717687650"/>
+      </p:ext>
+    </p:extLst>
+  </p:cSld>
+  <p:clrMapOvr>
+    <a:masterClrMapping/>
+  </p:clrMapOvr>
+</p:sld>
+</file>
+
 <file path=ppt/slides/slide2.xml><?xml version="1.0" encoding="utf-8"?>
 <p:sld xmlns:a="http://schemas.openxmlformats.org/drawingml/2006/main" xmlns:r="http://schemas.openxmlformats.org/officeDocument/2006/relationships" xmlns:p="http://schemas.openxmlformats.org/presentationml/2006/main">
   <p:cSld>
@@ -9454,6 +9599,2940 @@
     <p:extLst>
       <p:ext uri="{BB962C8B-B14F-4D97-AF65-F5344CB8AC3E}">
         <p14:creationId xmlns:p14="http://schemas.microsoft.com/office/powerpoint/2010/main" val="4231110881"/>
+      </p:ext>
+    </p:extLst>
+  </p:cSld>
+  <p:clrMapOvr>
+    <a:masterClrMapping/>
+  </p:clrMapOvr>
+</p:sld>
+</file>
+
+<file path=ppt/slides/slide20.xml><?xml version="1.0" encoding="utf-8"?>
+<p:sld xmlns:a="http://schemas.openxmlformats.org/drawingml/2006/main" xmlns:r="http://schemas.openxmlformats.org/officeDocument/2006/relationships" xmlns:p="http://schemas.openxmlformats.org/presentationml/2006/main">
+  <p:cSld>
+    <p:spTree>
+      <p:nvGrpSpPr>
+        <p:cNvPr id="1" name=""/>
+        <p:cNvGrpSpPr/>
+        <p:nvPr/>
+      </p:nvGrpSpPr>
+      <p:grpSpPr>
+        <a:xfrm>
+          <a:off x="0" y="0"/>
+          <a:ext cx="0" cy="0"/>
+          <a:chOff x="0" y="0"/>
+          <a:chExt cx="0" cy="0"/>
+        </a:xfrm>
+      </p:grpSpPr>
+      <p:sp>
+        <p:nvSpPr>
+          <p:cNvPr id="2" name="Title 1">
+            <a:extLst>
+              <a:ext uri="{FF2B5EF4-FFF2-40B4-BE49-F238E27FC236}">
+                <a16:creationId xmlns:a16="http://schemas.microsoft.com/office/drawing/2014/main" id="{AB1846BC-E71F-1929-301C-C215D040A743}"/>
+              </a:ext>
+            </a:extLst>
+          </p:cNvPr>
+          <p:cNvSpPr>
+            <a:spLocks noGrp="1"/>
+          </p:cNvSpPr>
+          <p:nvPr>
+            <p:ph type="title"/>
+          </p:nvPr>
+        </p:nvSpPr>
+        <p:spPr/>
+        <p:txBody>
+          <a:bodyPr/>
+          <a:lstStyle/>
+          <a:p>
+            <a:r>
+              <a:rPr lang="en-US" dirty="0"/>
+              <a:t>What is it?</a:t>
+            </a:r>
+            <a:endParaRPr lang="LID4096" dirty="0"/>
+          </a:p>
+        </p:txBody>
+      </p:sp>
+      <p:sp>
+        <p:nvSpPr>
+          <p:cNvPr id="3" name="Content Placeholder 2">
+            <a:extLst>
+              <a:ext uri="{FF2B5EF4-FFF2-40B4-BE49-F238E27FC236}">
+                <a16:creationId xmlns:a16="http://schemas.microsoft.com/office/drawing/2014/main" id="{FCE71F70-59FE-A16C-E6C8-51F668BD5692}"/>
+              </a:ext>
+            </a:extLst>
+          </p:cNvPr>
+          <p:cNvSpPr>
+            <a:spLocks noGrp="1"/>
+          </p:cNvSpPr>
+          <p:nvPr>
+            <p:ph idx="1"/>
+          </p:nvPr>
+        </p:nvSpPr>
+        <p:spPr/>
+        <p:txBody>
+          <a:bodyPr/>
+          <a:lstStyle/>
+          <a:p>
+            <a:r>
+              <a:rPr lang="en-US" dirty="0"/>
+              <a:t>Search for known</a:t>
+            </a:r>
+          </a:p>
+          <a:p>
+            <a:pPr lvl="1"/>
+            <a:r>
+              <a:rPr lang="en-US" dirty="0"/>
+              <a:t>buggy code patterns</a:t>
+            </a:r>
+          </a:p>
+          <a:p>
+            <a:pPr lvl="1"/>
+            <a:r>
+              <a:rPr lang="en-US" dirty="0"/>
+              <a:t>performance issues</a:t>
+            </a:r>
+          </a:p>
+          <a:p>
+            <a:pPr lvl="1"/>
+            <a:r>
+              <a:rPr lang="en-US" dirty="0"/>
+              <a:t>deprecated coding style</a:t>
+            </a:r>
+          </a:p>
+          <a:p>
+            <a:pPr lvl="1"/>
+            <a:r>
+              <a:rPr lang="en-US" dirty="0"/>
+              <a:t>...</a:t>
+            </a:r>
+          </a:p>
+          <a:p>
+            <a:r>
+              <a:rPr lang="en-US" dirty="0"/>
+              <a:t>Various implementations</a:t>
+            </a:r>
+          </a:p>
+          <a:p>
+            <a:pPr lvl="1"/>
+            <a:r>
+              <a:rPr lang="en-US" dirty="0"/>
+              <a:t>clang-tidy</a:t>
+            </a:r>
+          </a:p>
+          <a:p>
+            <a:pPr lvl="1"/>
+            <a:r>
+              <a:rPr lang="en-US" dirty="0" err="1"/>
+              <a:t>cppcheck</a:t>
+            </a:r>
+            <a:endParaRPr lang="en-US" dirty="0"/>
+          </a:p>
+          <a:p>
+            <a:endParaRPr lang="LID4096" dirty="0"/>
+          </a:p>
+        </p:txBody>
+      </p:sp>
+      <p:sp>
+        <p:nvSpPr>
+          <p:cNvPr id="4" name="Slide Number Placeholder 3">
+            <a:extLst>
+              <a:ext uri="{FF2B5EF4-FFF2-40B4-BE49-F238E27FC236}">
+                <a16:creationId xmlns:a16="http://schemas.microsoft.com/office/drawing/2014/main" id="{0C138307-A730-BDEC-3EC9-01FC74C4FEC1}"/>
+              </a:ext>
+            </a:extLst>
+          </p:cNvPr>
+          <p:cNvSpPr>
+            <a:spLocks noGrp="1"/>
+          </p:cNvSpPr>
+          <p:nvPr>
+            <p:ph type="sldNum" sz="quarter" idx="12"/>
+          </p:nvPr>
+        </p:nvSpPr>
+        <p:spPr/>
+        <p:txBody>
+          <a:bodyPr/>
+          <a:lstStyle/>
+          <a:p>
+            <a:fld id="{FDB1AA33-DFBB-49AC-8CEE-23FFECEB5648}" type="slidenum">
+              <a:rPr lang="LID4096" smtClean="0"/>
+              <a:t>20</a:t>
+            </a:fld>
+            <a:endParaRPr lang="LID4096"/>
+          </a:p>
+        </p:txBody>
+      </p:sp>
+      <p:sp>
+        <p:nvSpPr>
+          <p:cNvPr id="5" name="TextBox 4">
+            <a:extLst>
+              <a:ext uri="{FF2B5EF4-FFF2-40B4-BE49-F238E27FC236}">
+                <a16:creationId xmlns:a16="http://schemas.microsoft.com/office/drawing/2014/main" id="{1F3B1101-4F8B-017C-6A05-A10FD69F6145}"/>
+              </a:ext>
+            </a:extLst>
+          </p:cNvPr>
+          <p:cNvSpPr txBox="1"/>
+          <p:nvPr/>
+        </p:nvSpPr>
+        <p:spPr>
+          <a:xfrm>
+            <a:off x="92564" y="5486594"/>
+            <a:ext cx="11976612" cy="707886"/>
+          </a:xfrm>
+          <a:prstGeom prst="rect">
+            <a:avLst/>
+          </a:prstGeom>
+          <a:noFill/>
+          <a:ln>
+            <a:solidFill>
+              <a:schemeClr val="tx1"/>
+            </a:solidFill>
+          </a:ln>
+        </p:spPr>
+        <p:txBody>
+          <a:bodyPr wrap="none" rtlCol="0">
+            <a:spAutoFit/>
+          </a:bodyPr>
+          <a:lstStyle/>
+          <a:p>
+            <a:r>
+              <a:rPr lang="en-US" sz="2000" dirty="0"/>
+              <a:t>See</a:t>
+            </a:r>
+          </a:p>
+          <a:p>
+            <a:r>
+              <a:rPr lang="en-US" sz="2000" dirty="0">
+                <a:hlinkClick r:id="rId2"/>
+              </a:rPr>
+              <a:t>https://github.com/gjbex/C-plus-plus-software-engineering/tree/development/source-code/static-analysis</a:t>
+            </a:r>
+            <a:r>
+              <a:rPr lang="en-US" sz="2000" dirty="0"/>
+              <a:t> </a:t>
+            </a:r>
+            <a:endParaRPr lang="LID4096" sz="2000" dirty="0"/>
+          </a:p>
+        </p:txBody>
+      </p:sp>
+    </p:spTree>
+    <p:extLst>
+      <p:ext uri="{BB962C8B-B14F-4D97-AF65-F5344CB8AC3E}">
+        <p14:creationId xmlns:p14="http://schemas.microsoft.com/office/powerpoint/2010/main" val="3069155746"/>
+      </p:ext>
+    </p:extLst>
+  </p:cSld>
+  <p:clrMapOvr>
+    <a:masterClrMapping/>
+  </p:clrMapOvr>
+</p:sld>
+</file>
+
+<file path=ppt/slides/slide21.xml><?xml version="1.0" encoding="utf-8"?>
+<p:sld xmlns:a="http://schemas.openxmlformats.org/drawingml/2006/main" xmlns:r="http://schemas.openxmlformats.org/officeDocument/2006/relationships" xmlns:p="http://schemas.openxmlformats.org/presentationml/2006/main">
+  <p:cSld>
+    <p:spTree>
+      <p:nvGrpSpPr>
+        <p:cNvPr id="1" name=""/>
+        <p:cNvGrpSpPr/>
+        <p:nvPr/>
+      </p:nvGrpSpPr>
+      <p:grpSpPr>
+        <a:xfrm>
+          <a:off x="0" y="0"/>
+          <a:ext cx="0" cy="0"/>
+          <a:chOff x="0" y="0"/>
+          <a:chExt cx="0" cy="0"/>
+        </a:xfrm>
+      </p:grpSpPr>
+      <p:sp>
+        <p:nvSpPr>
+          <p:cNvPr id="2" name="Title 1">
+            <a:extLst>
+              <a:ext uri="{FF2B5EF4-FFF2-40B4-BE49-F238E27FC236}">
+                <a16:creationId xmlns:a16="http://schemas.microsoft.com/office/drawing/2014/main" id="{2FF549CA-6E36-F65E-1A27-A74B160DDF9A}"/>
+              </a:ext>
+            </a:extLst>
+          </p:cNvPr>
+          <p:cNvSpPr>
+            <a:spLocks noGrp="1"/>
+          </p:cNvSpPr>
+          <p:nvPr>
+            <p:ph type="title"/>
+          </p:nvPr>
+        </p:nvSpPr>
+        <p:spPr/>
+        <p:txBody>
+          <a:bodyPr/>
+          <a:lstStyle/>
+          <a:p>
+            <a:r>
+              <a:rPr lang="en-US" dirty="0"/>
+              <a:t>Further reading</a:t>
+            </a:r>
+            <a:endParaRPr lang="LID4096" dirty="0"/>
+          </a:p>
+        </p:txBody>
+      </p:sp>
+      <p:sp>
+        <p:nvSpPr>
+          <p:cNvPr id="3" name="Content Placeholder 2">
+            <a:extLst>
+              <a:ext uri="{FF2B5EF4-FFF2-40B4-BE49-F238E27FC236}">
+                <a16:creationId xmlns:a16="http://schemas.microsoft.com/office/drawing/2014/main" id="{CB941343-A9C5-D765-4E2E-E3736731272F}"/>
+              </a:ext>
+            </a:extLst>
+          </p:cNvPr>
+          <p:cNvSpPr>
+            <a:spLocks noGrp="1"/>
+          </p:cNvSpPr>
+          <p:nvPr>
+            <p:ph idx="1"/>
+          </p:nvPr>
+        </p:nvSpPr>
+        <p:spPr/>
+        <p:txBody>
+          <a:bodyPr/>
+          <a:lstStyle/>
+          <a:p>
+            <a:r>
+              <a:rPr lang="en-US" dirty="0"/>
+              <a:t>clang-tidy documentation</a:t>
+            </a:r>
+            <a:br>
+              <a:rPr lang="en-US" dirty="0"/>
+            </a:br>
+            <a:r>
+              <a:rPr lang="en-US" dirty="0">
+                <a:hlinkClick r:id="rId2"/>
+              </a:rPr>
+              <a:t>https://clang.llvm.org/extra/clang-tidy/</a:t>
+            </a:r>
+            <a:r>
+              <a:rPr lang="en-US" dirty="0"/>
+              <a:t> </a:t>
+            </a:r>
+          </a:p>
+          <a:p>
+            <a:r>
+              <a:rPr lang="en-US" dirty="0" err="1"/>
+              <a:t>cppcheck</a:t>
+            </a:r>
+            <a:r>
+              <a:rPr lang="en-US" dirty="0"/>
+              <a:t> documentation</a:t>
+            </a:r>
+            <a:br>
+              <a:rPr lang="en-US" dirty="0"/>
+            </a:br>
+            <a:r>
+              <a:rPr lang="en-US" dirty="0">
+                <a:hlinkClick r:id="rId3"/>
+              </a:rPr>
+              <a:t>https://cppcheck.sourceforge.io/#documentation</a:t>
+            </a:r>
+            <a:r>
+              <a:rPr lang="en-US" dirty="0"/>
+              <a:t> </a:t>
+            </a:r>
+            <a:endParaRPr lang="LID4096" dirty="0"/>
+          </a:p>
+        </p:txBody>
+      </p:sp>
+      <p:sp>
+        <p:nvSpPr>
+          <p:cNvPr id="4" name="Slide Number Placeholder 3">
+            <a:extLst>
+              <a:ext uri="{FF2B5EF4-FFF2-40B4-BE49-F238E27FC236}">
+                <a16:creationId xmlns:a16="http://schemas.microsoft.com/office/drawing/2014/main" id="{B912BED7-5D3F-391D-1E2C-0B002A979332}"/>
+              </a:ext>
+            </a:extLst>
+          </p:cNvPr>
+          <p:cNvSpPr>
+            <a:spLocks noGrp="1"/>
+          </p:cNvSpPr>
+          <p:nvPr>
+            <p:ph type="sldNum" sz="quarter" idx="12"/>
+          </p:nvPr>
+        </p:nvSpPr>
+        <p:spPr/>
+        <p:txBody>
+          <a:bodyPr/>
+          <a:lstStyle/>
+          <a:p>
+            <a:fld id="{FDB1AA33-DFBB-49AC-8CEE-23FFECEB5648}" type="slidenum">
+              <a:rPr lang="LID4096" smtClean="0"/>
+              <a:t>21</a:t>
+            </a:fld>
+            <a:endParaRPr lang="LID4096"/>
+          </a:p>
+        </p:txBody>
+      </p:sp>
+    </p:spTree>
+    <p:extLst>
+      <p:ext uri="{BB962C8B-B14F-4D97-AF65-F5344CB8AC3E}">
+        <p14:creationId xmlns:p14="http://schemas.microsoft.com/office/powerpoint/2010/main" val="4199631407"/>
+      </p:ext>
+    </p:extLst>
+  </p:cSld>
+  <p:clrMapOvr>
+    <a:masterClrMapping/>
+  </p:clrMapOvr>
+</p:sld>
+</file>
+
+<file path=ppt/slides/slide22.xml><?xml version="1.0" encoding="utf-8"?>
+<p:sld xmlns:a="http://schemas.openxmlformats.org/drawingml/2006/main" xmlns:r="http://schemas.openxmlformats.org/officeDocument/2006/relationships" xmlns:p="http://schemas.openxmlformats.org/presentationml/2006/main">
+  <p:cSld>
+    <p:spTree>
+      <p:nvGrpSpPr>
+        <p:cNvPr id="1" name=""/>
+        <p:cNvGrpSpPr/>
+        <p:nvPr/>
+      </p:nvGrpSpPr>
+      <p:grpSpPr>
+        <a:xfrm>
+          <a:off x="0" y="0"/>
+          <a:ext cx="0" cy="0"/>
+          <a:chOff x="0" y="0"/>
+          <a:chExt cx="0" cy="0"/>
+        </a:xfrm>
+      </p:grpSpPr>
+      <p:sp>
+        <p:nvSpPr>
+          <p:cNvPr id="2" name="Title 1">
+            <a:extLst>
+              <a:ext uri="{FF2B5EF4-FFF2-40B4-BE49-F238E27FC236}">
+                <a16:creationId xmlns:a16="http://schemas.microsoft.com/office/drawing/2014/main" id="{017B73CB-2434-132E-8DCF-BA439F009315}"/>
+              </a:ext>
+            </a:extLst>
+          </p:cNvPr>
+          <p:cNvSpPr>
+            <a:spLocks noGrp="1"/>
+          </p:cNvSpPr>
+          <p:nvPr>
+            <p:ph type="title"/>
+          </p:nvPr>
+        </p:nvSpPr>
+        <p:spPr/>
+        <p:txBody>
+          <a:bodyPr/>
+          <a:lstStyle/>
+          <a:p>
+            <a:r>
+              <a:rPr lang="en-US" dirty="0"/>
+              <a:t>Testing</a:t>
+            </a:r>
+            <a:endParaRPr lang="LID4096" dirty="0"/>
+          </a:p>
+        </p:txBody>
+      </p:sp>
+      <p:sp>
+        <p:nvSpPr>
+          <p:cNvPr id="3" name="Text Placeholder 2">
+            <a:extLst>
+              <a:ext uri="{FF2B5EF4-FFF2-40B4-BE49-F238E27FC236}">
+                <a16:creationId xmlns:a16="http://schemas.microsoft.com/office/drawing/2014/main" id="{FC79DC32-9D2C-63F2-E64F-DEC55584D93D}"/>
+              </a:ext>
+            </a:extLst>
+          </p:cNvPr>
+          <p:cNvSpPr>
+            <a:spLocks noGrp="1"/>
+          </p:cNvSpPr>
+          <p:nvPr>
+            <p:ph type="body" idx="1"/>
+          </p:nvPr>
+        </p:nvSpPr>
+        <p:spPr/>
+        <p:txBody>
+          <a:bodyPr/>
+          <a:lstStyle/>
+          <a:p>
+            <a:endParaRPr lang="LID4096"/>
+          </a:p>
+        </p:txBody>
+      </p:sp>
+      <p:sp>
+        <p:nvSpPr>
+          <p:cNvPr id="4" name="Slide Number Placeholder 3">
+            <a:extLst>
+              <a:ext uri="{FF2B5EF4-FFF2-40B4-BE49-F238E27FC236}">
+                <a16:creationId xmlns:a16="http://schemas.microsoft.com/office/drawing/2014/main" id="{4FE94A69-BEA7-FBFA-9E48-F2BC9913F21A}"/>
+              </a:ext>
+            </a:extLst>
+          </p:cNvPr>
+          <p:cNvSpPr>
+            <a:spLocks noGrp="1"/>
+          </p:cNvSpPr>
+          <p:nvPr>
+            <p:ph type="sldNum" sz="quarter" idx="12"/>
+          </p:nvPr>
+        </p:nvSpPr>
+        <p:spPr/>
+        <p:txBody>
+          <a:bodyPr/>
+          <a:lstStyle/>
+          <a:p>
+            <a:fld id="{FDB1AA33-DFBB-49AC-8CEE-23FFECEB5648}" type="slidenum">
+              <a:rPr lang="LID4096" smtClean="0"/>
+              <a:t>22</a:t>
+            </a:fld>
+            <a:endParaRPr lang="LID4096"/>
+          </a:p>
+        </p:txBody>
+      </p:sp>
+    </p:spTree>
+    <p:extLst>
+      <p:ext uri="{BB962C8B-B14F-4D97-AF65-F5344CB8AC3E}">
+        <p14:creationId xmlns:p14="http://schemas.microsoft.com/office/powerpoint/2010/main" val="3050132282"/>
+      </p:ext>
+    </p:extLst>
+  </p:cSld>
+  <p:clrMapOvr>
+    <a:masterClrMapping/>
+  </p:clrMapOvr>
+</p:sld>
+</file>
+
+<file path=ppt/slides/slide23.xml><?xml version="1.0" encoding="utf-8"?>
+<p:sld xmlns:a="http://schemas.openxmlformats.org/drawingml/2006/main" xmlns:r="http://schemas.openxmlformats.org/officeDocument/2006/relationships" xmlns:p="http://schemas.openxmlformats.org/presentationml/2006/main">
+  <p:cSld>
+    <p:spTree>
+      <p:nvGrpSpPr>
+        <p:cNvPr id="1" name=""/>
+        <p:cNvGrpSpPr/>
+        <p:nvPr/>
+      </p:nvGrpSpPr>
+      <p:grpSpPr>
+        <a:xfrm>
+          <a:off x="0" y="0"/>
+          <a:ext cx="0" cy="0"/>
+          <a:chOff x="0" y="0"/>
+          <a:chExt cx="0" cy="0"/>
+        </a:xfrm>
+      </p:grpSpPr>
+      <p:sp>
+        <p:nvSpPr>
+          <p:cNvPr id="2" name="Title 1">
+            <a:extLst>
+              <a:ext uri="{FF2B5EF4-FFF2-40B4-BE49-F238E27FC236}">
+                <a16:creationId xmlns:a16="http://schemas.microsoft.com/office/drawing/2014/main" id="{B31A3D2F-F6C6-95B0-3A39-A6919D0FA868}"/>
+              </a:ext>
+            </a:extLst>
+          </p:cNvPr>
+          <p:cNvSpPr>
+            <a:spLocks noGrp="1"/>
+          </p:cNvSpPr>
+          <p:nvPr>
+            <p:ph type="title"/>
+          </p:nvPr>
+        </p:nvSpPr>
+        <p:spPr/>
+        <p:txBody>
+          <a:bodyPr/>
+          <a:lstStyle/>
+          <a:p>
+            <a:r>
+              <a:rPr lang="en-US" dirty="0"/>
+              <a:t>Types of testing</a:t>
+            </a:r>
+            <a:endParaRPr lang="LID4096" dirty="0"/>
+          </a:p>
+        </p:txBody>
+      </p:sp>
+      <p:sp>
+        <p:nvSpPr>
+          <p:cNvPr id="3" name="Content Placeholder 2">
+            <a:extLst>
+              <a:ext uri="{FF2B5EF4-FFF2-40B4-BE49-F238E27FC236}">
+                <a16:creationId xmlns:a16="http://schemas.microsoft.com/office/drawing/2014/main" id="{D753267F-7BE9-8A04-BDF4-689EF366E406}"/>
+              </a:ext>
+            </a:extLst>
+          </p:cNvPr>
+          <p:cNvSpPr>
+            <a:spLocks noGrp="1"/>
+          </p:cNvSpPr>
+          <p:nvPr>
+            <p:ph idx="1"/>
+          </p:nvPr>
+        </p:nvSpPr>
+        <p:spPr/>
+        <p:txBody>
+          <a:bodyPr>
+            <a:normAutofit fontScale="85000" lnSpcReduction="20000"/>
+          </a:bodyPr>
+          <a:lstStyle/>
+          <a:p>
+            <a:r>
+              <a:rPr lang="en-US" dirty="0"/>
+              <a:t>Unit testing</a:t>
+            </a:r>
+          </a:p>
+          <a:p>
+            <a:pPr lvl="1"/>
+            <a:r>
+              <a:rPr lang="en-US" dirty="0"/>
+              <a:t>API level</a:t>
+            </a:r>
+          </a:p>
+          <a:p>
+            <a:pPr lvl="1"/>
+            <a:r>
+              <a:rPr lang="en-US" dirty="0"/>
+              <a:t>Various frameworks</a:t>
+            </a:r>
+          </a:p>
+          <a:p>
+            <a:pPr lvl="2"/>
+            <a:r>
+              <a:rPr lang="en-US" dirty="0"/>
+              <a:t>Catch2</a:t>
+            </a:r>
+          </a:p>
+          <a:p>
+            <a:pPr lvl="2"/>
+            <a:r>
+              <a:rPr lang="en-US" dirty="0"/>
+              <a:t>Google Test</a:t>
+            </a:r>
+          </a:p>
+          <a:p>
+            <a:pPr lvl="2"/>
+            <a:r>
+              <a:rPr lang="en-US" dirty="0" err="1"/>
+              <a:t>cppunit</a:t>
+            </a:r>
+            <a:endParaRPr lang="en-US" dirty="0"/>
+          </a:p>
+          <a:p>
+            <a:pPr lvl="2"/>
+            <a:r>
+              <a:rPr lang="en-US" dirty="0"/>
+              <a:t>Google </a:t>
+            </a:r>
+            <a:r>
+              <a:rPr lang="en-US" dirty="0" err="1"/>
+              <a:t>FuzzyTest</a:t>
+            </a:r>
+            <a:endParaRPr lang="en-US" dirty="0"/>
+          </a:p>
+          <a:p>
+            <a:r>
+              <a:rPr lang="en-US" dirty="0"/>
+              <a:t>Functional testing</a:t>
+            </a:r>
+          </a:p>
+          <a:p>
+            <a:pPr lvl="1"/>
+            <a:r>
+              <a:rPr lang="en-US" dirty="0"/>
+              <a:t>Application level</a:t>
+            </a:r>
+          </a:p>
+          <a:p>
+            <a:pPr lvl="1"/>
+            <a:r>
+              <a:rPr lang="en-US" dirty="0"/>
+              <a:t>Various frameworks</a:t>
+            </a:r>
+          </a:p>
+          <a:p>
+            <a:pPr lvl="2"/>
+            <a:r>
+              <a:rPr lang="en-US" dirty="0" err="1"/>
+              <a:t>CTest</a:t>
+            </a:r>
+            <a:endParaRPr lang="en-US" dirty="0"/>
+          </a:p>
+          <a:p>
+            <a:pPr lvl="2"/>
+            <a:r>
+              <a:rPr lang="en-US" dirty="0"/>
+              <a:t>Shunit2</a:t>
+            </a:r>
+          </a:p>
+          <a:p>
+            <a:pPr lvl="2"/>
+            <a:r>
+              <a:rPr lang="en-US" dirty="0"/>
+              <a:t>Google </a:t>
+            </a:r>
+            <a:r>
+              <a:rPr lang="en-US" dirty="0" err="1"/>
+              <a:t>FuzzyTest</a:t>
+            </a:r>
+            <a:endParaRPr lang="en-US" dirty="0"/>
+          </a:p>
+          <a:p>
+            <a:r>
+              <a:rPr lang="en-US" dirty="0"/>
+              <a:t>...</a:t>
+            </a:r>
+            <a:endParaRPr lang="LID4096" dirty="0"/>
+          </a:p>
+        </p:txBody>
+      </p:sp>
+      <p:sp>
+        <p:nvSpPr>
+          <p:cNvPr id="4" name="Slide Number Placeholder 3">
+            <a:extLst>
+              <a:ext uri="{FF2B5EF4-FFF2-40B4-BE49-F238E27FC236}">
+                <a16:creationId xmlns:a16="http://schemas.microsoft.com/office/drawing/2014/main" id="{6C502D11-C8B1-FCCE-45DC-355EB5441024}"/>
+              </a:ext>
+            </a:extLst>
+          </p:cNvPr>
+          <p:cNvSpPr>
+            <a:spLocks noGrp="1"/>
+          </p:cNvSpPr>
+          <p:nvPr>
+            <p:ph type="sldNum" sz="quarter" idx="12"/>
+          </p:nvPr>
+        </p:nvSpPr>
+        <p:spPr/>
+        <p:txBody>
+          <a:bodyPr/>
+          <a:lstStyle/>
+          <a:p>
+            <a:fld id="{FDB1AA33-DFBB-49AC-8CEE-23FFECEB5648}" type="slidenum">
+              <a:rPr lang="LID4096" smtClean="0"/>
+              <a:t>23</a:t>
+            </a:fld>
+            <a:endParaRPr lang="LID4096"/>
+          </a:p>
+        </p:txBody>
+      </p:sp>
+    </p:spTree>
+    <p:extLst>
+      <p:ext uri="{BB962C8B-B14F-4D97-AF65-F5344CB8AC3E}">
+        <p14:creationId xmlns:p14="http://schemas.microsoft.com/office/powerpoint/2010/main" val="1505899698"/>
+      </p:ext>
+    </p:extLst>
+  </p:cSld>
+  <p:clrMapOvr>
+    <a:masterClrMapping/>
+  </p:clrMapOvr>
+  <p:timing>
+    <p:tnLst>
+      <p:par>
+        <p:cTn id="1" dur="indefinite" restart="never" nodeType="tmRoot">
+          <p:childTnLst>
+            <p:seq concurrent="1" nextAc="seek">
+              <p:cTn id="2" dur="indefinite" nodeType="mainSeq">
+                <p:childTnLst>
+                  <p:par>
+                    <p:cTn id="3" fill="hold">
+                      <p:stCondLst>
+                        <p:cond delay="indefinite"/>
+                      </p:stCondLst>
+                      <p:childTnLst>
+                        <p:par>
+                          <p:cTn id="4" fill="hold">
+                            <p:stCondLst>
+                              <p:cond delay="0"/>
+                            </p:stCondLst>
+                            <p:childTnLst>
+                              <p:par>
+                                <p:cTn id="5" presetID="1" presetClass="entr" presetSubtype="0" fill="hold" grpId="0" nodeType="clickEffect">
+                                  <p:stCondLst>
+                                    <p:cond delay="0"/>
+                                  </p:stCondLst>
+                                  <p:childTnLst>
+                                    <p:set>
+                                      <p:cBhvr>
+                                        <p:cTn id="6" dur="1" fill="hold">
+                                          <p:stCondLst>
+                                            <p:cond delay="0"/>
+                                          </p:stCondLst>
+                                        </p:cTn>
+                                        <p:tgtEl>
+                                          <p:spTgt spid="3">
+                                            <p:txEl>
+                                              <p:pRg st="0" end="0"/>
+                                            </p:txEl>
+                                          </p:spTgt>
+                                        </p:tgtEl>
+                                        <p:attrNameLst>
+                                          <p:attrName>style.visibility</p:attrName>
+                                        </p:attrNameLst>
+                                      </p:cBhvr>
+                                      <p:to>
+                                        <p:strVal val="visible"/>
+                                      </p:to>
+                                    </p:set>
+                                  </p:childTnLst>
+                                </p:cTn>
+                              </p:par>
+                              <p:par>
+                                <p:cTn id="7" presetID="1" presetClass="entr" presetSubtype="0" fill="hold" grpId="0" nodeType="withEffect">
+                                  <p:stCondLst>
+                                    <p:cond delay="0"/>
+                                  </p:stCondLst>
+                                  <p:childTnLst>
+                                    <p:set>
+                                      <p:cBhvr>
+                                        <p:cTn id="8" dur="1" fill="hold">
+                                          <p:stCondLst>
+                                            <p:cond delay="0"/>
+                                          </p:stCondLst>
+                                        </p:cTn>
+                                        <p:tgtEl>
+                                          <p:spTgt spid="3">
+                                            <p:txEl>
+                                              <p:pRg st="1" end="1"/>
+                                            </p:txEl>
+                                          </p:spTgt>
+                                        </p:tgtEl>
+                                        <p:attrNameLst>
+                                          <p:attrName>style.visibility</p:attrName>
+                                        </p:attrNameLst>
+                                      </p:cBhvr>
+                                      <p:to>
+                                        <p:strVal val="visible"/>
+                                      </p:to>
+                                    </p:set>
+                                  </p:childTnLst>
+                                </p:cTn>
+                              </p:par>
+                              <p:par>
+                                <p:cTn id="9" presetID="1" presetClass="entr" presetSubtype="0" fill="hold" grpId="0" nodeType="withEffect">
+                                  <p:stCondLst>
+                                    <p:cond delay="0"/>
+                                  </p:stCondLst>
+                                  <p:childTnLst>
+                                    <p:set>
+                                      <p:cBhvr>
+                                        <p:cTn id="10" dur="1" fill="hold">
+                                          <p:stCondLst>
+                                            <p:cond delay="0"/>
+                                          </p:stCondLst>
+                                        </p:cTn>
+                                        <p:tgtEl>
+                                          <p:spTgt spid="3">
+                                            <p:txEl>
+                                              <p:pRg st="2" end="2"/>
+                                            </p:txEl>
+                                          </p:spTgt>
+                                        </p:tgtEl>
+                                        <p:attrNameLst>
+                                          <p:attrName>style.visibility</p:attrName>
+                                        </p:attrNameLst>
+                                      </p:cBhvr>
+                                      <p:to>
+                                        <p:strVal val="visible"/>
+                                      </p:to>
+                                    </p:set>
+                                  </p:childTnLst>
+                                </p:cTn>
+                              </p:par>
+                              <p:par>
+                                <p:cTn id="11" presetID="1" presetClass="entr" presetSubtype="0" fill="hold" grpId="0" nodeType="withEffect">
+                                  <p:stCondLst>
+                                    <p:cond delay="0"/>
+                                  </p:stCondLst>
+                                  <p:childTnLst>
+                                    <p:set>
+                                      <p:cBhvr>
+                                        <p:cTn id="12" dur="1" fill="hold">
+                                          <p:stCondLst>
+                                            <p:cond delay="0"/>
+                                          </p:stCondLst>
+                                        </p:cTn>
+                                        <p:tgtEl>
+                                          <p:spTgt spid="3">
+                                            <p:txEl>
+                                              <p:pRg st="3" end="3"/>
+                                            </p:txEl>
+                                          </p:spTgt>
+                                        </p:tgtEl>
+                                        <p:attrNameLst>
+                                          <p:attrName>style.visibility</p:attrName>
+                                        </p:attrNameLst>
+                                      </p:cBhvr>
+                                      <p:to>
+                                        <p:strVal val="visible"/>
+                                      </p:to>
+                                    </p:set>
+                                  </p:childTnLst>
+                                </p:cTn>
+                              </p:par>
+                              <p:par>
+                                <p:cTn id="13" presetID="1" presetClass="entr" presetSubtype="0" fill="hold" grpId="0" nodeType="withEffect">
+                                  <p:stCondLst>
+                                    <p:cond delay="0"/>
+                                  </p:stCondLst>
+                                  <p:childTnLst>
+                                    <p:set>
+                                      <p:cBhvr>
+                                        <p:cTn id="14" dur="1" fill="hold">
+                                          <p:stCondLst>
+                                            <p:cond delay="0"/>
+                                          </p:stCondLst>
+                                        </p:cTn>
+                                        <p:tgtEl>
+                                          <p:spTgt spid="3">
+                                            <p:txEl>
+                                              <p:pRg st="4" end="4"/>
+                                            </p:txEl>
+                                          </p:spTgt>
+                                        </p:tgtEl>
+                                        <p:attrNameLst>
+                                          <p:attrName>style.visibility</p:attrName>
+                                        </p:attrNameLst>
+                                      </p:cBhvr>
+                                      <p:to>
+                                        <p:strVal val="visible"/>
+                                      </p:to>
+                                    </p:set>
+                                  </p:childTnLst>
+                                </p:cTn>
+                              </p:par>
+                              <p:par>
+                                <p:cTn id="15" presetID="1" presetClass="entr" presetSubtype="0" fill="hold" grpId="0" nodeType="withEffect">
+                                  <p:stCondLst>
+                                    <p:cond delay="0"/>
+                                  </p:stCondLst>
+                                  <p:childTnLst>
+                                    <p:set>
+                                      <p:cBhvr>
+                                        <p:cTn id="16" dur="1" fill="hold">
+                                          <p:stCondLst>
+                                            <p:cond delay="0"/>
+                                          </p:stCondLst>
+                                        </p:cTn>
+                                        <p:tgtEl>
+                                          <p:spTgt spid="3">
+                                            <p:txEl>
+                                              <p:pRg st="5" end="5"/>
+                                            </p:txEl>
+                                          </p:spTgt>
+                                        </p:tgtEl>
+                                        <p:attrNameLst>
+                                          <p:attrName>style.visibility</p:attrName>
+                                        </p:attrNameLst>
+                                      </p:cBhvr>
+                                      <p:to>
+                                        <p:strVal val="visible"/>
+                                      </p:to>
+                                    </p:set>
+                                  </p:childTnLst>
+                                </p:cTn>
+                              </p:par>
+                              <p:par>
+                                <p:cTn id="17" presetID="1" presetClass="entr" presetSubtype="0" fill="hold" grpId="0" nodeType="withEffect">
+                                  <p:stCondLst>
+                                    <p:cond delay="0"/>
+                                  </p:stCondLst>
+                                  <p:childTnLst>
+                                    <p:set>
+                                      <p:cBhvr>
+                                        <p:cTn id="18" dur="1" fill="hold">
+                                          <p:stCondLst>
+                                            <p:cond delay="0"/>
+                                          </p:stCondLst>
+                                        </p:cTn>
+                                        <p:tgtEl>
+                                          <p:spTgt spid="3">
+                                            <p:txEl>
+                                              <p:pRg st="6" end="6"/>
+                                            </p:txEl>
+                                          </p:spTgt>
+                                        </p:tgtEl>
+                                        <p:attrNameLst>
+                                          <p:attrName>style.visibility</p:attrName>
+                                        </p:attrNameLst>
+                                      </p:cBhvr>
+                                      <p:to>
+                                        <p:strVal val="visible"/>
+                                      </p:to>
+                                    </p:set>
+                                  </p:childTnLst>
+                                </p:cTn>
+                              </p:par>
+                            </p:childTnLst>
+                          </p:cTn>
+                        </p:par>
+                      </p:childTnLst>
+                    </p:cTn>
+                  </p:par>
+                  <p:par>
+                    <p:cTn id="19" fill="hold">
+                      <p:stCondLst>
+                        <p:cond delay="indefinite"/>
+                      </p:stCondLst>
+                      <p:childTnLst>
+                        <p:par>
+                          <p:cTn id="20" fill="hold">
+                            <p:stCondLst>
+                              <p:cond delay="0"/>
+                            </p:stCondLst>
+                            <p:childTnLst>
+                              <p:par>
+                                <p:cTn id="21" presetID="1" presetClass="entr" presetSubtype="0" fill="hold" grpId="0" nodeType="clickEffect">
+                                  <p:stCondLst>
+                                    <p:cond delay="0"/>
+                                  </p:stCondLst>
+                                  <p:childTnLst>
+                                    <p:set>
+                                      <p:cBhvr>
+                                        <p:cTn id="22" dur="1" fill="hold">
+                                          <p:stCondLst>
+                                            <p:cond delay="0"/>
+                                          </p:stCondLst>
+                                        </p:cTn>
+                                        <p:tgtEl>
+                                          <p:spTgt spid="3">
+                                            <p:txEl>
+                                              <p:pRg st="7" end="7"/>
+                                            </p:txEl>
+                                          </p:spTgt>
+                                        </p:tgtEl>
+                                        <p:attrNameLst>
+                                          <p:attrName>style.visibility</p:attrName>
+                                        </p:attrNameLst>
+                                      </p:cBhvr>
+                                      <p:to>
+                                        <p:strVal val="visible"/>
+                                      </p:to>
+                                    </p:set>
+                                  </p:childTnLst>
+                                </p:cTn>
+                              </p:par>
+                              <p:par>
+                                <p:cTn id="23" presetID="1" presetClass="entr" presetSubtype="0" fill="hold" grpId="0" nodeType="withEffect">
+                                  <p:stCondLst>
+                                    <p:cond delay="0"/>
+                                  </p:stCondLst>
+                                  <p:childTnLst>
+                                    <p:set>
+                                      <p:cBhvr>
+                                        <p:cTn id="24" dur="1" fill="hold">
+                                          <p:stCondLst>
+                                            <p:cond delay="0"/>
+                                          </p:stCondLst>
+                                        </p:cTn>
+                                        <p:tgtEl>
+                                          <p:spTgt spid="3">
+                                            <p:txEl>
+                                              <p:pRg st="8" end="8"/>
+                                            </p:txEl>
+                                          </p:spTgt>
+                                        </p:tgtEl>
+                                        <p:attrNameLst>
+                                          <p:attrName>style.visibility</p:attrName>
+                                        </p:attrNameLst>
+                                      </p:cBhvr>
+                                      <p:to>
+                                        <p:strVal val="visible"/>
+                                      </p:to>
+                                    </p:set>
+                                  </p:childTnLst>
+                                </p:cTn>
+                              </p:par>
+                              <p:par>
+                                <p:cTn id="25" presetID="1" presetClass="entr" presetSubtype="0" fill="hold" grpId="0" nodeType="withEffect">
+                                  <p:stCondLst>
+                                    <p:cond delay="0"/>
+                                  </p:stCondLst>
+                                  <p:childTnLst>
+                                    <p:set>
+                                      <p:cBhvr>
+                                        <p:cTn id="26" dur="1" fill="hold">
+                                          <p:stCondLst>
+                                            <p:cond delay="0"/>
+                                          </p:stCondLst>
+                                        </p:cTn>
+                                        <p:tgtEl>
+                                          <p:spTgt spid="3">
+                                            <p:txEl>
+                                              <p:pRg st="9" end="9"/>
+                                            </p:txEl>
+                                          </p:spTgt>
+                                        </p:tgtEl>
+                                        <p:attrNameLst>
+                                          <p:attrName>style.visibility</p:attrName>
+                                        </p:attrNameLst>
+                                      </p:cBhvr>
+                                      <p:to>
+                                        <p:strVal val="visible"/>
+                                      </p:to>
+                                    </p:set>
+                                  </p:childTnLst>
+                                </p:cTn>
+                              </p:par>
+                              <p:par>
+                                <p:cTn id="27" presetID="1" presetClass="entr" presetSubtype="0" fill="hold" grpId="0" nodeType="withEffect">
+                                  <p:stCondLst>
+                                    <p:cond delay="0"/>
+                                  </p:stCondLst>
+                                  <p:childTnLst>
+                                    <p:set>
+                                      <p:cBhvr>
+                                        <p:cTn id="28" dur="1" fill="hold">
+                                          <p:stCondLst>
+                                            <p:cond delay="0"/>
+                                          </p:stCondLst>
+                                        </p:cTn>
+                                        <p:tgtEl>
+                                          <p:spTgt spid="3">
+                                            <p:txEl>
+                                              <p:pRg st="10" end="10"/>
+                                            </p:txEl>
+                                          </p:spTgt>
+                                        </p:tgtEl>
+                                        <p:attrNameLst>
+                                          <p:attrName>style.visibility</p:attrName>
+                                        </p:attrNameLst>
+                                      </p:cBhvr>
+                                      <p:to>
+                                        <p:strVal val="visible"/>
+                                      </p:to>
+                                    </p:set>
+                                  </p:childTnLst>
+                                </p:cTn>
+                              </p:par>
+                              <p:par>
+                                <p:cTn id="29" presetID="1" presetClass="entr" presetSubtype="0" fill="hold" grpId="0" nodeType="withEffect">
+                                  <p:stCondLst>
+                                    <p:cond delay="0"/>
+                                  </p:stCondLst>
+                                  <p:childTnLst>
+                                    <p:set>
+                                      <p:cBhvr>
+                                        <p:cTn id="30" dur="1" fill="hold">
+                                          <p:stCondLst>
+                                            <p:cond delay="0"/>
+                                          </p:stCondLst>
+                                        </p:cTn>
+                                        <p:tgtEl>
+                                          <p:spTgt spid="3">
+                                            <p:txEl>
+                                              <p:pRg st="11" end="11"/>
+                                            </p:txEl>
+                                          </p:spTgt>
+                                        </p:tgtEl>
+                                        <p:attrNameLst>
+                                          <p:attrName>style.visibility</p:attrName>
+                                        </p:attrNameLst>
+                                      </p:cBhvr>
+                                      <p:to>
+                                        <p:strVal val="visible"/>
+                                      </p:to>
+                                    </p:set>
+                                  </p:childTnLst>
+                                </p:cTn>
+                              </p:par>
+                              <p:par>
+                                <p:cTn id="31" presetID="1" presetClass="entr" presetSubtype="0" fill="hold" grpId="0" nodeType="withEffect">
+                                  <p:stCondLst>
+                                    <p:cond delay="0"/>
+                                  </p:stCondLst>
+                                  <p:childTnLst>
+                                    <p:set>
+                                      <p:cBhvr>
+                                        <p:cTn id="32" dur="1" fill="hold">
+                                          <p:stCondLst>
+                                            <p:cond delay="0"/>
+                                          </p:stCondLst>
+                                        </p:cTn>
+                                        <p:tgtEl>
+                                          <p:spTgt spid="3">
+                                            <p:txEl>
+                                              <p:pRg st="12" end="12"/>
+                                            </p:txEl>
+                                          </p:spTgt>
+                                        </p:tgtEl>
+                                        <p:attrNameLst>
+                                          <p:attrName>style.visibility</p:attrName>
+                                        </p:attrNameLst>
+                                      </p:cBhvr>
+                                      <p:to>
+                                        <p:strVal val="visible"/>
+                                      </p:to>
+                                    </p:set>
+                                  </p:childTnLst>
+                                </p:cTn>
+                              </p:par>
+                            </p:childTnLst>
+                          </p:cTn>
+                        </p:par>
+                      </p:childTnLst>
+                    </p:cTn>
+                  </p:par>
+                  <p:par>
+                    <p:cTn id="33" fill="hold">
+                      <p:stCondLst>
+                        <p:cond delay="indefinite"/>
+                      </p:stCondLst>
+                      <p:childTnLst>
+                        <p:par>
+                          <p:cTn id="34" fill="hold">
+                            <p:stCondLst>
+                              <p:cond delay="0"/>
+                            </p:stCondLst>
+                            <p:childTnLst>
+                              <p:par>
+                                <p:cTn id="35" presetID="1" presetClass="entr" presetSubtype="0" fill="hold" grpId="0" nodeType="clickEffect">
+                                  <p:stCondLst>
+                                    <p:cond delay="0"/>
+                                  </p:stCondLst>
+                                  <p:childTnLst>
+                                    <p:set>
+                                      <p:cBhvr>
+                                        <p:cTn id="36" dur="1" fill="hold">
+                                          <p:stCondLst>
+                                            <p:cond delay="0"/>
+                                          </p:stCondLst>
+                                        </p:cTn>
+                                        <p:tgtEl>
+                                          <p:spTgt spid="3">
+                                            <p:txEl>
+                                              <p:pRg st="13" end="13"/>
+                                            </p:txEl>
+                                          </p:spTgt>
+                                        </p:tgtEl>
+                                        <p:attrNameLst>
+                                          <p:attrName>style.visibility</p:attrName>
+                                        </p:attrNameLst>
+                                      </p:cBhvr>
+                                      <p:to>
+                                        <p:strVal val="visible"/>
+                                      </p:to>
+                                    </p:set>
+                                  </p:childTnLst>
+                                </p:cTn>
+                              </p:par>
+                            </p:childTnLst>
+                          </p:cTn>
+                        </p:par>
+                      </p:childTnLst>
+                    </p:cTn>
+                  </p:par>
+                </p:childTnLst>
+              </p:cTn>
+              <p:prevCondLst>
+                <p:cond evt="onPrev" delay="0">
+                  <p:tgtEl>
+                    <p:sldTgt/>
+                  </p:tgtEl>
+                </p:cond>
+              </p:prevCondLst>
+              <p:nextCondLst>
+                <p:cond evt="onNext" delay="0">
+                  <p:tgtEl>
+                    <p:sldTgt/>
+                  </p:tgtEl>
+                </p:cond>
+              </p:nextCondLst>
+            </p:seq>
+          </p:childTnLst>
+        </p:cTn>
+      </p:par>
+    </p:tnLst>
+    <p:bldLst>
+      <p:bldP spid="3" grpId="0" uiExpand="1" build="p"/>
+    </p:bldLst>
+  </p:timing>
+</p:sld>
+</file>
+
+<file path=ppt/slides/slide24.xml><?xml version="1.0" encoding="utf-8"?>
+<p:sld xmlns:a="http://schemas.openxmlformats.org/drawingml/2006/main" xmlns:r="http://schemas.openxmlformats.org/officeDocument/2006/relationships" xmlns:p="http://schemas.openxmlformats.org/presentationml/2006/main">
+  <p:cSld>
+    <p:spTree>
+      <p:nvGrpSpPr>
+        <p:cNvPr id="1" name=""/>
+        <p:cNvGrpSpPr/>
+        <p:nvPr/>
+      </p:nvGrpSpPr>
+      <p:grpSpPr>
+        <a:xfrm>
+          <a:off x="0" y="0"/>
+          <a:ext cx="0" cy="0"/>
+          <a:chOff x="0" y="0"/>
+          <a:chExt cx="0" cy="0"/>
+        </a:xfrm>
+      </p:grpSpPr>
+      <p:sp>
+        <p:nvSpPr>
+          <p:cNvPr id="4" name="Title 3"/>
+          <p:cNvSpPr>
+            <a:spLocks noGrp="1"/>
+          </p:cNvSpPr>
+          <p:nvPr>
+            <p:ph type="title"/>
+          </p:nvPr>
+        </p:nvSpPr>
+        <p:spPr/>
+        <p:txBody>
+          <a:bodyPr/>
+          <a:lstStyle/>
+          <a:p>
+            <a:r>
+              <a:rPr lang="en-US" dirty="0"/>
+              <a:t>Unit testing</a:t>
+            </a:r>
+            <a:endParaRPr lang="nl-BE" dirty="0"/>
+          </a:p>
+        </p:txBody>
+      </p:sp>
+      <p:sp>
+        <p:nvSpPr>
+          <p:cNvPr id="5" name="Content Placeholder 4"/>
+          <p:cNvSpPr>
+            <a:spLocks noGrp="1"/>
+          </p:cNvSpPr>
+          <p:nvPr>
+            <p:ph idx="1"/>
+          </p:nvPr>
+        </p:nvSpPr>
+        <p:spPr>
+          <a:xfrm>
+            <a:off x="838200" y="1825625"/>
+            <a:ext cx="10515600" cy="4074629"/>
+          </a:xfrm>
+        </p:spPr>
+        <p:txBody>
+          <a:bodyPr>
+            <a:normAutofit fontScale="92500" lnSpcReduction="10000"/>
+          </a:bodyPr>
+          <a:lstStyle/>
+          <a:p>
+            <a:r>
+              <a:rPr lang="en-US" dirty="0"/>
+              <a:t>Key concepts</a:t>
+            </a:r>
+          </a:p>
+          <a:p>
+            <a:pPr lvl="1"/>
+            <a:r>
+              <a:rPr lang="en-US" dirty="0"/>
+              <a:t>Implementation tested through API</a:t>
+            </a:r>
+          </a:p>
+          <a:p>
+            <a:pPr lvl="1"/>
+            <a:r>
+              <a:rPr lang="en-US" dirty="0"/>
+              <a:t>Testing should be easy</a:t>
+            </a:r>
+          </a:p>
+          <a:p>
+            <a:pPr lvl="1"/>
+            <a:r>
+              <a:rPr lang="en-US" dirty="0"/>
+              <a:t>Tests are independent of one another</a:t>
+            </a:r>
+          </a:p>
+          <a:p>
+            <a:r>
+              <a:rPr lang="en-US" dirty="0"/>
+              <a:t>Find problems early/fast</a:t>
+            </a:r>
+          </a:p>
+          <a:p>
+            <a:r>
+              <a:rPr lang="en-US" dirty="0"/>
+              <a:t>Facilitates change</a:t>
+            </a:r>
+          </a:p>
+          <a:p>
+            <a:pPr lvl="1"/>
+            <a:r>
+              <a:rPr lang="en-US" dirty="0"/>
+              <a:t>Make small change, run tests</a:t>
+            </a:r>
+          </a:p>
+          <a:p>
+            <a:r>
+              <a:rPr lang="en-US" dirty="0"/>
+              <a:t>TDD: Test Driven Development</a:t>
+            </a:r>
+          </a:p>
+          <a:p>
+            <a:pPr lvl="1"/>
+            <a:r>
+              <a:rPr lang="en-US" dirty="0"/>
+              <a:t>Write tests first, then implement</a:t>
+            </a:r>
+          </a:p>
+          <a:p>
+            <a:r>
+              <a:rPr lang="en-US" dirty="0"/>
+              <a:t>Programming framework, e.g., Catch2</a:t>
+            </a:r>
+            <a:endParaRPr lang="nl-BE" dirty="0"/>
+          </a:p>
+        </p:txBody>
+      </p:sp>
+      <p:grpSp>
+        <p:nvGrpSpPr>
+          <p:cNvPr id="6" name="Group 5"/>
+          <p:cNvGrpSpPr/>
+          <p:nvPr/>
+        </p:nvGrpSpPr>
+        <p:grpSpPr>
+          <a:xfrm>
+            <a:off x="7320137" y="3284985"/>
+            <a:ext cx="3155315" cy="1980559"/>
+            <a:chOff x="4821276" y="3871774"/>
+            <a:chExt cx="3155315" cy="1980559"/>
+          </a:xfrm>
+        </p:grpSpPr>
+        <p:sp>
+          <p:nvSpPr>
+            <p:cNvPr id="7" name="Rounded Rectangle 6"/>
+            <p:cNvSpPr/>
+            <p:nvPr/>
+          </p:nvSpPr>
+          <p:spPr>
+            <a:xfrm>
+              <a:off x="4821276" y="3871774"/>
+              <a:ext cx="3155315" cy="1980559"/>
+            </a:xfrm>
+            <a:prstGeom prst="roundRect">
+              <a:avLst/>
+            </a:prstGeom>
+            <a:solidFill>
+              <a:schemeClr val="bg1"/>
+            </a:solidFill>
+            <a:ln>
+              <a:solidFill>
+                <a:srgbClr val="0070C0"/>
+              </a:solidFill>
+            </a:ln>
+          </p:spPr>
+          <p:style>
+            <a:lnRef idx="2">
+              <a:schemeClr val="accent1">
+                <a:shade val="50000"/>
+              </a:schemeClr>
+            </a:lnRef>
+            <a:fillRef idx="1">
+              <a:schemeClr val="accent1"/>
+            </a:fillRef>
+            <a:effectRef idx="0">
+              <a:schemeClr val="accent1"/>
+            </a:effectRef>
+            <a:fontRef idx="minor">
+              <a:schemeClr val="lt1"/>
+            </a:fontRef>
+          </p:style>
+          <p:txBody>
+            <a:bodyPr rtlCol="0" anchor="ctr"/>
+            <a:lstStyle/>
+            <a:p>
+              <a:pPr algn="ctr"/>
+              <a:endParaRPr lang="en-US">
+                <a:solidFill>
+                  <a:prstClr val="white"/>
+                </a:solidFill>
+                <a:latin typeface="Calibri"/>
+              </a:endParaRPr>
+            </a:p>
+          </p:txBody>
+        </p:sp>
+        <p:sp>
+          <p:nvSpPr>
+            <p:cNvPr id="8" name="TextBox 7"/>
+            <p:cNvSpPr txBox="1"/>
+            <p:nvPr/>
+          </p:nvSpPr>
+          <p:spPr>
+            <a:xfrm>
+              <a:off x="4860032" y="3896713"/>
+              <a:ext cx="3116559" cy="1477328"/>
+            </a:xfrm>
+            <a:prstGeom prst="rect">
+              <a:avLst/>
+            </a:prstGeom>
+            <a:noFill/>
+          </p:spPr>
+          <p:txBody>
+            <a:bodyPr wrap="none" rtlCol="0">
+              <a:spAutoFit/>
+            </a:bodyPr>
+            <a:lstStyle/>
+            <a:p>
+              <a:pPr algn="just"/>
+              <a:r>
+                <a:rPr lang="en-US" dirty="0">
+                  <a:solidFill>
+                    <a:srgbClr val="0070C0"/>
+                  </a:solidFill>
+                  <a:latin typeface="Informal Roman" panose="030604020304060B0204" pitchFamily="66" charset="0"/>
+                </a:rPr>
+                <a:t>"How to test?" is a question that</a:t>
+              </a:r>
+            </a:p>
+            <a:p>
+              <a:pPr algn="just"/>
+              <a:r>
+                <a:rPr lang="en-US" dirty="0">
+                  <a:solidFill>
+                    <a:srgbClr val="0070C0"/>
+                  </a:solidFill>
+                  <a:latin typeface="Informal Roman" panose="030604020304060B0204" pitchFamily="66" charset="0"/>
+                </a:rPr>
+                <a:t>cannot be answered in general.</a:t>
+              </a:r>
+            </a:p>
+            <a:p>
+              <a:pPr algn="just"/>
+              <a:r>
+                <a:rPr lang="en-US" dirty="0">
+                  <a:solidFill>
+                    <a:srgbClr val="0070C0"/>
+                  </a:solidFill>
+                  <a:latin typeface="Informal Roman" panose="030604020304060B0204" pitchFamily="66" charset="0"/>
+                </a:rPr>
+                <a:t>"When to test?" however, does have</a:t>
+              </a:r>
+            </a:p>
+            <a:p>
+              <a:pPr algn="just"/>
+              <a:r>
+                <a:rPr lang="en-US" dirty="0">
+                  <a:solidFill>
+                    <a:srgbClr val="0070C0"/>
+                  </a:solidFill>
+                  <a:latin typeface="Informal Roman" panose="030604020304060B0204" pitchFamily="66" charset="0"/>
+                </a:rPr>
+                <a:t>a general answer: as early and as</a:t>
+              </a:r>
+            </a:p>
+            <a:p>
+              <a:pPr algn="just"/>
+              <a:r>
+                <a:rPr lang="en-US" dirty="0">
+                  <a:solidFill>
+                    <a:srgbClr val="0070C0"/>
+                  </a:solidFill>
+                  <a:latin typeface="Informal Roman" panose="030604020304060B0204" pitchFamily="66" charset="0"/>
+                </a:rPr>
+                <a:t>often as possible.</a:t>
+              </a:r>
+            </a:p>
+          </p:txBody>
+        </p:sp>
+        <p:sp>
+          <p:nvSpPr>
+            <p:cNvPr id="9" name="TextBox 8"/>
+            <p:cNvSpPr txBox="1"/>
+            <p:nvPr/>
+          </p:nvSpPr>
+          <p:spPr>
+            <a:xfrm>
+              <a:off x="5839790" y="5408069"/>
+              <a:ext cx="1887824" cy="338554"/>
+            </a:xfrm>
+            <a:prstGeom prst="rect">
+              <a:avLst/>
+            </a:prstGeom>
+            <a:noFill/>
+          </p:spPr>
+          <p:txBody>
+            <a:bodyPr wrap="none" rtlCol="0">
+              <a:spAutoFit/>
+            </a:bodyPr>
+            <a:lstStyle/>
+            <a:p>
+              <a:r>
+                <a:rPr lang="en-US" sz="1600" dirty="0">
+                  <a:solidFill>
+                    <a:srgbClr val="0070C0"/>
+                  </a:solidFill>
+                  <a:latin typeface="Calibri"/>
+                </a:rPr>
+                <a:t>— Bjarne </a:t>
+              </a:r>
+              <a:r>
+                <a:rPr lang="en-US" sz="1600" dirty="0" err="1">
+                  <a:solidFill>
+                    <a:srgbClr val="0070C0"/>
+                  </a:solidFill>
+                  <a:latin typeface="Calibri"/>
+                </a:rPr>
+                <a:t>Stroustrup</a:t>
+              </a:r>
+              <a:endParaRPr lang="en-US" sz="1600" dirty="0">
+                <a:solidFill>
+                  <a:srgbClr val="0070C0"/>
+                </a:solidFill>
+                <a:latin typeface="Calibri"/>
+              </a:endParaRPr>
+            </a:p>
+          </p:txBody>
+        </p:sp>
+      </p:grpSp>
+      <p:sp>
+        <p:nvSpPr>
+          <p:cNvPr id="2" name="TextBox 1">
+            <a:extLst>
+              <a:ext uri="{FF2B5EF4-FFF2-40B4-BE49-F238E27FC236}">
+                <a16:creationId xmlns:a16="http://schemas.microsoft.com/office/drawing/2014/main" id="{625959B0-A5E0-E823-3BE8-2CAE1318BB5B}"/>
+              </a:ext>
+            </a:extLst>
+          </p:cNvPr>
+          <p:cNvSpPr txBox="1"/>
+          <p:nvPr/>
+        </p:nvSpPr>
+        <p:spPr>
+          <a:xfrm>
+            <a:off x="92564" y="5628104"/>
+            <a:ext cx="11976612" cy="707886"/>
+          </a:xfrm>
+          <a:prstGeom prst="rect">
+            <a:avLst/>
+          </a:prstGeom>
+          <a:noFill/>
+          <a:ln>
+            <a:solidFill>
+              <a:schemeClr val="tx1"/>
+            </a:solidFill>
+          </a:ln>
+        </p:spPr>
+        <p:txBody>
+          <a:bodyPr wrap="none" rtlCol="0">
+            <a:spAutoFit/>
+          </a:bodyPr>
+          <a:lstStyle/>
+          <a:p>
+            <a:r>
+              <a:rPr lang="en-US" sz="2000" dirty="0"/>
+              <a:t>See</a:t>
+            </a:r>
+          </a:p>
+          <a:p>
+            <a:r>
+              <a:rPr lang="en-US" sz="2000" dirty="0">
+                <a:hlinkClick r:id="rId2"/>
+              </a:rPr>
+              <a:t>https://github.com/gjbex/C-plus-plus-software-engineering/tree/development/source-code/testing/catch2</a:t>
+            </a:r>
+            <a:r>
+              <a:rPr lang="en-US" sz="2000" dirty="0"/>
+              <a:t> </a:t>
+            </a:r>
+            <a:endParaRPr lang="LID4096" sz="2000" dirty="0"/>
+          </a:p>
+        </p:txBody>
+      </p:sp>
+      <p:sp>
+        <p:nvSpPr>
+          <p:cNvPr id="3" name="Slide Number Placeholder 2">
+            <a:extLst>
+              <a:ext uri="{FF2B5EF4-FFF2-40B4-BE49-F238E27FC236}">
+                <a16:creationId xmlns:a16="http://schemas.microsoft.com/office/drawing/2014/main" id="{83815017-2C3F-178B-ED98-26815A80D881}"/>
+              </a:ext>
+            </a:extLst>
+          </p:cNvPr>
+          <p:cNvSpPr>
+            <a:spLocks noGrp="1"/>
+          </p:cNvSpPr>
+          <p:nvPr>
+            <p:ph type="sldNum" sz="quarter" idx="12"/>
+          </p:nvPr>
+        </p:nvSpPr>
+        <p:spPr/>
+        <p:txBody>
+          <a:bodyPr/>
+          <a:lstStyle/>
+          <a:p>
+            <a:fld id="{FDB1AA33-DFBB-49AC-8CEE-23FFECEB5648}" type="slidenum">
+              <a:rPr lang="LID4096" smtClean="0"/>
+              <a:t>24</a:t>
+            </a:fld>
+            <a:endParaRPr lang="LID4096"/>
+          </a:p>
+        </p:txBody>
+      </p:sp>
+    </p:spTree>
+    <p:extLst>
+      <p:ext uri="{BB962C8B-B14F-4D97-AF65-F5344CB8AC3E}">
+        <p14:creationId xmlns:p14="http://schemas.microsoft.com/office/powerpoint/2010/main" val="54639014"/>
+      </p:ext>
+    </p:extLst>
+  </p:cSld>
+  <p:clrMapOvr>
+    <a:masterClrMapping/>
+  </p:clrMapOvr>
+  <p:timing>
+    <p:tnLst>
+      <p:par>
+        <p:cTn id="1" dur="indefinite" restart="never" nodeType="tmRoot">
+          <p:childTnLst>
+            <p:seq concurrent="1" nextAc="seek">
+              <p:cTn id="2" dur="indefinite" nodeType="mainSeq">
+                <p:childTnLst>
+                  <p:par>
+                    <p:cTn id="3" fill="hold">
+                      <p:stCondLst>
+                        <p:cond delay="indefinite"/>
+                        <p:cond evt="onBegin" delay="0">
+                          <p:tn val="2"/>
+                        </p:cond>
+                      </p:stCondLst>
+                      <p:childTnLst>
+                        <p:par>
+                          <p:cTn id="4" fill="hold">
+                            <p:stCondLst>
+                              <p:cond delay="0"/>
+                            </p:stCondLst>
+                            <p:childTnLst>
+                              <p:par>
+                                <p:cTn id="5" presetID="1" presetClass="entr" presetSubtype="0" fill="hold" grpId="0" nodeType="withEffect">
+                                  <p:stCondLst>
+                                    <p:cond delay="0"/>
+                                  </p:stCondLst>
+                                  <p:childTnLst>
+                                    <p:set>
+                                      <p:cBhvr>
+                                        <p:cTn id="6" dur="1" fill="hold">
+                                          <p:stCondLst>
+                                            <p:cond delay="0"/>
+                                          </p:stCondLst>
+                                        </p:cTn>
+                                        <p:tgtEl>
+                                          <p:spTgt spid="5">
+                                            <p:txEl>
+                                              <p:pRg st="0" end="0"/>
+                                            </p:txEl>
+                                          </p:spTgt>
+                                        </p:tgtEl>
+                                        <p:attrNameLst>
+                                          <p:attrName>style.visibility</p:attrName>
+                                        </p:attrNameLst>
+                                      </p:cBhvr>
+                                      <p:to>
+                                        <p:strVal val="visible"/>
+                                      </p:to>
+                                    </p:set>
+                                  </p:childTnLst>
+                                </p:cTn>
+                              </p:par>
+                              <p:par>
+                                <p:cTn id="7" presetID="1" presetClass="entr" presetSubtype="0" fill="hold" grpId="0" nodeType="withEffect">
+                                  <p:stCondLst>
+                                    <p:cond delay="0"/>
+                                  </p:stCondLst>
+                                  <p:childTnLst>
+                                    <p:set>
+                                      <p:cBhvr>
+                                        <p:cTn id="8" dur="1" fill="hold">
+                                          <p:stCondLst>
+                                            <p:cond delay="0"/>
+                                          </p:stCondLst>
+                                        </p:cTn>
+                                        <p:tgtEl>
+                                          <p:spTgt spid="5">
+                                            <p:txEl>
+                                              <p:pRg st="1" end="1"/>
+                                            </p:txEl>
+                                          </p:spTgt>
+                                        </p:tgtEl>
+                                        <p:attrNameLst>
+                                          <p:attrName>style.visibility</p:attrName>
+                                        </p:attrNameLst>
+                                      </p:cBhvr>
+                                      <p:to>
+                                        <p:strVal val="visible"/>
+                                      </p:to>
+                                    </p:set>
+                                  </p:childTnLst>
+                                </p:cTn>
+                              </p:par>
+                              <p:par>
+                                <p:cTn id="9" presetID="1" presetClass="entr" presetSubtype="0" fill="hold" grpId="0" nodeType="withEffect">
+                                  <p:stCondLst>
+                                    <p:cond delay="0"/>
+                                  </p:stCondLst>
+                                  <p:childTnLst>
+                                    <p:set>
+                                      <p:cBhvr>
+                                        <p:cTn id="10" dur="1" fill="hold">
+                                          <p:stCondLst>
+                                            <p:cond delay="0"/>
+                                          </p:stCondLst>
+                                        </p:cTn>
+                                        <p:tgtEl>
+                                          <p:spTgt spid="5">
+                                            <p:txEl>
+                                              <p:pRg st="2" end="2"/>
+                                            </p:txEl>
+                                          </p:spTgt>
+                                        </p:tgtEl>
+                                        <p:attrNameLst>
+                                          <p:attrName>style.visibility</p:attrName>
+                                        </p:attrNameLst>
+                                      </p:cBhvr>
+                                      <p:to>
+                                        <p:strVal val="visible"/>
+                                      </p:to>
+                                    </p:set>
+                                  </p:childTnLst>
+                                </p:cTn>
+                              </p:par>
+                              <p:par>
+                                <p:cTn id="11" presetID="1" presetClass="entr" presetSubtype="0" fill="hold" grpId="0" nodeType="withEffect">
+                                  <p:stCondLst>
+                                    <p:cond delay="0"/>
+                                  </p:stCondLst>
+                                  <p:childTnLst>
+                                    <p:set>
+                                      <p:cBhvr>
+                                        <p:cTn id="12" dur="1" fill="hold">
+                                          <p:stCondLst>
+                                            <p:cond delay="0"/>
+                                          </p:stCondLst>
+                                        </p:cTn>
+                                        <p:tgtEl>
+                                          <p:spTgt spid="5">
+                                            <p:txEl>
+                                              <p:pRg st="3" end="3"/>
+                                            </p:txEl>
+                                          </p:spTgt>
+                                        </p:tgtEl>
+                                        <p:attrNameLst>
+                                          <p:attrName>style.visibility</p:attrName>
+                                        </p:attrNameLst>
+                                      </p:cBhvr>
+                                      <p:to>
+                                        <p:strVal val="visible"/>
+                                      </p:to>
+                                    </p:set>
+                                  </p:childTnLst>
+                                </p:cTn>
+                              </p:par>
+                            </p:childTnLst>
+                          </p:cTn>
+                        </p:par>
+                      </p:childTnLst>
+                    </p:cTn>
+                  </p:par>
+                  <p:par>
+                    <p:cTn id="13" fill="hold">
+                      <p:stCondLst>
+                        <p:cond delay="indefinite"/>
+                      </p:stCondLst>
+                      <p:childTnLst>
+                        <p:par>
+                          <p:cTn id="14" fill="hold">
+                            <p:stCondLst>
+                              <p:cond delay="0"/>
+                            </p:stCondLst>
+                            <p:childTnLst>
+                              <p:par>
+                                <p:cTn id="15" presetID="1" presetClass="entr" presetSubtype="0" fill="hold" grpId="0" nodeType="clickEffect">
+                                  <p:stCondLst>
+                                    <p:cond delay="0"/>
+                                  </p:stCondLst>
+                                  <p:childTnLst>
+                                    <p:set>
+                                      <p:cBhvr>
+                                        <p:cTn id="16" dur="1" fill="hold">
+                                          <p:stCondLst>
+                                            <p:cond delay="0"/>
+                                          </p:stCondLst>
+                                        </p:cTn>
+                                        <p:tgtEl>
+                                          <p:spTgt spid="5">
+                                            <p:txEl>
+                                              <p:pRg st="4" end="4"/>
+                                            </p:txEl>
+                                          </p:spTgt>
+                                        </p:tgtEl>
+                                        <p:attrNameLst>
+                                          <p:attrName>style.visibility</p:attrName>
+                                        </p:attrNameLst>
+                                      </p:cBhvr>
+                                      <p:to>
+                                        <p:strVal val="visible"/>
+                                      </p:to>
+                                    </p:set>
+                                  </p:childTnLst>
+                                </p:cTn>
+                              </p:par>
+                            </p:childTnLst>
+                          </p:cTn>
+                        </p:par>
+                      </p:childTnLst>
+                    </p:cTn>
+                  </p:par>
+                  <p:par>
+                    <p:cTn id="17" fill="hold">
+                      <p:stCondLst>
+                        <p:cond delay="indefinite"/>
+                      </p:stCondLst>
+                      <p:childTnLst>
+                        <p:par>
+                          <p:cTn id="18" fill="hold">
+                            <p:stCondLst>
+                              <p:cond delay="0"/>
+                            </p:stCondLst>
+                            <p:childTnLst>
+                              <p:par>
+                                <p:cTn id="19" presetID="1" presetClass="entr" presetSubtype="0" fill="hold" grpId="0" nodeType="clickEffect">
+                                  <p:stCondLst>
+                                    <p:cond delay="0"/>
+                                  </p:stCondLst>
+                                  <p:childTnLst>
+                                    <p:set>
+                                      <p:cBhvr>
+                                        <p:cTn id="20" dur="1" fill="hold">
+                                          <p:stCondLst>
+                                            <p:cond delay="0"/>
+                                          </p:stCondLst>
+                                        </p:cTn>
+                                        <p:tgtEl>
+                                          <p:spTgt spid="5">
+                                            <p:txEl>
+                                              <p:pRg st="5" end="5"/>
+                                            </p:txEl>
+                                          </p:spTgt>
+                                        </p:tgtEl>
+                                        <p:attrNameLst>
+                                          <p:attrName>style.visibility</p:attrName>
+                                        </p:attrNameLst>
+                                      </p:cBhvr>
+                                      <p:to>
+                                        <p:strVal val="visible"/>
+                                      </p:to>
+                                    </p:set>
+                                  </p:childTnLst>
+                                </p:cTn>
+                              </p:par>
+                              <p:par>
+                                <p:cTn id="21" presetID="1" presetClass="entr" presetSubtype="0" fill="hold" grpId="0" nodeType="withEffect">
+                                  <p:stCondLst>
+                                    <p:cond delay="0"/>
+                                  </p:stCondLst>
+                                  <p:childTnLst>
+                                    <p:set>
+                                      <p:cBhvr>
+                                        <p:cTn id="22" dur="1" fill="hold">
+                                          <p:stCondLst>
+                                            <p:cond delay="0"/>
+                                          </p:stCondLst>
+                                        </p:cTn>
+                                        <p:tgtEl>
+                                          <p:spTgt spid="5">
+                                            <p:txEl>
+                                              <p:pRg st="6" end="6"/>
+                                            </p:txEl>
+                                          </p:spTgt>
+                                        </p:tgtEl>
+                                        <p:attrNameLst>
+                                          <p:attrName>style.visibility</p:attrName>
+                                        </p:attrNameLst>
+                                      </p:cBhvr>
+                                      <p:to>
+                                        <p:strVal val="visible"/>
+                                      </p:to>
+                                    </p:set>
+                                  </p:childTnLst>
+                                </p:cTn>
+                              </p:par>
+                            </p:childTnLst>
+                          </p:cTn>
+                        </p:par>
+                      </p:childTnLst>
+                    </p:cTn>
+                  </p:par>
+                  <p:par>
+                    <p:cTn id="23" fill="hold">
+                      <p:stCondLst>
+                        <p:cond delay="indefinite"/>
+                      </p:stCondLst>
+                      <p:childTnLst>
+                        <p:par>
+                          <p:cTn id="24" fill="hold">
+                            <p:stCondLst>
+                              <p:cond delay="0"/>
+                            </p:stCondLst>
+                            <p:childTnLst>
+                              <p:par>
+                                <p:cTn id="25" presetID="1" presetClass="entr" presetSubtype="0" fill="hold" grpId="0" nodeType="clickEffect">
+                                  <p:stCondLst>
+                                    <p:cond delay="0"/>
+                                  </p:stCondLst>
+                                  <p:childTnLst>
+                                    <p:set>
+                                      <p:cBhvr>
+                                        <p:cTn id="26" dur="1" fill="hold">
+                                          <p:stCondLst>
+                                            <p:cond delay="0"/>
+                                          </p:stCondLst>
+                                        </p:cTn>
+                                        <p:tgtEl>
+                                          <p:spTgt spid="5">
+                                            <p:txEl>
+                                              <p:pRg st="7" end="7"/>
+                                            </p:txEl>
+                                          </p:spTgt>
+                                        </p:tgtEl>
+                                        <p:attrNameLst>
+                                          <p:attrName>style.visibility</p:attrName>
+                                        </p:attrNameLst>
+                                      </p:cBhvr>
+                                      <p:to>
+                                        <p:strVal val="visible"/>
+                                      </p:to>
+                                    </p:set>
+                                  </p:childTnLst>
+                                </p:cTn>
+                              </p:par>
+                              <p:par>
+                                <p:cTn id="27" presetID="1" presetClass="entr" presetSubtype="0" fill="hold" grpId="0" nodeType="withEffect">
+                                  <p:stCondLst>
+                                    <p:cond delay="0"/>
+                                  </p:stCondLst>
+                                  <p:childTnLst>
+                                    <p:set>
+                                      <p:cBhvr>
+                                        <p:cTn id="28" dur="1" fill="hold">
+                                          <p:stCondLst>
+                                            <p:cond delay="0"/>
+                                          </p:stCondLst>
+                                        </p:cTn>
+                                        <p:tgtEl>
+                                          <p:spTgt spid="5">
+                                            <p:txEl>
+                                              <p:pRg st="8" end="8"/>
+                                            </p:txEl>
+                                          </p:spTgt>
+                                        </p:tgtEl>
+                                        <p:attrNameLst>
+                                          <p:attrName>style.visibility</p:attrName>
+                                        </p:attrNameLst>
+                                      </p:cBhvr>
+                                      <p:to>
+                                        <p:strVal val="visible"/>
+                                      </p:to>
+                                    </p:set>
+                                  </p:childTnLst>
+                                </p:cTn>
+                              </p:par>
+                            </p:childTnLst>
+                          </p:cTn>
+                        </p:par>
+                      </p:childTnLst>
+                    </p:cTn>
+                  </p:par>
+                  <p:par>
+                    <p:cTn id="29" fill="hold">
+                      <p:stCondLst>
+                        <p:cond delay="indefinite"/>
+                      </p:stCondLst>
+                      <p:childTnLst>
+                        <p:par>
+                          <p:cTn id="30" fill="hold">
+                            <p:stCondLst>
+                              <p:cond delay="0"/>
+                            </p:stCondLst>
+                            <p:childTnLst>
+                              <p:par>
+                                <p:cTn id="31" presetID="1" presetClass="entr" presetSubtype="0" fill="hold" grpId="0" nodeType="clickEffect">
+                                  <p:stCondLst>
+                                    <p:cond delay="0"/>
+                                  </p:stCondLst>
+                                  <p:childTnLst>
+                                    <p:set>
+                                      <p:cBhvr>
+                                        <p:cTn id="32" dur="1" fill="hold">
+                                          <p:stCondLst>
+                                            <p:cond delay="0"/>
+                                          </p:stCondLst>
+                                        </p:cTn>
+                                        <p:tgtEl>
+                                          <p:spTgt spid="5">
+                                            <p:txEl>
+                                              <p:pRg st="9" end="9"/>
+                                            </p:txEl>
+                                          </p:spTgt>
+                                        </p:tgtEl>
+                                        <p:attrNameLst>
+                                          <p:attrName>style.visibility</p:attrName>
+                                        </p:attrNameLst>
+                                      </p:cBhvr>
+                                      <p:to>
+                                        <p:strVal val="visible"/>
+                                      </p:to>
+                                    </p:set>
+                                  </p:childTnLst>
+                                </p:cTn>
+                              </p:par>
+                            </p:childTnLst>
+                          </p:cTn>
+                        </p:par>
+                      </p:childTnLst>
+                    </p:cTn>
+                  </p:par>
+                  <p:par>
+                    <p:cTn id="33" fill="hold">
+                      <p:stCondLst>
+                        <p:cond delay="indefinite"/>
+                      </p:stCondLst>
+                      <p:childTnLst>
+                        <p:par>
+                          <p:cTn id="34" fill="hold">
+                            <p:stCondLst>
+                              <p:cond delay="0"/>
+                            </p:stCondLst>
+                            <p:childTnLst>
+                              <p:par>
+                                <p:cTn id="35" presetID="1" presetClass="entr" presetSubtype="0" fill="hold" nodeType="clickEffect">
+                                  <p:stCondLst>
+                                    <p:cond delay="0"/>
+                                  </p:stCondLst>
+                                  <p:childTnLst>
+                                    <p:set>
+                                      <p:cBhvr>
+                                        <p:cTn id="36" dur="1" fill="hold">
+                                          <p:stCondLst>
+                                            <p:cond delay="0"/>
+                                          </p:stCondLst>
+                                        </p:cTn>
+                                        <p:tgtEl>
+                                          <p:spTgt spid="6"/>
+                                        </p:tgtEl>
+                                        <p:attrNameLst>
+                                          <p:attrName>style.visibility</p:attrName>
+                                        </p:attrNameLst>
+                                      </p:cBhvr>
+                                      <p:to>
+                                        <p:strVal val="visible"/>
+                                      </p:to>
+                                    </p:set>
+                                  </p:childTnLst>
+                                </p:cTn>
+                              </p:par>
+                            </p:childTnLst>
+                          </p:cTn>
+                        </p:par>
+                      </p:childTnLst>
+                    </p:cTn>
+                  </p:par>
+                  <p:par>
+                    <p:cTn id="37" fill="hold">
+                      <p:stCondLst>
+                        <p:cond delay="indefinite"/>
+                      </p:stCondLst>
+                      <p:childTnLst>
+                        <p:par>
+                          <p:cTn id="38" fill="hold">
+                            <p:stCondLst>
+                              <p:cond delay="0"/>
+                            </p:stCondLst>
+                            <p:childTnLst>
+                              <p:par>
+                                <p:cTn id="39" presetID="1" presetClass="entr" presetSubtype="0" fill="hold" grpId="0" nodeType="clickEffect">
+                                  <p:stCondLst>
+                                    <p:cond delay="0"/>
+                                  </p:stCondLst>
+                                  <p:childTnLst>
+                                    <p:set>
+                                      <p:cBhvr>
+                                        <p:cTn id="40" dur="1" fill="hold">
+                                          <p:stCondLst>
+                                            <p:cond delay="0"/>
+                                          </p:stCondLst>
+                                        </p:cTn>
+                                        <p:tgtEl>
+                                          <p:spTgt spid="2"/>
+                                        </p:tgtEl>
+                                        <p:attrNameLst>
+                                          <p:attrName>style.visibility</p:attrName>
+                                        </p:attrNameLst>
+                                      </p:cBhvr>
+                                      <p:to>
+                                        <p:strVal val="visible"/>
+                                      </p:to>
+                                    </p:set>
+                                  </p:childTnLst>
+                                </p:cTn>
+                              </p:par>
+                            </p:childTnLst>
+                          </p:cTn>
+                        </p:par>
+                      </p:childTnLst>
+                    </p:cTn>
+                  </p:par>
+                </p:childTnLst>
+              </p:cTn>
+              <p:prevCondLst>
+                <p:cond evt="onPrev" delay="0">
+                  <p:tgtEl>
+                    <p:sldTgt/>
+                  </p:tgtEl>
+                </p:cond>
+              </p:prevCondLst>
+              <p:nextCondLst>
+                <p:cond evt="onNext" delay="0">
+                  <p:tgtEl>
+                    <p:sldTgt/>
+                  </p:tgtEl>
+                </p:cond>
+              </p:nextCondLst>
+            </p:seq>
+          </p:childTnLst>
+        </p:cTn>
+      </p:par>
+    </p:tnLst>
+    <p:bldLst>
+      <p:bldP spid="5" grpId="0" build="p"/>
+      <p:bldP spid="2" grpId="0" animBg="1"/>
+    </p:bldLst>
+  </p:timing>
+</p:sld>
+</file>
+
+<file path=ppt/slides/slide25.xml><?xml version="1.0" encoding="utf-8"?>
+<p:sld xmlns:a="http://schemas.openxmlformats.org/drawingml/2006/main" xmlns:r="http://schemas.openxmlformats.org/officeDocument/2006/relationships" xmlns:p="http://schemas.openxmlformats.org/presentationml/2006/main">
+  <p:cSld>
+    <p:spTree>
+      <p:nvGrpSpPr>
+        <p:cNvPr id="1" name=""/>
+        <p:cNvGrpSpPr/>
+        <p:nvPr/>
+      </p:nvGrpSpPr>
+      <p:grpSpPr>
+        <a:xfrm>
+          <a:off x="0" y="0"/>
+          <a:ext cx="0" cy="0"/>
+          <a:chOff x="0" y="0"/>
+          <a:chExt cx="0" cy="0"/>
+        </a:xfrm>
+      </p:grpSpPr>
+      <p:sp>
+        <p:nvSpPr>
+          <p:cNvPr id="2" name="Title 1">
+            <a:extLst>
+              <a:ext uri="{FF2B5EF4-FFF2-40B4-BE49-F238E27FC236}">
+                <a16:creationId xmlns:a16="http://schemas.microsoft.com/office/drawing/2014/main" id="{1326C305-1691-253D-899F-2529DA2F8C14}"/>
+              </a:ext>
+            </a:extLst>
+          </p:cNvPr>
+          <p:cNvSpPr>
+            <a:spLocks noGrp="1"/>
+          </p:cNvSpPr>
+          <p:nvPr>
+            <p:ph type="title"/>
+          </p:nvPr>
+        </p:nvSpPr>
+        <p:spPr/>
+        <p:txBody>
+          <a:bodyPr/>
+          <a:lstStyle/>
+          <a:p>
+            <a:r>
+              <a:rPr lang="en-US" dirty="0"/>
+              <a:t>Functional testing</a:t>
+            </a:r>
+            <a:endParaRPr lang="LID4096" dirty="0"/>
+          </a:p>
+        </p:txBody>
+      </p:sp>
+      <p:sp>
+        <p:nvSpPr>
+          <p:cNvPr id="3" name="Content Placeholder 2">
+            <a:extLst>
+              <a:ext uri="{FF2B5EF4-FFF2-40B4-BE49-F238E27FC236}">
+                <a16:creationId xmlns:a16="http://schemas.microsoft.com/office/drawing/2014/main" id="{702F1548-00CD-56AC-8AE0-2F71AB048038}"/>
+              </a:ext>
+            </a:extLst>
+          </p:cNvPr>
+          <p:cNvSpPr>
+            <a:spLocks noGrp="1"/>
+          </p:cNvSpPr>
+          <p:nvPr>
+            <p:ph idx="1"/>
+          </p:nvPr>
+        </p:nvSpPr>
+        <p:spPr/>
+        <p:txBody>
+          <a:bodyPr/>
+          <a:lstStyle/>
+          <a:p>
+            <a:r>
+              <a:rPr lang="en-US" dirty="0"/>
+              <a:t>Run application and test results</a:t>
+            </a:r>
+          </a:p>
+        </p:txBody>
+      </p:sp>
+      <p:sp>
+        <p:nvSpPr>
+          <p:cNvPr id="4" name="Slide Number Placeholder 3">
+            <a:extLst>
+              <a:ext uri="{FF2B5EF4-FFF2-40B4-BE49-F238E27FC236}">
+                <a16:creationId xmlns:a16="http://schemas.microsoft.com/office/drawing/2014/main" id="{C652B5F1-BECE-8C34-3175-DE4394D8FDB1}"/>
+              </a:ext>
+            </a:extLst>
+          </p:cNvPr>
+          <p:cNvSpPr>
+            <a:spLocks noGrp="1"/>
+          </p:cNvSpPr>
+          <p:nvPr>
+            <p:ph type="sldNum" sz="quarter" idx="12"/>
+          </p:nvPr>
+        </p:nvSpPr>
+        <p:spPr/>
+        <p:txBody>
+          <a:bodyPr/>
+          <a:lstStyle/>
+          <a:p>
+            <a:fld id="{FDB1AA33-DFBB-49AC-8CEE-23FFECEB5648}" type="slidenum">
+              <a:rPr lang="LID4096" smtClean="0"/>
+              <a:t>25</a:t>
+            </a:fld>
+            <a:endParaRPr lang="LID4096"/>
+          </a:p>
+        </p:txBody>
+      </p:sp>
+      <p:sp>
+        <p:nvSpPr>
+          <p:cNvPr id="5" name="TextBox 4">
+            <a:extLst>
+              <a:ext uri="{FF2B5EF4-FFF2-40B4-BE49-F238E27FC236}">
+                <a16:creationId xmlns:a16="http://schemas.microsoft.com/office/drawing/2014/main" id="{1C3D44E7-5D9C-4329-6ACC-7C98642694A0}"/>
+              </a:ext>
+            </a:extLst>
+          </p:cNvPr>
+          <p:cNvSpPr txBox="1"/>
+          <p:nvPr/>
+        </p:nvSpPr>
+        <p:spPr>
+          <a:xfrm>
+            <a:off x="107694" y="2547447"/>
+            <a:ext cx="11976612" cy="707886"/>
+          </a:xfrm>
+          <a:prstGeom prst="rect">
+            <a:avLst/>
+          </a:prstGeom>
+          <a:noFill/>
+          <a:ln>
+            <a:solidFill>
+              <a:schemeClr val="tx1"/>
+            </a:solidFill>
+          </a:ln>
+        </p:spPr>
+        <p:txBody>
+          <a:bodyPr wrap="none" rtlCol="0">
+            <a:spAutoFit/>
+          </a:bodyPr>
+          <a:lstStyle/>
+          <a:p>
+            <a:r>
+              <a:rPr lang="en-US" sz="2000" dirty="0"/>
+              <a:t>See</a:t>
+            </a:r>
+          </a:p>
+          <a:p>
+            <a:r>
+              <a:rPr lang="en-US" sz="2000" dirty="0">
+                <a:hlinkClick r:id="rId2"/>
+              </a:rPr>
+              <a:t>https://github.com/gjbex/C-plus-plus-software-engineering/tree/development/source-code/testing/ctest</a:t>
+            </a:r>
+            <a:r>
+              <a:rPr lang="en-US" sz="2000" dirty="0"/>
+              <a:t>  </a:t>
+            </a:r>
+            <a:endParaRPr lang="LID4096" sz="2000" dirty="0"/>
+          </a:p>
+        </p:txBody>
+      </p:sp>
+    </p:spTree>
+    <p:extLst>
+      <p:ext uri="{BB962C8B-B14F-4D97-AF65-F5344CB8AC3E}">
+        <p14:creationId xmlns:p14="http://schemas.microsoft.com/office/powerpoint/2010/main" val="1488497271"/>
+      </p:ext>
+    </p:extLst>
+  </p:cSld>
+  <p:clrMapOvr>
+    <a:masterClrMapping/>
+  </p:clrMapOvr>
+  <p:timing>
+    <p:tnLst>
+      <p:par>
+        <p:cTn id="1" dur="indefinite" restart="never" nodeType="tmRoot">
+          <p:childTnLst>
+            <p:seq concurrent="1" nextAc="seek">
+              <p:cTn id="2" dur="indefinite" nodeType="mainSeq">
+                <p:childTnLst>
+                  <p:par>
+                    <p:cTn id="3" fill="hold">
+                      <p:stCondLst>
+                        <p:cond delay="indefinite"/>
+                      </p:stCondLst>
+                      <p:childTnLst>
+                        <p:par>
+                          <p:cTn id="4" fill="hold">
+                            <p:stCondLst>
+                              <p:cond delay="0"/>
+                            </p:stCondLst>
+                            <p:childTnLst>
+                              <p:par>
+                                <p:cTn id="5" presetID="1" presetClass="entr" presetSubtype="0" fill="hold" grpId="0" nodeType="clickEffect">
+                                  <p:stCondLst>
+                                    <p:cond delay="0"/>
+                                  </p:stCondLst>
+                                  <p:childTnLst>
+                                    <p:set>
+                                      <p:cBhvr>
+                                        <p:cTn id="6" dur="1" fill="hold">
+                                          <p:stCondLst>
+                                            <p:cond delay="0"/>
+                                          </p:stCondLst>
+                                        </p:cTn>
+                                        <p:tgtEl>
+                                          <p:spTgt spid="5"/>
+                                        </p:tgtEl>
+                                        <p:attrNameLst>
+                                          <p:attrName>style.visibility</p:attrName>
+                                        </p:attrNameLst>
+                                      </p:cBhvr>
+                                      <p:to>
+                                        <p:strVal val="visible"/>
+                                      </p:to>
+                                    </p:set>
+                                  </p:childTnLst>
+                                </p:cTn>
+                              </p:par>
+                            </p:childTnLst>
+                          </p:cTn>
+                        </p:par>
+                      </p:childTnLst>
+                    </p:cTn>
+                  </p:par>
+                </p:childTnLst>
+              </p:cTn>
+              <p:prevCondLst>
+                <p:cond evt="onPrev" delay="0">
+                  <p:tgtEl>
+                    <p:sldTgt/>
+                  </p:tgtEl>
+                </p:cond>
+              </p:prevCondLst>
+              <p:nextCondLst>
+                <p:cond evt="onNext" delay="0">
+                  <p:tgtEl>
+                    <p:sldTgt/>
+                  </p:tgtEl>
+                </p:cond>
+              </p:nextCondLst>
+            </p:seq>
+          </p:childTnLst>
+        </p:cTn>
+      </p:par>
+    </p:tnLst>
+    <p:bldLst>
+      <p:bldP spid="5" grpId="0" animBg="1"/>
+    </p:bldLst>
+  </p:timing>
+</p:sld>
+</file>
+
+<file path=ppt/slides/slide26.xml><?xml version="1.0" encoding="utf-8"?>
+<p:sld xmlns:a="http://schemas.openxmlformats.org/drawingml/2006/main" xmlns:r="http://schemas.openxmlformats.org/officeDocument/2006/relationships" xmlns:p="http://schemas.openxmlformats.org/presentationml/2006/main">
+  <p:cSld>
+    <p:spTree>
+      <p:nvGrpSpPr>
+        <p:cNvPr id="1" name=""/>
+        <p:cNvGrpSpPr/>
+        <p:nvPr/>
+      </p:nvGrpSpPr>
+      <p:grpSpPr>
+        <a:xfrm>
+          <a:off x="0" y="0"/>
+          <a:ext cx="0" cy="0"/>
+          <a:chOff x="0" y="0"/>
+          <a:chExt cx="0" cy="0"/>
+        </a:xfrm>
+      </p:grpSpPr>
+      <p:sp>
+        <p:nvSpPr>
+          <p:cNvPr id="2" name="Title 1">
+            <a:extLst>
+              <a:ext uri="{FF2B5EF4-FFF2-40B4-BE49-F238E27FC236}">
+                <a16:creationId xmlns:a16="http://schemas.microsoft.com/office/drawing/2014/main" id="{EB8FEFB0-A4A9-60C0-B838-D76179340907}"/>
+              </a:ext>
+            </a:extLst>
+          </p:cNvPr>
+          <p:cNvSpPr>
+            <a:spLocks noGrp="1"/>
+          </p:cNvSpPr>
+          <p:nvPr>
+            <p:ph type="title"/>
+          </p:nvPr>
+        </p:nvSpPr>
+        <p:spPr/>
+        <p:txBody>
+          <a:bodyPr/>
+          <a:lstStyle/>
+          <a:p>
+            <a:r>
+              <a:rPr lang="en-US" dirty="0"/>
+              <a:t>Further reading</a:t>
+            </a:r>
+            <a:endParaRPr lang="LID4096" dirty="0"/>
+          </a:p>
+        </p:txBody>
+      </p:sp>
+      <p:sp>
+        <p:nvSpPr>
+          <p:cNvPr id="3" name="Content Placeholder 2">
+            <a:extLst>
+              <a:ext uri="{FF2B5EF4-FFF2-40B4-BE49-F238E27FC236}">
+                <a16:creationId xmlns:a16="http://schemas.microsoft.com/office/drawing/2014/main" id="{1201784A-7F6B-CC16-C0F2-B288CC15E1A8}"/>
+              </a:ext>
+            </a:extLst>
+          </p:cNvPr>
+          <p:cNvSpPr>
+            <a:spLocks noGrp="1"/>
+          </p:cNvSpPr>
+          <p:nvPr>
+            <p:ph idx="1"/>
+          </p:nvPr>
+        </p:nvSpPr>
+        <p:spPr>
+          <a:xfrm>
+            <a:off x="838200" y="1803853"/>
+            <a:ext cx="10515600" cy="4351338"/>
+          </a:xfrm>
+        </p:spPr>
+        <p:txBody>
+          <a:bodyPr>
+            <a:normAutofit fontScale="92500" lnSpcReduction="20000"/>
+          </a:bodyPr>
+          <a:lstStyle/>
+          <a:p>
+            <a:r>
+              <a:rPr lang="en-US" dirty="0"/>
+              <a:t>Catch2 tutorial</a:t>
+            </a:r>
+            <a:br>
+              <a:rPr lang="en-US" dirty="0"/>
+            </a:br>
+            <a:r>
+              <a:rPr lang="en-US" dirty="0">
+                <a:hlinkClick r:id="rId2"/>
+              </a:rPr>
+              <a:t>https://github.com/catchorg/Catch2/blob/devel/docs/tutorial.md#top</a:t>
+            </a:r>
+            <a:r>
+              <a:rPr lang="en-US" dirty="0"/>
+              <a:t> </a:t>
+            </a:r>
+          </a:p>
+          <a:p>
+            <a:r>
+              <a:rPr lang="en-US" dirty="0"/>
+              <a:t>Google Test primer</a:t>
+            </a:r>
+            <a:br>
+              <a:rPr lang="en-US" dirty="0"/>
+            </a:br>
+            <a:r>
+              <a:rPr lang="en-US" dirty="0">
+                <a:hlinkClick r:id="rId3"/>
+              </a:rPr>
+              <a:t>https://google.github.io/googletest/primer.html</a:t>
+            </a:r>
+            <a:r>
+              <a:rPr lang="en-US" dirty="0"/>
+              <a:t> </a:t>
+            </a:r>
+          </a:p>
+          <a:p>
+            <a:r>
+              <a:rPr lang="en-US" dirty="0" err="1"/>
+              <a:t>cppunit</a:t>
+            </a:r>
+            <a:br>
+              <a:rPr lang="en-US" dirty="0"/>
+            </a:br>
+            <a:r>
+              <a:rPr lang="en-US" dirty="0">
+                <a:hlinkClick r:id="rId4"/>
+              </a:rPr>
+              <a:t>https://www.freedesktop.org/wiki/Software/cppunit/</a:t>
+            </a:r>
+            <a:r>
+              <a:rPr lang="en-US" dirty="0"/>
+              <a:t> </a:t>
+            </a:r>
+          </a:p>
+          <a:p>
+            <a:r>
+              <a:rPr lang="en-US" dirty="0" err="1"/>
+              <a:t>CTest</a:t>
+            </a:r>
+            <a:br>
+              <a:rPr lang="en-US" dirty="0"/>
+            </a:br>
+            <a:r>
+              <a:rPr lang="en-US" dirty="0">
+                <a:hlinkClick r:id="rId5"/>
+              </a:rPr>
+              <a:t>https://cmake.org/cmake/help/latest/module/CTest.html</a:t>
+            </a:r>
+            <a:r>
+              <a:rPr lang="en-US" dirty="0"/>
+              <a:t> </a:t>
+            </a:r>
+          </a:p>
+          <a:p>
+            <a:r>
+              <a:rPr lang="en-US" dirty="0"/>
+              <a:t>Google </a:t>
+            </a:r>
+            <a:r>
+              <a:rPr lang="en-US" dirty="0" err="1"/>
+              <a:t>FuzzTest</a:t>
+            </a:r>
+            <a:br>
+              <a:rPr lang="en-US" dirty="0"/>
+            </a:br>
+            <a:r>
+              <a:rPr lang="en-US" dirty="0">
+                <a:hlinkClick r:id="rId6"/>
+              </a:rPr>
+              <a:t>https://github.com/google/fuzztest</a:t>
+            </a:r>
+            <a:r>
+              <a:rPr lang="en-US" dirty="0"/>
+              <a:t> </a:t>
+            </a:r>
+          </a:p>
+          <a:p>
+            <a:r>
+              <a:rPr lang="en-US" dirty="0"/>
+              <a:t>shunit2</a:t>
+            </a:r>
+            <a:br>
+              <a:rPr lang="en-US" dirty="0"/>
+            </a:br>
+            <a:r>
+              <a:rPr lang="en-US" dirty="0">
+                <a:hlinkClick r:id="rId7"/>
+              </a:rPr>
+              <a:t>https://github.com/kward/shunit2</a:t>
+            </a:r>
+            <a:r>
+              <a:rPr lang="en-US" dirty="0"/>
+              <a:t> </a:t>
+            </a:r>
+            <a:endParaRPr lang="LID4096" dirty="0"/>
+          </a:p>
+        </p:txBody>
+      </p:sp>
+      <p:sp>
+        <p:nvSpPr>
+          <p:cNvPr id="4" name="Slide Number Placeholder 3">
+            <a:extLst>
+              <a:ext uri="{FF2B5EF4-FFF2-40B4-BE49-F238E27FC236}">
+                <a16:creationId xmlns:a16="http://schemas.microsoft.com/office/drawing/2014/main" id="{A09F9615-03AB-3F06-69F5-EC793295A749}"/>
+              </a:ext>
+            </a:extLst>
+          </p:cNvPr>
+          <p:cNvSpPr>
+            <a:spLocks noGrp="1"/>
+          </p:cNvSpPr>
+          <p:nvPr>
+            <p:ph type="sldNum" sz="quarter" idx="12"/>
+          </p:nvPr>
+        </p:nvSpPr>
+        <p:spPr/>
+        <p:txBody>
+          <a:bodyPr/>
+          <a:lstStyle/>
+          <a:p>
+            <a:fld id="{FDB1AA33-DFBB-49AC-8CEE-23FFECEB5648}" type="slidenum">
+              <a:rPr lang="LID4096" smtClean="0"/>
+              <a:t>26</a:t>
+            </a:fld>
+            <a:endParaRPr lang="LID4096"/>
+          </a:p>
+        </p:txBody>
+      </p:sp>
+    </p:spTree>
+    <p:extLst>
+      <p:ext uri="{BB962C8B-B14F-4D97-AF65-F5344CB8AC3E}">
+        <p14:creationId xmlns:p14="http://schemas.microsoft.com/office/powerpoint/2010/main" val="206501493"/>
+      </p:ext>
+    </p:extLst>
+  </p:cSld>
+  <p:clrMapOvr>
+    <a:masterClrMapping/>
+  </p:clrMapOvr>
+</p:sld>
+</file>
+
+<file path=ppt/slides/slide27.xml><?xml version="1.0" encoding="utf-8"?>
+<p:sld xmlns:a="http://schemas.openxmlformats.org/drawingml/2006/main" xmlns:r="http://schemas.openxmlformats.org/officeDocument/2006/relationships" xmlns:p="http://schemas.openxmlformats.org/presentationml/2006/main">
+  <p:cSld>
+    <p:spTree>
+      <p:nvGrpSpPr>
+        <p:cNvPr id="1" name=""/>
+        <p:cNvGrpSpPr/>
+        <p:nvPr/>
+      </p:nvGrpSpPr>
+      <p:grpSpPr>
+        <a:xfrm>
+          <a:off x="0" y="0"/>
+          <a:ext cx="0" cy="0"/>
+          <a:chOff x="0" y="0"/>
+          <a:chExt cx="0" cy="0"/>
+        </a:xfrm>
+      </p:grpSpPr>
+      <p:sp>
+        <p:nvSpPr>
+          <p:cNvPr id="2" name="Title 1">
+            <a:extLst>
+              <a:ext uri="{FF2B5EF4-FFF2-40B4-BE49-F238E27FC236}">
+                <a16:creationId xmlns:a16="http://schemas.microsoft.com/office/drawing/2014/main" id="{2C069EDD-AAA1-86E7-6663-1799EEA4BBEE}"/>
+              </a:ext>
+            </a:extLst>
+          </p:cNvPr>
+          <p:cNvSpPr>
+            <a:spLocks noGrp="1"/>
+          </p:cNvSpPr>
+          <p:nvPr>
+            <p:ph type="title"/>
+          </p:nvPr>
+        </p:nvSpPr>
+        <p:spPr/>
+        <p:txBody>
+          <a:bodyPr/>
+          <a:lstStyle/>
+          <a:p>
+            <a:r>
+              <a:rPr lang="en-US" dirty="0"/>
+              <a:t>Dependency management</a:t>
+            </a:r>
+            <a:endParaRPr lang="LID4096" dirty="0"/>
+          </a:p>
+        </p:txBody>
+      </p:sp>
+      <p:sp>
+        <p:nvSpPr>
+          <p:cNvPr id="3" name="Text Placeholder 2">
+            <a:extLst>
+              <a:ext uri="{FF2B5EF4-FFF2-40B4-BE49-F238E27FC236}">
+                <a16:creationId xmlns:a16="http://schemas.microsoft.com/office/drawing/2014/main" id="{7A84B348-AA22-783F-4CC3-747D6B717161}"/>
+              </a:ext>
+            </a:extLst>
+          </p:cNvPr>
+          <p:cNvSpPr>
+            <a:spLocks noGrp="1"/>
+          </p:cNvSpPr>
+          <p:nvPr>
+            <p:ph type="body" idx="1"/>
+          </p:nvPr>
+        </p:nvSpPr>
+        <p:spPr/>
+        <p:txBody>
+          <a:bodyPr/>
+          <a:lstStyle/>
+          <a:p>
+            <a:endParaRPr lang="LID4096"/>
+          </a:p>
+        </p:txBody>
+      </p:sp>
+      <p:sp>
+        <p:nvSpPr>
+          <p:cNvPr id="4" name="Slide Number Placeholder 3">
+            <a:extLst>
+              <a:ext uri="{FF2B5EF4-FFF2-40B4-BE49-F238E27FC236}">
+                <a16:creationId xmlns:a16="http://schemas.microsoft.com/office/drawing/2014/main" id="{A322FDCA-806A-FB0B-1F52-91BD6306481E}"/>
+              </a:ext>
+            </a:extLst>
+          </p:cNvPr>
+          <p:cNvSpPr>
+            <a:spLocks noGrp="1"/>
+          </p:cNvSpPr>
+          <p:nvPr>
+            <p:ph type="sldNum" sz="quarter" idx="12"/>
+          </p:nvPr>
+        </p:nvSpPr>
+        <p:spPr/>
+        <p:txBody>
+          <a:bodyPr/>
+          <a:lstStyle/>
+          <a:p>
+            <a:fld id="{FDB1AA33-DFBB-49AC-8CEE-23FFECEB5648}" type="slidenum">
+              <a:rPr lang="LID4096" smtClean="0"/>
+              <a:t>27</a:t>
+            </a:fld>
+            <a:endParaRPr lang="LID4096"/>
+          </a:p>
+        </p:txBody>
+      </p:sp>
+    </p:spTree>
+    <p:extLst>
+      <p:ext uri="{BB962C8B-B14F-4D97-AF65-F5344CB8AC3E}">
+        <p14:creationId xmlns:p14="http://schemas.microsoft.com/office/powerpoint/2010/main" val="634670316"/>
+      </p:ext>
+    </p:extLst>
+  </p:cSld>
+  <p:clrMapOvr>
+    <a:masterClrMapping/>
+  </p:clrMapOvr>
+</p:sld>
+</file>
+
+<file path=ppt/slides/slide28.xml><?xml version="1.0" encoding="utf-8"?>
+<p:sld xmlns:a="http://schemas.openxmlformats.org/drawingml/2006/main" xmlns:r="http://schemas.openxmlformats.org/officeDocument/2006/relationships" xmlns:p="http://schemas.openxmlformats.org/presentationml/2006/main">
+  <p:cSld>
+    <p:spTree>
+      <p:nvGrpSpPr>
+        <p:cNvPr id="1" name=""/>
+        <p:cNvGrpSpPr/>
+        <p:nvPr/>
+      </p:nvGrpSpPr>
+      <p:grpSpPr>
+        <a:xfrm>
+          <a:off x="0" y="0"/>
+          <a:ext cx="0" cy="0"/>
+          <a:chOff x="0" y="0"/>
+          <a:chExt cx="0" cy="0"/>
+        </a:xfrm>
+      </p:grpSpPr>
+      <p:sp>
+        <p:nvSpPr>
+          <p:cNvPr id="2" name="Title 1">
+            <a:extLst>
+              <a:ext uri="{FF2B5EF4-FFF2-40B4-BE49-F238E27FC236}">
+                <a16:creationId xmlns:a16="http://schemas.microsoft.com/office/drawing/2014/main" id="{748B151D-EE93-90D9-EB18-32064A36C5D7}"/>
+              </a:ext>
+            </a:extLst>
+          </p:cNvPr>
+          <p:cNvSpPr>
+            <a:spLocks noGrp="1"/>
+          </p:cNvSpPr>
+          <p:nvPr>
+            <p:ph type="title"/>
+          </p:nvPr>
+        </p:nvSpPr>
+        <p:spPr/>
+        <p:txBody>
+          <a:bodyPr/>
+          <a:lstStyle/>
+          <a:p>
+            <a:r>
+              <a:rPr lang="en-US" dirty="0"/>
+              <a:t>Package managers</a:t>
+            </a:r>
+            <a:endParaRPr lang="LID4096" dirty="0"/>
+          </a:p>
+        </p:txBody>
+      </p:sp>
+      <p:sp>
+        <p:nvSpPr>
+          <p:cNvPr id="3" name="Content Placeholder 2">
+            <a:extLst>
+              <a:ext uri="{FF2B5EF4-FFF2-40B4-BE49-F238E27FC236}">
+                <a16:creationId xmlns:a16="http://schemas.microsoft.com/office/drawing/2014/main" id="{533301B4-11F1-BA22-7463-50F7F9042A19}"/>
+              </a:ext>
+            </a:extLst>
+          </p:cNvPr>
+          <p:cNvSpPr>
+            <a:spLocks noGrp="1"/>
+          </p:cNvSpPr>
+          <p:nvPr>
+            <p:ph idx="1"/>
+          </p:nvPr>
+        </p:nvSpPr>
+        <p:spPr/>
+        <p:txBody>
+          <a:bodyPr/>
+          <a:lstStyle/>
+          <a:p>
+            <a:r>
+              <a:rPr lang="en-US" dirty="0"/>
+              <a:t>Conan</a:t>
+            </a:r>
+          </a:p>
+          <a:p>
+            <a:pPr lvl="1"/>
+            <a:r>
+              <a:rPr lang="en-US" dirty="0"/>
+              <a:t>Wide range of software packages</a:t>
+            </a:r>
+          </a:p>
+          <a:p>
+            <a:pPr lvl="1"/>
+            <a:r>
+              <a:rPr lang="en-US" dirty="0"/>
+              <a:t>Mature</a:t>
+            </a:r>
+          </a:p>
+          <a:p>
+            <a:r>
+              <a:rPr lang="en-US" dirty="0" err="1"/>
+              <a:t>vcpkg</a:t>
+            </a:r>
+            <a:endParaRPr lang="en-US" dirty="0"/>
+          </a:p>
+          <a:p>
+            <a:r>
+              <a:rPr lang="en-US" dirty="0"/>
+              <a:t>CPM</a:t>
+            </a:r>
+          </a:p>
+          <a:p>
+            <a:pPr lvl="1"/>
+            <a:r>
+              <a:rPr lang="en-US" dirty="0"/>
+              <a:t>Pure </a:t>
+            </a:r>
+            <a:r>
+              <a:rPr lang="en-US" dirty="0" err="1"/>
+              <a:t>Cmake</a:t>
+            </a:r>
+            <a:r>
+              <a:rPr lang="en-US" dirty="0"/>
+              <a:t>, (almost) zero install</a:t>
+            </a:r>
+            <a:endParaRPr lang="LID4096" dirty="0"/>
+          </a:p>
+        </p:txBody>
+      </p:sp>
+      <p:sp>
+        <p:nvSpPr>
+          <p:cNvPr id="4" name="Slide Number Placeholder 3">
+            <a:extLst>
+              <a:ext uri="{FF2B5EF4-FFF2-40B4-BE49-F238E27FC236}">
+                <a16:creationId xmlns:a16="http://schemas.microsoft.com/office/drawing/2014/main" id="{938E0D5F-6FF4-E9A6-B9F1-99B865015060}"/>
+              </a:ext>
+            </a:extLst>
+          </p:cNvPr>
+          <p:cNvSpPr>
+            <a:spLocks noGrp="1"/>
+          </p:cNvSpPr>
+          <p:nvPr>
+            <p:ph type="sldNum" sz="quarter" idx="12"/>
+          </p:nvPr>
+        </p:nvSpPr>
+        <p:spPr/>
+        <p:txBody>
+          <a:bodyPr/>
+          <a:lstStyle/>
+          <a:p>
+            <a:fld id="{FDB1AA33-DFBB-49AC-8CEE-23FFECEB5648}" type="slidenum">
+              <a:rPr lang="LID4096" smtClean="0"/>
+              <a:t>28</a:t>
+            </a:fld>
+            <a:endParaRPr lang="LID4096"/>
+          </a:p>
+        </p:txBody>
+      </p:sp>
+    </p:spTree>
+    <p:extLst>
+      <p:ext uri="{BB962C8B-B14F-4D97-AF65-F5344CB8AC3E}">
+        <p14:creationId xmlns:p14="http://schemas.microsoft.com/office/powerpoint/2010/main" val="30804723"/>
       </p:ext>
     </p:extLst>
   </p:cSld>

</xml_diff>

<commit_message>
Add dependency management section
</commit_message>
<xml_diff>
--- a/cpp_software_engineering.pptx
+++ b/cpp_software_engineering.pptx
@@ -5,7 +5,7 @@
     <p:sldMasterId id="2147483648" r:id="rId1"/>
   </p:sldMasterIdLst>
   <p:notesMasterIdLst>
-    <p:notesMasterId r:id="rId30"/>
+    <p:notesMasterId r:id="rId37"/>
   </p:notesMasterIdLst>
   <p:sldIdLst>
     <p:sldId id="257" r:id="rId2"/>
@@ -36,6 +36,13 @@
     <p:sldId id="378" r:id="rId27"/>
     <p:sldId id="380" r:id="rId28"/>
     <p:sldId id="381" r:id="rId29"/>
+    <p:sldId id="382" r:id="rId30"/>
+    <p:sldId id="383" r:id="rId31"/>
+    <p:sldId id="384" r:id="rId32"/>
+    <p:sldId id="386" r:id="rId33"/>
+    <p:sldId id="387" r:id="rId34"/>
+    <p:sldId id="385" r:id="rId35"/>
+    <p:sldId id="388" r:id="rId36"/>
   </p:sldIdLst>
   <p:sldSz cx="12192000" cy="6858000"/>
   <p:notesSz cx="6858000" cy="9144000"/>
@@ -187,6 +194,13 @@
           <p14:sldIdLst>
             <p14:sldId id="380"/>
             <p14:sldId id="381"/>
+            <p14:sldId id="382"/>
+            <p14:sldId id="383"/>
+            <p14:sldId id="384"/>
+            <p14:sldId id="386"/>
+            <p14:sldId id="387"/>
+            <p14:sldId id="385"/>
+            <p14:sldId id="388"/>
           </p14:sldIdLst>
         </p14:section>
       </p14:sectionLst>
@@ -6749,6 +6763,9 @@
               <a:avLst/>
             </a:prstGeom>
             <a:ln>
+              <a:solidFill>
+                <a:schemeClr val="tx1"/>
+              </a:solidFill>
               <a:tailEnd type="stealth" w="lg" len="lg"/>
             </a:ln>
           </p:spPr>
@@ -6861,6 +6878,9 @@
               <a:avLst/>
             </a:prstGeom>
             <a:ln>
+              <a:solidFill>
+                <a:schemeClr val="tx1"/>
+              </a:solidFill>
               <a:tailEnd type="stealth" w="lg" len="lg"/>
             </a:ln>
           </p:spPr>
@@ -6966,6 +6986,9 @@
               <a:avLst/>
             </a:prstGeom>
             <a:ln>
+              <a:solidFill>
+                <a:schemeClr val="tx1"/>
+              </a:solidFill>
               <a:tailEnd type="stealth" w="lg" len="lg"/>
             </a:ln>
           </p:spPr>
@@ -7092,6 +7115,9 @@
                 <a:avLst/>
               </a:prstGeom>
               <a:ln>
+                <a:solidFill>
+                  <a:schemeClr val="tx1"/>
+                </a:solidFill>
                 <a:tailEnd type="stealth" w="lg" len="lg"/>
               </a:ln>
             </p:spPr>
@@ -9194,7 +9220,7 @@
         <p:spPr>
           <a:xfrm>
             <a:off x="310281" y="5573682"/>
-            <a:ext cx="11571437" cy="400110"/>
+            <a:ext cx="10684592" cy="400110"/>
           </a:xfrm>
           <a:prstGeom prst="rect">
             <a:avLst/>
@@ -9220,7 +9246,7 @@
               <a:rPr lang="en-US" sz="2000" dirty="0">
                 <a:hlinkClick r:id="rId2"/>
               </a:rPr>
-              <a:t>https://github.com/gjbex/C-plus-plus-software-engineering/tree/development/source-code/cmake</a:t>
+              <a:t>https://github.com/gjbex/C-plus-plus-software-engineering/tree/main/source-code/cmake</a:t>
             </a:r>
             <a:r>
               <a:rPr lang="en-US" sz="2000" dirty="0"/>
@@ -9778,7 +9804,7 @@
         <p:spPr>
           <a:xfrm>
             <a:off x="92564" y="5486594"/>
-            <a:ext cx="11976612" cy="707886"/>
+            <a:ext cx="11089767" cy="707886"/>
           </a:xfrm>
           <a:prstGeom prst="rect">
             <a:avLst/>
@@ -9806,7 +9832,7 @@
               <a:rPr lang="en-US" sz="2000" dirty="0">
                 <a:hlinkClick r:id="rId2"/>
               </a:rPr>
-              <a:t>https://github.com/gjbex/C-plus-plus-software-engineering/tree/development/source-code/static-analysis</a:t>
+              <a:t>https://github.com/gjbex/C-plus-plus-software-engineering/tree/main/source-code/static-analysis</a:t>
             </a:r>
             <a:r>
               <a:rPr lang="en-US" sz="2000" dirty="0"/>
@@ -11180,7 +11206,7 @@
         <p:spPr>
           <a:xfrm>
             <a:off x="92564" y="5628104"/>
-            <a:ext cx="11976612" cy="707886"/>
+            <a:ext cx="11068030" cy="707886"/>
           </a:xfrm>
           <a:prstGeom prst="rect">
             <a:avLst/>
@@ -11208,7 +11234,7 @@
               <a:rPr lang="en-US" sz="2000" dirty="0">
                 <a:hlinkClick r:id="rId2"/>
               </a:rPr>
-              <a:t>https://github.com/gjbex/C-plus-plus-software-engineering/tree/development/source-code/testing/catch2</a:t>
+              <a:t>https://github.com/gjbex/C-plus-plus-software-engineering/tree/main/source-code/testing/catch2</a:t>
             </a:r>
             <a:r>
               <a:rPr lang="en-US" sz="2000" dirty="0"/>
@@ -11905,7 +11931,7 @@
         <p:spPr>
           <a:xfrm>
             <a:off x="107694" y="2547447"/>
-            <a:ext cx="11976612" cy="707886"/>
+            <a:ext cx="10917989" cy="707886"/>
           </a:xfrm>
           <a:prstGeom prst="rect">
             <a:avLst/>
@@ -11933,7 +11959,7 @@
               <a:rPr lang="en-US" sz="2000" dirty="0">
                 <a:hlinkClick r:id="rId2"/>
               </a:rPr>
-              <a:t>https://github.com/gjbex/C-plus-plus-software-engineering/tree/development/source-code/testing/ctest</a:t>
+              <a:t>https://github.com/gjbex/C-plus-plus-software-engineering/tree/main/source-code/testing/ctest</a:t>
             </a:r>
             <a:r>
               <a:rPr lang="en-US" sz="2000" dirty="0"/>
@@ -12447,7 +12473,9 @@
         </p:nvSpPr>
         <p:spPr/>
         <p:txBody>
-          <a:bodyPr/>
+          <a:bodyPr>
+            <a:normAutofit lnSpcReduction="10000"/>
+          </a:bodyPr>
           <a:lstStyle/>
           <a:p>
             <a:r>
@@ -12477,6 +12505,20 @@
             <a:endParaRPr lang="en-US" dirty="0"/>
           </a:p>
           <a:p>
+            <a:pPr lvl="1"/>
+            <a:r>
+              <a:rPr lang="en-US" dirty="0"/>
+              <a:t>Microsoft-backed</a:t>
+            </a:r>
+          </a:p>
+          <a:p>
+            <a:pPr lvl="1"/>
+            <a:r>
+              <a:rPr lang="en-US" dirty="0"/>
+              <a:t>Wide range of software packages</a:t>
+            </a:r>
+          </a:p>
+          <a:p>
             <a:r>
               <a:rPr lang="en-US" dirty="0"/>
               <a:t>CPM</a:t>
@@ -12485,6 +12527,17 @@
           <a:p>
             <a:pPr lvl="1"/>
             <a:r>
+              <a:rPr lang="en-US" dirty="0" err="1"/>
+              <a:t>CMake</a:t>
+            </a:r>
+            <a:r>
+              <a:rPr lang="en-US" dirty="0"/>
+              <a:t> centric</a:t>
+            </a:r>
+          </a:p>
+          <a:p>
+            <a:pPr lvl="1"/>
+            <a:r>
               <a:rPr lang="en-US" dirty="0"/>
               <a:t>Pure </a:t>
             </a:r>
@@ -12495,6 +12548,20 @@
             <a:r>
               <a:rPr lang="en-US" dirty="0"/>
               <a:t>, (almost) zero install</a:t>
+            </a:r>
+          </a:p>
+          <a:p>
+            <a:pPr lvl="1"/>
+            <a:r>
+              <a:rPr lang="en-US" dirty="0"/>
+              <a:t>Relies on CMakeLists.txt of software packages</a:t>
+            </a:r>
+          </a:p>
+          <a:p>
+            <a:pPr lvl="1"/>
+            <a:r>
+              <a:rPr lang="en-US" dirty="0"/>
+              <a:t>Can pull GitHub repositories</a:t>
             </a:r>
             <a:endParaRPr lang="LID4096" dirty="0"/>
           </a:p>
@@ -12539,6 +12606,1054 @@
   <p:clrMapOvr>
     <a:masterClrMapping/>
   </p:clrMapOvr>
+</p:sld>
+</file>
+
+<file path=ppt/slides/slide29.xml><?xml version="1.0" encoding="utf-8"?>
+<p:sld xmlns:a="http://schemas.openxmlformats.org/drawingml/2006/main" xmlns:r="http://schemas.openxmlformats.org/officeDocument/2006/relationships" xmlns:p="http://schemas.openxmlformats.org/presentationml/2006/main">
+  <p:cSld>
+    <p:spTree>
+      <p:nvGrpSpPr>
+        <p:cNvPr id="1" name=""/>
+        <p:cNvGrpSpPr/>
+        <p:nvPr/>
+      </p:nvGrpSpPr>
+      <p:grpSpPr>
+        <a:xfrm>
+          <a:off x="0" y="0"/>
+          <a:ext cx="0" cy="0"/>
+          <a:chOff x="0" y="0"/>
+          <a:chExt cx="0" cy="0"/>
+        </a:xfrm>
+      </p:grpSpPr>
+      <p:sp>
+        <p:nvSpPr>
+          <p:cNvPr id="2" name="Title 1">
+            <a:extLst>
+              <a:ext uri="{FF2B5EF4-FFF2-40B4-BE49-F238E27FC236}">
+                <a16:creationId xmlns:a16="http://schemas.microsoft.com/office/drawing/2014/main" id="{24072BB8-489C-2322-537A-7D10CD60E267}"/>
+              </a:ext>
+            </a:extLst>
+          </p:cNvPr>
+          <p:cNvSpPr>
+            <a:spLocks noGrp="1"/>
+          </p:cNvSpPr>
+          <p:nvPr>
+            <p:ph type="title"/>
+          </p:nvPr>
+        </p:nvSpPr>
+        <p:spPr/>
+        <p:txBody>
+          <a:bodyPr/>
+          <a:lstStyle/>
+          <a:p>
+            <a:r>
+              <a:rPr lang="en-US" dirty="0"/>
+              <a:t>Conan basic usage</a:t>
+            </a:r>
+            <a:endParaRPr lang="LID4096" dirty="0"/>
+          </a:p>
+        </p:txBody>
+      </p:sp>
+      <p:sp>
+        <p:nvSpPr>
+          <p:cNvPr id="3" name="Content Placeholder 2">
+            <a:extLst>
+              <a:ext uri="{FF2B5EF4-FFF2-40B4-BE49-F238E27FC236}">
+                <a16:creationId xmlns:a16="http://schemas.microsoft.com/office/drawing/2014/main" id="{2833EA31-C42C-5434-AB56-1E275880B3E6}"/>
+              </a:ext>
+            </a:extLst>
+          </p:cNvPr>
+          <p:cNvSpPr>
+            <a:spLocks noGrp="1"/>
+          </p:cNvSpPr>
+          <p:nvPr>
+            <p:ph idx="1"/>
+          </p:nvPr>
+        </p:nvSpPr>
+        <p:spPr/>
+        <p:txBody>
+          <a:bodyPr>
+            <a:normAutofit fontScale="85000" lnSpcReduction="20000"/>
+          </a:bodyPr>
+          <a:lstStyle/>
+          <a:p>
+            <a:r>
+              <a:rPr lang="en-US" dirty="0"/>
+              <a:t>Set up</a:t>
+            </a:r>
+          </a:p>
+          <a:p>
+            <a:endParaRPr lang="en-US" dirty="0"/>
+          </a:p>
+          <a:p>
+            <a:r>
+              <a:rPr lang="en-US" dirty="0"/>
+              <a:t>Write project requirement  </a:t>
+            </a:r>
+            <a:r>
+              <a:rPr lang="en-US" dirty="0">
+                <a:latin typeface="Courier New" panose="02070309020205020404" pitchFamily="49" charset="0"/>
+                <a:cs typeface="Courier New" panose="02070309020205020404" pitchFamily="49" charset="0"/>
+              </a:rPr>
+              <a:t>conanfile.txt</a:t>
+            </a:r>
+          </a:p>
+          <a:p>
+            <a:r>
+              <a:rPr lang="en-US" dirty="0"/>
+              <a:t>Install dependencies</a:t>
+            </a:r>
+          </a:p>
+          <a:p>
+            <a:endParaRPr lang="en-US" dirty="0"/>
+          </a:p>
+          <a:p>
+            <a:r>
+              <a:rPr lang="en-US" dirty="0"/>
+              <a:t>Change to build directory</a:t>
+            </a:r>
+          </a:p>
+          <a:p>
+            <a:endParaRPr lang="en-US" dirty="0"/>
+          </a:p>
+          <a:p>
+            <a:r>
+              <a:rPr lang="en-US" dirty="0"/>
+              <a:t>Generate build files</a:t>
+            </a:r>
+          </a:p>
+          <a:p>
+            <a:endParaRPr lang="en-US" dirty="0"/>
+          </a:p>
+          <a:p>
+            <a:endParaRPr lang="en-US" dirty="0"/>
+          </a:p>
+          <a:p>
+            <a:r>
+              <a:rPr lang="en-US" dirty="0"/>
+              <a:t>Build project</a:t>
+            </a:r>
+            <a:endParaRPr lang="LID4096" dirty="0"/>
+          </a:p>
+        </p:txBody>
+      </p:sp>
+      <p:sp>
+        <p:nvSpPr>
+          <p:cNvPr id="4" name="Slide Number Placeholder 3">
+            <a:extLst>
+              <a:ext uri="{FF2B5EF4-FFF2-40B4-BE49-F238E27FC236}">
+                <a16:creationId xmlns:a16="http://schemas.microsoft.com/office/drawing/2014/main" id="{44DC3C9C-C2DF-9153-4AC9-6C00AF6C5187}"/>
+              </a:ext>
+            </a:extLst>
+          </p:cNvPr>
+          <p:cNvSpPr>
+            <a:spLocks noGrp="1"/>
+          </p:cNvSpPr>
+          <p:nvPr>
+            <p:ph type="sldNum" sz="quarter" idx="12"/>
+          </p:nvPr>
+        </p:nvSpPr>
+        <p:spPr/>
+        <p:txBody>
+          <a:bodyPr/>
+          <a:lstStyle/>
+          <a:p>
+            <a:fld id="{FDB1AA33-DFBB-49AC-8CEE-23FFECEB5648}" type="slidenum">
+              <a:rPr lang="LID4096" smtClean="0"/>
+              <a:t>29</a:t>
+            </a:fld>
+            <a:endParaRPr lang="LID4096"/>
+          </a:p>
+        </p:txBody>
+      </p:sp>
+      <p:sp>
+        <p:nvSpPr>
+          <p:cNvPr id="5" name="TextBox 4">
+            <a:extLst>
+              <a:ext uri="{FF2B5EF4-FFF2-40B4-BE49-F238E27FC236}">
+                <a16:creationId xmlns:a16="http://schemas.microsoft.com/office/drawing/2014/main" id="{9E5810F3-8FBD-0FB5-304B-AE7E19556B08}"/>
+              </a:ext>
+            </a:extLst>
+          </p:cNvPr>
+          <p:cNvSpPr txBox="1"/>
+          <p:nvPr/>
+        </p:nvSpPr>
+        <p:spPr>
+          <a:xfrm>
+            <a:off x="1320756" y="2190610"/>
+            <a:ext cx="8519930" cy="369332"/>
+          </a:xfrm>
+          <a:prstGeom prst="rect">
+            <a:avLst/>
+          </a:prstGeom>
+          <a:solidFill>
+            <a:schemeClr val="tx1"/>
+          </a:solidFill>
+          <a:ln>
+            <a:solidFill>
+              <a:schemeClr val="tx1"/>
+            </a:solidFill>
+          </a:ln>
+        </p:spPr>
+        <p:txBody>
+          <a:bodyPr wrap="square" rtlCol="0">
+            <a:spAutoFit/>
+          </a:bodyPr>
+          <a:lstStyle/>
+          <a:p>
+            <a:r>
+              <a:rPr lang="en-US" b="1" dirty="0">
+                <a:solidFill>
+                  <a:schemeClr val="bg1"/>
+                </a:solidFill>
+                <a:latin typeface="Courier New" pitchFamily="49" charset="0"/>
+                <a:cs typeface="Courier New" pitchFamily="49" charset="0"/>
+              </a:rPr>
+              <a:t>$  pip install </a:t>
+            </a:r>
+            <a:r>
+              <a:rPr lang="en-US" b="1" dirty="0" err="1">
+                <a:solidFill>
+                  <a:schemeClr val="bg1"/>
+                </a:solidFill>
+                <a:latin typeface="Courier New" pitchFamily="49" charset="0"/>
+                <a:cs typeface="Courier New" pitchFamily="49" charset="0"/>
+              </a:rPr>
+              <a:t>conan</a:t>
+            </a:r>
+            <a:r>
+              <a:rPr lang="en-US" b="1" dirty="0">
+                <a:solidFill>
+                  <a:schemeClr val="bg1"/>
+                </a:solidFill>
+                <a:latin typeface="Courier New" pitchFamily="49" charset="0"/>
+                <a:cs typeface="Courier New" pitchFamily="49" charset="0"/>
+              </a:rPr>
+              <a:t> &amp;&amp; </a:t>
+            </a:r>
+            <a:r>
+              <a:rPr lang="en-US" b="1" dirty="0" err="1">
+                <a:solidFill>
+                  <a:schemeClr val="bg1"/>
+                </a:solidFill>
+                <a:latin typeface="Courier New" pitchFamily="49" charset="0"/>
+                <a:cs typeface="Courier New" pitchFamily="49" charset="0"/>
+              </a:rPr>
+              <a:t>conan</a:t>
+            </a:r>
+            <a:r>
+              <a:rPr lang="en-US" b="1" dirty="0">
+                <a:solidFill>
+                  <a:schemeClr val="bg1"/>
+                </a:solidFill>
+                <a:latin typeface="Courier New" pitchFamily="49" charset="0"/>
+                <a:cs typeface="Courier New" pitchFamily="49" charset="0"/>
+              </a:rPr>
+              <a:t> profile detect  --force  </a:t>
+            </a:r>
+            <a:endParaRPr lang="nl-BE" b="1" dirty="0">
+              <a:solidFill>
+                <a:schemeClr val="bg1"/>
+              </a:solidFill>
+              <a:latin typeface="Courier New" pitchFamily="49" charset="0"/>
+              <a:cs typeface="Courier New" pitchFamily="49" charset="0"/>
+            </a:endParaRPr>
+          </a:p>
+        </p:txBody>
+      </p:sp>
+      <p:sp>
+        <p:nvSpPr>
+          <p:cNvPr id="9" name="TextBox 8">
+            <a:extLst>
+              <a:ext uri="{FF2B5EF4-FFF2-40B4-BE49-F238E27FC236}">
+                <a16:creationId xmlns:a16="http://schemas.microsoft.com/office/drawing/2014/main" id="{FFD7ED03-37FB-D1F6-E11E-87F957D13740}"/>
+              </a:ext>
+            </a:extLst>
+          </p:cNvPr>
+          <p:cNvSpPr txBox="1"/>
+          <p:nvPr/>
+        </p:nvSpPr>
+        <p:spPr>
+          <a:xfrm>
+            <a:off x="1244556" y="3315885"/>
+            <a:ext cx="8596130" cy="369332"/>
+          </a:xfrm>
+          <a:prstGeom prst="rect">
+            <a:avLst/>
+          </a:prstGeom>
+          <a:solidFill>
+            <a:schemeClr val="tx1"/>
+          </a:solidFill>
+          <a:ln>
+            <a:solidFill>
+              <a:schemeClr val="tx1"/>
+            </a:solidFill>
+          </a:ln>
+        </p:spPr>
+        <p:txBody>
+          <a:bodyPr wrap="square" rtlCol="0">
+            <a:spAutoFit/>
+          </a:bodyPr>
+          <a:lstStyle/>
+          <a:p>
+            <a:r>
+              <a:rPr lang="en-US" b="1" dirty="0">
+                <a:solidFill>
+                  <a:schemeClr val="bg1"/>
+                </a:solidFill>
+                <a:latin typeface="Courier New" pitchFamily="49" charset="0"/>
+                <a:cs typeface="Courier New" pitchFamily="49" charset="0"/>
+              </a:rPr>
+              <a:t>$  </a:t>
+            </a:r>
+            <a:r>
+              <a:rPr lang="en-US" b="1" dirty="0" err="1">
+                <a:solidFill>
+                  <a:schemeClr val="bg1"/>
+                </a:solidFill>
+                <a:latin typeface="Courier New" pitchFamily="49" charset="0"/>
+                <a:cs typeface="Courier New" pitchFamily="49" charset="0"/>
+              </a:rPr>
+              <a:t>conan</a:t>
+            </a:r>
+            <a:r>
+              <a:rPr lang="en-US" b="1" dirty="0">
+                <a:solidFill>
+                  <a:schemeClr val="bg1"/>
+                </a:solidFill>
+                <a:latin typeface="Courier New" pitchFamily="49" charset="0"/>
+                <a:cs typeface="Courier New" pitchFamily="49" charset="0"/>
+              </a:rPr>
+              <a:t> install . --output-folder=build/  --build=missing</a:t>
+            </a:r>
+            <a:endParaRPr lang="nl-BE" b="1" dirty="0">
+              <a:solidFill>
+                <a:schemeClr val="bg1"/>
+              </a:solidFill>
+              <a:latin typeface="Courier New" pitchFamily="49" charset="0"/>
+              <a:cs typeface="Courier New" pitchFamily="49" charset="0"/>
+            </a:endParaRPr>
+          </a:p>
+        </p:txBody>
+      </p:sp>
+      <p:sp>
+        <p:nvSpPr>
+          <p:cNvPr id="10" name="TextBox 9">
+            <a:extLst>
+              <a:ext uri="{FF2B5EF4-FFF2-40B4-BE49-F238E27FC236}">
+                <a16:creationId xmlns:a16="http://schemas.microsoft.com/office/drawing/2014/main" id="{27AA2343-8684-816B-C4E4-32B1A369AB46}"/>
+              </a:ext>
+            </a:extLst>
+          </p:cNvPr>
+          <p:cNvSpPr txBox="1"/>
+          <p:nvPr/>
+        </p:nvSpPr>
+        <p:spPr>
+          <a:xfrm>
+            <a:off x="1244556" y="4093598"/>
+            <a:ext cx="8596130" cy="369332"/>
+          </a:xfrm>
+          <a:prstGeom prst="rect">
+            <a:avLst/>
+          </a:prstGeom>
+          <a:solidFill>
+            <a:schemeClr val="tx1"/>
+          </a:solidFill>
+          <a:ln>
+            <a:solidFill>
+              <a:schemeClr val="tx1"/>
+            </a:solidFill>
+          </a:ln>
+        </p:spPr>
+        <p:txBody>
+          <a:bodyPr wrap="square" rtlCol="0">
+            <a:spAutoFit/>
+          </a:bodyPr>
+          <a:lstStyle/>
+          <a:p>
+            <a:r>
+              <a:rPr lang="en-US" b="1" dirty="0">
+                <a:solidFill>
+                  <a:schemeClr val="bg1"/>
+                </a:solidFill>
+                <a:latin typeface="Courier New" pitchFamily="49" charset="0"/>
+                <a:cs typeface="Courier New" pitchFamily="49" charset="0"/>
+              </a:rPr>
+              <a:t>$  cd build/</a:t>
+            </a:r>
+            <a:endParaRPr lang="nl-BE" b="1" dirty="0">
+              <a:solidFill>
+                <a:schemeClr val="bg1"/>
+              </a:solidFill>
+              <a:latin typeface="Courier New" pitchFamily="49" charset="0"/>
+              <a:cs typeface="Courier New" pitchFamily="49" charset="0"/>
+            </a:endParaRPr>
+          </a:p>
+        </p:txBody>
+      </p:sp>
+      <p:sp>
+        <p:nvSpPr>
+          <p:cNvPr id="11" name="TextBox 10">
+            <a:extLst>
+              <a:ext uri="{FF2B5EF4-FFF2-40B4-BE49-F238E27FC236}">
+                <a16:creationId xmlns:a16="http://schemas.microsoft.com/office/drawing/2014/main" id="{80D800B7-D9CD-26C6-E7F5-C225C0026105}"/>
+              </a:ext>
+            </a:extLst>
+          </p:cNvPr>
+          <p:cNvSpPr txBox="1"/>
+          <p:nvPr/>
+        </p:nvSpPr>
+        <p:spPr>
+          <a:xfrm>
+            <a:off x="1244556" y="4843113"/>
+            <a:ext cx="8596130" cy="646331"/>
+          </a:xfrm>
+          <a:prstGeom prst="rect">
+            <a:avLst/>
+          </a:prstGeom>
+          <a:solidFill>
+            <a:schemeClr val="tx1"/>
+          </a:solidFill>
+          <a:ln>
+            <a:solidFill>
+              <a:schemeClr val="tx1"/>
+            </a:solidFill>
+          </a:ln>
+        </p:spPr>
+        <p:txBody>
+          <a:bodyPr wrap="square" rtlCol="0">
+            <a:spAutoFit/>
+          </a:bodyPr>
+          <a:lstStyle/>
+          <a:p>
+            <a:r>
+              <a:rPr lang="en-US" b="1" dirty="0">
+                <a:solidFill>
+                  <a:schemeClr val="bg1"/>
+                </a:solidFill>
+                <a:latin typeface="Courier New" pitchFamily="49" charset="0"/>
+                <a:cs typeface="Courier New" pitchFamily="49" charset="0"/>
+              </a:rPr>
+              <a:t>$  </a:t>
+            </a:r>
+            <a:r>
+              <a:rPr lang="en-US" b="1" dirty="0" err="1">
+                <a:solidFill>
+                  <a:schemeClr val="bg1"/>
+                </a:solidFill>
+                <a:latin typeface="Courier New" pitchFamily="49" charset="0"/>
+                <a:cs typeface="Courier New" pitchFamily="49" charset="0"/>
+              </a:rPr>
+              <a:t>cmake</a:t>
+            </a:r>
+            <a:r>
+              <a:rPr lang="en-US" b="1" dirty="0">
+                <a:solidFill>
+                  <a:schemeClr val="bg1"/>
+                </a:solidFill>
+                <a:latin typeface="Courier New" pitchFamily="49" charset="0"/>
+                <a:cs typeface="Courier New" pitchFamily="49" charset="0"/>
+              </a:rPr>
+              <a:t> .. -DCMAKE_TOOLCHAIN_FILE=</a:t>
+            </a:r>
+            <a:r>
+              <a:rPr lang="en-US" b="1" dirty="0" err="1">
+                <a:solidFill>
+                  <a:schemeClr val="bg1"/>
+                </a:solidFill>
+                <a:latin typeface="Courier New" pitchFamily="49" charset="0"/>
+                <a:cs typeface="Courier New" pitchFamily="49" charset="0"/>
+              </a:rPr>
+              <a:t>conan_toolchain.cmake</a:t>
+            </a:r>
+            <a:r>
+              <a:rPr lang="en-US" b="1" dirty="0">
+                <a:solidFill>
+                  <a:schemeClr val="bg1"/>
+                </a:solidFill>
+                <a:latin typeface="Courier New" pitchFamily="49" charset="0"/>
+                <a:cs typeface="Courier New" pitchFamily="49" charset="0"/>
+              </a:rPr>
+              <a:t> \</a:t>
+            </a:r>
+          </a:p>
+          <a:p>
+            <a:r>
+              <a:rPr lang="en-US" b="1" dirty="0">
+                <a:solidFill>
+                  <a:schemeClr val="bg1"/>
+                </a:solidFill>
+                <a:latin typeface="Courier New" pitchFamily="49" charset="0"/>
+                <a:cs typeface="Courier New" pitchFamily="49" charset="0"/>
+              </a:rPr>
+              <a:t>            -DCMAKE_BUILD_TYPE=Release</a:t>
+            </a:r>
+            <a:endParaRPr lang="nl-BE" b="1" dirty="0">
+              <a:solidFill>
+                <a:schemeClr val="bg1"/>
+              </a:solidFill>
+              <a:latin typeface="Courier New" pitchFamily="49" charset="0"/>
+              <a:cs typeface="Courier New" pitchFamily="49" charset="0"/>
+            </a:endParaRPr>
+          </a:p>
+        </p:txBody>
+      </p:sp>
+      <p:sp>
+        <p:nvSpPr>
+          <p:cNvPr id="12" name="TextBox 11">
+            <a:extLst>
+              <a:ext uri="{FF2B5EF4-FFF2-40B4-BE49-F238E27FC236}">
+                <a16:creationId xmlns:a16="http://schemas.microsoft.com/office/drawing/2014/main" id="{F71EF2D7-BBEF-BF21-3B57-3989D45D8C00}"/>
+              </a:ext>
+            </a:extLst>
+          </p:cNvPr>
+          <p:cNvSpPr txBox="1"/>
+          <p:nvPr/>
+        </p:nvSpPr>
+        <p:spPr>
+          <a:xfrm>
+            <a:off x="1244556" y="6010793"/>
+            <a:ext cx="8596130" cy="369332"/>
+          </a:xfrm>
+          <a:prstGeom prst="rect">
+            <a:avLst/>
+          </a:prstGeom>
+          <a:solidFill>
+            <a:schemeClr val="tx1"/>
+          </a:solidFill>
+          <a:ln>
+            <a:solidFill>
+              <a:schemeClr val="tx1"/>
+            </a:solidFill>
+          </a:ln>
+        </p:spPr>
+        <p:txBody>
+          <a:bodyPr wrap="square" rtlCol="0">
+            <a:spAutoFit/>
+          </a:bodyPr>
+          <a:lstStyle/>
+          <a:p>
+            <a:r>
+              <a:rPr lang="en-US" b="1" dirty="0">
+                <a:solidFill>
+                  <a:schemeClr val="bg1"/>
+                </a:solidFill>
+                <a:latin typeface="Courier New" pitchFamily="49" charset="0"/>
+                <a:cs typeface="Courier New" pitchFamily="49" charset="0"/>
+              </a:rPr>
+              <a:t>$  </a:t>
+            </a:r>
+            <a:r>
+              <a:rPr lang="en-US" b="1" dirty="0" err="1">
+                <a:solidFill>
+                  <a:schemeClr val="bg1"/>
+                </a:solidFill>
+                <a:latin typeface="Courier New" pitchFamily="49" charset="0"/>
+                <a:cs typeface="Courier New" pitchFamily="49" charset="0"/>
+              </a:rPr>
+              <a:t>cmake</a:t>
+            </a:r>
+            <a:r>
+              <a:rPr lang="en-US" b="1" dirty="0">
+                <a:solidFill>
+                  <a:schemeClr val="bg1"/>
+                </a:solidFill>
+                <a:latin typeface="Courier New" pitchFamily="49" charset="0"/>
+                <a:cs typeface="Courier New" pitchFamily="49" charset="0"/>
+              </a:rPr>
+              <a:t>  --build .</a:t>
+            </a:r>
+            <a:endParaRPr lang="nl-BE" b="1" dirty="0">
+              <a:solidFill>
+                <a:schemeClr val="bg1"/>
+              </a:solidFill>
+              <a:latin typeface="Courier New" pitchFamily="49" charset="0"/>
+              <a:cs typeface="Courier New" pitchFamily="49" charset="0"/>
+            </a:endParaRPr>
+          </a:p>
+        </p:txBody>
+      </p:sp>
+    </p:spTree>
+    <p:extLst>
+      <p:ext uri="{BB962C8B-B14F-4D97-AF65-F5344CB8AC3E}">
+        <p14:creationId xmlns:p14="http://schemas.microsoft.com/office/powerpoint/2010/main" val="320320306"/>
+      </p:ext>
+    </p:extLst>
+  </p:cSld>
+  <p:clrMapOvr>
+    <a:masterClrMapping/>
+  </p:clrMapOvr>
+  <p:timing>
+    <p:tnLst>
+      <p:par>
+        <p:cTn id="1" dur="indefinite" restart="never" nodeType="tmRoot">
+          <p:childTnLst>
+            <p:seq concurrent="1" nextAc="seek">
+              <p:cTn id="2" dur="indefinite" nodeType="mainSeq">
+                <p:childTnLst>
+                  <p:par>
+                    <p:cTn id="3" fill="hold">
+                      <p:stCondLst>
+                        <p:cond delay="indefinite"/>
+                        <p:cond evt="onBegin" delay="0">
+                          <p:tn val="2"/>
+                        </p:cond>
+                      </p:stCondLst>
+                      <p:childTnLst>
+                        <p:par>
+                          <p:cTn id="4" fill="hold">
+                            <p:stCondLst>
+                              <p:cond delay="0"/>
+                            </p:stCondLst>
+                            <p:childTnLst>
+                              <p:par>
+                                <p:cTn id="5" presetID="1" presetClass="entr" presetSubtype="0" fill="hold" grpId="0" nodeType="withEffect">
+                                  <p:stCondLst>
+                                    <p:cond delay="0"/>
+                                  </p:stCondLst>
+                                  <p:childTnLst>
+                                    <p:set>
+                                      <p:cBhvr>
+                                        <p:cTn id="6" dur="1" fill="hold">
+                                          <p:stCondLst>
+                                            <p:cond delay="0"/>
+                                          </p:stCondLst>
+                                        </p:cTn>
+                                        <p:tgtEl>
+                                          <p:spTgt spid="3">
+                                            <p:txEl>
+                                              <p:pRg st="0" end="0"/>
+                                            </p:txEl>
+                                          </p:spTgt>
+                                        </p:tgtEl>
+                                        <p:attrNameLst>
+                                          <p:attrName>style.visibility</p:attrName>
+                                        </p:attrNameLst>
+                                      </p:cBhvr>
+                                      <p:to>
+                                        <p:strVal val="visible"/>
+                                      </p:to>
+                                    </p:set>
+                                  </p:childTnLst>
+                                </p:cTn>
+                              </p:par>
+                              <p:par>
+                                <p:cTn id="7" presetID="1" presetClass="entr" presetSubtype="0" fill="hold" grpId="0" nodeType="withEffect">
+                                  <p:stCondLst>
+                                    <p:cond delay="0"/>
+                                  </p:stCondLst>
+                                  <p:childTnLst>
+                                    <p:set>
+                                      <p:cBhvr>
+                                        <p:cTn id="8" dur="1" fill="hold">
+                                          <p:stCondLst>
+                                            <p:cond delay="0"/>
+                                          </p:stCondLst>
+                                        </p:cTn>
+                                        <p:tgtEl>
+                                          <p:spTgt spid="5"/>
+                                        </p:tgtEl>
+                                        <p:attrNameLst>
+                                          <p:attrName>style.visibility</p:attrName>
+                                        </p:attrNameLst>
+                                      </p:cBhvr>
+                                      <p:to>
+                                        <p:strVal val="visible"/>
+                                      </p:to>
+                                    </p:set>
+                                  </p:childTnLst>
+                                </p:cTn>
+                              </p:par>
+                            </p:childTnLst>
+                          </p:cTn>
+                        </p:par>
+                      </p:childTnLst>
+                    </p:cTn>
+                  </p:par>
+                  <p:par>
+                    <p:cTn id="9" fill="hold">
+                      <p:stCondLst>
+                        <p:cond delay="indefinite"/>
+                      </p:stCondLst>
+                      <p:childTnLst>
+                        <p:par>
+                          <p:cTn id="10" fill="hold">
+                            <p:stCondLst>
+                              <p:cond delay="0"/>
+                            </p:stCondLst>
+                            <p:childTnLst>
+                              <p:par>
+                                <p:cTn id="11" presetID="1" presetClass="entr" presetSubtype="0" fill="hold" grpId="0" nodeType="clickEffect">
+                                  <p:stCondLst>
+                                    <p:cond delay="0"/>
+                                  </p:stCondLst>
+                                  <p:childTnLst>
+                                    <p:set>
+                                      <p:cBhvr>
+                                        <p:cTn id="12" dur="1" fill="hold">
+                                          <p:stCondLst>
+                                            <p:cond delay="0"/>
+                                          </p:stCondLst>
+                                        </p:cTn>
+                                        <p:tgtEl>
+                                          <p:spTgt spid="3">
+                                            <p:txEl>
+                                              <p:pRg st="2" end="2"/>
+                                            </p:txEl>
+                                          </p:spTgt>
+                                        </p:tgtEl>
+                                        <p:attrNameLst>
+                                          <p:attrName>style.visibility</p:attrName>
+                                        </p:attrNameLst>
+                                      </p:cBhvr>
+                                      <p:to>
+                                        <p:strVal val="visible"/>
+                                      </p:to>
+                                    </p:set>
+                                  </p:childTnLst>
+                                </p:cTn>
+                              </p:par>
+                            </p:childTnLst>
+                          </p:cTn>
+                        </p:par>
+                      </p:childTnLst>
+                    </p:cTn>
+                  </p:par>
+                  <p:par>
+                    <p:cTn id="13" fill="hold">
+                      <p:stCondLst>
+                        <p:cond delay="indefinite"/>
+                      </p:stCondLst>
+                      <p:childTnLst>
+                        <p:par>
+                          <p:cTn id="14" fill="hold">
+                            <p:stCondLst>
+                              <p:cond delay="0"/>
+                            </p:stCondLst>
+                            <p:childTnLst>
+                              <p:par>
+                                <p:cTn id="15" presetID="1" presetClass="entr" presetSubtype="0" fill="hold" grpId="0" nodeType="clickEffect">
+                                  <p:stCondLst>
+                                    <p:cond delay="0"/>
+                                  </p:stCondLst>
+                                  <p:childTnLst>
+                                    <p:set>
+                                      <p:cBhvr>
+                                        <p:cTn id="16" dur="1" fill="hold">
+                                          <p:stCondLst>
+                                            <p:cond delay="0"/>
+                                          </p:stCondLst>
+                                        </p:cTn>
+                                        <p:tgtEl>
+                                          <p:spTgt spid="3">
+                                            <p:txEl>
+                                              <p:pRg st="3" end="3"/>
+                                            </p:txEl>
+                                          </p:spTgt>
+                                        </p:tgtEl>
+                                        <p:attrNameLst>
+                                          <p:attrName>style.visibility</p:attrName>
+                                        </p:attrNameLst>
+                                      </p:cBhvr>
+                                      <p:to>
+                                        <p:strVal val="visible"/>
+                                      </p:to>
+                                    </p:set>
+                                  </p:childTnLst>
+                                </p:cTn>
+                              </p:par>
+                              <p:par>
+                                <p:cTn id="17" presetID="1" presetClass="entr" presetSubtype="0" fill="hold" grpId="0" nodeType="withEffect">
+                                  <p:stCondLst>
+                                    <p:cond delay="0"/>
+                                  </p:stCondLst>
+                                  <p:childTnLst>
+                                    <p:set>
+                                      <p:cBhvr>
+                                        <p:cTn id="18" dur="1" fill="hold">
+                                          <p:stCondLst>
+                                            <p:cond delay="0"/>
+                                          </p:stCondLst>
+                                        </p:cTn>
+                                        <p:tgtEl>
+                                          <p:spTgt spid="9"/>
+                                        </p:tgtEl>
+                                        <p:attrNameLst>
+                                          <p:attrName>style.visibility</p:attrName>
+                                        </p:attrNameLst>
+                                      </p:cBhvr>
+                                      <p:to>
+                                        <p:strVal val="visible"/>
+                                      </p:to>
+                                    </p:set>
+                                  </p:childTnLst>
+                                </p:cTn>
+                              </p:par>
+                            </p:childTnLst>
+                          </p:cTn>
+                        </p:par>
+                      </p:childTnLst>
+                    </p:cTn>
+                  </p:par>
+                  <p:par>
+                    <p:cTn id="19" fill="hold">
+                      <p:stCondLst>
+                        <p:cond delay="indefinite"/>
+                      </p:stCondLst>
+                      <p:childTnLst>
+                        <p:par>
+                          <p:cTn id="20" fill="hold">
+                            <p:stCondLst>
+                              <p:cond delay="0"/>
+                            </p:stCondLst>
+                            <p:childTnLst>
+                              <p:par>
+                                <p:cTn id="21" presetID="1" presetClass="entr" presetSubtype="0" fill="hold" grpId="0" nodeType="clickEffect">
+                                  <p:stCondLst>
+                                    <p:cond delay="0"/>
+                                  </p:stCondLst>
+                                  <p:childTnLst>
+                                    <p:set>
+                                      <p:cBhvr>
+                                        <p:cTn id="22" dur="1" fill="hold">
+                                          <p:stCondLst>
+                                            <p:cond delay="0"/>
+                                          </p:stCondLst>
+                                        </p:cTn>
+                                        <p:tgtEl>
+                                          <p:spTgt spid="3">
+                                            <p:txEl>
+                                              <p:pRg st="5" end="5"/>
+                                            </p:txEl>
+                                          </p:spTgt>
+                                        </p:tgtEl>
+                                        <p:attrNameLst>
+                                          <p:attrName>style.visibility</p:attrName>
+                                        </p:attrNameLst>
+                                      </p:cBhvr>
+                                      <p:to>
+                                        <p:strVal val="visible"/>
+                                      </p:to>
+                                    </p:set>
+                                  </p:childTnLst>
+                                </p:cTn>
+                              </p:par>
+                              <p:par>
+                                <p:cTn id="23" presetID="1" presetClass="entr" presetSubtype="0" fill="hold" grpId="0" nodeType="withEffect">
+                                  <p:stCondLst>
+                                    <p:cond delay="0"/>
+                                  </p:stCondLst>
+                                  <p:childTnLst>
+                                    <p:set>
+                                      <p:cBhvr>
+                                        <p:cTn id="24" dur="1" fill="hold">
+                                          <p:stCondLst>
+                                            <p:cond delay="0"/>
+                                          </p:stCondLst>
+                                        </p:cTn>
+                                        <p:tgtEl>
+                                          <p:spTgt spid="10"/>
+                                        </p:tgtEl>
+                                        <p:attrNameLst>
+                                          <p:attrName>style.visibility</p:attrName>
+                                        </p:attrNameLst>
+                                      </p:cBhvr>
+                                      <p:to>
+                                        <p:strVal val="visible"/>
+                                      </p:to>
+                                    </p:set>
+                                  </p:childTnLst>
+                                </p:cTn>
+                              </p:par>
+                            </p:childTnLst>
+                          </p:cTn>
+                        </p:par>
+                      </p:childTnLst>
+                    </p:cTn>
+                  </p:par>
+                  <p:par>
+                    <p:cTn id="25" fill="hold">
+                      <p:stCondLst>
+                        <p:cond delay="indefinite"/>
+                      </p:stCondLst>
+                      <p:childTnLst>
+                        <p:par>
+                          <p:cTn id="26" fill="hold">
+                            <p:stCondLst>
+                              <p:cond delay="0"/>
+                            </p:stCondLst>
+                            <p:childTnLst>
+                              <p:par>
+                                <p:cTn id="27" presetID="1" presetClass="entr" presetSubtype="0" fill="hold" grpId="0" nodeType="clickEffect">
+                                  <p:stCondLst>
+                                    <p:cond delay="0"/>
+                                  </p:stCondLst>
+                                  <p:childTnLst>
+                                    <p:set>
+                                      <p:cBhvr>
+                                        <p:cTn id="28" dur="1" fill="hold">
+                                          <p:stCondLst>
+                                            <p:cond delay="0"/>
+                                          </p:stCondLst>
+                                        </p:cTn>
+                                        <p:tgtEl>
+                                          <p:spTgt spid="3">
+                                            <p:txEl>
+                                              <p:pRg st="7" end="7"/>
+                                            </p:txEl>
+                                          </p:spTgt>
+                                        </p:tgtEl>
+                                        <p:attrNameLst>
+                                          <p:attrName>style.visibility</p:attrName>
+                                        </p:attrNameLst>
+                                      </p:cBhvr>
+                                      <p:to>
+                                        <p:strVal val="visible"/>
+                                      </p:to>
+                                    </p:set>
+                                  </p:childTnLst>
+                                </p:cTn>
+                              </p:par>
+                              <p:par>
+                                <p:cTn id="29" presetID="1" presetClass="entr" presetSubtype="0" fill="hold" grpId="0" nodeType="withEffect">
+                                  <p:stCondLst>
+                                    <p:cond delay="0"/>
+                                  </p:stCondLst>
+                                  <p:childTnLst>
+                                    <p:set>
+                                      <p:cBhvr>
+                                        <p:cTn id="30" dur="1" fill="hold">
+                                          <p:stCondLst>
+                                            <p:cond delay="0"/>
+                                          </p:stCondLst>
+                                        </p:cTn>
+                                        <p:tgtEl>
+                                          <p:spTgt spid="11"/>
+                                        </p:tgtEl>
+                                        <p:attrNameLst>
+                                          <p:attrName>style.visibility</p:attrName>
+                                        </p:attrNameLst>
+                                      </p:cBhvr>
+                                      <p:to>
+                                        <p:strVal val="visible"/>
+                                      </p:to>
+                                    </p:set>
+                                  </p:childTnLst>
+                                </p:cTn>
+                              </p:par>
+                            </p:childTnLst>
+                          </p:cTn>
+                        </p:par>
+                      </p:childTnLst>
+                    </p:cTn>
+                  </p:par>
+                  <p:par>
+                    <p:cTn id="31" fill="hold">
+                      <p:stCondLst>
+                        <p:cond delay="indefinite"/>
+                      </p:stCondLst>
+                      <p:childTnLst>
+                        <p:par>
+                          <p:cTn id="32" fill="hold">
+                            <p:stCondLst>
+                              <p:cond delay="0"/>
+                            </p:stCondLst>
+                            <p:childTnLst>
+                              <p:par>
+                                <p:cTn id="33" presetID="1" presetClass="entr" presetSubtype="0" fill="hold" grpId="0" nodeType="clickEffect">
+                                  <p:stCondLst>
+                                    <p:cond delay="0"/>
+                                  </p:stCondLst>
+                                  <p:childTnLst>
+                                    <p:set>
+                                      <p:cBhvr>
+                                        <p:cTn id="34" dur="1" fill="hold">
+                                          <p:stCondLst>
+                                            <p:cond delay="0"/>
+                                          </p:stCondLst>
+                                        </p:cTn>
+                                        <p:tgtEl>
+                                          <p:spTgt spid="3">
+                                            <p:txEl>
+                                              <p:pRg st="10" end="10"/>
+                                            </p:txEl>
+                                          </p:spTgt>
+                                        </p:tgtEl>
+                                        <p:attrNameLst>
+                                          <p:attrName>style.visibility</p:attrName>
+                                        </p:attrNameLst>
+                                      </p:cBhvr>
+                                      <p:to>
+                                        <p:strVal val="visible"/>
+                                      </p:to>
+                                    </p:set>
+                                  </p:childTnLst>
+                                </p:cTn>
+                              </p:par>
+                              <p:par>
+                                <p:cTn id="35" presetID="1" presetClass="entr" presetSubtype="0" fill="hold" grpId="0" nodeType="withEffect">
+                                  <p:stCondLst>
+                                    <p:cond delay="0"/>
+                                  </p:stCondLst>
+                                  <p:childTnLst>
+                                    <p:set>
+                                      <p:cBhvr>
+                                        <p:cTn id="36" dur="1" fill="hold">
+                                          <p:stCondLst>
+                                            <p:cond delay="0"/>
+                                          </p:stCondLst>
+                                        </p:cTn>
+                                        <p:tgtEl>
+                                          <p:spTgt spid="12"/>
+                                        </p:tgtEl>
+                                        <p:attrNameLst>
+                                          <p:attrName>style.visibility</p:attrName>
+                                        </p:attrNameLst>
+                                      </p:cBhvr>
+                                      <p:to>
+                                        <p:strVal val="visible"/>
+                                      </p:to>
+                                    </p:set>
+                                  </p:childTnLst>
+                                </p:cTn>
+                              </p:par>
+                            </p:childTnLst>
+                          </p:cTn>
+                        </p:par>
+                      </p:childTnLst>
+                    </p:cTn>
+                  </p:par>
+                </p:childTnLst>
+              </p:cTn>
+              <p:prevCondLst>
+                <p:cond evt="onPrev" delay="0">
+                  <p:tgtEl>
+                    <p:sldTgt/>
+                  </p:tgtEl>
+                </p:cond>
+              </p:prevCondLst>
+              <p:nextCondLst>
+                <p:cond evt="onNext" delay="0">
+                  <p:tgtEl>
+                    <p:sldTgt/>
+                  </p:tgtEl>
+                </p:cond>
+              </p:nextCondLst>
+            </p:seq>
+          </p:childTnLst>
+        </p:cTn>
+      </p:par>
+    </p:tnLst>
+    <p:bldLst>
+      <p:bldP spid="3" grpId="0" uiExpand="1" build="p"/>
+      <p:bldP spid="5" grpId="0" animBg="1"/>
+      <p:bldP spid="9" grpId="0" animBg="1"/>
+      <p:bldP spid="10" grpId="0" animBg="1"/>
+      <p:bldP spid="11" grpId="0" animBg="1"/>
+      <p:bldP spid="12" grpId="0" animBg="1"/>
+    </p:bldLst>
+  </p:timing>
 </p:sld>
 </file>
 
@@ -12628,6 +13743,2766 @@
     <p:extLst>
       <p:ext uri="{BB962C8B-B14F-4D97-AF65-F5344CB8AC3E}">
         <p14:creationId xmlns:p14="http://schemas.microsoft.com/office/powerpoint/2010/main" val="2488509471"/>
+      </p:ext>
+    </p:extLst>
+  </p:cSld>
+  <p:clrMapOvr>
+    <a:masterClrMapping/>
+  </p:clrMapOvr>
+</p:sld>
+</file>
+
+<file path=ppt/slides/slide30.xml><?xml version="1.0" encoding="utf-8"?>
+<p:sld xmlns:a="http://schemas.openxmlformats.org/drawingml/2006/main" xmlns:r="http://schemas.openxmlformats.org/officeDocument/2006/relationships" xmlns:p="http://schemas.openxmlformats.org/presentationml/2006/main">
+  <p:cSld>
+    <p:spTree>
+      <p:nvGrpSpPr>
+        <p:cNvPr id="1" name=""/>
+        <p:cNvGrpSpPr/>
+        <p:nvPr/>
+      </p:nvGrpSpPr>
+      <p:grpSpPr>
+        <a:xfrm>
+          <a:off x="0" y="0"/>
+          <a:ext cx="0" cy="0"/>
+          <a:chOff x="0" y="0"/>
+          <a:chExt cx="0" cy="0"/>
+        </a:xfrm>
+      </p:grpSpPr>
+      <p:sp>
+        <p:nvSpPr>
+          <p:cNvPr id="2" name="Title 1">
+            <a:extLst>
+              <a:ext uri="{FF2B5EF4-FFF2-40B4-BE49-F238E27FC236}">
+                <a16:creationId xmlns:a16="http://schemas.microsoft.com/office/drawing/2014/main" id="{DC88F323-D508-052E-81AA-3967DF5D3EE4}"/>
+              </a:ext>
+            </a:extLst>
+          </p:cNvPr>
+          <p:cNvSpPr>
+            <a:spLocks noGrp="1"/>
+          </p:cNvSpPr>
+          <p:nvPr>
+            <p:ph type="title"/>
+          </p:nvPr>
+        </p:nvSpPr>
+        <p:spPr/>
+        <p:txBody>
+          <a:bodyPr/>
+          <a:lstStyle/>
+          <a:p>
+            <a:r>
+              <a:rPr lang="en-US" dirty="0"/>
+              <a:t>Conan </a:t>
+            </a:r>
+            <a:r>
+              <a:rPr lang="en-US" dirty="0">
+                <a:latin typeface="Courier New" panose="02070309020205020404" pitchFamily="49" charset="0"/>
+                <a:cs typeface="Courier New" panose="02070309020205020404" pitchFamily="49" charset="0"/>
+              </a:rPr>
+              <a:t>conanfile.txt</a:t>
+            </a:r>
+            <a:endParaRPr lang="LID4096" dirty="0">
+              <a:latin typeface="Courier New" panose="02070309020205020404" pitchFamily="49" charset="0"/>
+              <a:cs typeface="Courier New" panose="02070309020205020404" pitchFamily="49" charset="0"/>
+            </a:endParaRPr>
+          </a:p>
+        </p:txBody>
+      </p:sp>
+      <p:sp>
+        <p:nvSpPr>
+          <p:cNvPr id="4" name="Slide Number Placeholder 3">
+            <a:extLst>
+              <a:ext uri="{FF2B5EF4-FFF2-40B4-BE49-F238E27FC236}">
+                <a16:creationId xmlns:a16="http://schemas.microsoft.com/office/drawing/2014/main" id="{94948D6F-B812-A6FE-48AE-8C1C6DAC7086}"/>
+              </a:ext>
+            </a:extLst>
+          </p:cNvPr>
+          <p:cNvSpPr>
+            <a:spLocks noGrp="1"/>
+          </p:cNvSpPr>
+          <p:nvPr>
+            <p:ph type="sldNum" sz="quarter" idx="12"/>
+          </p:nvPr>
+        </p:nvSpPr>
+        <p:spPr/>
+        <p:txBody>
+          <a:bodyPr/>
+          <a:lstStyle/>
+          <a:p>
+            <a:fld id="{FDB1AA33-DFBB-49AC-8CEE-23FFECEB5648}" type="slidenum">
+              <a:rPr lang="LID4096" smtClean="0"/>
+              <a:t>30</a:t>
+            </a:fld>
+            <a:endParaRPr lang="LID4096"/>
+          </a:p>
+        </p:txBody>
+      </p:sp>
+      <p:sp>
+        <p:nvSpPr>
+          <p:cNvPr id="6" name="TextBox 5">
+            <a:extLst>
+              <a:ext uri="{FF2B5EF4-FFF2-40B4-BE49-F238E27FC236}">
+                <a16:creationId xmlns:a16="http://schemas.microsoft.com/office/drawing/2014/main" id="{03885617-2387-7D06-419B-33D3DD032E99}"/>
+              </a:ext>
+            </a:extLst>
+          </p:cNvPr>
+          <p:cNvSpPr txBox="1"/>
+          <p:nvPr/>
+        </p:nvSpPr>
+        <p:spPr>
+          <a:xfrm>
+            <a:off x="961528" y="2261499"/>
+            <a:ext cx="3882616" cy="1754326"/>
+          </a:xfrm>
+          <a:prstGeom prst="rect">
+            <a:avLst/>
+          </a:prstGeom>
+          <a:solidFill>
+            <a:schemeClr val="accent6">
+              <a:lumMod val="20000"/>
+              <a:lumOff val="80000"/>
+            </a:schemeClr>
+          </a:solidFill>
+        </p:spPr>
+        <p:txBody>
+          <a:bodyPr wrap="square" rtlCol="0">
+            <a:spAutoFit/>
+          </a:bodyPr>
+          <a:lstStyle/>
+          <a:p>
+            <a:pPr lvl="0">
+              <a:defRPr/>
+            </a:pPr>
+            <a:r>
+              <a:rPr lang="en-US">
+                <a:solidFill>
+                  <a:prstClr val="black"/>
+                </a:solidFill>
+                <a:latin typeface="Courier New" pitchFamily="49" charset="0"/>
+                <a:cs typeface="Courier New" pitchFamily="49" charset="0"/>
+              </a:rPr>
+              <a:t>[requires]</a:t>
+            </a:r>
+          </a:p>
+          <a:p>
+            <a:pPr lvl="0">
+              <a:defRPr/>
+            </a:pPr>
+            <a:r>
+              <a:rPr lang="en-US">
+                <a:solidFill>
+                  <a:prstClr val="black"/>
+                </a:solidFill>
+                <a:latin typeface="Courier New" pitchFamily="49" charset="0"/>
+                <a:cs typeface="Courier New" pitchFamily="49" charset="0"/>
+              </a:rPr>
+              <a:t>blaze/3.8.2@</a:t>
+            </a:r>
+          </a:p>
+          <a:p>
+            <a:pPr lvl="0">
+              <a:defRPr/>
+            </a:pPr>
+            <a:endParaRPr lang="en-US">
+              <a:solidFill>
+                <a:prstClr val="black"/>
+              </a:solidFill>
+              <a:latin typeface="Courier New" pitchFamily="49" charset="0"/>
+              <a:cs typeface="Courier New" pitchFamily="49" charset="0"/>
+            </a:endParaRPr>
+          </a:p>
+          <a:p>
+            <a:pPr lvl="0">
+              <a:defRPr/>
+            </a:pPr>
+            <a:r>
+              <a:rPr lang="en-US">
+                <a:solidFill>
+                  <a:prstClr val="black"/>
+                </a:solidFill>
+                <a:latin typeface="Courier New" pitchFamily="49" charset="0"/>
+                <a:cs typeface="Courier New" pitchFamily="49" charset="0"/>
+              </a:rPr>
+              <a:t>[generators]</a:t>
+            </a:r>
+          </a:p>
+          <a:p>
+            <a:pPr lvl="0">
+              <a:defRPr/>
+            </a:pPr>
+            <a:r>
+              <a:rPr lang="en-US">
+                <a:solidFill>
+                  <a:prstClr val="black"/>
+                </a:solidFill>
+                <a:latin typeface="Courier New" pitchFamily="49" charset="0"/>
+                <a:cs typeface="Courier New" pitchFamily="49" charset="0"/>
+              </a:rPr>
+              <a:t>CMakeDeps</a:t>
+            </a:r>
+          </a:p>
+          <a:p>
+            <a:pPr lvl="0">
+              <a:defRPr/>
+            </a:pPr>
+            <a:r>
+              <a:rPr lang="en-US">
+                <a:solidFill>
+                  <a:prstClr val="black"/>
+                </a:solidFill>
+                <a:latin typeface="Courier New" pitchFamily="49" charset="0"/>
+                <a:cs typeface="Courier New" pitchFamily="49" charset="0"/>
+              </a:rPr>
+              <a:t>CMakeToolchain</a:t>
+            </a:r>
+            <a:endParaRPr kumimoji="0" lang="en-US" b="0" i="0" u="none" strike="noStrike" kern="1200" cap="none" spc="0" normalizeH="0" baseline="0" noProof="0" dirty="0">
+              <a:ln>
+                <a:noFill/>
+              </a:ln>
+              <a:solidFill>
+                <a:prstClr val="black"/>
+              </a:solidFill>
+              <a:effectLst/>
+              <a:uLnTx/>
+              <a:uFillTx/>
+              <a:latin typeface="Courier New" pitchFamily="49" charset="0"/>
+              <a:cs typeface="Courier New" pitchFamily="49" charset="0"/>
+            </a:endParaRPr>
+          </a:p>
+        </p:txBody>
+      </p:sp>
+      <p:grpSp>
+        <p:nvGrpSpPr>
+          <p:cNvPr id="7" name="Group 6">
+            <a:extLst>
+              <a:ext uri="{FF2B5EF4-FFF2-40B4-BE49-F238E27FC236}">
+                <a16:creationId xmlns:a16="http://schemas.microsoft.com/office/drawing/2014/main" id="{8D1DBEB0-B557-06A2-DEA1-A7F8BE805909}"/>
+              </a:ext>
+            </a:extLst>
+          </p:cNvPr>
+          <p:cNvGrpSpPr/>
+          <p:nvPr/>
+        </p:nvGrpSpPr>
+        <p:grpSpPr>
+          <a:xfrm>
+            <a:off x="2775858" y="2359861"/>
+            <a:ext cx="5547908" cy="523220"/>
+            <a:chOff x="6226629" y="2076833"/>
+            <a:chExt cx="5547908" cy="523220"/>
+          </a:xfrm>
+        </p:grpSpPr>
+        <p:sp>
+          <p:nvSpPr>
+            <p:cNvPr id="8" name="TextBox 7">
+              <a:extLst>
+                <a:ext uri="{FF2B5EF4-FFF2-40B4-BE49-F238E27FC236}">
+                  <a16:creationId xmlns:a16="http://schemas.microsoft.com/office/drawing/2014/main" id="{C971371F-2DC9-3A08-DFDE-0F24C0B7576C}"/>
+                </a:ext>
+              </a:extLst>
+            </p:cNvPr>
+            <p:cNvSpPr txBox="1"/>
+            <p:nvPr/>
+          </p:nvSpPr>
+          <p:spPr>
+            <a:xfrm>
+              <a:off x="8425543" y="2076833"/>
+              <a:ext cx="3348994" cy="523220"/>
+            </a:xfrm>
+            <a:prstGeom prst="rect">
+              <a:avLst/>
+            </a:prstGeom>
+            <a:noFill/>
+            <a:ln>
+              <a:solidFill>
+                <a:schemeClr val="tx1"/>
+              </a:solidFill>
+            </a:ln>
+          </p:spPr>
+          <p:txBody>
+            <a:bodyPr wrap="square" rtlCol="0">
+              <a:spAutoFit/>
+            </a:bodyPr>
+            <a:lstStyle/>
+            <a:p>
+              <a:pPr algn="ctr"/>
+              <a:r>
+                <a:rPr lang="en-US" sz="2800" dirty="0"/>
+                <a:t>Dependencies</a:t>
+              </a:r>
+              <a:endParaRPr lang="LID4096" sz="2800" dirty="0"/>
+            </a:p>
+          </p:txBody>
+        </p:sp>
+        <p:cxnSp>
+          <p:nvCxnSpPr>
+            <p:cNvPr id="9" name="Straight Arrow Connector 8">
+              <a:extLst>
+                <a:ext uri="{FF2B5EF4-FFF2-40B4-BE49-F238E27FC236}">
+                  <a16:creationId xmlns:a16="http://schemas.microsoft.com/office/drawing/2014/main" id="{D3CA3A64-A19E-614C-9D2E-8EC0B253E329}"/>
+                </a:ext>
+              </a:extLst>
+            </p:cNvPr>
+            <p:cNvCxnSpPr>
+              <a:cxnSpLocks/>
+              <a:stCxn id="8" idx="1"/>
+            </p:cNvCxnSpPr>
+            <p:nvPr/>
+          </p:nvCxnSpPr>
+          <p:spPr>
+            <a:xfrm flipH="1">
+              <a:off x="6226629" y="2338443"/>
+              <a:ext cx="2198914" cy="99957"/>
+            </a:xfrm>
+            <a:prstGeom prst="straightConnector1">
+              <a:avLst/>
+            </a:prstGeom>
+            <a:ln>
+              <a:solidFill>
+                <a:schemeClr val="tx1"/>
+              </a:solidFill>
+              <a:tailEnd type="stealth" w="lg" len="lg"/>
+            </a:ln>
+          </p:spPr>
+          <p:style>
+            <a:lnRef idx="2">
+              <a:schemeClr val="accent1"/>
+            </a:lnRef>
+            <a:fillRef idx="0">
+              <a:schemeClr val="accent1"/>
+            </a:fillRef>
+            <a:effectRef idx="1">
+              <a:schemeClr val="accent1"/>
+            </a:effectRef>
+            <a:fontRef idx="minor">
+              <a:schemeClr val="tx1"/>
+            </a:fontRef>
+          </p:style>
+        </p:cxnSp>
+      </p:grpSp>
+      <p:grpSp>
+        <p:nvGrpSpPr>
+          <p:cNvPr id="10" name="Group 9">
+            <a:extLst>
+              <a:ext uri="{FF2B5EF4-FFF2-40B4-BE49-F238E27FC236}">
+                <a16:creationId xmlns:a16="http://schemas.microsoft.com/office/drawing/2014/main" id="{A8F2148E-D168-66D4-0394-2B03932499A8}"/>
+              </a:ext>
+            </a:extLst>
+          </p:cNvPr>
+          <p:cNvGrpSpPr/>
+          <p:nvPr/>
+        </p:nvGrpSpPr>
+        <p:grpSpPr>
+          <a:xfrm>
+            <a:off x="3200400" y="3311822"/>
+            <a:ext cx="5123366" cy="523220"/>
+            <a:chOff x="6651171" y="2076833"/>
+            <a:chExt cx="5123366" cy="523220"/>
+          </a:xfrm>
+        </p:grpSpPr>
+        <p:sp>
+          <p:nvSpPr>
+            <p:cNvPr id="11" name="TextBox 10">
+              <a:extLst>
+                <a:ext uri="{FF2B5EF4-FFF2-40B4-BE49-F238E27FC236}">
+                  <a16:creationId xmlns:a16="http://schemas.microsoft.com/office/drawing/2014/main" id="{4AF9A261-C482-DD5C-5981-86DCB3D9621D}"/>
+                </a:ext>
+              </a:extLst>
+            </p:cNvPr>
+            <p:cNvSpPr txBox="1"/>
+            <p:nvPr/>
+          </p:nvSpPr>
+          <p:spPr>
+            <a:xfrm>
+              <a:off x="8425543" y="2076833"/>
+              <a:ext cx="3348994" cy="523220"/>
+            </a:xfrm>
+            <a:prstGeom prst="rect">
+              <a:avLst/>
+            </a:prstGeom>
+            <a:noFill/>
+            <a:ln>
+              <a:solidFill>
+                <a:schemeClr val="tx1"/>
+              </a:solidFill>
+            </a:ln>
+          </p:spPr>
+          <p:txBody>
+            <a:bodyPr wrap="square" rtlCol="0">
+              <a:spAutoFit/>
+            </a:bodyPr>
+            <a:lstStyle/>
+            <a:p>
+              <a:pPr algn="ctr"/>
+              <a:r>
+                <a:rPr lang="en-US" sz="2800" dirty="0"/>
+                <a:t>Build generator</a:t>
+              </a:r>
+              <a:endParaRPr lang="LID4096" sz="2800" dirty="0"/>
+            </a:p>
+          </p:txBody>
+        </p:sp>
+        <p:cxnSp>
+          <p:nvCxnSpPr>
+            <p:cNvPr id="12" name="Straight Arrow Connector 11">
+              <a:extLst>
+                <a:ext uri="{FF2B5EF4-FFF2-40B4-BE49-F238E27FC236}">
+                  <a16:creationId xmlns:a16="http://schemas.microsoft.com/office/drawing/2014/main" id="{2C7EBFB8-4B1A-B948-4738-A820942FCF25}"/>
+                </a:ext>
+              </a:extLst>
+            </p:cNvPr>
+            <p:cNvCxnSpPr>
+              <a:cxnSpLocks/>
+              <a:stCxn id="11" idx="1"/>
+            </p:cNvCxnSpPr>
+            <p:nvPr/>
+          </p:nvCxnSpPr>
+          <p:spPr>
+            <a:xfrm flipH="1">
+              <a:off x="6651171" y="2338443"/>
+              <a:ext cx="1774372" cy="78779"/>
+            </a:xfrm>
+            <a:prstGeom prst="straightConnector1">
+              <a:avLst/>
+            </a:prstGeom>
+            <a:ln>
+              <a:solidFill>
+                <a:schemeClr val="tx1"/>
+              </a:solidFill>
+              <a:tailEnd type="stealth" w="lg" len="lg"/>
+            </a:ln>
+          </p:spPr>
+          <p:style>
+            <a:lnRef idx="2">
+              <a:schemeClr val="accent1"/>
+            </a:lnRef>
+            <a:fillRef idx="0">
+              <a:schemeClr val="accent1"/>
+            </a:fillRef>
+            <a:effectRef idx="1">
+              <a:schemeClr val="accent1"/>
+            </a:effectRef>
+            <a:fontRef idx="minor">
+              <a:schemeClr val="tx1"/>
+            </a:fontRef>
+          </p:style>
+        </p:cxnSp>
+      </p:grpSp>
+      <p:sp>
+        <p:nvSpPr>
+          <p:cNvPr id="14" name="TextBox 13">
+            <a:extLst>
+              <a:ext uri="{FF2B5EF4-FFF2-40B4-BE49-F238E27FC236}">
+                <a16:creationId xmlns:a16="http://schemas.microsoft.com/office/drawing/2014/main" id="{C33776B5-EDE2-7785-DB56-371FC5AE1F99}"/>
+              </a:ext>
+            </a:extLst>
+          </p:cNvPr>
+          <p:cNvSpPr txBox="1"/>
+          <p:nvPr/>
+        </p:nvSpPr>
+        <p:spPr>
+          <a:xfrm>
+            <a:off x="466923" y="4735915"/>
+            <a:ext cx="10578793" cy="646331"/>
+          </a:xfrm>
+          <a:prstGeom prst="rect">
+            <a:avLst/>
+          </a:prstGeom>
+          <a:noFill/>
+          <a:ln>
+            <a:solidFill>
+              <a:schemeClr val="tx1"/>
+            </a:solidFill>
+          </a:ln>
+        </p:spPr>
+        <p:txBody>
+          <a:bodyPr wrap="none" rtlCol="0">
+            <a:spAutoFit/>
+          </a:bodyPr>
+          <a:lstStyle/>
+          <a:p>
+            <a:r>
+              <a:rPr lang="en-US" sz="2000" dirty="0"/>
+              <a:t>See</a:t>
+            </a:r>
+          </a:p>
+          <a:p>
+            <a:r>
+              <a:rPr lang="en-US" sz="1600" dirty="0">
+                <a:hlinkClick r:id="rId2"/>
+              </a:rPr>
+              <a:t>https://github.com/gjbex/C-plus-plus-software-engineering/tree/main/source-code/dependency-management/conan</a:t>
+            </a:r>
+            <a:r>
+              <a:rPr lang="en-US" sz="1600" dirty="0"/>
+              <a:t>  </a:t>
+            </a:r>
+            <a:endParaRPr lang="LID4096" sz="1600" dirty="0"/>
+          </a:p>
+        </p:txBody>
+      </p:sp>
+    </p:spTree>
+    <p:extLst>
+      <p:ext uri="{BB962C8B-B14F-4D97-AF65-F5344CB8AC3E}">
+        <p14:creationId xmlns:p14="http://schemas.microsoft.com/office/powerpoint/2010/main" val="72915374"/>
+      </p:ext>
+    </p:extLst>
+  </p:cSld>
+  <p:clrMapOvr>
+    <a:masterClrMapping/>
+  </p:clrMapOvr>
+  <p:timing>
+    <p:tnLst>
+      <p:par>
+        <p:cTn id="1" dur="indefinite" restart="never" nodeType="tmRoot">
+          <p:childTnLst>
+            <p:seq concurrent="1" nextAc="seek">
+              <p:cTn id="2" dur="indefinite" nodeType="mainSeq">
+                <p:childTnLst>
+                  <p:par>
+                    <p:cTn id="3" fill="hold">
+                      <p:stCondLst>
+                        <p:cond delay="indefinite"/>
+                      </p:stCondLst>
+                      <p:childTnLst>
+                        <p:par>
+                          <p:cTn id="4" fill="hold">
+                            <p:stCondLst>
+                              <p:cond delay="0"/>
+                            </p:stCondLst>
+                            <p:childTnLst>
+                              <p:par>
+                                <p:cTn id="5" presetID="1" presetClass="entr" presetSubtype="0" fill="hold" nodeType="clickEffect">
+                                  <p:stCondLst>
+                                    <p:cond delay="0"/>
+                                  </p:stCondLst>
+                                  <p:childTnLst>
+                                    <p:set>
+                                      <p:cBhvr>
+                                        <p:cTn id="6" dur="1" fill="hold">
+                                          <p:stCondLst>
+                                            <p:cond delay="0"/>
+                                          </p:stCondLst>
+                                        </p:cTn>
+                                        <p:tgtEl>
+                                          <p:spTgt spid="7"/>
+                                        </p:tgtEl>
+                                        <p:attrNameLst>
+                                          <p:attrName>style.visibility</p:attrName>
+                                        </p:attrNameLst>
+                                      </p:cBhvr>
+                                      <p:to>
+                                        <p:strVal val="visible"/>
+                                      </p:to>
+                                    </p:set>
+                                  </p:childTnLst>
+                                </p:cTn>
+                              </p:par>
+                            </p:childTnLst>
+                          </p:cTn>
+                        </p:par>
+                      </p:childTnLst>
+                    </p:cTn>
+                  </p:par>
+                  <p:par>
+                    <p:cTn id="7" fill="hold">
+                      <p:stCondLst>
+                        <p:cond delay="indefinite"/>
+                      </p:stCondLst>
+                      <p:childTnLst>
+                        <p:par>
+                          <p:cTn id="8" fill="hold">
+                            <p:stCondLst>
+                              <p:cond delay="0"/>
+                            </p:stCondLst>
+                            <p:childTnLst>
+                              <p:par>
+                                <p:cTn id="9" presetID="1" presetClass="entr" presetSubtype="0" fill="hold" nodeType="clickEffect">
+                                  <p:stCondLst>
+                                    <p:cond delay="0"/>
+                                  </p:stCondLst>
+                                  <p:childTnLst>
+                                    <p:set>
+                                      <p:cBhvr>
+                                        <p:cTn id="10" dur="1" fill="hold">
+                                          <p:stCondLst>
+                                            <p:cond delay="0"/>
+                                          </p:stCondLst>
+                                        </p:cTn>
+                                        <p:tgtEl>
+                                          <p:spTgt spid="10"/>
+                                        </p:tgtEl>
+                                        <p:attrNameLst>
+                                          <p:attrName>style.visibility</p:attrName>
+                                        </p:attrNameLst>
+                                      </p:cBhvr>
+                                      <p:to>
+                                        <p:strVal val="visible"/>
+                                      </p:to>
+                                    </p:set>
+                                  </p:childTnLst>
+                                </p:cTn>
+                              </p:par>
+                            </p:childTnLst>
+                          </p:cTn>
+                        </p:par>
+                      </p:childTnLst>
+                    </p:cTn>
+                  </p:par>
+                  <p:par>
+                    <p:cTn id="11" fill="hold">
+                      <p:stCondLst>
+                        <p:cond delay="indefinite"/>
+                      </p:stCondLst>
+                      <p:childTnLst>
+                        <p:par>
+                          <p:cTn id="12" fill="hold">
+                            <p:stCondLst>
+                              <p:cond delay="0"/>
+                            </p:stCondLst>
+                            <p:childTnLst>
+                              <p:par>
+                                <p:cTn id="13" presetID="1" presetClass="entr" presetSubtype="0" fill="hold" grpId="0" nodeType="clickEffect">
+                                  <p:stCondLst>
+                                    <p:cond delay="0"/>
+                                  </p:stCondLst>
+                                  <p:childTnLst>
+                                    <p:set>
+                                      <p:cBhvr>
+                                        <p:cTn id="14" dur="1" fill="hold">
+                                          <p:stCondLst>
+                                            <p:cond delay="0"/>
+                                          </p:stCondLst>
+                                        </p:cTn>
+                                        <p:tgtEl>
+                                          <p:spTgt spid="14"/>
+                                        </p:tgtEl>
+                                        <p:attrNameLst>
+                                          <p:attrName>style.visibility</p:attrName>
+                                        </p:attrNameLst>
+                                      </p:cBhvr>
+                                      <p:to>
+                                        <p:strVal val="visible"/>
+                                      </p:to>
+                                    </p:set>
+                                  </p:childTnLst>
+                                </p:cTn>
+                              </p:par>
+                            </p:childTnLst>
+                          </p:cTn>
+                        </p:par>
+                      </p:childTnLst>
+                    </p:cTn>
+                  </p:par>
+                </p:childTnLst>
+              </p:cTn>
+              <p:prevCondLst>
+                <p:cond evt="onPrev" delay="0">
+                  <p:tgtEl>
+                    <p:sldTgt/>
+                  </p:tgtEl>
+                </p:cond>
+              </p:prevCondLst>
+              <p:nextCondLst>
+                <p:cond evt="onNext" delay="0">
+                  <p:tgtEl>
+                    <p:sldTgt/>
+                  </p:tgtEl>
+                </p:cond>
+              </p:nextCondLst>
+            </p:seq>
+          </p:childTnLst>
+        </p:cTn>
+      </p:par>
+    </p:tnLst>
+    <p:bldLst>
+      <p:bldP spid="14" grpId="0" animBg="1"/>
+    </p:bldLst>
+  </p:timing>
+</p:sld>
+</file>
+
+<file path=ppt/slides/slide31.xml><?xml version="1.0" encoding="utf-8"?>
+<p:sld xmlns:a="http://schemas.openxmlformats.org/drawingml/2006/main" xmlns:r="http://schemas.openxmlformats.org/officeDocument/2006/relationships" xmlns:p="http://schemas.openxmlformats.org/presentationml/2006/main">
+  <p:cSld>
+    <p:spTree>
+      <p:nvGrpSpPr>
+        <p:cNvPr id="1" name=""/>
+        <p:cNvGrpSpPr/>
+        <p:nvPr/>
+      </p:nvGrpSpPr>
+      <p:grpSpPr>
+        <a:xfrm>
+          <a:off x="0" y="0"/>
+          <a:ext cx="0" cy="0"/>
+          <a:chOff x="0" y="0"/>
+          <a:chExt cx="0" cy="0"/>
+        </a:xfrm>
+      </p:grpSpPr>
+      <p:sp>
+        <p:nvSpPr>
+          <p:cNvPr id="2" name="Title 1">
+            <a:extLst>
+              <a:ext uri="{FF2B5EF4-FFF2-40B4-BE49-F238E27FC236}">
+                <a16:creationId xmlns:a16="http://schemas.microsoft.com/office/drawing/2014/main" id="{D2382BC6-BD02-92B3-6DF5-32826DD98E9F}"/>
+              </a:ext>
+            </a:extLst>
+          </p:cNvPr>
+          <p:cNvSpPr>
+            <a:spLocks noGrp="1"/>
+          </p:cNvSpPr>
+          <p:nvPr>
+            <p:ph type="title"/>
+          </p:nvPr>
+        </p:nvSpPr>
+        <p:spPr/>
+        <p:txBody>
+          <a:bodyPr/>
+          <a:lstStyle/>
+          <a:p>
+            <a:r>
+              <a:rPr lang="en-US" dirty="0" err="1"/>
+              <a:t>vcpkg</a:t>
+            </a:r>
+            <a:endParaRPr lang="LID4096" dirty="0"/>
+          </a:p>
+        </p:txBody>
+      </p:sp>
+      <p:sp>
+        <p:nvSpPr>
+          <p:cNvPr id="4" name="Content Placeholder 3">
+            <a:extLst>
+              <a:ext uri="{FF2B5EF4-FFF2-40B4-BE49-F238E27FC236}">
+                <a16:creationId xmlns:a16="http://schemas.microsoft.com/office/drawing/2014/main" id="{1BC03A33-90AE-45DE-95DE-9952DA2C49FD}"/>
+              </a:ext>
+            </a:extLst>
+          </p:cNvPr>
+          <p:cNvSpPr>
+            <a:spLocks noGrp="1"/>
+          </p:cNvSpPr>
+          <p:nvPr>
+            <p:ph idx="1"/>
+          </p:nvPr>
+        </p:nvSpPr>
+        <p:spPr/>
+        <p:txBody>
+          <a:bodyPr/>
+          <a:lstStyle/>
+          <a:p>
+            <a:r>
+              <a:rPr lang="en-US" dirty="0"/>
+              <a:t>Install </a:t>
+            </a:r>
+            <a:r>
+              <a:rPr lang="en-US" dirty="0" err="1"/>
+              <a:t>vcpkg</a:t>
+            </a:r>
+            <a:endParaRPr lang="en-US" dirty="0"/>
+          </a:p>
+          <a:p>
+            <a:endParaRPr lang="en-US" dirty="0"/>
+          </a:p>
+          <a:p>
+            <a:endParaRPr lang="en-US" dirty="0"/>
+          </a:p>
+          <a:p>
+            <a:r>
+              <a:rPr lang="en-US" dirty="0"/>
+              <a:t>Install packages, e.g., blaze</a:t>
+            </a:r>
+          </a:p>
+          <a:p>
+            <a:endParaRPr lang="en-US" dirty="0"/>
+          </a:p>
+          <a:p>
+            <a:r>
+              <a:rPr lang="en-US" dirty="0"/>
+              <a:t>Build your software</a:t>
+            </a:r>
+            <a:endParaRPr lang="LID4096" dirty="0"/>
+          </a:p>
+        </p:txBody>
+      </p:sp>
+      <p:sp>
+        <p:nvSpPr>
+          <p:cNvPr id="3" name="Slide Number Placeholder 2">
+            <a:extLst>
+              <a:ext uri="{FF2B5EF4-FFF2-40B4-BE49-F238E27FC236}">
+                <a16:creationId xmlns:a16="http://schemas.microsoft.com/office/drawing/2014/main" id="{234AA61E-C7B7-2C01-844D-B47CFE0199FA}"/>
+              </a:ext>
+            </a:extLst>
+          </p:cNvPr>
+          <p:cNvSpPr>
+            <a:spLocks noGrp="1"/>
+          </p:cNvSpPr>
+          <p:nvPr>
+            <p:ph type="sldNum" sz="quarter" idx="12"/>
+          </p:nvPr>
+        </p:nvSpPr>
+        <p:spPr/>
+        <p:txBody>
+          <a:bodyPr/>
+          <a:lstStyle/>
+          <a:p>
+            <a:fld id="{FDB1AA33-DFBB-49AC-8CEE-23FFECEB5648}" type="slidenum">
+              <a:rPr lang="LID4096" smtClean="0"/>
+              <a:t>31</a:t>
+            </a:fld>
+            <a:endParaRPr lang="LID4096"/>
+          </a:p>
+        </p:txBody>
+      </p:sp>
+      <p:sp>
+        <p:nvSpPr>
+          <p:cNvPr id="9" name="TextBox 8">
+            <a:extLst>
+              <a:ext uri="{FF2B5EF4-FFF2-40B4-BE49-F238E27FC236}">
+                <a16:creationId xmlns:a16="http://schemas.microsoft.com/office/drawing/2014/main" id="{5C5911E9-B258-F3C0-F651-E01F9EEDC7BF}"/>
+              </a:ext>
+            </a:extLst>
+          </p:cNvPr>
+          <p:cNvSpPr txBox="1"/>
+          <p:nvPr/>
+        </p:nvSpPr>
+        <p:spPr>
+          <a:xfrm>
+            <a:off x="1320756" y="2321241"/>
+            <a:ext cx="10348728" cy="923330"/>
+          </a:xfrm>
+          <a:prstGeom prst="rect">
+            <a:avLst/>
+          </a:prstGeom>
+          <a:solidFill>
+            <a:schemeClr val="tx1"/>
+          </a:solidFill>
+          <a:ln>
+            <a:solidFill>
+              <a:schemeClr val="tx1"/>
+            </a:solidFill>
+          </a:ln>
+        </p:spPr>
+        <p:txBody>
+          <a:bodyPr wrap="square" rtlCol="0">
+            <a:spAutoFit/>
+          </a:bodyPr>
+          <a:lstStyle/>
+          <a:p>
+            <a:r>
+              <a:rPr lang="en-US" b="1" dirty="0">
+                <a:solidFill>
+                  <a:schemeClr val="bg1"/>
+                </a:solidFill>
+                <a:latin typeface="Courier New" pitchFamily="49" charset="0"/>
+                <a:cs typeface="Courier New" pitchFamily="49" charset="0"/>
+              </a:rPr>
+              <a:t>$ git clone https://github.com/microsoft/vcpkg</a:t>
+            </a:r>
+          </a:p>
+          <a:p>
+            <a:r>
+              <a:rPr lang="en-US" b="1" dirty="0">
+                <a:solidFill>
+                  <a:schemeClr val="bg1"/>
+                </a:solidFill>
+                <a:latin typeface="Courier New" pitchFamily="49" charset="0"/>
+                <a:cs typeface="Courier New" pitchFamily="49" charset="0"/>
+              </a:rPr>
+              <a:t>$ ./vcpkg/bootstrap-vcpkg.sh</a:t>
+            </a:r>
+          </a:p>
+          <a:p>
+            <a:r>
+              <a:rPr lang="en-US" b="1" dirty="0">
+                <a:solidFill>
+                  <a:schemeClr val="bg1"/>
+                </a:solidFill>
+                <a:latin typeface="Courier New" pitchFamily="49" charset="0"/>
+                <a:cs typeface="Courier New" pitchFamily="49" charset="0"/>
+              </a:rPr>
+              <a:t>$ export VCPKG_DIR=$(</a:t>
+            </a:r>
+            <a:r>
+              <a:rPr lang="en-US" b="1" dirty="0" err="1">
+                <a:solidFill>
+                  <a:schemeClr val="bg1"/>
+                </a:solidFill>
+                <a:latin typeface="Courier New" pitchFamily="49" charset="0"/>
+                <a:cs typeface="Courier New" pitchFamily="49" charset="0"/>
+              </a:rPr>
+              <a:t>pwdd</a:t>
+            </a:r>
+            <a:r>
+              <a:rPr lang="en-US" b="1" dirty="0">
+                <a:solidFill>
+                  <a:schemeClr val="bg1"/>
+                </a:solidFill>
+                <a:latin typeface="Courier New" pitchFamily="49" charset="0"/>
+                <a:cs typeface="Courier New" pitchFamily="49" charset="0"/>
+              </a:rPr>
+              <a:t>)/</a:t>
+            </a:r>
+            <a:r>
+              <a:rPr lang="en-US" b="1" dirty="0" err="1">
+                <a:solidFill>
+                  <a:schemeClr val="bg1"/>
+                </a:solidFill>
+                <a:latin typeface="Courier New" pitchFamily="49" charset="0"/>
+                <a:cs typeface="Courier New" pitchFamily="49" charset="0"/>
+              </a:rPr>
+              <a:t>vcpkg</a:t>
+            </a:r>
+            <a:endParaRPr lang="nl-BE" b="1" dirty="0">
+              <a:solidFill>
+                <a:schemeClr val="bg1"/>
+              </a:solidFill>
+              <a:latin typeface="Courier New" pitchFamily="49" charset="0"/>
+              <a:cs typeface="Courier New" pitchFamily="49" charset="0"/>
+            </a:endParaRPr>
+          </a:p>
+        </p:txBody>
+      </p:sp>
+      <p:sp>
+        <p:nvSpPr>
+          <p:cNvPr id="10" name="TextBox 9">
+            <a:extLst>
+              <a:ext uri="{FF2B5EF4-FFF2-40B4-BE49-F238E27FC236}">
+                <a16:creationId xmlns:a16="http://schemas.microsoft.com/office/drawing/2014/main" id="{16CFBE6D-9550-7036-54D5-55707E6A573F}"/>
+              </a:ext>
+            </a:extLst>
+          </p:cNvPr>
+          <p:cNvSpPr txBox="1"/>
+          <p:nvPr/>
+        </p:nvSpPr>
+        <p:spPr>
+          <a:xfrm>
+            <a:off x="1320755" y="3890428"/>
+            <a:ext cx="10348729" cy="374610"/>
+          </a:xfrm>
+          <a:prstGeom prst="rect">
+            <a:avLst/>
+          </a:prstGeom>
+          <a:solidFill>
+            <a:schemeClr val="tx1"/>
+          </a:solidFill>
+          <a:ln>
+            <a:solidFill>
+              <a:schemeClr val="tx1"/>
+            </a:solidFill>
+          </a:ln>
+        </p:spPr>
+        <p:txBody>
+          <a:bodyPr wrap="square" rtlCol="0">
+            <a:spAutoFit/>
+          </a:bodyPr>
+          <a:lstStyle/>
+          <a:p>
+            <a:r>
+              <a:rPr lang="en-US" b="1" dirty="0">
+                <a:solidFill>
+                  <a:schemeClr val="bg1"/>
+                </a:solidFill>
+                <a:latin typeface="Courier New" pitchFamily="49" charset="0"/>
+                <a:cs typeface="Courier New" pitchFamily="49" charset="0"/>
+              </a:rPr>
+              <a:t>$ $VCPKG_DIR/</a:t>
+            </a:r>
+            <a:r>
+              <a:rPr lang="en-US" b="1" dirty="0" err="1">
+                <a:solidFill>
+                  <a:schemeClr val="bg1"/>
+                </a:solidFill>
+                <a:latin typeface="Courier New" pitchFamily="49" charset="0"/>
+                <a:cs typeface="Courier New" pitchFamily="49" charset="0"/>
+              </a:rPr>
+              <a:t>vcpkg</a:t>
+            </a:r>
+            <a:r>
+              <a:rPr lang="en-US" b="1" dirty="0">
+                <a:solidFill>
+                  <a:schemeClr val="bg1"/>
+                </a:solidFill>
+                <a:latin typeface="Courier New" pitchFamily="49" charset="0"/>
+                <a:cs typeface="Courier New" pitchFamily="49" charset="0"/>
+              </a:rPr>
+              <a:t> install blaze</a:t>
+            </a:r>
+            <a:endParaRPr lang="nl-BE" b="1" dirty="0">
+              <a:solidFill>
+                <a:schemeClr val="bg1"/>
+              </a:solidFill>
+              <a:latin typeface="Courier New" pitchFamily="49" charset="0"/>
+              <a:cs typeface="Courier New" pitchFamily="49" charset="0"/>
+            </a:endParaRPr>
+          </a:p>
+        </p:txBody>
+      </p:sp>
+      <p:sp>
+        <p:nvSpPr>
+          <p:cNvPr id="13" name="TextBox 12">
+            <a:extLst>
+              <a:ext uri="{FF2B5EF4-FFF2-40B4-BE49-F238E27FC236}">
+                <a16:creationId xmlns:a16="http://schemas.microsoft.com/office/drawing/2014/main" id="{F9EBD776-B10E-52CA-3FAF-DA4973E7C030}"/>
+              </a:ext>
+            </a:extLst>
+          </p:cNvPr>
+          <p:cNvSpPr txBox="1"/>
+          <p:nvPr/>
+        </p:nvSpPr>
+        <p:spPr>
+          <a:xfrm>
+            <a:off x="1320756" y="4849029"/>
+            <a:ext cx="10348730" cy="923330"/>
+          </a:xfrm>
+          <a:prstGeom prst="rect">
+            <a:avLst/>
+          </a:prstGeom>
+          <a:solidFill>
+            <a:schemeClr val="tx1"/>
+          </a:solidFill>
+          <a:ln>
+            <a:solidFill>
+              <a:schemeClr val="tx1"/>
+            </a:solidFill>
+          </a:ln>
+        </p:spPr>
+        <p:txBody>
+          <a:bodyPr wrap="square" rtlCol="0">
+            <a:spAutoFit/>
+          </a:bodyPr>
+          <a:lstStyle/>
+          <a:p>
+            <a:r>
+              <a:rPr lang="en-US" b="1" dirty="0">
+                <a:solidFill>
+                  <a:schemeClr val="bg1"/>
+                </a:solidFill>
+                <a:latin typeface="Courier New" pitchFamily="49" charset="0"/>
+                <a:cs typeface="Courier New" pitchFamily="49" charset="0"/>
+              </a:rPr>
+              <a:t>$ </a:t>
+            </a:r>
+            <a:r>
+              <a:rPr lang="en-US" b="1" dirty="0" err="1">
+                <a:solidFill>
+                  <a:schemeClr val="bg1"/>
+                </a:solidFill>
+                <a:latin typeface="Courier New" pitchFamily="49" charset="0"/>
+                <a:cs typeface="Courier New" pitchFamily="49" charset="0"/>
+              </a:rPr>
+              <a:t>cmake</a:t>
+            </a:r>
+            <a:r>
+              <a:rPr lang="en-US" b="1" dirty="0">
+                <a:solidFill>
+                  <a:schemeClr val="bg1"/>
+                </a:solidFill>
+                <a:latin typeface="Courier New" pitchFamily="49" charset="0"/>
+                <a:cs typeface="Courier New" pitchFamily="49" charset="0"/>
+              </a:rPr>
+              <a:t>  -S .  -B build/  \</a:t>
+            </a:r>
+          </a:p>
+          <a:p>
+            <a:r>
+              <a:rPr lang="en-US" b="1" dirty="0">
+                <a:solidFill>
+                  <a:schemeClr val="bg1"/>
+                </a:solidFill>
+                <a:latin typeface="Courier New" pitchFamily="49" charset="0"/>
+                <a:cs typeface="Courier New" pitchFamily="49" charset="0"/>
+              </a:rPr>
+              <a:t>      -DCMAKE_TOOLCHAIN_FILE=$VCPKG_DIR/scripts/</a:t>
+            </a:r>
+            <a:r>
+              <a:rPr lang="en-US" b="1" dirty="0" err="1">
+                <a:solidFill>
+                  <a:schemeClr val="bg1"/>
+                </a:solidFill>
+                <a:latin typeface="Courier New" pitchFamily="49" charset="0"/>
+                <a:cs typeface="Courier New" pitchFamily="49" charset="0"/>
+              </a:rPr>
+              <a:t>buildsystems</a:t>
+            </a:r>
+            <a:r>
+              <a:rPr lang="en-US" b="1" dirty="0">
+                <a:solidFill>
+                  <a:schemeClr val="bg1"/>
+                </a:solidFill>
+                <a:latin typeface="Courier New" pitchFamily="49" charset="0"/>
+                <a:cs typeface="Courier New" pitchFamily="49" charset="0"/>
+              </a:rPr>
+              <a:t>/</a:t>
+            </a:r>
+            <a:r>
+              <a:rPr lang="en-US" b="1" dirty="0" err="1">
+                <a:solidFill>
+                  <a:schemeClr val="bg1"/>
+                </a:solidFill>
+                <a:latin typeface="Courier New" pitchFamily="49" charset="0"/>
+                <a:cs typeface="Courier New" pitchFamily="49" charset="0"/>
+              </a:rPr>
+              <a:t>vcpkg</a:t>
+            </a:r>
+            <a:r>
+              <a:rPr lang="en-US" b="1" dirty="0">
+                <a:solidFill>
+                  <a:schemeClr val="bg1"/>
+                </a:solidFill>
+                <a:latin typeface="Courier New" pitchFamily="49" charset="0"/>
+                <a:cs typeface="Courier New" pitchFamily="49" charset="0"/>
+              </a:rPr>
+              <a:t> .</a:t>
+            </a:r>
+            <a:r>
+              <a:rPr lang="en-US" b="1" dirty="0" err="1">
+                <a:solidFill>
+                  <a:schemeClr val="bg1"/>
+                </a:solidFill>
+                <a:latin typeface="Courier New" pitchFamily="49" charset="0"/>
+                <a:cs typeface="Courier New" pitchFamily="49" charset="0"/>
+              </a:rPr>
+              <a:t>cmake</a:t>
+            </a:r>
+            <a:endParaRPr lang="en-US" b="1" dirty="0">
+              <a:solidFill>
+                <a:schemeClr val="bg1"/>
+              </a:solidFill>
+              <a:latin typeface="Courier New" pitchFamily="49" charset="0"/>
+              <a:cs typeface="Courier New" pitchFamily="49" charset="0"/>
+            </a:endParaRPr>
+          </a:p>
+          <a:p>
+            <a:r>
+              <a:rPr lang="en-US" b="1" dirty="0">
+                <a:solidFill>
+                  <a:schemeClr val="bg1"/>
+                </a:solidFill>
+                <a:latin typeface="Courier New" pitchFamily="49" charset="0"/>
+                <a:cs typeface="Courier New" pitchFamily="49" charset="0"/>
+              </a:rPr>
+              <a:t>$ </a:t>
+            </a:r>
+            <a:r>
+              <a:rPr lang="en-US" b="1" dirty="0" err="1">
+                <a:solidFill>
+                  <a:schemeClr val="bg1"/>
+                </a:solidFill>
+                <a:latin typeface="Courier New" pitchFamily="49" charset="0"/>
+                <a:cs typeface="Courier New" pitchFamily="49" charset="0"/>
+              </a:rPr>
+              <a:t>cmake</a:t>
+            </a:r>
+            <a:r>
+              <a:rPr lang="en-US" b="1" dirty="0">
+                <a:solidFill>
+                  <a:schemeClr val="bg1"/>
+                </a:solidFill>
+                <a:latin typeface="Courier New" pitchFamily="49" charset="0"/>
+                <a:cs typeface="Courier New" pitchFamily="49" charset="0"/>
+              </a:rPr>
+              <a:t>  --build build/</a:t>
+            </a:r>
+            <a:endParaRPr lang="nl-BE" b="1" dirty="0">
+              <a:solidFill>
+                <a:schemeClr val="bg1"/>
+              </a:solidFill>
+              <a:latin typeface="Courier New" pitchFamily="49" charset="0"/>
+              <a:cs typeface="Courier New" pitchFamily="49" charset="0"/>
+            </a:endParaRPr>
+          </a:p>
+        </p:txBody>
+      </p:sp>
+    </p:spTree>
+    <p:extLst>
+      <p:ext uri="{BB962C8B-B14F-4D97-AF65-F5344CB8AC3E}">
+        <p14:creationId xmlns:p14="http://schemas.microsoft.com/office/powerpoint/2010/main" val="2060789449"/>
+      </p:ext>
+    </p:extLst>
+  </p:cSld>
+  <p:clrMapOvr>
+    <a:masterClrMapping/>
+  </p:clrMapOvr>
+  <p:timing>
+    <p:tnLst>
+      <p:par>
+        <p:cTn id="1" dur="indefinite" restart="never" nodeType="tmRoot">
+          <p:childTnLst>
+            <p:seq concurrent="1" nextAc="seek">
+              <p:cTn id="2" dur="indefinite" nodeType="mainSeq">
+                <p:childTnLst>
+                  <p:par>
+                    <p:cTn id="3" fill="hold">
+                      <p:stCondLst>
+                        <p:cond delay="indefinite"/>
+                        <p:cond evt="onBegin" delay="0">
+                          <p:tn val="2"/>
+                        </p:cond>
+                      </p:stCondLst>
+                      <p:childTnLst>
+                        <p:par>
+                          <p:cTn id="4" fill="hold">
+                            <p:stCondLst>
+                              <p:cond delay="0"/>
+                            </p:stCondLst>
+                            <p:childTnLst>
+                              <p:par>
+                                <p:cTn id="5" presetID="1" presetClass="entr" presetSubtype="0" fill="hold" grpId="0" nodeType="withEffect">
+                                  <p:stCondLst>
+                                    <p:cond delay="0"/>
+                                  </p:stCondLst>
+                                  <p:childTnLst>
+                                    <p:set>
+                                      <p:cBhvr>
+                                        <p:cTn id="6" dur="1" fill="hold">
+                                          <p:stCondLst>
+                                            <p:cond delay="0"/>
+                                          </p:stCondLst>
+                                        </p:cTn>
+                                        <p:tgtEl>
+                                          <p:spTgt spid="4">
+                                            <p:txEl>
+                                              <p:pRg st="0" end="0"/>
+                                            </p:txEl>
+                                          </p:spTgt>
+                                        </p:tgtEl>
+                                        <p:attrNameLst>
+                                          <p:attrName>style.visibility</p:attrName>
+                                        </p:attrNameLst>
+                                      </p:cBhvr>
+                                      <p:to>
+                                        <p:strVal val="visible"/>
+                                      </p:to>
+                                    </p:set>
+                                  </p:childTnLst>
+                                </p:cTn>
+                              </p:par>
+                              <p:par>
+                                <p:cTn id="7" presetID="1" presetClass="entr" presetSubtype="0" fill="hold" grpId="0" nodeType="withEffect">
+                                  <p:stCondLst>
+                                    <p:cond delay="0"/>
+                                  </p:stCondLst>
+                                  <p:childTnLst>
+                                    <p:set>
+                                      <p:cBhvr>
+                                        <p:cTn id="8" dur="1" fill="hold">
+                                          <p:stCondLst>
+                                            <p:cond delay="0"/>
+                                          </p:stCondLst>
+                                        </p:cTn>
+                                        <p:tgtEl>
+                                          <p:spTgt spid="9"/>
+                                        </p:tgtEl>
+                                        <p:attrNameLst>
+                                          <p:attrName>style.visibility</p:attrName>
+                                        </p:attrNameLst>
+                                      </p:cBhvr>
+                                      <p:to>
+                                        <p:strVal val="visible"/>
+                                      </p:to>
+                                    </p:set>
+                                  </p:childTnLst>
+                                </p:cTn>
+                              </p:par>
+                            </p:childTnLst>
+                          </p:cTn>
+                        </p:par>
+                      </p:childTnLst>
+                    </p:cTn>
+                  </p:par>
+                  <p:par>
+                    <p:cTn id="9" fill="hold">
+                      <p:stCondLst>
+                        <p:cond delay="indefinite"/>
+                      </p:stCondLst>
+                      <p:childTnLst>
+                        <p:par>
+                          <p:cTn id="10" fill="hold">
+                            <p:stCondLst>
+                              <p:cond delay="0"/>
+                            </p:stCondLst>
+                            <p:childTnLst>
+                              <p:par>
+                                <p:cTn id="11" presetID="1" presetClass="entr" presetSubtype="0" fill="hold" grpId="0" nodeType="clickEffect">
+                                  <p:stCondLst>
+                                    <p:cond delay="0"/>
+                                  </p:stCondLst>
+                                  <p:childTnLst>
+                                    <p:set>
+                                      <p:cBhvr>
+                                        <p:cTn id="12" dur="1" fill="hold">
+                                          <p:stCondLst>
+                                            <p:cond delay="0"/>
+                                          </p:stCondLst>
+                                        </p:cTn>
+                                        <p:tgtEl>
+                                          <p:spTgt spid="4">
+                                            <p:txEl>
+                                              <p:pRg st="3" end="3"/>
+                                            </p:txEl>
+                                          </p:spTgt>
+                                        </p:tgtEl>
+                                        <p:attrNameLst>
+                                          <p:attrName>style.visibility</p:attrName>
+                                        </p:attrNameLst>
+                                      </p:cBhvr>
+                                      <p:to>
+                                        <p:strVal val="visible"/>
+                                      </p:to>
+                                    </p:set>
+                                  </p:childTnLst>
+                                </p:cTn>
+                              </p:par>
+                              <p:par>
+                                <p:cTn id="13" presetID="1" presetClass="entr" presetSubtype="0" fill="hold" grpId="0" nodeType="withEffect">
+                                  <p:stCondLst>
+                                    <p:cond delay="0"/>
+                                  </p:stCondLst>
+                                  <p:childTnLst>
+                                    <p:set>
+                                      <p:cBhvr>
+                                        <p:cTn id="14" dur="1" fill="hold">
+                                          <p:stCondLst>
+                                            <p:cond delay="0"/>
+                                          </p:stCondLst>
+                                        </p:cTn>
+                                        <p:tgtEl>
+                                          <p:spTgt spid="10"/>
+                                        </p:tgtEl>
+                                        <p:attrNameLst>
+                                          <p:attrName>style.visibility</p:attrName>
+                                        </p:attrNameLst>
+                                      </p:cBhvr>
+                                      <p:to>
+                                        <p:strVal val="visible"/>
+                                      </p:to>
+                                    </p:set>
+                                  </p:childTnLst>
+                                </p:cTn>
+                              </p:par>
+                            </p:childTnLst>
+                          </p:cTn>
+                        </p:par>
+                      </p:childTnLst>
+                    </p:cTn>
+                  </p:par>
+                  <p:par>
+                    <p:cTn id="15" fill="hold">
+                      <p:stCondLst>
+                        <p:cond delay="indefinite"/>
+                      </p:stCondLst>
+                      <p:childTnLst>
+                        <p:par>
+                          <p:cTn id="16" fill="hold">
+                            <p:stCondLst>
+                              <p:cond delay="0"/>
+                            </p:stCondLst>
+                            <p:childTnLst>
+                              <p:par>
+                                <p:cTn id="17" presetID="1" presetClass="entr" presetSubtype="0" fill="hold" grpId="0" nodeType="clickEffect">
+                                  <p:stCondLst>
+                                    <p:cond delay="0"/>
+                                  </p:stCondLst>
+                                  <p:childTnLst>
+                                    <p:set>
+                                      <p:cBhvr>
+                                        <p:cTn id="18" dur="1" fill="hold">
+                                          <p:stCondLst>
+                                            <p:cond delay="0"/>
+                                          </p:stCondLst>
+                                        </p:cTn>
+                                        <p:tgtEl>
+                                          <p:spTgt spid="4">
+                                            <p:txEl>
+                                              <p:pRg st="5" end="5"/>
+                                            </p:txEl>
+                                          </p:spTgt>
+                                        </p:tgtEl>
+                                        <p:attrNameLst>
+                                          <p:attrName>style.visibility</p:attrName>
+                                        </p:attrNameLst>
+                                      </p:cBhvr>
+                                      <p:to>
+                                        <p:strVal val="visible"/>
+                                      </p:to>
+                                    </p:set>
+                                  </p:childTnLst>
+                                </p:cTn>
+                              </p:par>
+                              <p:par>
+                                <p:cTn id="19" presetID="1" presetClass="entr" presetSubtype="0" fill="hold" grpId="0" nodeType="withEffect">
+                                  <p:stCondLst>
+                                    <p:cond delay="0"/>
+                                  </p:stCondLst>
+                                  <p:childTnLst>
+                                    <p:set>
+                                      <p:cBhvr>
+                                        <p:cTn id="20" dur="1" fill="hold">
+                                          <p:stCondLst>
+                                            <p:cond delay="0"/>
+                                          </p:stCondLst>
+                                        </p:cTn>
+                                        <p:tgtEl>
+                                          <p:spTgt spid="13"/>
+                                        </p:tgtEl>
+                                        <p:attrNameLst>
+                                          <p:attrName>style.visibility</p:attrName>
+                                        </p:attrNameLst>
+                                      </p:cBhvr>
+                                      <p:to>
+                                        <p:strVal val="visible"/>
+                                      </p:to>
+                                    </p:set>
+                                  </p:childTnLst>
+                                </p:cTn>
+                              </p:par>
+                            </p:childTnLst>
+                          </p:cTn>
+                        </p:par>
+                      </p:childTnLst>
+                    </p:cTn>
+                  </p:par>
+                </p:childTnLst>
+              </p:cTn>
+              <p:prevCondLst>
+                <p:cond evt="onPrev" delay="0">
+                  <p:tgtEl>
+                    <p:sldTgt/>
+                  </p:tgtEl>
+                </p:cond>
+              </p:prevCondLst>
+              <p:nextCondLst>
+                <p:cond evt="onNext" delay="0">
+                  <p:tgtEl>
+                    <p:sldTgt/>
+                  </p:tgtEl>
+                </p:cond>
+              </p:nextCondLst>
+            </p:seq>
+          </p:childTnLst>
+        </p:cTn>
+      </p:par>
+    </p:tnLst>
+    <p:bldLst>
+      <p:bldP spid="4" grpId="0" uiExpand="1" build="p"/>
+      <p:bldP spid="9" grpId="0" animBg="1"/>
+      <p:bldP spid="10" grpId="0" animBg="1"/>
+      <p:bldP spid="13" grpId="0" animBg="1"/>
+    </p:bldLst>
+  </p:timing>
+</p:sld>
+</file>
+
+<file path=ppt/slides/slide32.xml><?xml version="1.0" encoding="utf-8"?>
+<p:sld xmlns:a="http://schemas.openxmlformats.org/drawingml/2006/main" xmlns:r="http://schemas.openxmlformats.org/officeDocument/2006/relationships" xmlns:p="http://schemas.openxmlformats.org/presentationml/2006/main">
+  <p:cSld>
+    <p:spTree>
+      <p:nvGrpSpPr>
+        <p:cNvPr id="1" name=""/>
+        <p:cNvGrpSpPr/>
+        <p:nvPr/>
+      </p:nvGrpSpPr>
+      <p:grpSpPr>
+        <a:xfrm>
+          <a:off x="0" y="0"/>
+          <a:ext cx="0" cy="0"/>
+          <a:chOff x="0" y="0"/>
+          <a:chExt cx="0" cy="0"/>
+        </a:xfrm>
+      </p:grpSpPr>
+      <p:sp>
+        <p:nvSpPr>
+          <p:cNvPr id="2" name="Title 1">
+            <a:extLst>
+              <a:ext uri="{FF2B5EF4-FFF2-40B4-BE49-F238E27FC236}">
+                <a16:creationId xmlns:a16="http://schemas.microsoft.com/office/drawing/2014/main" id="{212D882D-DD91-762A-9862-FA6E706576E3}"/>
+              </a:ext>
+            </a:extLst>
+          </p:cNvPr>
+          <p:cNvSpPr>
+            <a:spLocks noGrp="1"/>
+          </p:cNvSpPr>
+          <p:nvPr>
+            <p:ph type="title"/>
+          </p:nvPr>
+        </p:nvSpPr>
+        <p:spPr/>
+        <p:txBody>
+          <a:bodyPr/>
+          <a:lstStyle/>
+          <a:p>
+            <a:r>
+              <a:rPr lang="en-US" dirty="0"/>
+              <a:t>CPM</a:t>
+            </a:r>
+            <a:endParaRPr lang="LID4096" dirty="0"/>
+          </a:p>
+        </p:txBody>
+      </p:sp>
+      <p:sp>
+        <p:nvSpPr>
+          <p:cNvPr id="3" name="Content Placeholder 2">
+            <a:extLst>
+              <a:ext uri="{FF2B5EF4-FFF2-40B4-BE49-F238E27FC236}">
+                <a16:creationId xmlns:a16="http://schemas.microsoft.com/office/drawing/2014/main" id="{2D3556D6-66A1-32F0-325E-89EF55D4D684}"/>
+              </a:ext>
+            </a:extLst>
+          </p:cNvPr>
+          <p:cNvSpPr>
+            <a:spLocks noGrp="1"/>
+          </p:cNvSpPr>
+          <p:nvPr>
+            <p:ph idx="1"/>
+          </p:nvPr>
+        </p:nvSpPr>
+        <p:spPr/>
+        <p:txBody>
+          <a:bodyPr/>
+          <a:lstStyle/>
+          <a:p>
+            <a:r>
+              <a:rPr lang="en-US" dirty="0"/>
+              <a:t>Install via </a:t>
+            </a:r>
+            <a:r>
+              <a:rPr lang="en-US" dirty="0">
+                <a:latin typeface="Courier New" panose="02070309020205020404" pitchFamily="49" charset="0"/>
+                <a:cs typeface="Courier New" panose="02070309020205020404" pitchFamily="49" charset="0"/>
+              </a:rPr>
+              <a:t>CMakeLists.txt</a:t>
+            </a:r>
+            <a:endParaRPr lang="LID4096" dirty="0">
+              <a:latin typeface="Courier New" panose="02070309020205020404" pitchFamily="49" charset="0"/>
+              <a:cs typeface="Courier New" panose="02070309020205020404" pitchFamily="49" charset="0"/>
+            </a:endParaRPr>
+          </a:p>
+        </p:txBody>
+      </p:sp>
+      <p:sp>
+        <p:nvSpPr>
+          <p:cNvPr id="4" name="Slide Number Placeholder 3">
+            <a:extLst>
+              <a:ext uri="{FF2B5EF4-FFF2-40B4-BE49-F238E27FC236}">
+                <a16:creationId xmlns:a16="http://schemas.microsoft.com/office/drawing/2014/main" id="{841DACAC-48E5-D353-91C5-829E80964E4A}"/>
+              </a:ext>
+            </a:extLst>
+          </p:cNvPr>
+          <p:cNvSpPr>
+            <a:spLocks noGrp="1"/>
+          </p:cNvSpPr>
+          <p:nvPr>
+            <p:ph type="sldNum" sz="quarter" idx="12"/>
+          </p:nvPr>
+        </p:nvSpPr>
+        <p:spPr/>
+        <p:txBody>
+          <a:bodyPr/>
+          <a:lstStyle/>
+          <a:p>
+            <a:fld id="{FDB1AA33-DFBB-49AC-8CEE-23FFECEB5648}" type="slidenum">
+              <a:rPr lang="LID4096" smtClean="0"/>
+              <a:t>32</a:t>
+            </a:fld>
+            <a:endParaRPr lang="LID4096"/>
+          </a:p>
+        </p:txBody>
+      </p:sp>
+      <p:sp>
+        <p:nvSpPr>
+          <p:cNvPr id="5" name="TextBox 4">
+            <a:extLst>
+              <a:ext uri="{FF2B5EF4-FFF2-40B4-BE49-F238E27FC236}">
+                <a16:creationId xmlns:a16="http://schemas.microsoft.com/office/drawing/2014/main" id="{56A406B8-BE76-0E4B-5848-6008C26F5D6A}"/>
+              </a:ext>
+            </a:extLst>
+          </p:cNvPr>
+          <p:cNvSpPr txBox="1"/>
+          <p:nvPr/>
+        </p:nvSpPr>
+        <p:spPr>
+          <a:xfrm>
+            <a:off x="1055915" y="2413899"/>
+            <a:ext cx="9579429" cy="4062651"/>
+          </a:xfrm>
+          <a:prstGeom prst="rect">
+            <a:avLst/>
+          </a:prstGeom>
+          <a:solidFill>
+            <a:schemeClr val="accent6">
+              <a:lumMod val="20000"/>
+              <a:lumOff val="80000"/>
+            </a:schemeClr>
+          </a:solidFill>
+        </p:spPr>
+        <p:txBody>
+          <a:bodyPr wrap="square" rtlCol="0">
+            <a:spAutoFit/>
+          </a:bodyPr>
+          <a:lstStyle/>
+          <a:p>
+            <a:pPr lvl="0">
+              <a:defRPr/>
+            </a:pPr>
+            <a:r>
+              <a:rPr lang="en-US" sz="1200" dirty="0">
+                <a:solidFill>
+                  <a:prstClr val="black"/>
+                </a:solidFill>
+                <a:latin typeface="Courier New" pitchFamily="49" charset="0"/>
+                <a:cs typeface="Courier New" pitchFamily="49" charset="0"/>
+                <a:sym typeface="Symbol" panose="05050102010706020507" pitchFamily="18" charset="2"/>
+              </a:rPr>
+              <a:t></a:t>
+            </a:r>
+          </a:p>
+          <a:p>
+            <a:pPr lvl="0">
+              <a:defRPr/>
+            </a:pPr>
+            <a:r>
+              <a:rPr lang="en-US" sz="1200" dirty="0">
+                <a:solidFill>
+                  <a:prstClr val="black"/>
+                </a:solidFill>
+                <a:latin typeface="Courier New" pitchFamily="49" charset="0"/>
+                <a:cs typeface="Courier New" pitchFamily="49" charset="0"/>
+              </a:rPr>
+              <a:t>set(CPM_DOWNLOAD_VERSION 0.38.1)</a:t>
+            </a:r>
+          </a:p>
+          <a:p>
+            <a:pPr lvl="0">
+              <a:defRPr/>
+            </a:pPr>
+            <a:endParaRPr lang="en-US" sz="1200" dirty="0">
+              <a:solidFill>
+                <a:prstClr val="black"/>
+              </a:solidFill>
+              <a:latin typeface="Courier New" pitchFamily="49" charset="0"/>
+              <a:cs typeface="Courier New" pitchFamily="49" charset="0"/>
+            </a:endParaRPr>
+          </a:p>
+          <a:p>
+            <a:pPr lvl="0">
+              <a:defRPr/>
+            </a:pPr>
+            <a:r>
+              <a:rPr lang="en-US" sz="1200" dirty="0">
+                <a:solidFill>
+                  <a:prstClr val="black"/>
+                </a:solidFill>
+                <a:latin typeface="Courier New" pitchFamily="49" charset="0"/>
+                <a:cs typeface="Courier New" pitchFamily="49" charset="0"/>
+              </a:rPr>
+              <a:t>if(CPM_SOURCE_CACHE)</a:t>
+            </a:r>
+          </a:p>
+          <a:p>
+            <a:pPr lvl="0">
+              <a:defRPr/>
+            </a:pPr>
+            <a:r>
+              <a:rPr lang="en-US" sz="1200" dirty="0">
+                <a:solidFill>
+                  <a:prstClr val="black"/>
+                </a:solidFill>
+                <a:latin typeface="Courier New" pitchFamily="49" charset="0"/>
+                <a:cs typeface="Courier New" pitchFamily="49" charset="0"/>
+              </a:rPr>
+              <a:t>  set(CPM_DOWNLOAD_LOCATION "${CPM_SOURCE_CACHE}/</a:t>
+            </a:r>
+            <a:r>
+              <a:rPr lang="en-US" sz="1200" dirty="0" err="1">
+                <a:solidFill>
+                  <a:prstClr val="black"/>
+                </a:solidFill>
+                <a:latin typeface="Courier New" pitchFamily="49" charset="0"/>
+                <a:cs typeface="Courier New" pitchFamily="49" charset="0"/>
+              </a:rPr>
+              <a:t>cpm</a:t>
+            </a:r>
+            <a:r>
+              <a:rPr lang="en-US" sz="1200" dirty="0">
+                <a:solidFill>
+                  <a:prstClr val="black"/>
+                </a:solidFill>
+                <a:latin typeface="Courier New" pitchFamily="49" charset="0"/>
+                <a:cs typeface="Courier New" pitchFamily="49" charset="0"/>
+              </a:rPr>
+              <a:t>/CPM_${CPM_DOWNLOAD_VERSION}.</a:t>
+            </a:r>
+            <a:r>
+              <a:rPr lang="en-US" sz="1200" dirty="0" err="1">
+                <a:solidFill>
+                  <a:prstClr val="black"/>
+                </a:solidFill>
+                <a:latin typeface="Courier New" pitchFamily="49" charset="0"/>
+                <a:cs typeface="Courier New" pitchFamily="49" charset="0"/>
+              </a:rPr>
+              <a:t>cmake</a:t>
+            </a:r>
+            <a:r>
+              <a:rPr lang="en-US" sz="1200" dirty="0">
+                <a:solidFill>
+                  <a:prstClr val="black"/>
+                </a:solidFill>
+                <a:latin typeface="Courier New" pitchFamily="49" charset="0"/>
+                <a:cs typeface="Courier New" pitchFamily="49" charset="0"/>
+              </a:rPr>
+              <a:t>")</a:t>
+            </a:r>
+          </a:p>
+          <a:p>
+            <a:pPr lvl="0">
+              <a:defRPr/>
+            </a:pPr>
+            <a:r>
+              <a:rPr lang="en-US" sz="1200" dirty="0">
+                <a:solidFill>
+                  <a:prstClr val="black"/>
+                </a:solidFill>
+                <a:latin typeface="Courier New" pitchFamily="49" charset="0"/>
+                <a:cs typeface="Courier New" pitchFamily="49" charset="0"/>
+              </a:rPr>
+              <a:t>elseif(DEFINED ENV{CPM_SOURCE_CACHE})</a:t>
+            </a:r>
+          </a:p>
+          <a:p>
+            <a:pPr lvl="0">
+              <a:defRPr/>
+            </a:pPr>
+            <a:r>
+              <a:rPr lang="en-US" sz="1200" dirty="0">
+                <a:solidFill>
+                  <a:prstClr val="black"/>
+                </a:solidFill>
+                <a:latin typeface="Courier New" pitchFamily="49" charset="0"/>
+                <a:cs typeface="Courier New" pitchFamily="49" charset="0"/>
+              </a:rPr>
+              <a:t>  set(CPM_DOWNLOAD_LOCATION "$ENV{CPM_SOURCE_CACHE}/</a:t>
+            </a:r>
+            <a:r>
+              <a:rPr lang="en-US" sz="1200" dirty="0" err="1">
+                <a:solidFill>
+                  <a:prstClr val="black"/>
+                </a:solidFill>
+                <a:latin typeface="Courier New" pitchFamily="49" charset="0"/>
+                <a:cs typeface="Courier New" pitchFamily="49" charset="0"/>
+              </a:rPr>
+              <a:t>cpm</a:t>
+            </a:r>
+            <a:r>
+              <a:rPr lang="en-US" sz="1200" dirty="0">
+                <a:solidFill>
+                  <a:prstClr val="black"/>
+                </a:solidFill>
+                <a:latin typeface="Courier New" pitchFamily="49" charset="0"/>
+                <a:cs typeface="Courier New" pitchFamily="49" charset="0"/>
+              </a:rPr>
+              <a:t>/CPM_${CPM_DOWNLOAD_VERSION}.</a:t>
+            </a:r>
+            <a:r>
+              <a:rPr lang="en-US" sz="1200" dirty="0" err="1">
+                <a:solidFill>
+                  <a:prstClr val="black"/>
+                </a:solidFill>
+                <a:latin typeface="Courier New" pitchFamily="49" charset="0"/>
+                <a:cs typeface="Courier New" pitchFamily="49" charset="0"/>
+              </a:rPr>
+              <a:t>cmake</a:t>
+            </a:r>
+            <a:r>
+              <a:rPr lang="en-US" sz="1200" dirty="0">
+                <a:solidFill>
+                  <a:prstClr val="black"/>
+                </a:solidFill>
+                <a:latin typeface="Courier New" pitchFamily="49" charset="0"/>
+                <a:cs typeface="Courier New" pitchFamily="49" charset="0"/>
+              </a:rPr>
+              <a:t>")</a:t>
+            </a:r>
+          </a:p>
+          <a:p>
+            <a:pPr lvl="0">
+              <a:defRPr/>
+            </a:pPr>
+            <a:r>
+              <a:rPr lang="en-US" sz="1200" dirty="0">
+                <a:solidFill>
+                  <a:prstClr val="black"/>
+                </a:solidFill>
+                <a:latin typeface="Courier New" pitchFamily="49" charset="0"/>
+                <a:cs typeface="Courier New" pitchFamily="49" charset="0"/>
+              </a:rPr>
+              <a:t>else()</a:t>
+            </a:r>
+          </a:p>
+          <a:p>
+            <a:pPr lvl="0">
+              <a:defRPr/>
+            </a:pPr>
+            <a:r>
+              <a:rPr lang="en-US" sz="1200" dirty="0">
+                <a:solidFill>
+                  <a:prstClr val="black"/>
+                </a:solidFill>
+                <a:latin typeface="Courier New" pitchFamily="49" charset="0"/>
+                <a:cs typeface="Courier New" pitchFamily="49" charset="0"/>
+              </a:rPr>
+              <a:t>  set(CPM_DOWNLOAD_LOCATION "${CMAKE_BINARY_DIR}/</a:t>
+            </a:r>
+            <a:r>
+              <a:rPr lang="en-US" sz="1200" dirty="0" err="1">
+                <a:solidFill>
+                  <a:prstClr val="black"/>
+                </a:solidFill>
+                <a:latin typeface="Courier New" pitchFamily="49" charset="0"/>
+                <a:cs typeface="Courier New" pitchFamily="49" charset="0"/>
+              </a:rPr>
+              <a:t>cmake</a:t>
+            </a:r>
+            <a:r>
+              <a:rPr lang="en-US" sz="1200" dirty="0">
+                <a:solidFill>
+                  <a:prstClr val="black"/>
+                </a:solidFill>
+                <a:latin typeface="Courier New" pitchFamily="49" charset="0"/>
+                <a:cs typeface="Courier New" pitchFamily="49" charset="0"/>
+              </a:rPr>
+              <a:t>/CPM_${CPM_DOWNLOAD_VERSION}.</a:t>
+            </a:r>
+            <a:r>
+              <a:rPr lang="en-US" sz="1200" dirty="0" err="1">
+                <a:solidFill>
+                  <a:prstClr val="black"/>
+                </a:solidFill>
+                <a:latin typeface="Courier New" pitchFamily="49" charset="0"/>
+                <a:cs typeface="Courier New" pitchFamily="49" charset="0"/>
+              </a:rPr>
+              <a:t>cmake</a:t>
+            </a:r>
+            <a:r>
+              <a:rPr lang="en-US" sz="1200" dirty="0">
+                <a:solidFill>
+                  <a:prstClr val="black"/>
+                </a:solidFill>
+                <a:latin typeface="Courier New" pitchFamily="49" charset="0"/>
+                <a:cs typeface="Courier New" pitchFamily="49" charset="0"/>
+              </a:rPr>
+              <a:t>")</a:t>
+            </a:r>
+          </a:p>
+          <a:p>
+            <a:pPr lvl="0">
+              <a:defRPr/>
+            </a:pPr>
+            <a:r>
+              <a:rPr lang="en-US" sz="1200" dirty="0">
+                <a:solidFill>
+                  <a:prstClr val="black"/>
+                </a:solidFill>
+                <a:latin typeface="Courier New" pitchFamily="49" charset="0"/>
+                <a:cs typeface="Courier New" pitchFamily="49" charset="0"/>
+              </a:rPr>
+              <a:t>endif()</a:t>
+            </a:r>
+          </a:p>
+          <a:p>
+            <a:pPr lvl="0">
+              <a:defRPr/>
+            </a:pPr>
+            <a:endParaRPr lang="en-US" sz="1200" dirty="0">
+              <a:solidFill>
+                <a:prstClr val="black"/>
+              </a:solidFill>
+              <a:latin typeface="Courier New" pitchFamily="49" charset="0"/>
+              <a:cs typeface="Courier New" pitchFamily="49" charset="0"/>
+            </a:endParaRPr>
+          </a:p>
+          <a:p>
+            <a:pPr lvl="0">
+              <a:defRPr/>
+            </a:pPr>
+            <a:r>
+              <a:rPr lang="en-US" sz="1200" dirty="0">
+                <a:solidFill>
+                  <a:prstClr val="black"/>
+                </a:solidFill>
+                <a:latin typeface="Courier New" pitchFamily="49" charset="0"/>
+                <a:cs typeface="Courier New" pitchFamily="49" charset="0"/>
+              </a:rPr>
+              <a:t>if(NOT (EXISTS ${CPM_DOWNLOAD_LOCATION}))</a:t>
+            </a:r>
+          </a:p>
+          <a:p>
+            <a:pPr lvl="0">
+              <a:defRPr/>
+            </a:pPr>
+            <a:r>
+              <a:rPr lang="en-US" sz="1200" dirty="0">
+                <a:solidFill>
+                  <a:prstClr val="black"/>
+                </a:solidFill>
+                <a:latin typeface="Courier New" pitchFamily="49" charset="0"/>
+                <a:cs typeface="Courier New" pitchFamily="49" charset="0"/>
+              </a:rPr>
+              <a:t>  message(STATUS "Downloading </a:t>
+            </a:r>
+            <a:r>
+              <a:rPr lang="en-US" sz="1200" dirty="0" err="1">
+                <a:solidFill>
+                  <a:prstClr val="black"/>
+                </a:solidFill>
+                <a:latin typeface="Courier New" pitchFamily="49" charset="0"/>
+                <a:cs typeface="Courier New" pitchFamily="49" charset="0"/>
+              </a:rPr>
+              <a:t>CPM.cmake</a:t>
+            </a:r>
+            <a:r>
+              <a:rPr lang="en-US" sz="1200" dirty="0">
+                <a:solidFill>
+                  <a:prstClr val="black"/>
+                </a:solidFill>
+                <a:latin typeface="Courier New" pitchFamily="49" charset="0"/>
+                <a:cs typeface="Courier New" pitchFamily="49" charset="0"/>
+              </a:rPr>
+              <a:t> to ${CPM_DOWNLOAD_LOCATION}")</a:t>
+            </a:r>
+          </a:p>
+          <a:p>
+            <a:pPr lvl="0">
+              <a:defRPr/>
+            </a:pPr>
+            <a:r>
+              <a:rPr lang="en-US" sz="1200" dirty="0">
+                <a:solidFill>
+                  <a:prstClr val="black"/>
+                </a:solidFill>
+                <a:latin typeface="Courier New" pitchFamily="49" charset="0"/>
+                <a:cs typeface="Courier New" pitchFamily="49" charset="0"/>
+              </a:rPr>
+              <a:t>  file(DOWNLOAD</a:t>
+            </a:r>
+          </a:p>
+          <a:p>
+            <a:pPr lvl="0">
+              <a:defRPr/>
+            </a:pPr>
+            <a:r>
+              <a:rPr lang="en-US" sz="1200" dirty="0">
+                <a:solidFill>
+                  <a:prstClr val="black"/>
+                </a:solidFill>
+                <a:latin typeface="Courier New" pitchFamily="49" charset="0"/>
+                <a:cs typeface="Courier New" pitchFamily="49" charset="0"/>
+              </a:rPr>
+              <a:t>       https://github.com/TheLartians/CPM.cmake/releases/download/v${CPM_DOWNLOAD_VERSION}/CPM.cmake</a:t>
+            </a:r>
+          </a:p>
+          <a:p>
+            <a:pPr lvl="0">
+              <a:defRPr/>
+            </a:pPr>
+            <a:r>
+              <a:rPr lang="en-US" sz="1200" dirty="0">
+                <a:solidFill>
+                  <a:prstClr val="black"/>
+                </a:solidFill>
+                <a:latin typeface="Courier New" pitchFamily="49" charset="0"/>
+                <a:cs typeface="Courier New" pitchFamily="49" charset="0"/>
+              </a:rPr>
+              <a:t>       ${CPM_DOWNLOAD_LOCATION}</a:t>
+            </a:r>
+          </a:p>
+          <a:p>
+            <a:pPr lvl="0">
+              <a:defRPr/>
+            </a:pPr>
+            <a:r>
+              <a:rPr lang="en-US" sz="1200" dirty="0">
+                <a:solidFill>
+                  <a:prstClr val="black"/>
+                </a:solidFill>
+                <a:latin typeface="Courier New" pitchFamily="49" charset="0"/>
+                <a:cs typeface="Courier New" pitchFamily="49" charset="0"/>
+              </a:rPr>
+              <a:t>  )</a:t>
+            </a:r>
+          </a:p>
+          <a:p>
+            <a:pPr lvl="0">
+              <a:defRPr/>
+            </a:pPr>
+            <a:r>
+              <a:rPr lang="en-US" sz="1200" dirty="0">
+                <a:solidFill>
+                  <a:prstClr val="black"/>
+                </a:solidFill>
+                <a:latin typeface="Courier New" pitchFamily="49" charset="0"/>
+                <a:cs typeface="Courier New" pitchFamily="49" charset="0"/>
+              </a:rPr>
+              <a:t>endif()</a:t>
+            </a:r>
+          </a:p>
+          <a:p>
+            <a:pPr lvl="0">
+              <a:defRPr/>
+            </a:pPr>
+            <a:endParaRPr lang="en-US" sz="1200" dirty="0">
+              <a:solidFill>
+                <a:prstClr val="black"/>
+              </a:solidFill>
+              <a:latin typeface="Courier New" pitchFamily="49" charset="0"/>
+              <a:cs typeface="Courier New" pitchFamily="49" charset="0"/>
+            </a:endParaRPr>
+          </a:p>
+          <a:p>
+            <a:pPr lvl="0">
+              <a:defRPr/>
+            </a:pPr>
+            <a:r>
+              <a:rPr lang="en-US" sz="1200" dirty="0">
+                <a:solidFill>
+                  <a:prstClr val="black"/>
+                </a:solidFill>
+                <a:latin typeface="Courier New" pitchFamily="49" charset="0"/>
+                <a:cs typeface="Courier New" pitchFamily="49" charset="0"/>
+              </a:rPr>
+              <a:t>include(${CPM_DOWNLOAD_LOCATION})</a:t>
+            </a:r>
+          </a:p>
+          <a:p>
+            <a:pPr lvl="0">
+              <a:defRPr/>
+            </a:pPr>
+            <a:r>
+              <a:rPr lang="en-US" sz="1800" dirty="0">
+                <a:solidFill>
+                  <a:prstClr val="black"/>
+                </a:solidFill>
+                <a:latin typeface="Courier New" pitchFamily="49" charset="0"/>
+                <a:cs typeface="Courier New" pitchFamily="49" charset="0"/>
+                <a:sym typeface="Symbol" panose="05050102010706020507" pitchFamily="18" charset="2"/>
+              </a:rPr>
+              <a:t></a:t>
+            </a:r>
+            <a:endParaRPr kumimoji="0" lang="en-US" b="0" i="0" u="none" strike="noStrike" kern="1200" cap="none" spc="0" normalizeH="0" baseline="0" noProof="0" dirty="0">
+              <a:ln>
+                <a:noFill/>
+              </a:ln>
+              <a:solidFill>
+                <a:prstClr val="black"/>
+              </a:solidFill>
+              <a:effectLst/>
+              <a:uLnTx/>
+              <a:uFillTx/>
+              <a:latin typeface="Courier New" pitchFamily="49" charset="0"/>
+              <a:cs typeface="Courier New" pitchFamily="49" charset="0"/>
+            </a:endParaRPr>
+          </a:p>
+        </p:txBody>
+      </p:sp>
+    </p:spTree>
+    <p:extLst>
+      <p:ext uri="{BB962C8B-B14F-4D97-AF65-F5344CB8AC3E}">
+        <p14:creationId xmlns:p14="http://schemas.microsoft.com/office/powerpoint/2010/main" val="38105009"/>
+      </p:ext>
+    </p:extLst>
+  </p:cSld>
+  <p:clrMapOvr>
+    <a:masterClrMapping/>
+  </p:clrMapOvr>
+</p:sld>
+</file>
+
+<file path=ppt/slides/slide33.xml><?xml version="1.0" encoding="utf-8"?>
+<p:sld xmlns:a="http://schemas.openxmlformats.org/drawingml/2006/main" xmlns:r="http://schemas.openxmlformats.org/officeDocument/2006/relationships" xmlns:p="http://schemas.openxmlformats.org/presentationml/2006/main">
+  <p:cSld>
+    <p:spTree>
+      <p:nvGrpSpPr>
+        <p:cNvPr id="1" name=""/>
+        <p:cNvGrpSpPr/>
+        <p:nvPr/>
+      </p:nvGrpSpPr>
+      <p:grpSpPr>
+        <a:xfrm>
+          <a:off x="0" y="0"/>
+          <a:ext cx="0" cy="0"/>
+          <a:chOff x="0" y="0"/>
+          <a:chExt cx="0" cy="0"/>
+        </a:xfrm>
+      </p:grpSpPr>
+      <p:sp>
+        <p:nvSpPr>
+          <p:cNvPr id="2" name="Title 1">
+            <a:extLst>
+              <a:ext uri="{FF2B5EF4-FFF2-40B4-BE49-F238E27FC236}">
+                <a16:creationId xmlns:a16="http://schemas.microsoft.com/office/drawing/2014/main" id="{212D882D-DD91-762A-9862-FA6E706576E3}"/>
+              </a:ext>
+            </a:extLst>
+          </p:cNvPr>
+          <p:cNvSpPr>
+            <a:spLocks noGrp="1"/>
+          </p:cNvSpPr>
+          <p:nvPr>
+            <p:ph type="title"/>
+          </p:nvPr>
+        </p:nvSpPr>
+        <p:spPr/>
+        <p:txBody>
+          <a:bodyPr/>
+          <a:lstStyle/>
+          <a:p>
+            <a:r>
+              <a:rPr lang="en-US" dirty="0"/>
+              <a:t>CPM</a:t>
+            </a:r>
+            <a:endParaRPr lang="LID4096" dirty="0"/>
+          </a:p>
+        </p:txBody>
+      </p:sp>
+      <p:sp>
+        <p:nvSpPr>
+          <p:cNvPr id="3" name="Content Placeholder 2">
+            <a:extLst>
+              <a:ext uri="{FF2B5EF4-FFF2-40B4-BE49-F238E27FC236}">
+                <a16:creationId xmlns:a16="http://schemas.microsoft.com/office/drawing/2014/main" id="{2D3556D6-66A1-32F0-325E-89EF55D4D684}"/>
+              </a:ext>
+            </a:extLst>
+          </p:cNvPr>
+          <p:cNvSpPr>
+            <a:spLocks noGrp="1"/>
+          </p:cNvSpPr>
+          <p:nvPr>
+            <p:ph idx="1"/>
+          </p:nvPr>
+        </p:nvSpPr>
+        <p:spPr/>
+        <p:txBody>
+          <a:bodyPr/>
+          <a:lstStyle/>
+          <a:p>
+            <a:r>
+              <a:rPr lang="en-US" dirty="0"/>
+              <a:t>Install software packages</a:t>
+            </a:r>
+          </a:p>
+          <a:p>
+            <a:endParaRPr lang="en-US" dirty="0">
+              <a:latin typeface="Courier New" panose="02070309020205020404" pitchFamily="49" charset="0"/>
+              <a:cs typeface="Courier New" panose="02070309020205020404" pitchFamily="49" charset="0"/>
+            </a:endParaRPr>
+          </a:p>
+          <a:p>
+            <a:endParaRPr lang="en-US" dirty="0">
+              <a:latin typeface="Courier New" panose="02070309020205020404" pitchFamily="49" charset="0"/>
+              <a:cs typeface="Courier New" panose="02070309020205020404" pitchFamily="49" charset="0"/>
+            </a:endParaRPr>
+          </a:p>
+          <a:p>
+            <a:endParaRPr lang="en-US" dirty="0">
+              <a:latin typeface="Courier New" panose="02070309020205020404" pitchFamily="49" charset="0"/>
+              <a:cs typeface="Courier New" panose="02070309020205020404" pitchFamily="49" charset="0"/>
+            </a:endParaRPr>
+          </a:p>
+          <a:p>
+            <a:r>
+              <a:rPr lang="en-US" dirty="0">
+                <a:cs typeface="Courier New" panose="02070309020205020404" pitchFamily="49" charset="0"/>
+              </a:rPr>
+              <a:t>Download and build of dependencies done by </a:t>
+            </a:r>
+            <a:r>
+              <a:rPr lang="en-US" dirty="0" err="1">
+                <a:cs typeface="Courier New" panose="02070309020205020404" pitchFamily="49" charset="0"/>
+              </a:rPr>
+              <a:t>CMake</a:t>
+            </a:r>
+            <a:endParaRPr lang="LID4096" dirty="0">
+              <a:cs typeface="Courier New" panose="02070309020205020404" pitchFamily="49" charset="0"/>
+            </a:endParaRPr>
+          </a:p>
+        </p:txBody>
+      </p:sp>
+      <p:sp>
+        <p:nvSpPr>
+          <p:cNvPr id="4" name="Slide Number Placeholder 3">
+            <a:extLst>
+              <a:ext uri="{FF2B5EF4-FFF2-40B4-BE49-F238E27FC236}">
+                <a16:creationId xmlns:a16="http://schemas.microsoft.com/office/drawing/2014/main" id="{841DACAC-48E5-D353-91C5-829E80964E4A}"/>
+              </a:ext>
+            </a:extLst>
+          </p:cNvPr>
+          <p:cNvSpPr>
+            <a:spLocks noGrp="1"/>
+          </p:cNvSpPr>
+          <p:nvPr>
+            <p:ph type="sldNum" sz="quarter" idx="12"/>
+          </p:nvPr>
+        </p:nvSpPr>
+        <p:spPr/>
+        <p:txBody>
+          <a:bodyPr/>
+          <a:lstStyle/>
+          <a:p>
+            <a:fld id="{FDB1AA33-DFBB-49AC-8CEE-23FFECEB5648}" type="slidenum">
+              <a:rPr lang="LID4096" smtClean="0"/>
+              <a:t>33</a:t>
+            </a:fld>
+            <a:endParaRPr lang="LID4096"/>
+          </a:p>
+        </p:txBody>
+      </p:sp>
+      <p:sp>
+        <p:nvSpPr>
+          <p:cNvPr id="5" name="TextBox 4">
+            <a:extLst>
+              <a:ext uri="{FF2B5EF4-FFF2-40B4-BE49-F238E27FC236}">
+                <a16:creationId xmlns:a16="http://schemas.microsoft.com/office/drawing/2014/main" id="{56A406B8-BE76-0E4B-5848-6008C26F5D6A}"/>
+              </a:ext>
+            </a:extLst>
+          </p:cNvPr>
+          <p:cNvSpPr txBox="1"/>
+          <p:nvPr/>
+        </p:nvSpPr>
+        <p:spPr>
+          <a:xfrm>
+            <a:off x="1055915" y="2413899"/>
+            <a:ext cx="9579429" cy="1015663"/>
+          </a:xfrm>
+          <a:prstGeom prst="rect">
+            <a:avLst/>
+          </a:prstGeom>
+          <a:solidFill>
+            <a:schemeClr val="accent6">
+              <a:lumMod val="20000"/>
+              <a:lumOff val="80000"/>
+            </a:schemeClr>
+          </a:solidFill>
+        </p:spPr>
+        <p:txBody>
+          <a:bodyPr wrap="square" rtlCol="0">
+            <a:spAutoFit/>
+          </a:bodyPr>
+          <a:lstStyle/>
+          <a:p>
+            <a:pPr lvl="0">
+              <a:defRPr/>
+            </a:pPr>
+            <a:r>
+              <a:rPr lang="en-US" sz="2000" dirty="0">
+                <a:solidFill>
+                  <a:prstClr val="black"/>
+                </a:solidFill>
+                <a:latin typeface="Courier New" pitchFamily="49" charset="0"/>
+                <a:cs typeface="Courier New" pitchFamily="49" charset="0"/>
+                <a:sym typeface="Symbol" panose="05050102010706020507" pitchFamily="18" charset="2"/>
+              </a:rPr>
+              <a:t></a:t>
+            </a:r>
+          </a:p>
+          <a:p>
+            <a:pPr lvl="0">
+              <a:defRPr/>
+            </a:pPr>
+            <a:r>
+              <a:rPr lang="en-US" sz="2000" dirty="0" err="1">
+                <a:solidFill>
+                  <a:prstClr val="black"/>
+                </a:solidFill>
+                <a:latin typeface="Courier New" pitchFamily="49" charset="0"/>
+                <a:cs typeface="Courier New" pitchFamily="49" charset="0"/>
+                <a:sym typeface="Symbol" panose="05050102010706020507" pitchFamily="18" charset="2"/>
+              </a:rPr>
+              <a:t>CPMAddPackage</a:t>
+            </a:r>
+            <a:r>
+              <a:rPr lang="en-US" sz="2000" dirty="0">
+                <a:solidFill>
+                  <a:prstClr val="black"/>
+                </a:solidFill>
+                <a:latin typeface="Courier New" pitchFamily="49" charset="0"/>
+                <a:cs typeface="Courier New" pitchFamily="49" charset="0"/>
+                <a:sym typeface="Symbol" panose="05050102010706020507" pitchFamily="18" charset="2"/>
+              </a:rPr>
+              <a:t>("</a:t>
+            </a:r>
+            <a:r>
+              <a:rPr lang="en-US" sz="2000" dirty="0" err="1">
+                <a:solidFill>
+                  <a:prstClr val="black"/>
+                </a:solidFill>
+                <a:latin typeface="Courier New" pitchFamily="49" charset="0"/>
+                <a:cs typeface="Courier New" pitchFamily="49" charset="0"/>
+                <a:sym typeface="Symbol" panose="05050102010706020507" pitchFamily="18" charset="2"/>
+              </a:rPr>
+              <a:t>gh:fmtlib</a:t>
+            </a:r>
+            <a:r>
+              <a:rPr lang="en-US" sz="2000" dirty="0">
+                <a:solidFill>
+                  <a:prstClr val="black"/>
+                </a:solidFill>
+                <a:latin typeface="Courier New" pitchFamily="49" charset="0"/>
+                <a:cs typeface="Courier New" pitchFamily="49" charset="0"/>
+                <a:sym typeface="Symbol" panose="05050102010706020507" pitchFamily="18" charset="2"/>
+              </a:rPr>
+              <a:t>/fmt#9.1.0")</a:t>
+            </a:r>
+          </a:p>
+          <a:p>
+            <a:pPr lvl="0">
+              <a:defRPr/>
+            </a:pPr>
+            <a:r>
+              <a:rPr lang="en-US" sz="2000" dirty="0">
+                <a:solidFill>
+                  <a:prstClr val="black"/>
+                </a:solidFill>
+                <a:latin typeface="Courier New" pitchFamily="49" charset="0"/>
+                <a:cs typeface="Courier New" pitchFamily="49" charset="0"/>
+                <a:sym typeface="Symbol" panose="05050102010706020507" pitchFamily="18" charset="2"/>
+              </a:rPr>
+              <a:t></a:t>
+            </a:r>
+            <a:endParaRPr kumimoji="0" lang="en-US" sz="2000" b="0" i="0" u="none" strike="noStrike" kern="1200" cap="none" spc="0" normalizeH="0" baseline="0" noProof="0" dirty="0">
+              <a:ln>
+                <a:noFill/>
+              </a:ln>
+              <a:solidFill>
+                <a:prstClr val="black"/>
+              </a:solidFill>
+              <a:effectLst/>
+              <a:uLnTx/>
+              <a:uFillTx/>
+              <a:latin typeface="Courier New" pitchFamily="49" charset="0"/>
+              <a:cs typeface="Courier New" pitchFamily="49" charset="0"/>
+            </a:endParaRPr>
+          </a:p>
+        </p:txBody>
+      </p:sp>
+      <p:sp>
+        <p:nvSpPr>
+          <p:cNvPr id="7" name="TextBox 6">
+            <a:extLst>
+              <a:ext uri="{FF2B5EF4-FFF2-40B4-BE49-F238E27FC236}">
+                <a16:creationId xmlns:a16="http://schemas.microsoft.com/office/drawing/2014/main" id="{D24CD040-C2F1-2804-6DCE-6946592E60D7}"/>
+              </a:ext>
+            </a:extLst>
+          </p:cNvPr>
+          <p:cNvSpPr txBox="1"/>
+          <p:nvPr/>
+        </p:nvSpPr>
+        <p:spPr>
+          <a:xfrm>
+            <a:off x="499580" y="4735915"/>
+            <a:ext cx="10376815" cy="646331"/>
+          </a:xfrm>
+          <a:prstGeom prst="rect">
+            <a:avLst/>
+          </a:prstGeom>
+          <a:noFill/>
+          <a:ln>
+            <a:solidFill>
+              <a:schemeClr val="tx1"/>
+            </a:solidFill>
+          </a:ln>
+        </p:spPr>
+        <p:txBody>
+          <a:bodyPr wrap="none" rtlCol="0">
+            <a:spAutoFit/>
+          </a:bodyPr>
+          <a:lstStyle/>
+          <a:p>
+            <a:r>
+              <a:rPr lang="en-US" sz="2000" dirty="0"/>
+              <a:t>See</a:t>
+            </a:r>
+          </a:p>
+          <a:p>
+            <a:r>
+              <a:rPr lang="en-US" sz="1600" dirty="0">
+                <a:hlinkClick r:id="rId2"/>
+              </a:rPr>
+              <a:t>https://github.com/gjbex/C-plus-plus-software-engineering/tree/main/source-code/dependency-management/cpm</a:t>
+            </a:r>
+            <a:r>
+              <a:rPr lang="en-US" sz="1600" dirty="0"/>
+              <a:t> </a:t>
+            </a:r>
+            <a:endParaRPr lang="LID4096" sz="1600" dirty="0"/>
+          </a:p>
+        </p:txBody>
+      </p:sp>
+    </p:spTree>
+    <p:extLst>
+      <p:ext uri="{BB962C8B-B14F-4D97-AF65-F5344CB8AC3E}">
+        <p14:creationId xmlns:p14="http://schemas.microsoft.com/office/powerpoint/2010/main" val="1959778651"/>
+      </p:ext>
+    </p:extLst>
+  </p:cSld>
+  <p:clrMapOvr>
+    <a:masterClrMapping/>
+  </p:clrMapOvr>
+  <p:timing>
+    <p:tnLst>
+      <p:par>
+        <p:cTn id="1" dur="indefinite" restart="never" nodeType="tmRoot">
+          <p:childTnLst>
+            <p:seq concurrent="1" nextAc="seek">
+              <p:cTn id="2" dur="indefinite" nodeType="mainSeq">
+                <p:childTnLst>
+                  <p:par>
+                    <p:cTn id="3" fill="hold">
+                      <p:stCondLst>
+                        <p:cond delay="indefinite"/>
+                      </p:stCondLst>
+                      <p:childTnLst>
+                        <p:par>
+                          <p:cTn id="4" fill="hold">
+                            <p:stCondLst>
+                              <p:cond delay="0"/>
+                            </p:stCondLst>
+                            <p:childTnLst>
+                              <p:par>
+                                <p:cTn id="5" presetID="1" presetClass="entr" presetSubtype="0" fill="hold" grpId="0" nodeType="clickEffect">
+                                  <p:stCondLst>
+                                    <p:cond delay="0"/>
+                                  </p:stCondLst>
+                                  <p:childTnLst>
+                                    <p:set>
+                                      <p:cBhvr>
+                                        <p:cTn id="6" dur="1" fill="hold">
+                                          <p:stCondLst>
+                                            <p:cond delay="0"/>
+                                          </p:stCondLst>
+                                        </p:cTn>
+                                        <p:tgtEl>
+                                          <p:spTgt spid="7"/>
+                                        </p:tgtEl>
+                                        <p:attrNameLst>
+                                          <p:attrName>style.visibility</p:attrName>
+                                        </p:attrNameLst>
+                                      </p:cBhvr>
+                                      <p:to>
+                                        <p:strVal val="visible"/>
+                                      </p:to>
+                                    </p:set>
+                                  </p:childTnLst>
+                                </p:cTn>
+                              </p:par>
+                            </p:childTnLst>
+                          </p:cTn>
+                        </p:par>
+                      </p:childTnLst>
+                    </p:cTn>
+                  </p:par>
+                </p:childTnLst>
+              </p:cTn>
+              <p:prevCondLst>
+                <p:cond evt="onPrev" delay="0">
+                  <p:tgtEl>
+                    <p:sldTgt/>
+                  </p:tgtEl>
+                </p:cond>
+              </p:prevCondLst>
+              <p:nextCondLst>
+                <p:cond evt="onNext" delay="0">
+                  <p:tgtEl>
+                    <p:sldTgt/>
+                  </p:tgtEl>
+                </p:cond>
+              </p:nextCondLst>
+            </p:seq>
+          </p:childTnLst>
+        </p:cTn>
+      </p:par>
+    </p:tnLst>
+    <p:bldLst>
+      <p:bldP spid="7" grpId="0" animBg="1"/>
+    </p:bldLst>
+  </p:timing>
+</p:sld>
+</file>
+
+<file path=ppt/slides/slide34.xml><?xml version="1.0" encoding="utf-8"?>
+<p:sld xmlns:a="http://schemas.openxmlformats.org/drawingml/2006/main" xmlns:r="http://schemas.openxmlformats.org/officeDocument/2006/relationships" xmlns:p="http://schemas.openxmlformats.org/presentationml/2006/main">
+  <p:cSld>
+    <p:spTree>
+      <p:nvGrpSpPr>
+        <p:cNvPr id="1" name=""/>
+        <p:cNvGrpSpPr/>
+        <p:nvPr/>
+      </p:nvGrpSpPr>
+      <p:grpSpPr>
+        <a:xfrm>
+          <a:off x="0" y="0"/>
+          <a:ext cx="0" cy="0"/>
+          <a:chOff x="0" y="0"/>
+          <a:chExt cx="0" cy="0"/>
+        </a:xfrm>
+      </p:grpSpPr>
+      <p:sp>
+        <p:nvSpPr>
+          <p:cNvPr id="2" name="Title 1">
+            <a:extLst>
+              <a:ext uri="{FF2B5EF4-FFF2-40B4-BE49-F238E27FC236}">
+                <a16:creationId xmlns:a16="http://schemas.microsoft.com/office/drawing/2014/main" id="{5D47E52C-C68B-48ED-C2F6-90624F3E92FB}"/>
+              </a:ext>
+            </a:extLst>
+          </p:cNvPr>
+          <p:cNvSpPr>
+            <a:spLocks noGrp="1"/>
+          </p:cNvSpPr>
+          <p:nvPr>
+            <p:ph type="title"/>
+          </p:nvPr>
+        </p:nvSpPr>
+        <p:spPr/>
+        <p:txBody>
+          <a:bodyPr/>
+          <a:lstStyle/>
+          <a:p>
+            <a:r>
+              <a:rPr lang="en-US" dirty="0"/>
+              <a:t>Further reading</a:t>
+            </a:r>
+            <a:endParaRPr lang="LID4096" dirty="0"/>
+          </a:p>
+        </p:txBody>
+      </p:sp>
+      <p:sp>
+        <p:nvSpPr>
+          <p:cNvPr id="3" name="Content Placeholder 2">
+            <a:extLst>
+              <a:ext uri="{FF2B5EF4-FFF2-40B4-BE49-F238E27FC236}">
+                <a16:creationId xmlns:a16="http://schemas.microsoft.com/office/drawing/2014/main" id="{4185A2C6-A3DC-11B2-63F1-FAC2EF9310FD}"/>
+              </a:ext>
+            </a:extLst>
+          </p:cNvPr>
+          <p:cNvSpPr>
+            <a:spLocks noGrp="1"/>
+          </p:cNvSpPr>
+          <p:nvPr>
+            <p:ph idx="1"/>
+          </p:nvPr>
+        </p:nvSpPr>
+        <p:spPr/>
+        <p:txBody>
+          <a:bodyPr/>
+          <a:lstStyle/>
+          <a:p>
+            <a:r>
+              <a:rPr lang="en-US" dirty="0"/>
+              <a:t>Conan documentation</a:t>
+            </a:r>
+            <a:br>
+              <a:rPr lang="en-US" dirty="0"/>
+            </a:br>
+            <a:r>
+              <a:rPr lang="en-US" dirty="0">
+                <a:hlinkClick r:id="rId2"/>
+              </a:rPr>
+              <a:t>https://docs.conan.io/2/</a:t>
+            </a:r>
+            <a:r>
+              <a:rPr lang="en-US" dirty="0"/>
+              <a:t> </a:t>
+            </a:r>
+          </a:p>
+          <a:p>
+            <a:r>
+              <a:rPr lang="en-US" dirty="0" err="1"/>
+              <a:t>vcpkg</a:t>
+            </a:r>
+            <a:r>
+              <a:rPr lang="en-US" dirty="0"/>
+              <a:t> documentation</a:t>
+            </a:r>
+            <a:br>
+              <a:rPr lang="en-US" dirty="0"/>
+            </a:br>
+            <a:r>
+              <a:rPr lang="en-US" dirty="0">
+                <a:hlinkClick r:id="rId3"/>
+              </a:rPr>
+              <a:t>https://learn.microsoft.com/en-us/vcpkg/</a:t>
+            </a:r>
+            <a:endParaRPr lang="en-US" dirty="0"/>
+          </a:p>
+          <a:p>
+            <a:r>
+              <a:rPr lang="en-US" dirty="0"/>
+              <a:t>CPM site</a:t>
+            </a:r>
+            <a:br>
+              <a:rPr lang="en-US" dirty="0"/>
+            </a:br>
+            <a:r>
+              <a:rPr lang="en-US" dirty="0">
+                <a:hlinkClick r:id="rId4"/>
+              </a:rPr>
+              <a:t>https://github.com/cpm-cmake/CPM.cmake</a:t>
+            </a:r>
+            <a:r>
+              <a:rPr lang="en-US" dirty="0"/>
+              <a:t> </a:t>
+            </a:r>
+            <a:br>
+              <a:rPr lang="en-US" dirty="0"/>
+            </a:br>
+            <a:r>
+              <a:rPr lang="en-US" dirty="0"/>
+              <a:t> </a:t>
+            </a:r>
+            <a:endParaRPr lang="LID4096" dirty="0"/>
+          </a:p>
+        </p:txBody>
+      </p:sp>
+      <p:sp>
+        <p:nvSpPr>
+          <p:cNvPr id="4" name="Slide Number Placeholder 3">
+            <a:extLst>
+              <a:ext uri="{FF2B5EF4-FFF2-40B4-BE49-F238E27FC236}">
+                <a16:creationId xmlns:a16="http://schemas.microsoft.com/office/drawing/2014/main" id="{7A6CA5D4-ECE8-DEEA-8D8A-F23346724986}"/>
+              </a:ext>
+            </a:extLst>
+          </p:cNvPr>
+          <p:cNvSpPr>
+            <a:spLocks noGrp="1"/>
+          </p:cNvSpPr>
+          <p:nvPr>
+            <p:ph type="sldNum" sz="quarter" idx="12"/>
+          </p:nvPr>
+        </p:nvSpPr>
+        <p:spPr/>
+        <p:txBody>
+          <a:bodyPr/>
+          <a:lstStyle/>
+          <a:p>
+            <a:fld id="{FDB1AA33-DFBB-49AC-8CEE-23FFECEB5648}" type="slidenum">
+              <a:rPr lang="LID4096" smtClean="0"/>
+              <a:t>34</a:t>
+            </a:fld>
+            <a:endParaRPr lang="LID4096"/>
+          </a:p>
+        </p:txBody>
+      </p:sp>
+    </p:spTree>
+    <p:extLst>
+      <p:ext uri="{BB962C8B-B14F-4D97-AF65-F5344CB8AC3E}">
+        <p14:creationId xmlns:p14="http://schemas.microsoft.com/office/powerpoint/2010/main" val="82836660"/>
+      </p:ext>
+    </p:extLst>
+  </p:cSld>
+  <p:clrMapOvr>
+    <a:masterClrMapping/>
+  </p:clrMapOvr>
+</p:sld>
+</file>
+
+<file path=ppt/slides/slide35.xml><?xml version="1.0" encoding="utf-8"?>
+<p:sld xmlns:a="http://schemas.openxmlformats.org/drawingml/2006/main" xmlns:r="http://schemas.openxmlformats.org/officeDocument/2006/relationships" xmlns:p="http://schemas.openxmlformats.org/presentationml/2006/main">
+  <p:cSld>
+    <p:spTree>
+      <p:nvGrpSpPr>
+        <p:cNvPr id="1" name=""/>
+        <p:cNvGrpSpPr/>
+        <p:nvPr/>
+      </p:nvGrpSpPr>
+      <p:grpSpPr>
+        <a:xfrm>
+          <a:off x="0" y="0"/>
+          <a:ext cx="0" cy="0"/>
+          <a:chOff x="0" y="0"/>
+          <a:chExt cx="0" cy="0"/>
+        </a:xfrm>
+      </p:grpSpPr>
+      <p:sp>
+        <p:nvSpPr>
+          <p:cNvPr id="2" name="Title 1">
+            <a:extLst>
+              <a:ext uri="{FF2B5EF4-FFF2-40B4-BE49-F238E27FC236}">
+                <a16:creationId xmlns:a16="http://schemas.microsoft.com/office/drawing/2014/main" id="{22DA9DDC-00AC-C65F-BAB9-D666A4911419}"/>
+              </a:ext>
+            </a:extLst>
+          </p:cNvPr>
+          <p:cNvSpPr>
+            <a:spLocks noGrp="1"/>
+          </p:cNvSpPr>
+          <p:nvPr>
+            <p:ph type="title"/>
+          </p:nvPr>
+        </p:nvSpPr>
+        <p:spPr/>
+        <p:txBody>
+          <a:bodyPr/>
+          <a:lstStyle/>
+          <a:p>
+            <a:r>
+              <a:rPr lang="en-US" dirty="0"/>
+              <a:t>Design patterns</a:t>
+            </a:r>
+            <a:endParaRPr lang="LID4096" dirty="0"/>
+          </a:p>
+        </p:txBody>
+      </p:sp>
+      <p:sp>
+        <p:nvSpPr>
+          <p:cNvPr id="3" name="Text Placeholder 2">
+            <a:extLst>
+              <a:ext uri="{FF2B5EF4-FFF2-40B4-BE49-F238E27FC236}">
+                <a16:creationId xmlns:a16="http://schemas.microsoft.com/office/drawing/2014/main" id="{9A3CC304-7A54-167F-627F-941E46AB2D0A}"/>
+              </a:ext>
+            </a:extLst>
+          </p:cNvPr>
+          <p:cNvSpPr>
+            <a:spLocks noGrp="1"/>
+          </p:cNvSpPr>
+          <p:nvPr>
+            <p:ph type="body" idx="1"/>
+          </p:nvPr>
+        </p:nvSpPr>
+        <p:spPr/>
+        <p:txBody>
+          <a:bodyPr/>
+          <a:lstStyle/>
+          <a:p>
+            <a:endParaRPr lang="LID4096"/>
+          </a:p>
+        </p:txBody>
+      </p:sp>
+      <p:sp>
+        <p:nvSpPr>
+          <p:cNvPr id="4" name="Slide Number Placeholder 3">
+            <a:extLst>
+              <a:ext uri="{FF2B5EF4-FFF2-40B4-BE49-F238E27FC236}">
+                <a16:creationId xmlns:a16="http://schemas.microsoft.com/office/drawing/2014/main" id="{22A889D4-CBB4-A356-9FBF-17C5A6AB3E9C}"/>
+              </a:ext>
+            </a:extLst>
+          </p:cNvPr>
+          <p:cNvSpPr>
+            <a:spLocks noGrp="1"/>
+          </p:cNvSpPr>
+          <p:nvPr>
+            <p:ph type="sldNum" sz="quarter" idx="12"/>
+          </p:nvPr>
+        </p:nvSpPr>
+        <p:spPr/>
+        <p:txBody>
+          <a:bodyPr/>
+          <a:lstStyle/>
+          <a:p>
+            <a:fld id="{FDB1AA33-DFBB-49AC-8CEE-23FFECEB5648}" type="slidenum">
+              <a:rPr lang="LID4096" smtClean="0"/>
+              <a:t>35</a:t>
+            </a:fld>
+            <a:endParaRPr lang="LID4096"/>
+          </a:p>
+        </p:txBody>
+      </p:sp>
+    </p:spTree>
+    <p:extLst>
+      <p:ext uri="{BB962C8B-B14F-4D97-AF65-F5344CB8AC3E}">
+        <p14:creationId xmlns:p14="http://schemas.microsoft.com/office/powerpoint/2010/main" val="2812671867"/>
       </p:ext>
     </p:extLst>
   </p:cSld>

</xml_diff>

<commit_message>
Add section on design patters
</commit_message>
<xml_diff>
--- a/cpp_software_engineering.pptx
+++ b/cpp_software_engineering.pptx
@@ -5,7 +5,7 @@
     <p:sldMasterId id="2147483648" r:id="rId1"/>
   </p:sldMasterIdLst>
   <p:notesMasterIdLst>
-    <p:notesMasterId r:id="rId37"/>
+    <p:notesMasterId r:id="rId40"/>
   </p:notesMasterIdLst>
   <p:sldIdLst>
     <p:sldId id="257" r:id="rId2"/>
@@ -43,6 +43,9 @@
     <p:sldId id="387" r:id="rId34"/>
     <p:sldId id="385" r:id="rId35"/>
     <p:sldId id="388" r:id="rId36"/>
+    <p:sldId id="389" r:id="rId37"/>
+    <p:sldId id="390" r:id="rId38"/>
+    <p:sldId id="391" r:id="rId39"/>
   </p:sldIdLst>
   <p:sldSz cx="12192000" cy="6858000"/>
   <p:notesSz cx="6858000" cy="9144000"/>
@@ -200,7 +203,14 @@
             <p14:sldId id="386"/>
             <p14:sldId id="387"/>
             <p14:sldId id="385"/>
+          </p14:sldIdLst>
+        </p14:section>
+        <p14:section name="Design patterns" id="{0C77B766-F7F3-4118-BE76-9D5D9D4086B8}">
+          <p14:sldIdLst>
             <p14:sldId id="388"/>
+            <p14:sldId id="389"/>
+            <p14:sldId id="390"/>
+            <p14:sldId id="391"/>
           </p14:sldIdLst>
         </p14:section>
       </p14:sectionLst>
@@ -16503,6 +16513,565 @@
     <p:extLst>
       <p:ext uri="{BB962C8B-B14F-4D97-AF65-F5344CB8AC3E}">
         <p14:creationId xmlns:p14="http://schemas.microsoft.com/office/powerpoint/2010/main" val="2812671867"/>
+      </p:ext>
+    </p:extLst>
+  </p:cSld>
+  <p:clrMapOvr>
+    <a:masterClrMapping/>
+  </p:clrMapOvr>
+</p:sld>
+</file>
+
+<file path=ppt/slides/slide36.xml><?xml version="1.0" encoding="utf-8"?>
+<p:sld xmlns:a="http://schemas.openxmlformats.org/drawingml/2006/main" xmlns:r="http://schemas.openxmlformats.org/officeDocument/2006/relationships" xmlns:p="http://schemas.openxmlformats.org/presentationml/2006/main">
+  <p:cSld>
+    <p:spTree>
+      <p:nvGrpSpPr>
+        <p:cNvPr id="1" name=""/>
+        <p:cNvGrpSpPr/>
+        <p:nvPr/>
+      </p:nvGrpSpPr>
+      <p:grpSpPr>
+        <a:xfrm>
+          <a:off x="0" y="0"/>
+          <a:ext cx="0" cy="0"/>
+          <a:chOff x="0" y="0"/>
+          <a:chExt cx="0" cy="0"/>
+        </a:xfrm>
+      </p:grpSpPr>
+      <p:sp>
+        <p:nvSpPr>
+          <p:cNvPr id="2" name="Title 1">
+            <a:extLst>
+              <a:ext uri="{FF2B5EF4-FFF2-40B4-BE49-F238E27FC236}">
+                <a16:creationId xmlns:a16="http://schemas.microsoft.com/office/drawing/2014/main" id="{0CDE1B04-6F71-4330-B666-5B7B430C7C40}"/>
+              </a:ext>
+            </a:extLst>
+          </p:cNvPr>
+          <p:cNvSpPr>
+            <a:spLocks noGrp="1"/>
+          </p:cNvSpPr>
+          <p:nvPr>
+            <p:ph type="title"/>
+          </p:nvPr>
+        </p:nvSpPr>
+        <p:spPr/>
+        <p:txBody>
+          <a:bodyPr/>
+          <a:lstStyle/>
+          <a:p>
+            <a:r>
+              <a:rPr lang="en-US" dirty="0"/>
+              <a:t>Motivation</a:t>
+            </a:r>
+          </a:p>
+        </p:txBody>
+      </p:sp>
+      <p:sp>
+        <p:nvSpPr>
+          <p:cNvPr id="3" name="Content Placeholder 2">
+            <a:extLst>
+              <a:ext uri="{FF2B5EF4-FFF2-40B4-BE49-F238E27FC236}">
+                <a16:creationId xmlns:a16="http://schemas.microsoft.com/office/drawing/2014/main" id="{CC98AEC1-1A7F-4251-B837-4A655C9DC61E}"/>
+              </a:ext>
+            </a:extLst>
+          </p:cNvPr>
+          <p:cNvSpPr>
+            <a:spLocks noGrp="1"/>
+          </p:cNvSpPr>
+          <p:nvPr>
+            <p:ph idx="1"/>
+          </p:nvPr>
+        </p:nvSpPr>
+        <p:spPr/>
+        <p:txBody>
+          <a:bodyPr/>
+          <a:lstStyle/>
+          <a:p>
+            <a:r>
+              <a:rPr lang="en-US" dirty="0"/>
+              <a:t>Observation: patterns in problems to solve</a:t>
+            </a:r>
+          </a:p>
+          <a:p>
+            <a:r>
+              <a:rPr lang="en-US" dirty="0"/>
+              <a:t>Design pattern = recipe for software design</a:t>
+            </a:r>
+          </a:p>
+          <a:p>
+            <a:pPr lvl="1"/>
+            <a:r>
+              <a:rPr lang="en-US" dirty="0"/>
+              <a:t>Don’t reinvent the wheel</a:t>
+            </a:r>
+          </a:p>
+        </p:txBody>
+      </p:sp>
+      <p:sp>
+        <p:nvSpPr>
+          <p:cNvPr id="4" name="Slide Number Placeholder 3">
+            <a:extLst>
+              <a:ext uri="{FF2B5EF4-FFF2-40B4-BE49-F238E27FC236}">
+                <a16:creationId xmlns:a16="http://schemas.microsoft.com/office/drawing/2014/main" id="{9F31908B-C8B8-481C-9414-BA9B8EAA880A}"/>
+              </a:ext>
+            </a:extLst>
+          </p:cNvPr>
+          <p:cNvSpPr>
+            <a:spLocks noGrp="1"/>
+          </p:cNvSpPr>
+          <p:nvPr>
+            <p:ph type="sldNum" sz="quarter" idx="12"/>
+          </p:nvPr>
+        </p:nvSpPr>
+        <p:spPr/>
+        <p:txBody>
+          <a:bodyPr/>
+          <a:lstStyle/>
+          <a:p>
+            <a:fld id="{5A209D72-2E9D-49B0-8977-41DCCC66C0BB}" type="slidenum">
+              <a:rPr lang="nl-BE" smtClean="0"/>
+              <a:t>36</a:t>
+            </a:fld>
+            <a:endParaRPr lang="nl-BE"/>
+          </a:p>
+        </p:txBody>
+      </p:sp>
+    </p:spTree>
+    <p:extLst>
+      <p:ext uri="{BB962C8B-B14F-4D97-AF65-F5344CB8AC3E}">
+        <p14:creationId xmlns:p14="http://schemas.microsoft.com/office/powerpoint/2010/main" val="3503158207"/>
+      </p:ext>
+    </p:extLst>
+  </p:cSld>
+  <p:clrMapOvr>
+    <a:masterClrMapping/>
+  </p:clrMapOvr>
+</p:sld>
+</file>
+
+<file path=ppt/slides/slide37.xml><?xml version="1.0" encoding="utf-8"?>
+<p:sld xmlns:a="http://schemas.openxmlformats.org/drawingml/2006/main" xmlns:r="http://schemas.openxmlformats.org/officeDocument/2006/relationships" xmlns:p="http://schemas.openxmlformats.org/presentationml/2006/main">
+  <p:cSld>
+    <p:spTree>
+      <p:nvGrpSpPr>
+        <p:cNvPr id="1" name=""/>
+        <p:cNvGrpSpPr/>
+        <p:nvPr/>
+      </p:nvGrpSpPr>
+      <p:grpSpPr>
+        <a:xfrm>
+          <a:off x="0" y="0"/>
+          <a:ext cx="0" cy="0"/>
+          <a:chOff x="0" y="0"/>
+          <a:chExt cx="0" cy="0"/>
+        </a:xfrm>
+      </p:grpSpPr>
+      <p:sp>
+        <p:nvSpPr>
+          <p:cNvPr id="2" name="Title 1">
+            <a:extLst>
+              <a:ext uri="{FF2B5EF4-FFF2-40B4-BE49-F238E27FC236}">
+                <a16:creationId xmlns:a16="http://schemas.microsoft.com/office/drawing/2014/main" id="{AA5E72B2-61DF-4F7D-A226-9483D7C44016}"/>
+              </a:ext>
+            </a:extLst>
+          </p:cNvPr>
+          <p:cNvSpPr>
+            <a:spLocks noGrp="1"/>
+          </p:cNvSpPr>
+          <p:nvPr>
+            <p:ph type="title"/>
+          </p:nvPr>
+        </p:nvSpPr>
+        <p:spPr/>
+        <p:txBody>
+          <a:bodyPr/>
+          <a:lstStyle/>
+          <a:p>
+            <a:r>
+              <a:rPr lang="en-US" dirty="0"/>
+              <a:t>Patterns</a:t>
+            </a:r>
+          </a:p>
+        </p:txBody>
+      </p:sp>
+      <p:sp>
+        <p:nvSpPr>
+          <p:cNvPr id="3" name="Content Placeholder 2">
+            <a:extLst>
+              <a:ext uri="{FF2B5EF4-FFF2-40B4-BE49-F238E27FC236}">
+                <a16:creationId xmlns:a16="http://schemas.microsoft.com/office/drawing/2014/main" id="{D04ABB18-0664-4863-B217-DD2E149B55F2}"/>
+              </a:ext>
+            </a:extLst>
+          </p:cNvPr>
+          <p:cNvSpPr>
+            <a:spLocks noGrp="1"/>
+          </p:cNvSpPr>
+          <p:nvPr>
+            <p:ph idx="1"/>
+          </p:nvPr>
+        </p:nvSpPr>
+        <p:spPr/>
+        <p:txBody>
+          <a:bodyPr/>
+          <a:lstStyle/>
+          <a:p>
+            <a:r>
+              <a:rPr lang="en-US" dirty="0"/>
+              <a:t>Quite a lot (23 originally)</a:t>
+            </a:r>
+          </a:p>
+          <a:p>
+            <a:pPr lvl="1"/>
+            <a:r>
+              <a:rPr lang="en-US" dirty="0"/>
+              <a:t>Creational patterns</a:t>
+            </a:r>
+          </a:p>
+          <a:p>
+            <a:pPr lvl="2"/>
+            <a:r>
+              <a:rPr lang="en-US" dirty="0"/>
+              <a:t>E.g., builder, factory</a:t>
+            </a:r>
+          </a:p>
+          <a:p>
+            <a:pPr lvl="1"/>
+            <a:r>
+              <a:rPr lang="en-US" dirty="0"/>
+              <a:t>Structural patterns</a:t>
+            </a:r>
+          </a:p>
+          <a:p>
+            <a:pPr lvl="2"/>
+            <a:r>
+              <a:rPr lang="en-US" dirty="0"/>
+              <a:t>E.g., decorator</a:t>
+            </a:r>
+          </a:p>
+          <a:p>
+            <a:pPr lvl="1"/>
+            <a:r>
+              <a:rPr lang="en-US" dirty="0"/>
+              <a:t>Behavioral patterns</a:t>
+            </a:r>
+          </a:p>
+          <a:p>
+            <a:pPr lvl="2"/>
+            <a:r>
+              <a:rPr lang="en-US" dirty="0"/>
+              <a:t>E.g., state, strategy</a:t>
+            </a:r>
+          </a:p>
+          <a:p>
+            <a:pPr lvl="1"/>
+            <a:r>
+              <a:rPr lang="en-US" dirty="0"/>
+              <a:t>Parallel patterns</a:t>
+            </a:r>
+          </a:p>
+        </p:txBody>
+      </p:sp>
+      <p:sp>
+        <p:nvSpPr>
+          <p:cNvPr id="4" name="Slide Number Placeholder 3">
+            <a:extLst>
+              <a:ext uri="{FF2B5EF4-FFF2-40B4-BE49-F238E27FC236}">
+                <a16:creationId xmlns:a16="http://schemas.microsoft.com/office/drawing/2014/main" id="{6CAD0D00-276F-449C-8ED3-67B7F75E2EF3}"/>
+              </a:ext>
+            </a:extLst>
+          </p:cNvPr>
+          <p:cNvSpPr>
+            <a:spLocks noGrp="1"/>
+          </p:cNvSpPr>
+          <p:nvPr>
+            <p:ph type="sldNum" sz="quarter" idx="12"/>
+          </p:nvPr>
+        </p:nvSpPr>
+        <p:spPr/>
+        <p:txBody>
+          <a:bodyPr/>
+          <a:lstStyle/>
+          <a:p>
+            <a:fld id="{5A209D72-2E9D-49B0-8977-41DCCC66C0BB}" type="slidenum">
+              <a:rPr lang="nl-BE" smtClean="0"/>
+              <a:t>37</a:t>
+            </a:fld>
+            <a:endParaRPr lang="nl-BE"/>
+          </a:p>
+        </p:txBody>
+      </p:sp>
+      <p:sp>
+        <p:nvSpPr>
+          <p:cNvPr id="5" name="TextBox 4">
+            <a:extLst>
+              <a:ext uri="{FF2B5EF4-FFF2-40B4-BE49-F238E27FC236}">
+                <a16:creationId xmlns:a16="http://schemas.microsoft.com/office/drawing/2014/main" id="{0847D2CC-8781-2378-7EC4-F6B367CC3018}"/>
+              </a:ext>
+            </a:extLst>
+          </p:cNvPr>
+          <p:cNvSpPr txBox="1"/>
+          <p:nvPr/>
+        </p:nvSpPr>
+        <p:spPr>
+          <a:xfrm>
+            <a:off x="608437" y="5084258"/>
+            <a:ext cx="9022535" cy="646331"/>
+          </a:xfrm>
+          <a:prstGeom prst="rect">
+            <a:avLst/>
+          </a:prstGeom>
+          <a:noFill/>
+          <a:ln>
+            <a:solidFill>
+              <a:schemeClr val="tx1"/>
+            </a:solidFill>
+          </a:ln>
+        </p:spPr>
+        <p:txBody>
+          <a:bodyPr wrap="none" rtlCol="0">
+            <a:spAutoFit/>
+          </a:bodyPr>
+          <a:lstStyle/>
+          <a:p>
+            <a:r>
+              <a:rPr lang="en-US" sz="2000" dirty="0"/>
+              <a:t>See</a:t>
+            </a:r>
+          </a:p>
+          <a:p>
+            <a:r>
+              <a:rPr lang="en-US" sz="1600" dirty="0">
+                <a:hlinkClick r:id="rId2"/>
+              </a:rPr>
+              <a:t>https://github.com/gjbex/C-plus-plus-software-engineering/tree/main/source-code/design-patterns</a:t>
+            </a:r>
+            <a:r>
+              <a:rPr lang="en-US" sz="1600" dirty="0"/>
+              <a:t> </a:t>
+            </a:r>
+            <a:endParaRPr lang="LID4096" sz="1600" dirty="0"/>
+          </a:p>
+        </p:txBody>
+      </p:sp>
+    </p:spTree>
+    <p:extLst>
+      <p:ext uri="{BB962C8B-B14F-4D97-AF65-F5344CB8AC3E}">
+        <p14:creationId xmlns:p14="http://schemas.microsoft.com/office/powerpoint/2010/main" val="1597816929"/>
+      </p:ext>
+    </p:extLst>
+  </p:cSld>
+  <p:clrMapOvr>
+    <a:masterClrMapping/>
+  </p:clrMapOvr>
+  <p:timing>
+    <p:tnLst>
+      <p:par>
+        <p:cTn id="1" dur="indefinite" restart="never" nodeType="tmRoot">
+          <p:childTnLst>
+            <p:seq concurrent="1" nextAc="seek">
+              <p:cTn id="2" dur="indefinite" nodeType="mainSeq">
+                <p:childTnLst>
+                  <p:par>
+                    <p:cTn id="3" fill="hold">
+                      <p:stCondLst>
+                        <p:cond delay="indefinite"/>
+                      </p:stCondLst>
+                      <p:childTnLst>
+                        <p:par>
+                          <p:cTn id="4" fill="hold">
+                            <p:stCondLst>
+                              <p:cond delay="0"/>
+                            </p:stCondLst>
+                            <p:childTnLst>
+                              <p:par>
+                                <p:cTn id="5" presetID="1" presetClass="entr" presetSubtype="0" fill="hold" grpId="0" nodeType="clickEffect">
+                                  <p:stCondLst>
+                                    <p:cond delay="0"/>
+                                  </p:stCondLst>
+                                  <p:childTnLst>
+                                    <p:set>
+                                      <p:cBhvr>
+                                        <p:cTn id="6" dur="1" fill="hold">
+                                          <p:stCondLst>
+                                            <p:cond delay="0"/>
+                                          </p:stCondLst>
+                                        </p:cTn>
+                                        <p:tgtEl>
+                                          <p:spTgt spid="5"/>
+                                        </p:tgtEl>
+                                        <p:attrNameLst>
+                                          <p:attrName>style.visibility</p:attrName>
+                                        </p:attrNameLst>
+                                      </p:cBhvr>
+                                      <p:to>
+                                        <p:strVal val="visible"/>
+                                      </p:to>
+                                    </p:set>
+                                  </p:childTnLst>
+                                </p:cTn>
+                              </p:par>
+                            </p:childTnLst>
+                          </p:cTn>
+                        </p:par>
+                      </p:childTnLst>
+                    </p:cTn>
+                  </p:par>
+                </p:childTnLst>
+              </p:cTn>
+              <p:prevCondLst>
+                <p:cond evt="onPrev" delay="0">
+                  <p:tgtEl>
+                    <p:sldTgt/>
+                  </p:tgtEl>
+                </p:cond>
+              </p:prevCondLst>
+              <p:nextCondLst>
+                <p:cond evt="onNext" delay="0">
+                  <p:tgtEl>
+                    <p:sldTgt/>
+                  </p:tgtEl>
+                </p:cond>
+              </p:nextCondLst>
+            </p:seq>
+          </p:childTnLst>
+        </p:cTn>
+      </p:par>
+    </p:tnLst>
+    <p:bldLst>
+      <p:bldP spid="5" grpId="0" animBg="1"/>
+    </p:bldLst>
+  </p:timing>
+</p:sld>
+</file>
+
+<file path=ppt/slides/slide38.xml><?xml version="1.0" encoding="utf-8"?>
+<p:sld xmlns:a="http://schemas.openxmlformats.org/drawingml/2006/main" xmlns:r="http://schemas.openxmlformats.org/officeDocument/2006/relationships" xmlns:p="http://schemas.openxmlformats.org/presentationml/2006/main">
+  <p:cSld>
+    <p:spTree>
+      <p:nvGrpSpPr>
+        <p:cNvPr id="1" name=""/>
+        <p:cNvGrpSpPr/>
+        <p:nvPr/>
+      </p:nvGrpSpPr>
+      <p:grpSpPr>
+        <a:xfrm>
+          <a:off x="0" y="0"/>
+          <a:ext cx="0" cy="0"/>
+          <a:chOff x="0" y="0"/>
+          <a:chExt cx="0" cy="0"/>
+        </a:xfrm>
+      </p:grpSpPr>
+      <p:sp>
+        <p:nvSpPr>
+          <p:cNvPr id="2" name="Title 1"/>
+          <p:cNvSpPr>
+            <a:spLocks noGrp="1"/>
+          </p:cNvSpPr>
+          <p:nvPr>
+            <p:ph type="title"/>
+          </p:nvPr>
+        </p:nvSpPr>
+        <p:spPr/>
+        <p:txBody>
+          <a:bodyPr/>
+          <a:lstStyle/>
+          <a:p>
+            <a:r>
+              <a:rPr lang="en-US" dirty="0"/>
+              <a:t>Further reading</a:t>
+            </a:r>
+            <a:endParaRPr lang="nl-BE" dirty="0"/>
+          </a:p>
+        </p:txBody>
+      </p:sp>
+      <p:sp>
+        <p:nvSpPr>
+          <p:cNvPr id="3" name="Content Placeholder 2"/>
+          <p:cNvSpPr>
+            <a:spLocks noGrp="1"/>
+          </p:cNvSpPr>
+          <p:nvPr>
+            <p:ph idx="1"/>
+          </p:nvPr>
+        </p:nvSpPr>
+        <p:spPr/>
+        <p:txBody>
+          <a:bodyPr/>
+          <a:lstStyle/>
+          <a:p>
+            <a:r>
+              <a:rPr lang="en-US" dirty="0"/>
+              <a:t>Erich Gamma, Richard Helm, Ralph Johnson and John </a:t>
+            </a:r>
+            <a:r>
+              <a:rPr lang="en-US" dirty="0" err="1"/>
+              <a:t>Vlissides</a:t>
+            </a:r>
+            <a:r>
+              <a:rPr lang="en-US" dirty="0"/>
+              <a:t> (1994) </a:t>
+            </a:r>
+            <a:r>
+              <a:rPr lang="en-US" i="1" dirty="0"/>
+              <a:t>Design patterns: elements of reusable object-oriented software</a:t>
+            </a:r>
+            <a:r>
+              <a:rPr lang="en-US" dirty="0"/>
+              <a:t>, Addison-Wesley</a:t>
+            </a:r>
+            <a:endParaRPr lang="en-US" sz="2800" dirty="0"/>
+          </a:p>
+          <a:p>
+            <a:endParaRPr lang="en-US" sz="2800" dirty="0"/>
+          </a:p>
+          <a:p>
+            <a:endParaRPr lang="nl-BE" dirty="0"/>
+          </a:p>
+        </p:txBody>
+      </p:sp>
+      <p:sp>
+        <p:nvSpPr>
+          <p:cNvPr id="4" name="Slide Number Placeholder 3"/>
+          <p:cNvSpPr>
+            <a:spLocks noGrp="1"/>
+          </p:cNvSpPr>
+          <p:nvPr>
+            <p:ph type="sldNum" sz="quarter" idx="12"/>
+          </p:nvPr>
+        </p:nvSpPr>
+        <p:spPr/>
+        <p:txBody>
+          <a:bodyPr/>
+          <a:lstStyle/>
+          <a:p>
+            <a:fld id="{5A209D72-2E9D-49B0-8977-41DCCC66C0BB}" type="slidenum">
+              <a:rPr lang="nl-BE">
+                <a:solidFill>
+                  <a:prstClr val="black">
+                    <a:tint val="75000"/>
+                  </a:prstClr>
+                </a:solidFill>
+                <a:latin typeface="Calibri"/>
+              </a:rPr>
+              <a:pPr/>
+              <a:t>38</a:t>
+            </a:fld>
+            <a:endParaRPr lang="nl-BE">
+              <a:solidFill>
+                <a:prstClr val="black">
+                  <a:tint val="75000"/>
+                </a:prstClr>
+              </a:solidFill>
+              <a:latin typeface="Calibri"/>
+            </a:endParaRPr>
+          </a:p>
+        </p:txBody>
+      </p:sp>
+    </p:spTree>
+    <p:extLst>
+      <p:ext uri="{BB962C8B-B14F-4D97-AF65-F5344CB8AC3E}">
+        <p14:creationId xmlns:p14="http://schemas.microsoft.com/office/powerpoint/2010/main" val="4100769943"/>
       </p:ext>
     </p:extLst>
   </p:cSld>

</xml_diff>

<commit_message>
Add section on functional approaches
</commit_message>
<xml_diff>
--- a/cpp_software_engineering.pptx
+++ b/cpp_software_engineering.pptx
@@ -5,7 +5,7 @@
     <p:sldMasterId id="2147483648" r:id="rId1"/>
   </p:sldMasterIdLst>
   <p:notesMasterIdLst>
-    <p:notesMasterId r:id="rId40"/>
+    <p:notesMasterId r:id="rId42"/>
   </p:notesMasterIdLst>
   <p:sldIdLst>
     <p:sldId id="257" r:id="rId2"/>
@@ -46,6 +46,8 @@
     <p:sldId id="389" r:id="rId37"/>
     <p:sldId id="390" r:id="rId38"/>
     <p:sldId id="391" r:id="rId39"/>
+    <p:sldId id="392" r:id="rId40"/>
+    <p:sldId id="393" r:id="rId41"/>
   </p:sldIdLst>
   <p:sldSz cx="12192000" cy="6858000"/>
   <p:notesSz cx="6858000" cy="9144000"/>
@@ -211,6 +213,12 @@
             <p14:sldId id="389"/>
             <p14:sldId id="390"/>
             <p14:sldId id="391"/>
+          </p14:sldIdLst>
+        </p14:section>
+        <p14:section name="Functional approach" id="{4B4382B9-CC1F-4A42-846B-93E1F1BC9BBB}">
+          <p14:sldIdLst>
+            <p14:sldId id="392"/>
+            <p14:sldId id="393"/>
           </p14:sldIdLst>
         </p14:section>
       </p14:sectionLst>
@@ -17081,6 +17089,119 @@
 </p:sld>
 </file>
 
+<file path=ppt/slides/slide39.xml><?xml version="1.0" encoding="utf-8"?>
+<p:sld xmlns:a="http://schemas.openxmlformats.org/drawingml/2006/main" xmlns:r="http://schemas.openxmlformats.org/officeDocument/2006/relationships" xmlns:p="http://schemas.openxmlformats.org/presentationml/2006/main">
+  <p:cSld>
+    <p:spTree>
+      <p:nvGrpSpPr>
+        <p:cNvPr id="1" name=""/>
+        <p:cNvGrpSpPr/>
+        <p:nvPr/>
+      </p:nvGrpSpPr>
+      <p:grpSpPr>
+        <a:xfrm>
+          <a:off x="0" y="0"/>
+          <a:ext cx="0" cy="0"/>
+          <a:chOff x="0" y="0"/>
+          <a:chExt cx="0" cy="0"/>
+        </a:xfrm>
+      </p:grpSpPr>
+      <p:sp>
+        <p:nvSpPr>
+          <p:cNvPr id="5" name="Title 4">
+            <a:extLst>
+              <a:ext uri="{FF2B5EF4-FFF2-40B4-BE49-F238E27FC236}">
+                <a16:creationId xmlns:a16="http://schemas.microsoft.com/office/drawing/2014/main" id="{B047AC09-4137-6264-6757-2F13914ACA28}"/>
+              </a:ext>
+            </a:extLst>
+          </p:cNvPr>
+          <p:cNvSpPr>
+            <a:spLocks noGrp="1"/>
+          </p:cNvSpPr>
+          <p:nvPr>
+            <p:ph type="title"/>
+          </p:nvPr>
+        </p:nvSpPr>
+        <p:spPr/>
+        <p:txBody>
+          <a:bodyPr/>
+          <a:lstStyle/>
+          <a:p>
+            <a:r>
+              <a:rPr lang="en-US" dirty="0"/>
+              <a:t>Functional approach</a:t>
+            </a:r>
+            <a:endParaRPr lang="LID4096" dirty="0"/>
+          </a:p>
+        </p:txBody>
+      </p:sp>
+      <p:sp>
+        <p:nvSpPr>
+          <p:cNvPr id="6" name="Text Placeholder 5">
+            <a:extLst>
+              <a:ext uri="{FF2B5EF4-FFF2-40B4-BE49-F238E27FC236}">
+                <a16:creationId xmlns:a16="http://schemas.microsoft.com/office/drawing/2014/main" id="{482D214C-4E56-C7D6-335F-9FBD13AF24C6}"/>
+              </a:ext>
+            </a:extLst>
+          </p:cNvPr>
+          <p:cNvSpPr>
+            <a:spLocks noGrp="1"/>
+          </p:cNvSpPr>
+          <p:nvPr>
+            <p:ph type="body" idx="1"/>
+          </p:nvPr>
+        </p:nvSpPr>
+        <p:spPr/>
+        <p:txBody>
+          <a:bodyPr/>
+          <a:lstStyle/>
+          <a:p>
+            <a:endParaRPr lang="LID4096"/>
+          </a:p>
+        </p:txBody>
+      </p:sp>
+      <p:sp>
+        <p:nvSpPr>
+          <p:cNvPr id="4" name="Slide Number Placeholder 3">
+            <a:extLst>
+              <a:ext uri="{FF2B5EF4-FFF2-40B4-BE49-F238E27FC236}">
+                <a16:creationId xmlns:a16="http://schemas.microsoft.com/office/drawing/2014/main" id="{B66B75E1-EA21-65CD-B316-C1D421486EE7}"/>
+              </a:ext>
+            </a:extLst>
+          </p:cNvPr>
+          <p:cNvSpPr>
+            <a:spLocks noGrp="1"/>
+          </p:cNvSpPr>
+          <p:nvPr>
+            <p:ph type="sldNum" sz="quarter" idx="12"/>
+          </p:nvPr>
+        </p:nvSpPr>
+        <p:spPr/>
+        <p:txBody>
+          <a:bodyPr/>
+          <a:lstStyle/>
+          <a:p>
+            <a:fld id="{FDB1AA33-DFBB-49AC-8CEE-23FFECEB5648}" type="slidenum">
+              <a:rPr lang="LID4096" smtClean="0"/>
+              <a:t>39</a:t>
+            </a:fld>
+            <a:endParaRPr lang="LID4096"/>
+          </a:p>
+        </p:txBody>
+      </p:sp>
+    </p:spTree>
+    <p:extLst>
+      <p:ext uri="{BB962C8B-B14F-4D97-AF65-F5344CB8AC3E}">
+        <p14:creationId xmlns:p14="http://schemas.microsoft.com/office/powerpoint/2010/main" val="4080926898"/>
+      </p:ext>
+    </p:extLst>
+  </p:cSld>
+  <p:clrMapOvr>
+    <a:masterClrMapping/>
+  </p:clrMapOvr>
+</p:sld>
+</file>
+
 <file path=ppt/slides/slide4.xml><?xml version="1.0" encoding="utf-8"?>
 <p:sld xmlns:a="http://schemas.openxmlformats.org/drawingml/2006/main" xmlns:r="http://schemas.openxmlformats.org/officeDocument/2006/relationships" xmlns:p="http://schemas.openxmlformats.org/presentationml/2006/main">
   <p:cSld>
@@ -18399,6 +18520,272 @@
       <p:bldP spid="3" grpId="0" uiExpand="1" build="p"/>
       <p:bldP spid="5" grpId="0" animBg="1"/>
       <p:bldP spid="6" grpId="0" animBg="1"/>
+    </p:bldLst>
+  </p:timing>
+</p:sld>
+</file>
+
+<file path=ppt/slides/slide40.xml><?xml version="1.0" encoding="utf-8"?>
+<p:sld xmlns:a="http://schemas.openxmlformats.org/drawingml/2006/main" xmlns:r="http://schemas.openxmlformats.org/officeDocument/2006/relationships" xmlns:p="http://schemas.openxmlformats.org/presentationml/2006/main">
+  <p:cSld>
+    <p:spTree>
+      <p:nvGrpSpPr>
+        <p:cNvPr id="1" name=""/>
+        <p:cNvGrpSpPr/>
+        <p:nvPr/>
+      </p:nvGrpSpPr>
+      <p:grpSpPr>
+        <a:xfrm>
+          <a:off x="0" y="0"/>
+          <a:ext cx="0" cy="0"/>
+          <a:chOff x="0" y="0"/>
+          <a:chExt cx="0" cy="0"/>
+        </a:xfrm>
+      </p:grpSpPr>
+      <p:sp>
+        <p:nvSpPr>
+          <p:cNvPr id="2" name="Title 1">
+            <a:extLst>
+              <a:ext uri="{FF2B5EF4-FFF2-40B4-BE49-F238E27FC236}">
+                <a16:creationId xmlns:a16="http://schemas.microsoft.com/office/drawing/2014/main" id="{8F06986E-3696-7561-EFEC-42A2474822BD}"/>
+              </a:ext>
+            </a:extLst>
+          </p:cNvPr>
+          <p:cNvSpPr>
+            <a:spLocks noGrp="1"/>
+          </p:cNvSpPr>
+          <p:nvPr>
+            <p:ph type="title"/>
+          </p:nvPr>
+        </p:nvSpPr>
+        <p:spPr/>
+        <p:txBody>
+          <a:bodyPr/>
+          <a:lstStyle/>
+          <a:p>
+            <a:r>
+              <a:rPr lang="en-US" dirty="0"/>
+              <a:t>Functional features in C++</a:t>
+            </a:r>
+            <a:endParaRPr lang="LID4096" dirty="0"/>
+          </a:p>
+        </p:txBody>
+      </p:sp>
+      <p:sp>
+        <p:nvSpPr>
+          <p:cNvPr id="3" name="Content Placeholder 2">
+            <a:extLst>
+              <a:ext uri="{FF2B5EF4-FFF2-40B4-BE49-F238E27FC236}">
+                <a16:creationId xmlns:a16="http://schemas.microsoft.com/office/drawing/2014/main" id="{0CDB4156-11FC-1770-3D00-44985A46E102}"/>
+              </a:ext>
+            </a:extLst>
+          </p:cNvPr>
+          <p:cNvSpPr>
+            <a:spLocks noGrp="1"/>
+          </p:cNvSpPr>
+          <p:nvPr>
+            <p:ph idx="1"/>
+          </p:nvPr>
+        </p:nvSpPr>
+        <p:spPr/>
+        <p:txBody>
+          <a:bodyPr/>
+          <a:lstStyle/>
+          <a:p>
+            <a:r>
+              <a:rPr lang="en-US" dirty="0"/>
+              <a:t>Lambda functions</a:t>
+            </a:r>
+          </a:p>
+          <a:p>
+            <a:r>
+              <a:rPr lang="en-US" dirty="0"/>
+              <a:t>STL algorithms</a:t>
+            </a:r>
+          </a:p>
+          <a:p>
+            <a:r>
+              <a:rPr lang="en-US" dirty="0"/>
+              <a:t>STL ranges/views</a:t>
+            </a:r>
+          </a:p>
+          <a:p>
+            <a:r>
+              <a:rPr lang="en-US" dirty="0"/>
+              <a:t>STL generators</a:t>
+            </a:r>
+            <a:endParaRPr lang="LID4096" dirty="0"/>
+          </a:p>
+        </p:txBody>
+      </p:sp>
+      <p:sp>
+        <p:nvSpPr>
+          <p:cNvPr id="4" name="Slide Number Placeholder 3">
+            <a:extLst>
+              <a:ext uri="{FF2B5EF4-FFF2-40B4-BE49-F238E27FC236}">
+                <a16:creationId xmlns:a16="http://schemas.microsoft.com/office/drawing/2014/main" id="{DA0FD79C-C1CA-A2C6-29B6-1118C6206C43}"/>
+              </a:ext>
+            </a:extLst>
+          </p:cNvPr>
+          <p:cNvSpPr>
+            <a:spLocks noGrp="1"/>
+          </p:cNvSpPr>
+          <p:nvPr>
+            <p:ph type="sldNum" sz="quarter" idx="12"/>
+          </p:nvPr>
+        </p:nvSpPr>
+        <p:spPr/>
+        <p:txBody>
+          <a:bodyPr/>
+          <a:lstStyle/>
+          <a:p>
+            <a:fld id="{FDB1AA33-DFBB-49AC-8CEE-23FFECEB5648}" type="slidenum">
+              <a:rPr lang="LID4096" smtClean="0"/>
+              <a:t>40</a:t>
+            </a:fld>
+            <a:endParaRPr lang="LID4096"/>
+          </a:p>
+        </p:txBody>
+      </p:sp>
+      <p:sp>
+        <p:nvSpPr>
+          <p:cNvPr id="5" name="TextBox 4">
+            <a:extLst>
+              <a:ext uri="{FF2B5EF4-FFF2-40B4-BE49-F238E27FC236}">
+                <a16:creationId xmlns:a16="http://schemas.microsoft.com/office/drawing/2014/main" id="{C8E6E66E-0B41-F167-E211-1131037E0EC2}"/>
+              </a:ext>
+            </a:extLst>
+          </p:cNvPr>
+          <p:cNvSpPr txBox="1"/>
+          <p:nvPr/>
+        </p:nvSpPr>
+        <p:spPr>
+          <a:xfrm>
+            <a:off x="838200" y="4561744"/>
+            <a:ext cx="6652655" cy="646331"/>
+          </a:xfrm>
+          <a:prstGeom prst="rect">
+            <a:avLst/>
+          </a:prstGeom>
+          <a:noFill/>
+          <a:ln>
+            <a:solidFill>
+              <a:schemeClr val="tx1"/>
+            </a:solidFill>
+          </a:ln>
+        </p:spPr>
+        <p:txBody>
+          <a:bodyPr wrap="none" rtlCol="0">
+            <a:spAutoFit/>
+          </a:bodyPr>
+          <a:lstStyle/>
+          <a:p>
+            <a:r>
+              <a:rPr lang="en-US" sz="2000" dirty="0"/>
+              <a:t>See</a:t>
+            </a:r>
+          </a:p>
+          <a:p>
+            <a:r>
+              <a:rPr lang="en-US" sz="1600" dirty="0">
+                <a:hlinkClick r:id="rId2"/>
+              </a:rPr>
+              <a:t>https://github.com/gjbex/Scientific-C-plus-plus/tree/master/source-code</a:t>
+            </a:r>
+            <a:r>
+              <a:rPr lang="en-US" sz="1600" dirty="0"/>
+              <a:t> </a:t>
+            </a:r>
+            <a:endParaRPr lang="LID4096" sz="1600" dirty="0"/>
+          </a:p>
+        </p:txBody>
+      </p:sp>
+    </p:spTree>
+    <p:extLst>
+      <p:ext uri="{BB962C8B-B14F-4D97-AF65-F5344CB8AC3E}">
+        <p14:creationId xmlns:p14="http://schemas.microsoft.com/office/powerpoint/2010/main" val="1848637771"/>
+      </p:ext>
+    </p:extLst>
+  </p:cSld>
+  <p:clrMapOvr>
+    <a:masterClrMapping/>
+  </p:clrMapOvr>
+  <p:timing>
+    <p:tnLst>
+      <p:par>
+        <p:cTn id="1" dur="indefinite" restart="never" nodeType="tmRoot">
+          <p:childTnLst>
+            <p:seq concurrent="1" nextAc="seek">
+              <p:cTn id="2" dur="indefinite" nodeType="mainSeq">
+                <p:childTnLst>
+                  <p:par>
+                    <p:cTn id="3" fill="hold">
+                      <p:stCondLst>
+                        <p:cond delay="indefinite"/>
+                      </p:stCondLst>
+                      <p:childTnLst>
+                        <p:par>
+                          <p:cTn id="4" fill="hold">
+                            <p:stCondLst>
+                              <p:cond delay="0"/>
+                            </p:stCondLst>
+                            <p:childTnLst>
+                              <p:par>
+                                <p:cTn id="5" presetID="1" presetClass="entr" presetSubtype="0" fill="hold" grpId="0" nodeType="clickEffect">
+                                  <p:stCondLst>
+                                    <p:cond delay="0"/>
+                                  </p:stCondLst>
+                                  <p:childTnLst>
+                                    <p:set>
+                                      <p:cBhvr>
+                                        <p:cTn id="6" dur="1" fill="hold">
+                                          <p:stCondLst>
+                                            <p:cond delay="0"/>
+                                          </p:stCondLst>
+                                        </p:cTn>
+                                        <p:tgtEl>
+                                          <p:spTgt spid="5"/>
+                                        </p:tgtEl>
+                                        <p:attrNameLst>
+                                          <p:attrName>style.visibility</p:attrName>
+                                        </p:attrNameLst>
+                                      </p:cBhvr>
+                                      <p:to>
+                                        <p:strVal val="visible"/>
+                                      </p:to>
+                                    </p:set>
+                                  </p:childTnLst>
+                                </p:cTn>
+                              </p:par>
+                            </p:childTnLst>
+                          </p:cTn>
+                        </p:par>
+                      </p:childTnLst>
+                    </p:cTn>
+                  </p:par>
+                </p:childTnLst>
+              </p:cTn>
+              <p:prevCondLst>
+                <p:cond evt="onPrev" delay="0">
+                  <p:tgtEl>
+                    <p:sldTgt/>
+                  </p:tgtEl>
+                </p:cond>
+              </p:prevCondLst>
+              <p:nextCondLst>
+                <p:cond evt="onNext" delay="0">
+                  <p:tgtEl>
+                    <p:sldTgt/>
+                  </p:tgtEl>
+                </p:cond>
+              </p:nextCondLst>
+            </p:seq>
+          </p:childTnLst>
+        </p:cTn>
+      </p:par>
+    </p:tnLst>
+    <p:bldLst>
+      <p:bldP spid="5" grpId="0" animBg="1"/>
     </p:bldLst>
   </p:timing>
 </p:sld>

</xml_diff>

<commit_message>
Fix typos, add references
</commit_message>
<xml_diff>
--- a/cpp_software_engineering.pptx
+++ b/cpp_software_engineering.pptx
@@ -380,7 +380,7 @@
           <a:p>
             <a:fld id="{75E18316-3541-442E-8E76-B95A0AF605E0}" type="datetimeFigureOut">
               <a:rPr lang="LID4096" smtClean="0"/>
-              <a:t>05/17/2024</a:t>
+              <a:t>05/21/2024</a:t>
             </a:fld>
             <a:endParaRPr lang="LID4096"/>
           </a:p>
@@ -797,7 +797,7 @@
           <a:p>
             <a:fld id="{D4CCEB0E-618E-45C7-A579-AD180C33220D}" type="datetime1">
               <a:rPr lang="LID4096" smtClean="0"/>
-              <a:t>05/17/2024</a:t>
+              <a:t>05/21/2024</a:t>
             </a:fld>
             <a:endParaRPr lang="LID4096"/>
           </a:p>
@@ -997,7 +997,7 @@
           <a:p>
             <a:fld id="{8F9B0D5F-347B-4B69-9FE7-43363B46D130}" type="datetime1">
               <a:rPr lang="LID4096" smtClean="0"/>
-              <a:t>05/17/2024</a:t>
+              <a:t>05/21/2024</a:t>
             </a:fld>
             <a:endParaRPr lang="LID4096"/>
           </a:p>
@@ -1207,7 +1207,7 @@
           <a:p>
             <a:fld id="{A72936A9-07CF-4428-8F68-9DB53105CCBE}" type="datetime1">
               <a:rPr lang="LID4096" smtClean="0"/>
-              <a:t>05/17/2024</a:t>
+              <a:t>05/21/2024</a:t>
             </a:fld>
             <a:endParaRPr lang="LID4096"/>
           </a:p>
@@ -1407,7 +1407,7 @@
           <a:p>
             <a:fld id="{136170E8-8909-47C9-AECF-C7A110A9E262}" type="datetime1">
               <a:rPr lang="LID4096" smtClean="0"/>
-              <a:t>05/17/2024</a:t>
+              <a:t>05/21/2024</a:t>
             </a:fld>
             <a:endParaRPr lang="LID4096"/>
           </a:p>
@@ -1683,7 +1683,7 @@
           <a:p>
             <a:fld id="{D37C590D-7973-43C9-B207-04F7CE471508}" type="datetime1">
               <a:rPr lang="LID4096" smtClean="0"/>
-              <a:t>05/17/2024</a:t>
+              <a:t>05/21/2024</a:t>
             </a:fld>
             <a:endParaRPr lang="LID4096"/>
           </a:p>
@@ -1951,7 +1951,7 @@
           <a:p>
             <a:fld id="{D8E041D7-7EA6-423B-88A0-A217731AA946}" type="datetime1">
               <a:rPr lang="LID4096" smtClean="0"/>
-              <a:t>05/17/2024</a:t>
+              <a:t>05/21/2024</a:t>
             </a:fld>
             <a:endParaRPr lang="LID4096"/>
           </a:p>
@@ -2366,7 +2366,7 @@
           <a:p>
             <a:fld id="{1BDF2A55-FD61-4AC5-A515-ED3F1E80F296}" type="datetime1">
               <a:rPr lang="LID4096" smtClean="0"/>
-              <a:t>05/17/2024</a:t>
+              <a:t>05/21/2024</a:t>
             </a:fld>
             <a:endParaRPr lang="LID4096"/>
           </a:p>
@@ -2508,7 +2508,7 @@
           <a:p>
             <a:fld id="{AAED7C0E-94F0-4D14-8F58-6D25D315F3DC}" type="datetime1">
               <a:rPr lang="LID4096" smtClean="0"/>
-              <a:t>05/17/2024</a:t>
+              <a:t>05/21/2024</a:t>
             </a:fld>
             <a:endParaRPr lang="LID4096"/>
           </a:p>
@@ -2621,7 +2621,7 @@
           <a:p>
             <a:fld id="{2888AB77-1B4E-4D00-8D86-8CBF03A7E13C}" type="datetime1">
               <a:rPr lang="LID4096" smtClean="0"/>
-              <a:t>05/17/2024</a:t>
+              <a:t>05/21/2024</a:t>
             </a:fld>
             <a:endParaRPr lang="LID4096"/>
           </a:p>
@@ -2934,7 +2934,7 @@
           <a:p>
             <a:fld id="{013C0D7F-F788-458A-93D6-DCF4C7F29636}" type="datetime1">
               <a:rPr lang="LID4096" smtClean="0"/>
-              <a:t>05/17/2024</a:t>
+              <a:t>05/21/2024</a:t>
             </a:fld>
             <a:endParaRPr lang="LID4096"/>
           </a:p>
@@ -3223,7 +3223,7 @@
           <a:p>
             <a:fld id="{EEC7CCBC-154E-498D-B8FD-669CE3C64250}" type="datetime1">
               <a:rPr lang="LID4096" smtClean="0"/>
-              <a:t>05/17/2024</a:t>
+              <a:t>05/21/2024</a:t>
             </a:fld>
             <a:endParaRPr lang="LID4096"/>
           </a:p>
@@ -3466,7 +3466,7 @@
           <a:p>
             <a:fld id="{161B14D2-6539-4609-80C5-044F9B782269}" type="datetime1">
               <a:rPr lang="LID4096" smtClean="0"/>
-              <a:t>05/17/2024</a:t>
+              <a:t>05/21/2024</a:t>
             </a:fld>
             <a:endParaRPr lang="LID4096"/>
           </a:p>
@@ -5525,7 +5525,7 @@
             </a:r>
             <a:r>
               <a:rPr lang="en-US" dirty="0" err="1"/>
-              <a:t>Cmake</a:t>
+              <a:t>CMake</a:t>
             </a:r>
             <a:r>
               <a:rPr lang="en-US" dirty="0"/>
@@ -7669,7 +7669,7 @@
                 <a:latin typeface="Courier New" pitchFamily="49" charset="0"/>
                 <a:cs typeface="Courier New" pitchFamily="49" charset="0"/>
               </a:rPr>
-              <a:t>  -DCMAKE_INSTALL_PREFIX= </a:t>
+              <a:t>  -DCMAKE_INSTALL_PREFIX=</a:t>
             </a:r>
             <a:r>
               <a:rPr lang="en-US" b="1" dirty="0" err="1">
@@ -9373,6 +9373,64 @@
             </a:r>
             <a:r>
               <a:rPr lang="en-US" dirty="0"/>
+              <a:t> </a:t>
+            </a:r>
+          </a:p>
+          <a:p>
+            <a:r>
+              <a:rPr lang="en-US" dirty="0"/>
+              <a:t> Dominik Berner and Mustafa Kemal </a:t>
+            </a:r>
+            <a:r>
+              <a:rPr lang="en-US" dirty="0" err="1"/>
+              <a:t>Gilor</a:t>
+            </a:r>
+            <a:r>
+              <a:rPr lang="en-US" dirty="0"/>
+              <a:t>, 2022, </a:t>
+            </a:r>
+            <a:r>
+              <a:rPr lang="en-US" i="1" dirty="0" err="1"/>
+              <a:t>CMake</a:t>
+            </a:r>
+            <a:r>
+              <a:rPr lang="en-US" i="1" dirty="0"/>
+              <a:t> Best Practices: Discover proven techniques for creating and maintaining programming projects with </a:t>
+            </a:r>
+            <a:r>
+              <a:rPr lang="en-US" i="1" dirty="0" err="1"/>
+              <a:t>Cmake</a:t>
+            </a:r>
+            <a:r>
+              <a:rPr lang="en-US" dirty="0"/>
+              <a:t>, </a:t>
+            </a:r>
+            <a:r>
+              <a:rPr lang="en-US" dirty="0" err="1"/>
+              <a:t>Packt</a:t>
+            </a:r>
+            <a:endParaRPr lang="en-US" dirty="0"/>
+          </a:p>
+          <a:p>
+            <a:r>
+              <a:rPr lang="en-US" dirty="0"/>
+              <a:t>Better </a:t>
+            </a:r>
+            <a:r>
+              <a:rPr lang="en-US" dirty="0" err="1"/>
+              <a:t>CMake</a:t>
+            </a:r>
+            <a:br>
+              <a:rPr lang="en-US" dirty="0"/>
+            </a:br>
+            <a:r>
+              <a:rPr lang="en-US" sz="2000" dirty="0">
+                <a:hlinkClick r:id="rId3"/>
+              </a:rPr>
+              <a:t>https://www.youtube.com/playlist?list=PL8i3OhJb4FNV10aIZ8oF0AA46HgA2ed8g</a:t>
+            </a:r>
+            <a:r>
+              <a:rPr lang="en-US" sz="2000" dirty="0"/>
               <a:t> </a:t>
             </a:r>
             <a:endParaRPr lang="LID4096" dirty="0"/>

</xml_diff>

<commit_message>
Add slides on CRTP
</commit_message>
<xml_diff>
--- a/cpp_software_engineering.pptx
+++ b/cpp_software_engineering.pptx
@@ -5,7 +5,7 @@
     <p:sldMasterId id="2147483648" r:id="rId1"/>
   </p:sldMasterIdLst>
   <p:notesMasterIdLst>
-    <p:notesMasterId r:id="rId42"/>
+    <p:notesMasterId r:id="rId47"/>
   </p:notesMasterIdLst>
   <p:sldIdLst>
     <p:sldId id="257" r:id="rId2"/>
@@ -48,6 +48,11 @@
     <p:sldId id="391" r:id="rId39"/>
     <p:sldId id="392" r:id="rId40"/>
     <p:sldId id="393" r:id="rId41"/>
+    <p:sldId id="394" r:id="rId42"/>
+    <p:sldId id="395" r:id="rId43"/>
+    <p:sldId id="396" r:id="rId44"/>
+    <p:sldId id="398" r:id="rId45"/>
+    <p:sldId id="397" r:id="rId46"/>
   </p:sldIdLst>
   <p:sldSz cx="12192000" cy="6858000"/>
   <p:notesSz cx="6858000" cy="9144000"/>
@@ -219,6 +224,11 @@
           <p14:sldIdLst>
             <p14:sldId id="392"/>
             <p14:sldId id="393"/>
+            <p14:sldId id="394"/>
+            <p14:sldId id="395"/>
+            <p14:sldId id="396"/>
+            <p14:sldId id="398"/>
+            <p14:sldId id="397"/>
           </p14:sldIdLst>
         </p14:section>
       </p14:sectionLst>
@@ -380,7 +390,7 @@
           <a:p>
             <a:fld id="{75E18316-3541-442E-8E76-B95A0AF605E0}" type="datetimeFigureOut">
               <a:rPr lang="LID4096" smtClean="0"/>
-              <a:t>05/23/2024</a:t>
+              <a:t>04/08/2025</a:t>
             </a:fld>
             <a:endParaRPr lang="LID4096"/>
           </a:p>
@@ -797,7 +807,7 @@
           <a:p>
             <a:fld id="{D4CCEB0E-618E-45C7-A579-AD180C33220D}" type="datetime1">
               <a:rPr lang="LID4096" smtClean="0"/>
-              <a:t>05/23/2024</a:t>
+              <a:t>04/08/2025</a:t>
             </a:fld>
             <a:endParaRPr lang="LID4096"/>
           </a:p>
@@ -997,7 +1007,7 @@
           <a:p>
             <a:fld id="{8F9B0D5F-347B-4B69-9FE7-43363B46D130}" type="datetime1">
               <a:rPr lang="LID4096" smtClean="0"/>
-              <a:t>05/23/2024</a:t>
+              <a:t>04/08/2025</a:t>
             </a:fld>
             <a:endParaRPr lang="LID4096"/>
           </a:p>
@@ -1207,7 +1217,7 @@
           <a:p>
             <a:fld id="{A72936A9-07CF-4428-8F68-9DB53105CCBE}" type="datetime1">
               <a:rPr lang="LID4096" smtClean="0"/>
-              <a:t>05/23/2024</a:t>
+              <a:t>04/08/2025</a:t>
             </a:fld>
             <a:endParaRPr lang="LID4096"/>
           </a:p>
@@ -1407,7 +1417,7 @@
           <a:p>
             <a:fld id="{136170E8-8909-47C9-AECF-C7A110A9E262}" type="datetime1">
               <a:rPr lang="LID4096" smtClean="0"/>
-              <a:t>05/23/2024</a:t>
+              <a:t>04/08/2025</a:t>
             </a:fld>
             <a:endParaRPr lang="LID4096"/>
           </a:p>
@@ -1683,7 +1693,7 @@
           <a:p>
             <a:fld id="{D37C590D-7973-43C9-B207-04F7CE471508}" type="datetime1">
               <a:rPr lang="LID4096" smtClean="0"/>
-              <a:t>05/23/2024</a:t>
+              <a:t>04/08/2025</a:t>
             </a:fld>
             <a:endParaRPr lang="LID4096"/>
           </a:p>
@@ -1951,7 +1961,7 @@
           <a:p>
             <a:fld id="{D8E041D7-7EA6-423B-88A0-A217731AA946}" type="datetime1">
               <a:rPr lang="LID4096" smtClean="0"/>
-              <a:t>05/23/2024</a:t>
+              <a:t>04/08/2025</a:t>
             </a:fld>
             <a:endParaRPr lang="LID4096"/>
           </a:p>
@@ -2366,7 +2376,7 @@
           <a:p>
             <a:fld id="{1BDF2A55-FD61-4AC5-A515-ED3F1E80F296}" type="datetime1">
               <a:rPr lang="LID4096" smtClean="0"/>
-              <a:t>05/23/2024</a:t>
+              <a:t>04/08/2025</a:t>
             </a:fld>
             <a:endParaRPr lang="LID4096"/>
           </a:p>
@@ -2508,7 +2518,7 @@
           <a:p>
             <a:fld id="{AAED7C0E-94F0-4D14-8F58-6D25D315F3DC}" type="datetime1">
               <a:rPr lang="LID4096" smtClean="0"/>
-              <a:t>05/23/2024</a:t>
+              <a:t>04/08/2025</a:t>
             </a:fld>
             <a:endParaRPr lang="LID4096"/>
           </a:p>
@@ -2621,7 +2631,7 @@
           <a:p>
             <a:fld id="{2888AB77-1B4E-4D00-8D86-8CBF03A7E13C}" type="datetime1">
               <a:rPr lang="LID4096" smtClean="0"/>
-              <a:t>05/23/2024</a:t>
+              <a:t>04/08/2025</a:t>
             </a:fld>
             <a:endParaRPr lang="LID4096"/>
           </a:p>
@@ -2934,7 +2944,7 @@
           <a:p>
             <a:fld id="{013C0D7F-F788-458A-93D6-DCF4C7F29636}" type="datetime1">
               <a:rPr lang="LID4096" smtClean="0"/>
-              <a:t>05/23/2024</a:t>
+              <a:t>04/08/2025</a:t>
             </a:fld>
             <a:endParaRPr lang="LID4096"/>
           </a:p>
@@ -3223,7 +3233,7 @@
           <a:p>
             <a:fld id="{EEC7CCBC-154E-498D-B8FD-669CE3C64250}" type="datetime1">
               <a:rPr lang="LID4096" smtClean="0"/>
-              <a:t>05/23/2024</a:t>
+              <a:t>04/08/2025</a:t>
             </a:fld>
             <a:endParaRPr lang="LID4096"/>
           </a:p>
@@ -3466,7 +3476,7 @@
           <a:p>
             <a:fld id="{161B14D2-6539-4609-80C5-044F9B782269}" type="datetime1">
               <a:rPr lang="LID4096" smtClean="0"/>
-              <a:t>05/23/2024</a:t>
+              <a:t>04/08/2025</a:t>
             </a:fld>
             <a:endParaRPr lang="LID4096"/>
           </a:p>
@@ -4154,7 +4164,7 @@
           <a:p>
             <a:r>
               <a:rPr lang="en-US" dirty="0"/>
-              <a:t>Use language idioms</a:t>
+              <a:t>Use (modern) language idioms</a:t>
             </a:r>
           </a:p>
         </p:txBody>
@@ -18905,6 +18915,2824 @@
       <p:bldP spid="5" grpId="0" animBg="1"/>
     </p:bldLst>
   </p:timing>
+</p:sld>
+</file>
+
+<file path=ppt/slides/slide41.xml><?xml version="1.0" encoding="utf-8"?>
+<p:sld xmlns:a="http://schemas.openxmlformats.org/drawingml/2006/main" xmlns:r="http://schemas.openxmlformats.org/officeDocument/2006/relationships" xmlns:p="http://schemas.openxmlformats.org/presentationml/2006/main">
+  <p:cSld>
+    <p:spTree>
+      <p:nvGrpSpPr>
+        <p:cNvPr id="1" name=""/>
+        <p:cNvGrpSpPr/>
+        <p:nvPr/>
+      </p:nvGrpSpPr>
+      <p:grpSpPr>
+        <a:xfrm>
+          <a:off x="0" y="0"/>
+          <a:ext cx="0" cy="0"/>
+          <a:chOff x="0" y="0"/>
+          <a:chExt cx="0" cy="0"/>
+        </a:xfrm>
+      </p:grpSpPr>
+      <p:sp>
+        <p:nvSpPr>
+          <p:cNvPr id="2" name="Title 1">
+            <a:extLst>
+              <a:ext uri="{FF2B5EF4-FFF2-40B4-BE49-F238E27FC236}">
+                <a16:creationId xmlns:a16="http://schemas.microsoft.com/office/drawing/2014/main" id="{96A48829-0721-1480-5994-E855FF935E6E}"/>
+              </a:ext>
+            </a:extLst>
+          </p:cNvPr>
+          <p:cNvSpPr>
+            <a:spLocks noGrp="1"/>
+          </p:cNvSpPr>
+          <p:nvPr>
+            <p:ph type="title"/>
+          </p:nvPr>
+        </p:nvSpPr>
+        <p:spPr/>
+        <p:txBody>
+          <a:bodyPr/>
+          <a:lstStyle/>
+          <a:p>
+            <a:r>
+              <a:rPr lang="en-US" dirty="0"/>
+              <a:t>Curiously, Repeating Template Pattern (CRTP)</a:t>
+            </a:r>
+            <a:endParaRPr lang="LID4096" dirty="0"/>
+          </a:p>
+        </p:txBody>
+      </p:sp>
+      <p:sp>
+        <p:nvSpPr>
+          <p:cNvPr id="3" name="Content Placeholder 2">
+            <a:extLst>
+              <a:ext uri="{FF2B5EF4-FFF2-40B4-BE49-F238E27FC236}">
+                <a16:creationId xmlns:a16="http://schemas.microsoft.com/office/drawing/2014/main" id="{9BB61A49-5C18-EB0F-3E0D-D280F9E302A4}"/>
+              </a:ext>
+            </a:extLst>
+          </p:cNvPr>
+          <p:cNvSpPr>
+            <a:spLocks noGrp="1"/>
+          </p:cNvSpPr>
+          <p:nvPr>
+            <p:ph idx="1"/>
+          </p:nvPr>
+        </p:nvSpPr>
+        <p:spPr/>
+        <p:txBody>
+          <a:bodyPr>
+            <a:normAutofit/>
+          </a:bodyPr>
+          <a:lstStyle/>
+          <a:p>
+            <a:r>
+              <a:rPr lang="en-US" dirty="0"/>
+              <a:t>Avoid virtual function overhead</a:t>
+            </a:r>
+          </a:p>
+          <a:p>
+            <a:r>
+              <a:rPr lang="en-US" dirty="0"/>
+              <a:t>Enforce compile time interface constraints</a:t>
+            </a:r>
+          </a:p>
+          <a:p>
+            <a:r>
+              <a:rPr lang="en-US" dirty="0"/>
+              <a:t>Code reuse without dynamic polymorphism</a:t>
+            </a:r>
+          </a:p>
+          <a:p>
+            <a:r>
+              <a:rPr lang="en-US" dirty="0"/>
+              <a:t>Static  polymorphism</a:t>
+            </a:r>
+          </a:p>
+        </p:txBody>
+      </p:sp>
+      <p:sp>
+        <p:nvSpPr>
+          <p:cNvPr id="4" name="Slide Number Placeholder 3">
+            <a:extLst>
+              <a:ext uri="{FF2B5EF4-FFF2-40B4-BE49-F238E27FC236}">
+                <a16:creationId xmlns:a16="http://schemas.microsoft.com/office/drawing/2014/main" id="{0D8837DD-4DFF-B3FC-6690-1408C5CBE0FA}"/>
+              </a:ext>
+            </a:extLst>
+          </p:cNvPr>
+          <p:cNvSpPr>
+            <a:spLocks noGrp="1"/>
+          </p:cNvSpPr>
+          <p:nvPr>
+            <p:ph type="sldNum" sz="quarter" idx="12"/>
+          </p:nvPr>
+        </p:nvSpPr>
+        <p:spPr/>
+        <p:txBody>
+          <a:bodyPr/>
+          <a:lstStyle/>
+          <a:p>
+            <a:fld id="{FDB1AA33-DFBB-49AC-8CEE-23FFECEB5648}" type="slidenum">
+              <a:rPr lang="LID4096" smtClean="0"/>
+              <a:t>41</a:t>
+            </a:fld>
+            <a:endParaRPr lang="LID4096"/>
+          </a:p>
+        </p:txBody>
+      </p:sp>
+    </p:spTree>
+    <p:extLst>
+      <p:ext uri="{BB962C8B-B14F-4D97-AF65-F5344CB8AC3E}">
+        <p14:creationId xmlns:p14="http://schemas.microsoft.com/office/powerpoint/2010/main" val="1803633621"/>
+      </p:ext>
+    </p:extLst>
+  </p:cSld>
+  <p:clrMapOvr>
+    <a:masterClrMapping/>
+  </p:clrMapOvr>
+</p:sld>
+</file>
+
+<file path=ppt/slides/slide42.xml><?xml version="1.0" encoding="utf-8"?>
+<p:sld xmlns:a="http://schemas.openxmlformats.org/drawingml/2006/main" xmlns:r="http://schemas.openxmlformats.org/officeDocument/2006/relationships" xmlns:p="http://schemas.openxmlformats.org/presentationml/2006/main">
+  <p:cSld>
+    <p:spTree>
+      <p:nvGrpSpPr>
+        <p:cNvPr id="1" name=""/>
+        <p:cNvGrpSpPr/>
+        <p:nvPr/>
+      </p:nvGrpSpPr>
+      <p:grpSpPr>
+        <a:xfrm>
+          <a:off x="0" y="0"/>
+          <a:ext cx="0" cy="0"/>
+          <a:chOff x="0" y="0"/>
+          <a:chExt cx="0" cy="0"/>
+        </a:xfrm>
+      </p:grpSpPr>
+      <p:sp>
+        <p:nvSpPr>
+          <p:cNvPr id="2" name="Title 1">
+            <a:extLst>
+              <a:ext uri="{FF2B5EF4-FFF2-40B4-BE49-F238E27FC236}">
+                <a16:creationId xmlns:a16="http://schemas.microsoft.com/office/drawing/2014/main" id="{08C9A350-282A-80DC-C746-795502250CAE}"/>
+              </a:ext>
+            </a:extLst>
+          </p:cNvPr>
+          <p:cNvSpPr>
+            <a:spLocks noGrp="1"/>
+          </p:cNvSpPr>
+          <p:nvPr>
+            <p:ph type="title"/>
+          </p:nvPr>
+        </p:nvSpPr>
+        <p:spPr/>
+        <p:txBody>
+          <a:bodyPr/>
+          <a:lstStyle/>
+          <a:p>
+            <a:r>
+              <a:rPr lang="en-US" dirty="0"/>
+              <a:t>CRTP: base class</a:t>
+            </a:r>
+            <a:endParaRPr lang="LID4096" dirty="0"/>
+          </a:p>
+        </p:txBody>
+      </p:sp>
+      <p:sp>
+        <p:nvSpPr>
+          <p:cNvPr id="4" name="Slide Number Placeholder 3">
+            <a:extLst>
+              <a:ext uri="{FF2B5EF4-FFF2-40B4-BE49-F238E27FC236}">
+                <a16:creationId xmlns:a16="http://schemas.microsoft.com/office/drawing/2014/main" id="{2B59DEA4-516B-75F2-1733-1B9E7DD26F95}"/>
+              </a:ext>
+            </a:extLst>
+          </p:cNvPr>
+          <p:cNvSpPr>
+            <a:spLocks noGrp="1"/>
+          </p:cNvSpPr>
+          <p:nvPr>
+            <p:ph type="sldNum" sz="quarter" idx="12"/>
+          </p:nvPr>
+        </p:nvSpPr>
+        <p:spPr/>
+        <p:txBody>
+          <a:bodyPr/>
+          <a:lstStyle/>
+          <a:p>
+            <a:fld id="{FDB1AA33-DFBB-49AC-8CEE-23FFECEB5648}" type="slidenum">
+              <a:rPr lang="LID4096" smtClean="0"/>
+              <a:t>42</a:t>
+            </a:fld>
+            <a:endParaRPr lang="LID4096"/>
+          </a:p>
+        </p:txBody>
+      </p:sp>
+      <p:grpSp>
+        <p:nvGrpSpPr>
+          <p:cNvPr id="6" name="Group 5">
+            <a:extLst>
+              <a:ext uri="{FF2B5EF4-FFF2-40B4-BE49-F238E27FC236}">
+                <a16:creationId xmlns:a16="http://schemas.microsoft.com/office/drawing/2014/main" id="{422A5259-8E34-23B7-D0B5-2A1B96CA029E}"/>
+              </a:ext>
+            </a:extLst>
+          </p:cNvPr>
+          <p:cNvGrpSpPr/>
+          <p:nvPr/>
+        </p:nvGrpSpPr>
+        <p:grpSpPr>
+          <a:xfrm>
+            <a:off x="217714" y="1747890"/>
+            <a:ext cx="11745686" cy="4524315"/>
+            <a:chOff x="-217714" y="1268919"/>
+            <a:chExt cx="11745686" cy="4524315"/>
+          </a:xfrm>
+        </p:grpSpPr>
+        <p:sp>
+          <p:nvSpPr>
+            <p:cNvPr id="5" name="TextBox 4">
+              <a:extLst>
+                <a:ext uri="{FF2B5EF4-FFF2-40B4-BE49-F238E27FC236}">
+                  <a16:creationId xmlns:a16="http://schemas.microsoft.com/office/drawing/2014/main" id="{95DA2B60-1900-8786-7856-DAE7BF3CF8C0}"/>
+                </a:ext>
+              </a:extLst>
+            </p:cNvPr>
+            <p:cNvSpPr txBox="1"/>
+            <p:nvPr/>
+          </p:nvSpPr>
+          <p:spPr>
+            <a:xfrm>
+              <a:off x="-217714" y="1268919"/>
+              <a:ext cx="11745686" cy="4524315"/>
+            </a:xfrm>
+            <a:prstGeom prst="rect">
+              <a:avLst/>
+            </a:prstGeom>
+            <a:solidFill>
+              <a:schemeClr val="bg1">
+                <a:lumMod val="85000"/>
+              </a:schemeClr>
+            </a:solidFill>
+            <a:ln>
+              <a:solidFill>
+                <a:schemeClr val="tx1"/>
+              </a:solidFill>
+            </a:ln>
+          </p:spPr>
+          <p:txBody>
+            <a:bodyPr wrap="square" rtlCol="0">
+              <a:spAutoFit/>
+            </a:bodyPr>
+            <a:lstStyle/>
+            <a:p>
+              <a:pPr lvl="0">
+                <a:defRPr/>
+              </a:pPr>
+              <a:r>
+                <a:rPr lang="en-US" dirty="0">
+                  <a:solidFill>
+                    <a:prstClr val="black"/>
+                  </a:solidFill>
+                  <a:latin typeface="Courier New" pitchFamily="49" charset="0"/>
+                  <a:cs typeface="Courier New" pitchFamily="49" charset="0"/>
+                </a:rPr>
+                <a:t>template&lt;class </a:t>
+              </a:r>
+              <a:r>
+                <a:rPr lang="en-US" b="1" dirty="0">
+                  <a:solidFill>
+                    <a:srgbClr val="FF0000"/>
+                  </a:solidFill>
+                  <a:latin typeface="Courier New" pitchFamily="49" charset="0"/>
+                  <a:cs typeface="Courier New" pitchFamily="49" charset="0"/>
+                </a:rPr>
+                <a:t>Derived</a:t>
+              </a:r>
+              <a:r>
+                <a:rPr lang="en-US" dirty="0">
+                  <a:solidFill>
+                    <a:prstClr val="black"/>
+                  </a:solidFill>
+                  <a:latin typeface="Courier New" pitchFamily="49" charset="0"/>
+                  <a:cs typeface="Courier New" pitchFamily="49" charset="0"/>
+                </a:rPr>
+                <a:t>&gt;</a:t>
+              </a:r>
+            </a:p>
+            <a:p>
+              <a:pPr lvl="0">
+                <a:defRPr/>
+              </a:pPr>
+              <a:r>
+                <a:rPr lang="en-US" dirty="0">
+                  <a:solidFill>
+                    <a:prstClr val="black"/>
+                  </a:solidFill>
+                  <a:latin typeface="Courier New" pitchFamily="49" charset="0"/>
+                  <a:cs typeface="Courier New" pitchFamily="49" charset="0"/>
+                </a:rPr>
+                <a:t>struct Simulation {</a:t>
+              </a:r>
+            </a:p>
+            <a:p>
+              <a:pPr lvl="0">
+                <a:defRPr/>
+              </a:pPr>
+              <a:r>
+                <a:rPr lang="en-US" dirty="0">
+                  <a:solidFill>
+                    <a:prstClr val="black"/>
+                  </a:solidFill>
+                  <a:latin typeface="Courier New" pitchFamily="49" charset="0"/>
+                  <a:cs typeface="Courier New" pitchFamily="49" charset="0"/>
+                </a:rPr>
+                <a:t>    protected:</a:t>
+              </a:r>
+            </a:p>
+            <a:p>
+              <a:pPr lvl="0">
+                <a:defRPr/>
+              </a:pPr>
+              <a:r>
+                <a:rPr lang="en-US" dirty="0">
+                  <a:solidFill>
+                    <a:prstClr val="black"/>
+                  </a:solidFill>
+                  <a:latin typeface="Courier New" pitchFamily="49" charset="0"/>
+                  <a:cs typeface="Courier New" pitchFamily="49" charset="0"/>
+                  <a:sym typeface="Symbol" panose="05050102010706020507" pitchFamily="18" charset="2"/>
+                </a:rPr>
+                <a:t>        </a:t>
+              </a:r>
+              <a:endParaRPr lang="en-US" dirty="0">
+                <a:solidFill>
+                  <a:prstClr val="black"/>
+                </a:solidFill>
+                <a:latin typeface="Courier New" pitchFamily="49" charset="0"/>
+                <a:cs typeface="Courier New" pitchFamily="49" charset="0"/>
+              </a:endParaRPr>
+            </a:p>
+            <a:p>
+              <a:pPr lvl="0">
+                <a:defRPr/>
+              </a:pPr>
+              <a:r>
+                <a:rPr lang="en-US" dirty="0">
+                  <a:solidFill>
+                    <a:prstClr val="black"/>
+                  </a:solidFill>
+                  <a:latin typeface="Courier New" pitchFamily="49" charset="0"/>
+                  <a:cs typeface="Courier New" pitchFamily="49" charset="0"/>
+                </a:rPr>
+                <a:t>    public:</a:t>
+              </a:r>
+            </a:p>
+            <a:p>
+              <a:pPr lvl="0">
+                <a:defRPr/>
+              </a:pPr>
+              <a:r>
+                <a:rPr lang="en-US" dirty="0">
+                  <a:solidFill>
+                    <a:prstClr val="black"/>
+                  </a:solidFill>
+                  <a:latin typeface="Courier New" pitchFamily="49" charset="0"/>
+                  <a:cs typeface="Courier New" pitchFamily="49" charset="0"/>
+                </a:rPr>
+                <a:t>        </a:t>
+              </a:r>
+              <a:r>
+                <a:rPr lang="en-US" dirty="0">
+                  <a:solidFill>
+                    <a:prstClr val="black"/>
+                  </a:solidFill>
+                  <a:latin typeface="Courier New" pitchFamily="49" charset="0"/>
+                  <a:cs typeface="Courier New" pitchFamily="49" charset="0"/>
+                  <a:sym typeface="Symbol" panose="05050102010706020507" pitchFamily="18" charset="2"/>
+                </a:rPr>
+                <a:t></a:t>
+              </a:r>
+              <a:endParaRPr lang="en-US" dirty="0">
+                <a:solidFill>
+                  <a:prstClr val="black"/>
+                </a:solidFill>
+                <a:latin typeface="Courier New" pitchFamily="49" charset="0"/>
+                <a:cs typeface="Courier New" pitchFamily="49" charset="0"/>
+              </a:endParaRPr>
+            </a:p>
+            <a:p>
+              <a:pPr lvl="0">
+                <a:defRPr/>
+              </a:pPr>
+              <a:r>
+                <a:rPr lang="en-US" dirty="0">
+                  <a:solidFill>
+                    <a:prstClr val="black"/>
+                  </a:solidFill>
+                  <a:latin typeface="Courier New" pitchFamily="49" charset="0"/>
+                  <a:cs typeface="Courier New" pitchFamily="49" charset="0"/>
+                </a:rPr>
+                <a:t>        void step() {</a:t>
+              </a:r>
+            </a:p>
+            <a:p>
+              <a:pPr lvl="0">
+                <a:defRPr/>
+              </a:pPr>
+              <a:r>
+                <a:rPr lang="en-US" dirty="0">
+                  <a:solidFill>
+                    <a:prstClr val="black"/>
+                  </a:solidFill>
+                  <a:latin typeface="Courier New" pitchFamily="49" charset="0"/>
+                  <a:cs typeface="Courier New" pitchFamily="49" charset="0"/>
+                </a:rPr>
+                <a:t>            if (</a:t>
+              </a:r>
+              <a:r>
+                <a:rPr lang="en-US" dirty="0" err="1">
+                  <a:solidFill>
+                    <a:prstClr val="black"/>
+                  </a:solidFill>
+                  <a:latin typeface="Courier New" pitchFamily="49" charset="0"/>
+                  <a:cs typeface="Courier New" pitchFamily="49" charset="0"/>
+                </a:rPr>
+                <a:t>is_verbose</a:t>
+              </a:r>
+              <a:r>
+                <a:rPr lang="en-US" dirty="0">
+                  <a:solidFill>
+                    <a:prstClr val="black"/>
+                  </a:solidFill>
+                  <a:latin typeface="Courier New" pitchFamily="49" charset="0"/>
+                  <a:cs typeface="Courier New" pitchFamily="49" charset="0"/>
+                </a:rPr>
+                <a:t>_) std::</a:t>
+              </a:r>
+              <a:r>
+                <a:rPr lang="en-US" dirty="0" err="1">
+                  <a:solidFill>
+                    <a:prstClr val="black"/>
+                  </a:solidFill>
+                  <a:latin typeface="Courier New" pitchFamily="49" charset="0"/>
+                  <a:cs typeface="Courier New" pitchFamily="49" charset="0"/>
+                </a:rPr>
+                <a:t>cout</a:t>
+              </a:r>
+              <a:r>
+                <a:rPr lang="en-US" dirty="0">
+                  <a:solidFill>
+                    <a:prstClr val="black"/>
+                  </a:solidFill>
+                  <a:latin typeface="Courier New" pitchFamily="49" charset="0"/>
+                  <a:cs typeface="Courier New" pitchFamily="49" charset="0"/>
+                </a:rPr>
+                <a:t> &lt;&lt; "start step " &lt;&lt; </a:t>
+              </a:r>
+              <a:r>
+                <a:rPr lang="en-US" dirty="0" err="1">
+                  <a:solidFill>
+                    <a:prstClr val="black"/>
+                  </a:solidFill>
+                  <a:latin typeface="Courier New" pitchFamily="49" charset="0"/>
+                  <a:cs typeface="Courier New" pitchFamily="49" charset="0"/>
+                </a:rPr>
+                <a:t>current_step</a:t>
+              </a:r>
+              <a:r>
+                <a:rPr lang="en-US" dirty="0">
+                  <a:solidFill>
+                    <a:prstClr val="black"/>
+                  </a:solidFill>
+                  <a:latin typeface="Courier New" pitchFamily="49" charset="0"/>
+                  <a:cs typeface="Courier New" pitchFamily="49" charset="0"/>
+                </a:rPr>
+                <a:t>_ &lt;&lt; '\n';</a:t>
+              </a:r>
+            </a:p>
+            <a:p>
+              <a:pPr lvl="0">
+                <a:defRPr/>
+              </a:pPr>
+              <a:r>
+                <a:rPr lang="en-US" dirty="0">
+                  <a:solidFill>
+                    <a:prstClr val="black"/>
+                  </a:solidFill>
+                  <a:latin typeface="Courier New" pitchFamily="49" charset="0"/>
+                  <a:cs typeface="Courier New" pitchFamily="49" charset="0"/>
+                </a:rPr>
+                <a:t>            </a:t>
+              </a:r>
+              <a:r>
+                <a:rPr lang="en-US" dirty="0" err="1">
+                  <a:solidFill>
+                    <a:prstClr val="black"/>
+                  </a:solidFill>
+                  <a:latin typeface="Courier New" pitchFamily="49" charset="0"/>
+                  <a:cs typeface="Courier New" pitchFamily="49" charset="0"/>
+                </a:rPr>
+                <a:t>static_cast</a:t>
+              </a:r>
+              <a:r>
+                <a:rPr lang="en-US" dirty="0">
+                  <a:solidFill>
+                    <a:prstClr val="black"/>
+                  </a:solidFill>
+                  <a:latin typeface="Courier New" pitchFamily="49" charset="0"/>
+                  <a:cs typeface="Courier New" pitchFamily="49" charset="0"/>
+                </a:rPr>
+                <a:t>&lt;</a:t>
+              </a:r>
+              <a:r>
+                <a:rPr lang="en-US" b="1" dirty="0">
+                  <a:solidFill>
+                    <a:srgbClr val="FF0000"/>
+                  </a:solidFill>
+                  <a:latin typeface="Courier New" pitchFamily="49" charset="0"/>
+                  <a:cs typeface="Courier New" pitchFamily="49" charset="0"/>
+                </a:rPr>
+                <a:t>Derived</a:t>
+              </a:r>
+              <a:r>
+                <a:rPr lang="en-US" dirty="0">
+                  <a:solidFill>
+                    <a:prstClr val="black"/>
+                  </a:solidFill>
+                  <a:latin typeface="Courier New" pitchFamily="49" charset="0"/>
+                  <a:cs typeface="Courier New" pitchFamily="49" charset="0"/>
+                </a:rPr>
+                <a:t>*&gt;(this)-&gt;</a:t>
+              </a:r>
+              <a:r>
+                <a:rPr lang="en-US" b="1" dirty="0" err="1">
+                  <a:solidFill>
+                    <a:srgbClr val="FF0000"/>
+                  </a:solidFill>
+                  <a:latin typeface="Courier New" pitchFamily="49" charset="0"/>
+                  <a:cs typeface="Courier New" pitchFamily="49" charset="0"/>
+                </a:rPr>
+                <a:t>step_implementation</a:t>
+              </a:r>
+              <a:r>
+                <a:rPr lang="en-US" dirty="0">
+                  <a:solidFill>
+                    <a:prstClr val="black"/>
+                  </a:solidFill>
+                  <a:latin typeface="Courier New" pitchFamily="49" charset="0"/>
+                  <a:cs typeface="Courier New" pitchFamily="49" charset="0"/>
+                </a:rPr>
+                <a:t>();</a:t>
+              </a:r>
+            </a:p>
+            <a:p>
+              <a:pPr lvl="0">
+                <a:defRPr/>
+              </a:pPr>
+              <a:r>
+                <a:rPr lang="en-US" dirty="0">
+                  <a:solidFill>
+                    <a:prstClr val="black"/>
+                  </a:solidFill>
+                  <a:latin typeface="Courier New" pitchFamily="49" charset="0"/>
+                  <a:cs typeface="Courier New" pitchFamily="49" charset="0"/>
+                </a:rPr>
+                <a:t>            if (</a:t>
+              </a:r>
+              <a:r>
+                <a:rPr lang="en-US" dirty="0" err="1">
+                  <a:solidFill>
+                    <a:prstClr val="black"/>
+                  </a:solidFill>
+                  <a:latin typeface="Courier New" pitchFamily="49" charset="0"/>
+                  <a:cs typeface="Courier New" pitchFamily="49" charset="0"/>
+                </a:rPr>
+                <a:t>is_verbose</a:t>
+              </a:r>
+              <a:r>
+                <a:rPr lang="en-US" dirty="0">
+                  <a:solidFill>
+                    <a:prstClr val="black"/>
+                  </a:solidFill>
+                  <a:latin typeface="Courier New" pitchFamily="49" charset="0"/>
+                  <a:cs typeface="Courier New" pitchFamily="49" charset="0"/>
+                </a:rPr>
+                <a:t>_) std::</a:t>
+              </a:r>
+              <a:r>
+                <a:rPr lang="en-US" dirty="0" err="1">
+                  <a:solidFill>
+                    <a:prstClr val="black"/>
+                  </a:solidFill>
+                  <a:latin typeface="Courier New" pitchFamily="49" charset="0"/>
+                  <a:cs typeface="Courier New" pitchFamily="49" charset="0"/>
+                </a:rPr>
+                <a:t>cout</a:t>
+              </a:r>
+              <a:r>
+                <a:rPr lang="en-US" dirty="0">
+                  <a:solidFill>
+                    <a:prstClr val="black"/>
+                  </a:solidFill>
+                  <a:latin typeface="Courier New" pitchFamily="49" charset="0"/>
+                  <a:cs typeface="Courier New" pitchFamily="49" charset="0"/>
+                </a:rPr>
+                <a:t> &lt;&lt; "end step " &lt;&lt; </a:t>
+              </a:r>
+              <a:r>
+                <a:rPr lang="en-US" dirty="0" err="1">
+                  <a:solidFill>
+                    <a:prstClr val="black"/>
+                  </a:solidFill>
+                  <a:latin typeface="Courier New" pitchFamily="49" charset="0"/>
+                  <a:cs typeface="Courier New" pitchFamily="49" charset="0"/>
+                </a:rPr>
+                <a:t>current_step</a:t>
+              </a:r>
+              <a:r>
+                <a:rPr lang="en-US" dirty="0">
+                  <a:solidFill>
+                    <a:prstClr val="black"/>
+                  </a:solidFill>
+                  <a:latin typeface="Courier New" pitchFamily="49" charset="0"/>
+                  <a:cs typeface="Courier New" pitchFamily="49" charset="0"/>
+                </a:rPr>
+                <a:t>_ &lt;&lt; '\n';</a:t>
+              </a:r>
+            </a:p>
+            <a:p>
+              <a:pPr lvl="0">
+                <a:defRPr/>
+              </a:pPr>
+              <a:r>
+                <a:rPr lang="en-US" dirty="0">
+                  <a:solidFill>
+                    <a:prstClr val="black"/>
+                  </a:solidFill>
+                  <a:latin typeface="Courier New" pitchFamily="49" charset="0"/>
+                  <a:cs typeface="Courier New" pitchFamily="49" charset="0"/>
+                </a:rPr>
+                <a:t>            </a:t>
+              </a:r>
+              <a:r>
+                <a:rPr lang="en-US" dirty="0" err="1">
+                  <a:solidFill>
+                    <a:prstClr val="black"/>
+                  </a:solidFill>
+                  <a:latin typeface="Courier New" pitchFamily="49" charset="0"/>
+                  <a:cs typeface="Courier New" pitchFamily="49" charset="0"/>
+                </a:rPr>
+                <a:t>current_step</a:t>
+              </a:r>
+              <a:r>
+                <a:rPr lang="en-US" dirty="0">
+                  <a:solidFill>
+                    <a:prstClr val="black"/>
+                  </a:solidFill>
+                  <a:latin typeface="Courier New" pitchFamily="49" charset="0"/>
+                  <a:cs typeface="Courier New" pitchFamily="49" charset="0"/>
+                </a:rPr>
+                <a:t>_++;</a:t>
+              </a:r>
+            </a:p>
+            <a:p>
+              <a:pPr lvl="0">
+                <a:defRPr/>
+              </a:pPr>
+              <a:r>
+                <a:rPr lang="en-US" dirty="0">
+                  <a:solidFill>
+                    <a:prstClr val="black"/>
+                  </a:solidFill>
+                  <a:latin typeface="Courier New" pitchFamily="49" charset="0"/>
+                  <a:cs typeface="Courier New" pitchFamily="49" charset="0"/>
+                </a:rPr>
+                <a:t>        }</a:t>
+              </a:r>
+            </a:p>
+            <a:p>
+              <a:pPr lvl="0">
+                <a:defRPr/>
+              </a:pPr>
+              <a:r>
+                <a:rPr lang="en-US" dirty="0">
+                  <a:solidFill>
+                    <a:prstClr val="black"/>
+                  </a:solidFill>
+                  <a:latin typeface="Courier New" pitchFamily="49" charset="0"/>
+                  <a:cs typeface="Courier New" pitchFamily="49" charset="0"/>
+                </a:rPr>
+                <a:t>        void run(const std::</a:t>
+              </a:r>
+              <a:r>
+                <a:rPr lang="en-US" dirty="0" err="1">
+                  <a:solidFill>
+                    <a:prstClr val="black"/>
+                  </a:solidFill>
+                  <a:latin typeface="Courier New" pitchFamily="49" charset="0"/>
+                  <a:cs typeface="Courier New" pitchFamily="49" charset="0"/>
+                </a:rPr>
+                <a:t>size_t</a:t>
+              </a:r>
+              <a:r>
+                <a:rPr lang="en-US" dirty="0">
+                  <a:solidFill>
+                    <a:prstClr val="black"/>
+                  </a:solidFill>
+                  <a:latin typeface="Courier New" pitchFamily="49" charset="0"/>
+                  <a:cs typeface="Courier New" pitchFamily="49" charset="0"/>
+                </a:rPr>
+                <a:t> </a:t>
+              </a:r>
+              <a:r>
+                <a:rPr lang="en-US" dirty="0" err="1">
+                  <a:solidFill>
+                    <a:prstClr val="black"/>
+                  </a:solidFill>
+                  <a:latin typeface="Courier New" pitchFamily="49" charset="0"/>
+                  <a:cs typeface="Courier New" pitchFamily="49" charset="0"/>
+                </a:rPr>
+                <a:t>max_nr_steps</a:t>
+              </a:r>
+              <a:r>
+                <a:rPr lang="en-US" dirty="0">
+                  <a:solidFill>
+                    <a:prstClr val="black"/>
+                  </a:solidFill>
+                  <a:latin typeface="Courier New" pitchFamily="49" charset="0"/>
+                  <a:cs typeface="Courier New" pitchFamily="49" charset="0"/>
+                </a:rPr>
+                <a:t>) {</a:t>
+              </a:r>
+            </a:p>
+            <a:p>
+              <a:pPr lvl="0">
+                <a:defRPr/>
+              </a:pPr>
+              <a:r>
+                <a:rPr lang="en-US" dirty="0">
+                  <a:solidFill>
+                    <a:prstClr val="black"/>
+                  </a:solidFill>
+                  <a:latin typeface="Courier New" pitchFamily="49" charset="0"/>
+                  <a:cs typeface="Courier New" pitchFamily="49" charset="0"/>
+                </a:rPr>
+                <a:t>            for (</a:t>
+              </a:r>
+              <a:r>
+                <a:rPr lang="en-US" dirty="0" err="1">
+                  <a:solidFill>
+                    <a:prstClr val="black"/>
+                  </a:solidFill>
+                  <a:latin typeface="Courier New" pitchFamily="49" charset="0"/>
+                  <a:cs typeface="Courier New" pitchFamily="49" charset="0"/>
+                </a:rPr>
+                <a:t>size_t</a:t>
+              </a:r>
+              <a:r>
+                <a:rPr lang="en-US" dirty="0">
+                  <a:solidFill>
+                    <a:prstClr val="black"/>
+                  </a:solidFill>
+                  <a:latin typeface="Courier New" pitchFamily="49" charset="0"/>
+                  <a:cs typeface="Courier New" pitchFamily="49" charset="0"/>
+                </a:rPr>
+                <a:t> </a:t>
+              </a:r>
+              <a:r>
+                <a:rPr lang="en-US" dirty="0" err="1">
+                  <a:solidFill>
+                    <a:prstClr val="black"/>
+                  </a:solidFill>
+                  <a:latin typeface="Courier New" pitchFamily="49" charset="0"/>
+                  <a:cs typeface="Courier New" pitchFamily="49" charset="0"/>
+                </a:rPr>
+                <a:t>step_nr</a:t>
+              </a:r>
+              <a:r>
+                <a:rPr lang="en-US" dirty="0">
+                  <a:solidFill>
+                    <a:prstClr val="black"/>
+                  </a:solidFill>
+                  <a:latin typeface="Courier New" pitchFamily="49" charset="0"/>
+                  <a:cs typeface="Courier New" pitchFamily="49" charset="0"/>
+                </a:rPr>
+                <a:t> = 0; </a:t>
+              </a:r>
+              <a:r>
+                <a:rPr lang="en-US" dirty="0" err="1">
+                  <a:solidFill>
+                    <a:prstClr val="black"/>
+                  </a:solidFill>
+                  <a:latin typeface="Courier New" pitchFamily="49" charset="0"/>
+                  <a:cs typeface="Courier New" pitchFamily="49" charset="0"/>
+                </a:rPr>
+                <a:t>step_nr</a:t>
+              </a:r>
+              <a:r>
+                <a:rPr lang="en-US" dirty="0">
+                  <a:solidFill>
+                    <a:prstClr val="black"/>
+                  </a:solidFill>
+                  <a:latin typeface="Courier New" pitchFamily="49" charset="0"/>
+                  <a:cs typeface="Courier New" pitchFamily="49" charset="0"/>
+                </a:rPr>
+                <a:t> &lt; </a:t>
+              </a:r>
+              <a:r>
+                <a:rPr lang="en-US" dirty="0" err="1">
+                  <a:solidFill>
+                    <a:prstClr val="black"/>
+                  </a:solidFill>
+                  <a:latin typeface="Courier New" pitchFamily="49" charset="0"/>
+                  <a:cs typeface="Courier New" pitchFamily="49" charset="0"/>
+                </a:rPr>
+                <a:t>max_nr_steps</a:t>
+              </a:r>
+              <a:r>
+                <a:rPr lang="en-US" dirty="0">
+                  <a:solidFill>
+                    <a:prstClr val="black"/>
+                  </a:solidFill>
+                  <a:latin typeface="Courier New" pitchFamily="49" charset="0"/>
+                  <a:cs typeface="Courier New" pitchFamily="49" charset="0"/>
+                </a:rPr>
+                <a:t>; ++</a:t>
+              </a:r>
+              <a:r>
+                <a:rPr lang="en-US" dirty="0" err="1">
+                  <a:solidFill>
+                    <a:prstClr val="black"/>
+                  </a:solidFill>
+                  <a:latin typeface="Courier New" pitchFamily="49" charset="0"/>
+                  <a:cs typeface="Courier New" pitchFamily="49" charset="0"/>
+                </a:rPr>
+                <a:t>step_nr</a:t>
+              </a:r>
+              <a:r>
+                <a:rPr lang="en-US" dirty="0">
+                  <a:solidFill>
+                    <a:prstClr val="black"/>
+                  </a:solidFill>
+                  <a:latin typeface="Courier New" pitchFamily="49" charset="0"/>
+                  <a:cs typeface="Courier New" pitchFamily="49" charset="0"/>
+                </a:rPr>
+                <a:t>) step();</a:t>
+              </a:r>
+            </a:p>
+            <a:p>
+              <a:pPr lvl="0">
+                <a:defRPr/>
+              </a:pPr>
+              <a:r>
+                <a:rPr lang="en-US" dirty="0">
+                  <a:solidFill>
+                    <a:prstClr val="black"/>
+                  </a:solidFill>
+                  <a:latin typeface="Courier New" pitchFamily="49" charset="0"/>
+                  <a:cs typeface="Courier New" pitchFamily="49" charset="0"/>
+                </a:rPr>
+                <a:t>        }</a:t>
+              </a:r>
+            </a:p>
+            <a:p>
+              <a:pPr lvl="0">
+                <a:defRPr/>
+              </a:pPr>
+              <a:r>
+                <a:rPr lang="en-US" dirty="0">
+                  <a:solidFill>
+                    <a:prstClr val="black"/>
+                  </a:solidFill>
+                  <a:latin typeface="Courier New" pitchFamily="49" charset="0"/>
+                  <a:cs typeface="Courier New" pitchFamily="49" charset="0"/>
+                </a:rPr>
+                <a:t>    </a:t>
+              </a:r>
+              <a:r>
+                <a:rPr lang="en-US" dirty="0">
+                  <a:solidFill>
+                    <a:prstClr val="black"/>
+                  </a:solidFill>
+                  <a:latin typeface="Courier New" pitchFamily="49" charset="0"/>
+                  <a:cs typeface="Courier New" pitchFamily="49" charset="0"/>
+                  <a:sym typeface="Symbol" panose="05050102010706020507" pitchFamily="18" charset="2"/>
+                </a:rPr>
+                <a:t></a:t>
+              </a:r>
+              <a:endParaRPr kumimoji="0" lang="en-US" b="0" i="0" u="none" strike="noStrike" kern="1200" cap="none" spc="0" normalizeH="0" baseline="0" noProof="0" dirty="0">
+                <a:ln>
+                  <a:noFill/>
+                </a:ln>
+                <a:solidFill>
+                  <a:prstClr val="black"/>
+                </a:solidFill>
+                <a:effectLst/>
+                <a:uLnTx/>
+                <a:uFillTx/>
+                <a:latin typeface="Courier New" pitchFamily="49" charset="0"/>
+                <a:cs typeface="Courier New" pitchFamily="49" charset="0"/>
+              </a:endParaRPr>
+            </a:p>
+          </p:txBody>
+        </p:sp>
+        <p:sp>
+          <p:nvSpPr>
+            <p:cNvPr id="3" name="TextBox 2">
+              <a:extLst>
+                <a:ext uri="{FF2B5EF4-FFF2-40B4-BE49-F238E27FC236}">
+                  <a16:creationId xmlns:a16="http://schemas.microsoft.com/office/drawing/2014/main" id="{07AEFD06-A58F-2F37-FB8D-9092DB0ECFFD}"/>
+                </a:ext>
+              </a:extLst>
+            </p:cNvPr>
+            <p:cNvSpPr txBox="1"/>
+            <p:nvPr/>
+          </p:nvSpPr>
+          <p:spPr>
+            <a:xfrm>
+              <a:off x="9851246" y="1268919"/>
+              <a:ext cx="1665841" cy="338554"/>
+            </a:xfrm>
+            <a:prstGeom prst="rect">
+              <a:avLst/>
+            </a:prstGeom>
+            <a:solidFill>
+              <a:schemeClr val="bg1"/>
+            </a:solidFill>
+            <a:ln>
+              <a:solidFill>
+                <a:schemeClr val="tx1"/>
+              </a:solidFill>
+            </a:ln>
+          </p:spPr>
+          <p:txBody>
+            <a:bodyPr wrap="none" rtlCol="0">
+              <a:spAutoFit/>
+            </a:bodyPr>
+            <a:lstStyle/>
+            <a:p>
+              <a:r>
+                <a:rPr lang="en-US" sz="1600" dirty="0" err="1">
+                  <a:latin typeface="Courier New" panose="02070309020205020404" pitchFamily="49" charset="0"/>
+                  <a:cs typeface="Courier New" panose="02070309020205020404" pitchFamily="49" charset="0"/>
+                </a:rPr>
+                <a:t>simulation.h</a:t>
+              </a:r>
+              <a:endParaRPr lang="LID4096" sz="1600" dirty="0">
+                <a:latin typeface="Courier New" panose="02070309020205020404" pitchFamily="49" charset="0"/>
+                <a:cs typeface="Courier New" panose="02070309020205020404" pitchFamily="49" charset="0"/>
+              </a:endParaRPr>
+            </a:p>
+          </p:txBody>
+        </p:sp>
+      </p:grpSp>
+    </p:spTree>
+    <p:extLst>
+      <p:ext uri="{BB962C8B-B14F-4D97-AF65-F5344CB8AC3E}">
+        <p14:creationId xmlns:p14="http://schemas.microsoft.com/office/powerpoint/2010/main" val="3866999852"/>
+      </p:ext>
+    </p:extLst>
+  </p:cSld>
+  <p:clrMapOvr>
+    <a:masterClrMapping/>
+  </p:clrMapOvr>
+</p:sld>
+</file>
+
+<file path=ppt/slides/slide43.xml><?xml version="1.0" encoding="utf-8"?>
+<p:sld xmlns:a="http://schemas.openxmlformats.org/drawingml/2006/main" xmlns:r="http://schemas.openxmlformats.org/officeDocument/2006/relationships" xmlns:p="http://schemas.openxmlformats.org/presentationml/2006/main">
+  <p:cSld>
+    <p:spTree>
+      <p:nvGrpSpPr>
+        <p:cNvPr id="1" name=""/>
+        <p:cNvGrpSpPr/>
+        <p:nvPr/>
+      </p:nvGrpSpPr>
+      <p:grpSpPr>
+        <a:xfrm>
+          <a:off x="0" y="0"/>
+          <a:ext cx="0" cy="0"/>
+          <a:chOff x="0" y="0"/>
+          <a:chExt cx="0" cy="0"/>
+        </a:xfrm>
+      </p:grpSpPr>
+      <p:sp>
+        <p:nvSpPr>
+          <p:cNvPr id="2" name="Title 1">
+            <a:extLst>
+              <a:ext uri="{FF2B5EF4-FFF2-40B4-BE49-F238E27FC236}">
+                <a16:creationId xmlns:a16="http://schemas.microsoft.com/office/drawing/2014/main" id="{F407F120-BE31-DEBE-569A-7E4F169F5A63}"/>
+              </a:ext>
+            </a:extLst>
+          </p:cNvPr>
+          <p:cNvSpPr>
+            <a:spLocks noGrp="1"/>
+          </p:cNvSpPr>
+          <p:nvPr>
+            <p:ph type="title"/>
+          </p:nvPr>
+        </p:nvSpPr>
+        <p:spPr/>
+        <p:txBody>
+          <a:bodyPr/>
+          <a:lstStyle/>
+          <a:p>
+            <a:r>
+              <a:rPr lang="en-US" dirty="0"/>
+              <a:t>CRTP: first derived class</a:t>
+            </a:r>
+            <a:endParaRPr lang="LID4096" dirty="0"/>
+          </a:p>
+        </p:txBody>
+      </p:sp>
+      <p:sp>
+        <p:nvSpPr>
+          <p:cNvPr id="3" name="Slide Number Placeholder 2">
+            <a:extLst>
+              <a:ext uri="{FF2B5EF4-FFF2-40B4-BE49-F238E27FC236}">
+                <a16:creationId xmlns:a16="http://schemas.microsoft.com/office/drawing/2014/main" id="{A8BA7589-2BE2-E21F-B60E-24CE64438779}"/>
+              </a:ext>
+            </a:extLst>
+          </p:cNvPr>
+          <p:cNvSpPr>
+            <a:spLocks noGrp="1"/>
+          </p:cNvSpPr>
+          <p:nvPr>
+            <p:ph type="sldNum" sz="quarter" idx="12"/>
+          </p:nvPr>
+        </p:nvSpPr>
+        <p:spPr/>
+        <p:txBody>
+          <a:bodyPr/>
+          <a:lstStyle/>
+          <a:p>
+            <a:fld id="{FDB1AA33-DFBB-49AC-8CEE-23FFECEB5648}" type="slidenum">
+              <a:rPr lang="LID4096" smtClean="0"/>
+              <a:t>43</a:t>
+            </a:fld>
+            <a:endParaRPr lang="LID4096"/>
+          </a:p>
+        </p:txBody>
+      </p:sp>
+      <p:grpSp>
+        <p:nvGrpSpPr>
+          <p:cNvPr id="7" name="Group 6">
+            <a:extLst>
+              <a:ext uri="{FF2B5EF4-FFF2-40B4-BE49-F238E27FC236}">
+                <a16:creationId xmlns:a16="http://schemas.microsoft.com/office/drawing/2014/main" id="{1CD1CE94-2C5B-A331-8ED4-4E4C9DA169DE}"/>
+              </a:ext>
+            </a:extLst>
+          </p:cNvPr>
+          <p:cNvGrpSpPr/>
+          <p:nvPr/>
+        </p:nvGrpSpPr>
+        <p:grpSpPr>
+          <a:xfrm>
+            <a:off x="435429" y="1569488"/>
+            <a:ext cx="10918372" cy="3139321"/>
+            <a:chOff x="435429" y="1569488"/>
+            <a:chExt cx="10918372" cy="3139321"/>
+          </a:xfrm>
+        </p:grpSpPr>
+        <p:sp>
+          <p:nvSpPr>
+            <p:cNvPr id="4" name="TextBox 3">
+              <a:extLst>
+                <a:ext uri="{FF2B5EF4-FFF2-40B4-BE49-F238E27FC236}">
+                  <a16:creationId xmlns:a16="http://schemas.microsoft.com/office/drawing/2014/main" id="{55D3781A-4AC6-5BD5-A245-BFB392168377}"/>
+                </a:ext>
+              </a:extLst>
+            </p:cNvPr>
+            <p:cNvSpPr txBox="1"/>
+            <p:nvPr/>
+          </p:nvSpPr>
+          <p:spPr>
+            <a:xfrm>
+              <a:off x="435429" y="1569488"/>
+              <a:ext cx="10918372" cy="3139321"/>
+            </a:xfrm>
+            <a:prstGeom prst="rect">
+              <a:avLst/>
+            </a:prstGeom>
+            <a:solidFill>
+              <a:schemeClr val="bg1">
+                <a:lumMod val="85000"/>
+              </a:schemeClr>
+            </a:solidFill>
+            <a:ln>
+              <a:solidFill>
+                <a:schemeClr val="tx1"/>
+              </a:solidFill>
+            </a:ln>
+          </p:spPr>
+          <p:txBody>
+            <a:bodyPr wrap="square" rtlCol="0">
+              <a:spAutoFit/>
+            </a:bodyPr>
+            <a:lstStyle/>
+            <a:p>
+              <a:pPr lvl="0">
+                <a:defRPr/>
+              </a:pPr>
+              <a:r>
+                <a:rPr lang="en-US" dirty="0">
+                  <a:solidFill>
+                    <a:prstClr val="black"/>
+                  </a:solidFill>
+                  <a:latin typeface="Courier New" pitchFamily="49" charset="0"/>
+                  <a:cs typeface="Courier New" pitchFamily="49" charset="0"/>
+                  <a:sym typeface="Symbol" panose="05050102010706020507" pitchFamily="18" charset="2"/>
+                </a:rPr>
+                <a:t> </a:t>
+              </a:r>
+            </a:p>
+            <a:p>
+              <a:pPr lvl="0">
+                <a:defRPr/>
+              </a:pPr>
+              <a:r>
+                <a:rPr lang="en-US" dirty="0">
+                  <a:solidFill>
+                    <a:prstClr val="black"/>
+                  </a:solidFill>
+                  <a:latin typeface="Courier New" pitchFamily="49" charset="0"/>
+                  <a:cs typeface="Courier New" pitchFamily="49" charset="0"/>
+                </a:rPr>
+                <a:t>#include "</a:t>
+              </a:r>
+              <a:r>
+                <a:rPr lang="en-US" dirty="0" err="1">
+                  <a:solidFill>
+                    <a:prstClr val="black"/>
+                  </a:solidFill>
+                  <a:latin typeface="Courier New" pitchFamily="49" charset="0"/>
+                  <a:cs typeface="Courier New" pitchFamily="49" charset="0"/>
+                </a:rPr>
+                <a:t>simulation.h</a:t>
+              </a:r>
+              <a:r>
+                <a:rPr lang="en-US" dirty="0">
+                  <a:solidFill>
+                    <a:prstClr val="black"/>
+                  </a:solidFill>
+                  <a:latin typeface="Courier New" pitchFamily="49" charset="0"/>
+                  <a:cs typeface="Courier New" pitchFamily="49" charset="0"/>
+                </a:rPr>
+                <a:t>"</a:t>
+              </a:r>
+            </a:p>
+            <a:p>
+              <a:pPr lvl="0">
+                <a:defRPr/>
+              </a:pPr>
+              <a:endParaRPr lang="en-US" dirty="0">
+                <a:solidFill>
+                  <a:prstClr val="black"/>
+                </a:solidFill>
+                <a:latin typeface="Courier New" pitchFamily="49" charset="0"/>
+                <a:cs typeface="Courier New" pitchFamily="49" charset="0"/>
+              </a:endParaRPr>
+            </a:p>
+            <a:p>
+              <a:pPr lvl="0">
+                <a:defRPr/>
+              </a:pPr>
+              <a:r>
+                <a:rPr lang="en-US" dirty="0">
+                  <a:solidFill>
+                    <a:prstClr val="black"/>
+                  </a:solidFill>
+                  <a:latin typeface="Courier New" pitchFamily="49" charset="0"/>
+                  <a:cs typeface="Courier New" pitchFamily="49" charset="0"/>
+                </a:rPr>
+                <a:t>struct </a:t>
+              </a:r>
+              <a:r>
+                <a:rPr lang="en-US" dirty="0" err="1">
+                  <a:solidFill>
+                    <a:prstClr val="black"/>
+                  </a:solidFill>
+                  <a:latin typeface="Courier New" pitchFamily="49" charset="0"/>
+                  <a:cs typeface="Courier New" pitchFamily="49" charset="0"/>
+                </a:rPr>
+                <a:t>DiceSimulation</a:t>
+              </a:r>
+              <a:r>
+                <a:rPr lang="en-US" dirty="0">
+                  <a:solidFill>
+                    <a:prstClr val="black"/>
+                  </a:solidFill>
+                  <a:latin typeface="Courier New" pitchFamily="49" charset="0"/>
+                  <a:cs typeface="Courier New" pitchFamily="49" charset="0"/>
+                </a:rPr>
+                <a:t> : public </a:t>
+              </a:r>
+              <a:r>
+                <a:rPr lang="en-US" b="1" dirty="0">
+                  <a:solidFill>
+                    <a:srgbClr val="FF0000"/>
+                  </a:solidFill>
+                  <a:latin typeface="Courier New" pitchFamily="49" charset="0"/>
+                  <a:cs typeface="Courier New" pitchFamily="49" charset="0"/>
+                </a:rPr>
+                <a:t>Simulation&lt;</a:t>
+              </a:r>
+              <a:r>
+                <a:rPr lang="en-US" b="1" dirty="0" err="1">
+                  <a:solidFill>
+                    <a:srgbClr val="FF0000"/>
+                  </a:solidFill>
+                  <a:latin typeface="Courier New" pitchFamily="49" charset="0"/>
+                  <a:cs typeface="Courier New" pitchFamily="49" charset="0"/>
+                </a:rPr>
+                <a:t>DiceSimulation</a:t>
+              </a:r>
+              <a:r>
+                <a:rPr lang="en-US" b="1" dirty="0">
+                  <a:solidFill>
+                    <a:srgbClr val="FF0000"/>
+                  </a:solidFill>
+                  <a:latin typeface="Courier New" pitchFamily="49" charset="0"/>
+                  <a:cs typeface="Courier New" pitchFamily="49" charset="0"/>
+                </a:rPr>
+                <a:t>&gt;</a:t>
+              </a:r>
+              <a:r>
+                <a:rPr lang="en-US" dirty="0">
+                  <a:solidFill>
+                    <a:prstClr val="black"/>
+                  </a:solidFill>
+                  <a:latin typeface="Courier New" pitchFamily="49" charset="0"/>
+                  <a:cs typeface="Courier New" pitchFamily="49" charset="0"/>
+                </a:rPr>
+                <a:t> {</a:t>
+              </a:r>
+            </a:p>
+            <a:p>
+              <a:pPr lvl="0">
+                <a:defRPr/>
+              </a:pPr>
+              <a:r>
+                <a:rPr lang="en-US" dirty="0">
+                  <a:solidFill>
+                    <a:prstClr val="black"/>
+                  </a:solidFill>
+                  <a:latin typeface="Courier New" pitchFamily="49" charset="0"/>
+                  <a:cs typeface="Courier New" pitchFamily="49" charset="0"/>
+                </a:rPr>
+                <a:t>    protected:</a:t>
+              </a:r>
+            </a:p>
+            <a:p>
+              <a:pPr lvl="0">
+                <a:defRPr/>
+              </a:pPr>
+              <a:r>
+                <a:rPr lang="en-US" dirty="0">
+                  <a:solidFill>
+                    <a:prstClr val="black"/>
+                  </a:solidFill>
+                  <a:latin typeface="Courier New" pitchFamily="49" charset="0"/>
+                  <a:cs typeface="Courier New" pitchFamily="49" charset="0"/>
+                </a:rPr>
+                <a:t>        std::mt19937_64 engine_;</a:t>
+              </a:r>
+            </a:p>
+            <a:p>
+              <a:pPr lvl="0">
+                <a:defRPr/>
+              </a:pPr>
+              <a:r>
+                <a:rPr lang="en-US" dirty="0">
+                  <a:solidFill>
+                    <a:prstClr val="black"/>
+                  </a:solidFill>
+                  <a:latin typeface="Courier New" pitchFamily="49" charset="0"/>
+                  <a:cs typeface="Courier New" pitchFamily="49" charset="0"/>
+                </a:rPr>
+                <a:t>        std::</a:t>
+              </a:r>
+              <a:r>
+                <a:rPr lang="en-US" dirty="0" err="1">
+                  <a:solidFill>
+                    <a:prstClr val="black"/>
+                  </a:solidFill>
+                  <a:latin typeface="Courier New" pitchFamily="49" charset="0"/>
+                  <a:cs typeface="Courier New" pitchFamily="49" charset="0"/>
+                </a:rPr>
+                <a:t>uniform_int_distribution</a:t>
+              </a:r>
+              <a:r>
+                <a:rPr lang="en-US" dirty="0">
+                  <a:solidFill>
+                    <a:prstClr val="black"/>
+                  </a:solidFill>
+                  <a:latin typeface="Courier New" pitchFamily="49" charset="0"/>
+                  <a:cs typeface="Courier New" pitchFamily="49" charset="0"/>
+                </a:rPr>
+                <a:t>&lt;int&gt; </a:t>
+              </a:r>
+              <a:r>
+                <a:rPr lang="en-US" dirty="0" err="1">
+                  <a:solidFill>
+                    <a:prstClr val="black"/>
+                  </a:solidFill>
+                  <a:latin typeface="Courier New" pitchFamily="49" charset="0"/>
+                  <a:cs typeface="Courier New" pitchFamily="49" charset="0"/>
+                </a:rPr>
+                <a:t>distr</a:t>
+              </a:r>
+              <a:r>
+                <a:rPr lang="en-US" dirty="0">
+                  <a:solidFill>
+                    <a:prstClr val="black"/>
+                  </a:solidFill>
+                  <a:latin typeface="Courier New" pitchFamily="49" charset="0"/>
+                  <a:cs typeface="Courier New" pitchFamily="49" charset="0"/>
+                </a:rPr>
+                <a:t>_ {1, 6};</a:t>
+              </a:r>
+            </a:p>
+            <a:p>
+              <a:pPr lvl="0">
+                <a:defRPr/>
+              </a:pPr>
+              <a:r>
+                <a:rPr lang="en-US" dirty="0">
+                  <a:solidFill>
+                    <a:prstClr val="black"/>
+                  </a:solidFill>
+                  <a:latin typeface="Courier New" pitchFamily="49" charset="0"/>
+                  <a:cs typeface="Courier New" pitchFamily="49" charset="0"/>
+                </a:rPr>
+                <a:t>    public:</a:t>
+              </a:r>
+            </a:p>
+            <a:p>
+              <a:pPr lvl="0">
+                <a:defRPr/>
+              </a:pPr>
+              <a:r>
+                <a:rPr lang="en-US" dirty="0">
+                  <a:solidFill>
+                    <a:prstClr val="black"/>
+                  </a:solidFill>
+                  <a:latin typeface="Courier New" pitchFamily="49" charset="0"/>
+                  <a:cs typeface="Courier New" pitchFamily="49" charset="0"/>
+                </a:rPr>
+                <a:t>        void seed(const std::</a:t>
+              </a:r>
+              <a:r>
+                <a:rPr lang="en-US" dirty="0" err="1">
+                  <a:solidFill>
+                    <a:prstClr val="black"/>
+                  </a:solidFill>
+                  <a:latin typeface="Courier New" pitchFamily="49" charset="0"/>
+                  <a:cs typeface="Courier New" pitchFamily="49" charset="0"/>
+                </a:rPr>
+                <a:t>size_t</a:t>
+              </a:r>
+              <a:r>
+                <a:rPr lang="en-US" dirty="0">
+                  <a:solidFill>
+                    <a:prstClr val="black"/>
+                  </a:solidFill>
+                  <a:latin typeface="Courier New" pitchFamily="49" charset="0"/>
+                  <a:cs typeface="Courier New" pitchFamily="49" charset="0"/>
+                </a:rPr>
+                <a:t> </a:t>
+              </a:r>
+              <a:r>
+                <a:rPr lang="en-US" dirty="0" err="1">
+                  <a:solidFill>
+                    <a:prstClr val="black"/>
+                  </a:solidFill>
+                  <a:latin typeface="Courier New" pitchFamily="49" charset="0"/>
+                  <a:cs typeface="Courier New" pitchFamily="49" charset="0"/>
+                </a:rPr>
+                <a:t>seed_value</a:t>
+              </a:r>
+              <a:r>
+                <a:rPr lang="en-US" dirty="0">
+                  <a:solidFill>
+                    <a:prstClr val="black"/>
+                  </a:solidFill>
+                  <a:latin typeface="Courier New" pitchFamily="49" charset="0"/>
+                  <a:cs typeface="Courier New" pitchFamily="49" charset="0"/>
+                </a:rPr>
+                <a:t>) { </a:t>
+              </a:r>
+              <a:r>
+                <a:rPr lang="en-US" dirty="0" err="1">
+                  <a:solidFill>
+                    <a:prstClr val="black"/>
+                  </a:solidFill>
+                  <a:latin typeface="Courier New" pitchFamily="49" charset="0"/>
+                  <a:cs typeface="Courier New" pitchFamily="49" charset="0"/>
+                </a:rPr>
+                <a:t>engine_.seed</a:t>
+              </a:r>
+              <a:r>
+                <a:rPr lang="en-US" dirty="0">
+                  <a:solidFill>
+                    <a:prstClr val="black"/>
+                  </a:solidFill>
+                  <a:latin typeface="Courier New" pitchFamily="49" charset="0"/>
+                  <a:cs typeface="Courier New" pitchFamily="49" charset="0"/>
+                </a:rPr>
+                <a:t>(</a:t>
+              </a:r>
+              <a:r>
+                <a:rPr lang="en-US" dirty="0" err="1">
+                  <a:solidFill>
+                    <a:prstClr val="black"/>
+                  </a:solidFill>
+                  <a:latin typeface="Courier New" pitchFamily="49" charset="0"/>
+                  <a:cs typeface="Courier New" pitchFamily="49" charset="0"/>
+                </a:rPr>
+                <a:t>seed_value</a:t>
+              </a:r>
+              <a:r>
+                <a:rPr lang="en-US" dirty="0">
+                  <a:solidFill>
+                    <a:prstClr val="black"/>
+                  </a:solidFill>
+                  <a:latin typeface="Courier New" pitchFamily="49" charset="0"/>
+                  <a:cs typeface="Courier New" pitchFamily="49" charset="0"/>
+                </a:rPr>
+                <a:t>); }</a:t>
+              </a:r>
+            </a:p>
+            <a:p>
+              <a:pPr lvl="0">
+                <a:defRPr/>
+              </a:pPr>
+              <a:r>
+                <a:rPr lang="en-US" dirty="0">
+                  <a:solidFill>
+                    <a:prstClr val="black"/>
+                  </a:solidFill>
+                  <a:latin typeface="Courier New" pitchFamily="49" charset="0"/>
+                  <a:cs typeface="Courier New" pitchFamily="49" charset="0"/>
+                </a:rPr>
+                <a:t>        void </a:t>
+              </a:r>
+              <a:r>
+                <a:rPr lang="en-US" b="1" dirty="0" err="1">
+                  <a:solidFill>
+                    <a:srgbClr val="FF0000"/>
+                  </a:solidFill>
+                  <a:latin typeface="Courier New" pitchFamily="49" charset="0"/>
+                  <a:cs typeface="Courier New" pitchFamily="49" charset="0"/>
+                </a:rPr>
+                <a:t>step_implementation</a:t>
+              </a:r>
+              <a:r>
+                <a:rPr lang="en-US" dirty="0">
+                  <a:solidFill>
+                    <a:prstClr val="black"/>
+                  </a:solidFill>
+                  <a:latin typeface="Courier New" pitchFamily="49" charset="0"/>
+                  <a:cs typeface="Courier New" pitchFamily="49" charset="0"/>
+                </a:rPr>
+                <a:t>() { std::</a:t>
+              </a:r>
+              <a:r>
+                <a:rPr lang="en-US" dirty="0" err="1">
+                  <a:solidFill>
+                    <a:prstClr val="black"/>
+                  </a:solidFill>
+                  <a:latin typeface="Courier New" pitchFamily="49" charset="0"/>
+                  <a:cs typeface="Courier New" pitchFamily="49" charset="0"/>
+                </a:rPr>
+                <a:t>cout</a:t>
+              </a:r>
+              <a:r>
+                <a:rPr lang="en-US" dirty="0">
+                  <a:solidFill>
+                    <a:prstClr val="black"/>
+                  </a:solidFill>
+                  <a:latin typeface="Courier New" pitchFamily="49" charset="0"/>
+                  <a:cs typeface="Courier New" pitchFamily="49" charset="0"/>
+                </a:rPr>
+                <a:t> &lt;&lt; </a:t>
+              </a:r>
+              <a:r>
+                <a:rPr lang="en-US" dirty="0" err="1">
+                  <a:solidFill>
+                    <a:prstClr val="black"/>
+                  </a:solidFill>
+                  <a:latin typeface="Courier New" pitchFamily="49" charset="0"/>
+                  <a:cs typeface="Courier New" pitchFamily="49" charset="0"/>
+                </a:rPr>
+                <a:t>distr</a:t>
+              </a:r>
+              <a:r>
+                <a:rPr lang="en-US" dirty="0">
+                  <a:solidFill>
+                    <a:prstClr val="black"/>
+                  </a:solidFill>
+                  <a:latin typeface="Courier New" pitchFamily="49" charset="0"/>
+                  <a:cs typeface="Courier New" pitchFamily="49" charset="0"/>
+                </a:rPr>
+                <a:t>_(engine_) &lt;&lt; '\n'; };</a:t>
+              </a:r>
+            </a:p>
+            <a:p>
+              <a:pPr lvl="0">
+                <a:defRPr/>
+              </a:pPr>
+              <a:r>
+                <a:rPr lang="en-US" dirty="0">
+                  <a:solidFill>
+                    <a:prstClr val="black"/>
+                  </a:solidFill>
+                  <a:latin typeface="Courier New" pitchFamily="49" charset="0"/>
+                  <a:cs typeface="Courier New" pitchFamily="49" charset="0"/>
+                </a:rPr>
+                <a:t>};</a:t>
+              </a:r>
+              <a:endParaRPr kumimoji="0" lang="en-US" sz="1800" b="0" i="0" u="none" strike="noStrike" kern="1200" cap="none" spc="0" normalizeH="0" baseline="0" noProof="0" dirty="0">
+                <a:ln>
+                  <a:noFill/>
+                </a:ln>
+                <a:solidFill>
+                  <a:prstClr val="black"/>
+                </a:solidFill>
+                <a:effectLst/>
+                <a:uLnTx/>
+                <a:uFillTx/>
+                <a:latin typeface="Courier New" pitchFamily="49" charset="0"/>
+                <a:ea typeface="+mn-ea"/>
+                <a:cs typeface="Courier New" pitchFamily="49" charset="0"/>
+              </a:endParaRPr>
+            </a:p>
+          </p:txBody>
+        </p:sp>
+        <p:sp>
+          <p:nvSpPr>
+            <p:cNvPr id="6" name="TextBox 5">
+              <a:extLst>
+                <a:ext uri="{FF2B5EF4-FFF2-40B4-BE49-F238E27FC236}">
+                  <a16:creationId xmlns:a16="http://schemas.microsoft.com/office/drawing/2014/main" id="{8B1C1ADF-6270-B7A5-7581-82AEB9353671}"/>
+                </a:ext>
+              </a:extLst>
+            </p:cNvPr>
+            <p:cNvSpPr txBox="1"/>
+            <p:nvPr/>
+          </p:nvSpPr>
+          <p:spPr>
+            <a:xfrm>
+              <a:off x="9067475" y="1569488"/>
+              <a:ext cx="2282997" cy="338554"/>
+            </a:xfrm>
+            <a:prstGeom prst="rect">
+              <a:avLst/>
+            </a:prstGeom>
+            <a:solidFill>
+              <a:schemeClr val="bg1"/>
+            </a:solidFill>
+            <a:ln>
+              <a:solidFill>
+                <a:schemeClr val="tx1"/>
+              </a:solidFill>
+            </a:ln>
+          </p:spPr>
+          <p:txBody>
+            <a:bodyPr wrap="none" rtlCol="0">
+              <a:spAutoFit/>
+            </a:bodyPr>
+            <a:lstStyle/>
+            <a:p>
+              <a:r>
+                <a:rPr lang="en-US" sz="1600" dirty="0" err="1">
+                  <a:latin typeface="Courier New" panose="02070309020205020404" pitchFamily="49" charset="0"/>
+                  <a:cs typeface="Courier New" panose="02070309020205020404" pitchFamily="49" charset="0"/>
+                </a:rPr>
+                <a:t>dice_simulation.h</a:t>
+              </a:r>
+              <a:endParaRPr lang="LID4096" sz="1600" dirty="0">
+                <a:latin typeface="Courier New" panose="02070309020205020404" pitchFamily="49" charset="0"/>
+                <a:cs typeface="Courier New" panose="02070309020205020404" pitchFamily="49" charset="0"/>
+              </a:endParaRPr>
+            </a:p>
+          </p:txBody>
+        </p:sp>
+      </p:grpSp>
+    </p:spTree>
+    <p:extLst>
+      <p:ext uri="{BB962C8B-B14F-4D97-AF65-F5344CB8AC3E}">
+        <p14:creationId xmlns:p14="http://schemas.microsoft.com/office/powerpoint/2010/main" val="4020257836"/>
+      </p:ext>
+    </p:extLst>
+  </p:cSld>
+  <p:clrMapOvr>
+    <a:masterClrMapping/>
+  </p:clrMapOvr>
+</p:sld>
+</file>
+
+<file path=ppt/slides/slide44.xml><?xml version="1.0" encoding="utf-8"?>
+<p:sld xmlns:a="http://schemas.openxmlformats.org/drawingml/2006/main" xmlns:r="http://schemas.openxmlformats.org/officeDocument/2006/relationships" xmlns:p="http://schemas.openxmlformats.org/presentationml/2006/main">
+  <p:cSld>
+    <p:spTree>
+      <p:nvGrpSpPr>
+        <p:cNvPr id="1" name=""/>
+        <p:cNvGrpSpPr/>
+        <p:nvPr/>
+      </p:nvGrpSpPr>
+      <p:grpSpPr>
+        <a:xfrm>
+          <a:off x="0" y="0"/>
+          <a:ext cx="0" cy="0"/>
+          <a:chOff x="0" y="0"/>
+          <a:chExt cx="0" cy="0"/>
+        </a:xfrm>
+      </p:grpSpPr>
+      <p:sp>
+        <p:nvSpPr>
+          <p:cNvPr id="2" name="Title 1">
+            <a:extLst>
+              <a:ext uri="{FF2B5EF4-FFF2-40B4-BE49-F238E27FC236}">
+                <a16:creationId xmlns:a16="http://schemas.microsoft.com/office/drawing/2014/main" id="{F90C6BCD-B0C3-91E9-B309-4BC7DE2128D7}"/>
+              </a:ext>
+            </a:extLst>
+          </p:cNvPr>
+          <p:cNvSpPr>
+            <a:spLocks noGrp="1"/>
+          </p:cNvSpPr>
+          <p:nvPr>
+            <p:ph type="title"/>
+          </p:nvPr>
+        </p:nvSpPr>
+        <p:spPr/>
+        <p:txBody>
+          <a:bodyPr/>
+          <a:lstStyle/>
+          <a:p>
+            <a:r>
+              <a:rPr lang="en-US" dirty="0"/>
+              <a:t>CRTP: second derived class</a:t>
+            </a:r>
+            <a:endParaRPr lang="LID4096" dirty="0"/>
+          </a:p>
+        </p:txBody>
+      </p:sp>
+      <p:sp>
+        <p:nvSpPr>
+          <p:cNvPr id="3" name="Slide Number Placeholder 2">
+            <a:extLst>
+              <a:ext uri="{FF2B5EF4-FFF2-40B4-BE49-F238E27FC236}">
+                <a16:creationId xmlns:a16="http://schemas.microsoft.com/office/drawing/2014/main" id="{700B4273-98E9-8C48-F760-D50BA9244A4D}"/>
+              </a:ext>
+            </a:extLst>
+          </p:cNvPr>
+          <p:cNvSpPr>
+            <a:spLocks noGrp="1"/>
+          </p:cNvSpPr>
+          <p:nvPr>
+            <p:ph type="sldNum" sz="quarter" idx="12"/>
+          </p:nvPr>
+        </p:nvSpPr>
+        <p:spPr/>
+        <p:txBody>
+          <a:bodyPr/>
+          <a:lstStyle/>
+          <a:p>
+            <a:fld id="{FDB1AA33-DFBB-49AC-8CEE-23FFECEB5648}" type="slidenum">
+              <a:rPr lang="LID4096" smtClean="0"/>
+              <a:t>44</a:t>
+            </a:fld>
+            <a:endParaRPr lang="LID4096"/>
+          </a:p>
+        </p:txBody>
+      </p:sp>
+      <p:grpSp>
+        <p:nvGrpSpPr>
+          <p:cNvPr id="5" name="Group 4">
+            <a:extLst>
+              <a:ext uri="{FF2B5EF4-FFF2-40B4-BE49-F238E27FC236}">
+                <a16:creationId xmlns:a16="http://schemas.microsoft.com/office/drawing/2014/main" id="{3D29181F-FEBF-B5C7-2BD1-180AA4CF2F9C}"/>
+              </a:ext>
+            </a:extLst>
+          </p:cNvPr>
+          <p:cNvGrpSpPr/>
+          <p:nvPr/>
+        </p:nvGrpSpPr>
+        <p:grpSpPr>
+          <a:xfrm>
+            <a:off x="435429" y="1438859"/>
+            <a:ext cx="10918372" cy="4801314"/>
+            <a:chOff x="435429" y="1569488"/>
+            <a:chExt cx="10918372" cy="4801314"/>
+          </a:xfrm>
+        </p:grpSpPr>
+        <p:sp>
+          <p:nvSpPr>
+            <p:cNvPr id="6" name="TextBox 5">
+              <a:extLst>
+                <a:ext uri="{FF2B5EF4-FFF2-40B4-BE49-F238E27FC236}">
+                  <a16:creationId xmlns:a16="http://schemas.microsoft.com/office/drawing/2014/main" id="{9F4F34E6-3A7F-E212-23B8-55AAF04035B4}"/>
+                </a:ext>
+              </a:extLst>
+            </p:cNvPr>
+            <p:cNvSpPr txBox="1"/>
+            <p:nvPr/>
+          </p:nvSpPr>
+          <p:spPr>
+            <a:xfrm>
+              <a:off x="435429" y="1569488"/>
+              <a:ext cx="10918372" cy="4801314"/>
+            </a:xfrm>
+            <a:prstGeom prst="rect">
+              <a:avLst/>
+            </a:prstGeom>
+            <a:solidFill>
+              <a:schemeClr val="bg1">
+                <a:lumMod val="85000"/>
+              </a:schemeClr>
+            </a:solidFill>
+            <a:ln>
+              <a:solidFill>
+                <a:schemeClr val="tx1"/>
+              </a:solidFill>
+            </a:ln>
+          </p:spPr>
+          <p:txBody>
+            <a:bodyPr wrap="square" rtlCol="0">
+              <a:spAutoFit/>
+            </a:bodyPr>
+            <a:lstStyle/>
+            <a:p>
+              <a:pPr lvl="0">
+                <a:defRPr/>
+              </a:pPr>
+              <a:r>
+                <a:rPr lang="en-US" dirty="0">
+                  <a:solidFill>
+                    <a:prstClr val="black"/>
+                  </a:solidFill>
+                  <a:latin typeface="Courier New" pitchFamily="49" charset="0"/>
+                  <a:cs typeface="Courier New" pitchFamily="49" charset="0"/>
+                  <a:sym typeface="Symbol" panose="05050102010706020507" pitchFamily="18" charset="2"/>
+                </a:rPr>
+                <a:t></a:t>
+              </a:r>
+              <a:endParaRPr lang="en-US" dirty="0">
+                <a:solidFill>
+                  <a:prstClr val="black"/>
+                </a:solidFill>
+                <a:latin typeface="Courier New" pitchFamily="49" charset="0"/>
+                <a:cs typeface="Courier New" pitchFamily="49" charset="0"/>
+              </a:endParaRPr>
+            </a:p>
+            <a:p>
+              <a:pPr lvl="0">
+                <a:defRPr/>
+              </a:pPr>
+              <a:r>
+                <a:rPr lang="en-US" dirty="0">
+                  <a:solidFill>
+                    <a:prstClr val="black"/>
+                  </a:solidFill>
+                  <a:latin typeface="Courier New" pitchFamily="49" charset="0"/>
+                  <a:cs typeface="Courier New" pitchFamily="49" charset="0"/>
+                </a:rPr>
+                <a:t>#include "</a:t>
+              </a:r>
+              <a:r>
+                <a:rPr lang="en-US" dirty="0" err="1">
+                  <a:solidFill>
+                    <a:prstClr val="black"/>
+                  </a:solidFill>
+                  <a:latin typeface="Courier New" pitchFamily="49" charset="0"/>
+                  <a:cs typeface="Courier New" pitchFamily="49" charset="0"/>
+                </a:rPr>
+                <a:t>simulation.h</a:t>
+              </a:r>
+              <a:r>
+                <a:rPr lang="en-US" dirty="0">
+                  <a:solidFill>
+                    <a:prstClr val="black"/>
+                  </a:solidFill>
+                  <a:latin typeface="Courier New" pitchFamily="49" charset="0"/>
+                  <a:cs typeface="Courier New" pitchFamily="49" charset="0"/>
+                </a:rPr>
+                <a:t>"</a:t>
+              </a:r>
+            </a:p>
+            <a:p>
+              <a:pPr lvl="0">
+                <a:defRPr/>
+              </a:pPr>
+              <a:endParaRPr lang="en-US" dirty="0">
+                <a:solidFill>
+                  <a:prstClr val="black"/>
+                </a:solidFill>
+                <a:latin typeface="Courier New" pitchFamily="49" charset="0"/>
+                <a:cs typeface="Courier New" pitchFamily="49" charset="0"/>
+              </a:endParaRPr>
+            </a:p>
+            <a:p>
+              <a:pPr lvl="0">
+                <a:defRPr/>
+              </a:pPr>
+              <a:r>
+                <a:rPr lang="en-US" dirty="0">
+                  <a:solidFill>
+                    <a:prstClr val="black"/>
+                  </a:solidFill>
+                  <a:latin typeface="Courier New" pitchFamily="49" charset="0"/>
+                  <a:cs typeface="Courier New" pitchFamily="49" charset="0"/>
+                </a:rPr>
+                <a:t>using Distribution = std::array&lt;std::</a:t>
+              </a:r>
+              <a:r>
+                <a:rPr lang="en-US" dirty="0" err="1">
+                  <a:solidFill>
+                    <a:prstClr val="black"/>
+                  </a:solidFill>
+                  <a:latin typeface="Courier New" pitchFamily="49" charset="0"/>
+                  <a:cs typeface="Courier New" pitchFamily="49" charset="0"/>
+                </a:rPr>
+                <a:t>size_t</a:t>
+              </a:r>
+              <a:r>
+                <a:rPr lang="en-US" dirty="0">
+                  <a:solidFill>
+                    <a:prstClr val="black"/>
+                  </a:solidFill>
+                  <a:latin typeface="Courier New" pitchFamily="49" charset="0"/>
+                  <a:cs typeface="Courier New" pitchFamily="49" charset="0"/>
+                </a:rPr>
+                <a:t>, 6&gt;;</a:t>
+              </a:r>
+            </a:p>
+            <a:p>
+              <a:pPr lvl="0">
+                <a:defRPr/>
+              </a:pPr>
+              <a:endParaRPr lang="en-US" dirty="0">
+                <a:solidFill>
+                  <a:prstClr val="black"/>
+                </a:solidFill>
+                <a:latin typeface="Courier New" pitchFamily="49" charset="0"/>
+                <a:cs typeface="Courier New" pitchFamily="49" charset="0"/>
+              </a:endParaRPr>
+            </a:p>
+            <a:p>
+              <a:pPr lvl="0">
+                <a:defRPr/>
+              </a:pPr>
+              <a:r>
+                <a:rPr lang="en-US" dirty="0">
+                  <a:solidFill>
+                    <a:prstClr val="black"/>
+                  </a:solidFill>
+                  <a:latin typeface="Courier New" pitchFamily="49" charset="0"/>
+                  <a:cs typeface="Courier New" pitchFamily="49" charset="0"/>
+                </a:rPr>
+                <a:t>struct </a:t>
+              </a:r>
+              <a:r>
+                <a:rPr lang="en-US" dirty="0" err="1">
+                  <a:solidFill>
+                    <a:prstClr val="black"/>
+                  </a:solidFill>
+                  <a:latin typeface="Courier New" pitchFamily="49" charset="0"/>
+                  <a:cs typeface="Courier New" pitchFamily="49" charset="0"/>
+                </a:rPr>
+                <a:t>DiceAvgSimulation</a:t>
+              </a:r>
+              <a:r>
+                <a:rPr lang="en-US" dirty="0">
+                  <a:solidFill>
+                    <a:prstClr val="black"/>
+                  </a:solidFill>
+                  <a:latin typeface="Courier New" pitchFamily="49" charset="0"/>
+                  <a:cs typeface="Courier New" pitchFamily="49" charset="0"/>
+                </a:rPr>
+                <a:t> : public </a:t>
+              </a:r>
+              <a:r>
+                <a:rPr lang="en-US" b="1" dirty="0">
+                  <a:solidFill>
+                    <a:srgbClr val="FF0000"/>
+                  </a:solidFill>
+                  <a:latin typeface="Courier New" pitchFamily="49" charset="0"/>
+                  <a:cs typeface="Courier New" pitchFamily="49" charset="0"/>
+                </a:rPr>
+                <a:t>Simulation&lt;</a:t>
+              </a:r>
+              <a:r>
+                <a:rPr lang="en-US" b="1" dirty="0" err="1">
+                  <a:solidFill>
+                    <a:srgbClr val="FF0000"/>
+                  </a:solidFill>
+                  <a:latin typeface="Courier New" pitchFamily="49" charset="0"/>
+                  <a:cs typeface="Courier New" pitchFamily="49" charset="0"/>
+                </a:rPr>
+                <a:t>DiceAvgSimulation</a:t>
+              </a:r>
+              <a:r>
+                <a:rPr lang="en-US" b="1" dirty="0">
+                  <a:solidFill>
+                    <a:srgbClr val="FF0000"/>
+                  </a:solidFill>
+                  <a:latin typeface="Courier New" pitchFamily="49" charset="0"/>
+                  <a:cs typeface="Courier New" pitchFamily="49" charset="0"/>
+                </a:rPr>
+                <a:t>&gt;</a:t>
+              </a:r>
+              <a:r>
+                <a:rPr lang="en-US" dirty="0">
+                  <a:solidFill>
+                    <a:prstClr val="black"/>
+                  </a:solidFill>
+                  <a:latin typeface="Courier New" pitchFamily="49" charset="0"/>
+                  <a:cs typeface="Courier New" pitchFamily="49" charset="0"/>
+                </a:rPr>
+                <a:t> {</a:t>
+              </a:r>
+            </a:p>
+            <a:p>
+              <a:pPr lvl="0">
+                <a:defRPr/>
+              </a:pPr>
+              <a:r>
+                <a:rPr lang="en-US" dirty="0">
+                  <a:solidFill>
+                    <a:prstClr val="black"/>
+                  </a:solidFill>
+                  <a:latin typeface="Courier New" pitchFamily="49" charset="0"/>
+                  <a:cs typeface="Courier New" pitchFamily="49" charset="0"/>
+                </a:rPr>
+                <a:t>    protected:</a:t>
+              </a:r>
+            </a:p>
+            <a:p>
+              <a:pPr lvl="0">
+                <a:defRPr/>
+              </a:pPr>
+              <a:r>
+                <a:rPr lang="en-US" dirty="0">
+                  <a:solidFill>
+                    <a:prstClr val="black"/>
+                  </a:solidFill>
+                  <a:latin typeface="Courier New" pitchFamily="49" charset="0"/>
+                  <a:cs typeface="Courier New" pitchFamily="49" charset="0"/>
+                </a:rPr>
+                <a:t>        std::mt19937_64 engine_;</a:t>
+              </a:r>
+            </a:p>
+            <a:p>
+              <a:pPr lvl="0">
+                <a:defRPr/>
+              </a:pPr>
+              <a:r>
+                <a:rPr lang="en-US" dirty="0">
+                  <a:solidFill>
+                    <a:prstClr val="black"/>
+                  </a:solidFill>
+                  <a:latin typeface="Courier New" pitchFamily="49" charset="0"/>
+                  <a:cs typeface="Courier New" pitchFamily="49" charset="0"/>
+                </a:rPr>
+                <a:t>        std::</a:t>
+              </a:r>
+              <a:r>
+                <a:rPr lang="en-US" dirty="0" err="1">
+                  <a:solidFill>
+                    <a:prstClr val="black"/>
+                  </a:solidFill>
+                  <a:latin typeface="Courier New" pitchFamily="49" charset="0"/>
+                  <a:cs typeface="Courier New" pitchFamily="49" charset="0"/>
+                </a:rPr>
+                <a:t>uniform_int_distribution</a:t>
+              </a:r>
+              <a:r>
+                <a:rPr lang="en-US" dirty="0">
+                  <a:solidFill>
+                    <a:prstClr val="black"/>
+                  </a:solidFill>
+                  <a:latin typeface="Courier New" pitchFamily="49" charset="0"/>
+                  <a:cs typeface="Courier New" pitchFamily="49" charset="0"/>
+                </a:rPr>
+                <a:t>&lt;int&gt; </a:t>
+              </a:r>
+              <a:r>
+                <a:rPr lang="en-US" dirty="0" err="1">
+                  <a:solidFill>
+                    <a:prstClr val="black"/>
+                  </a:solidFill>
+                  <a:latin typeface="Courier New" pitchFamily="49" charset="0"/>
+                  <a:cs typeface="Courier New" pitchFamily="49" charset="0"/>
+                </a:rPr>
+                <a:t>distr</a:t>
+              </a:r>
+              <a:r>
+                <a:rPr lang="en-US" dirty="0">
+                  <a:solidFill>
+                    <a:prstClr val="black"/>
+                  </a:solidFill>
+                  <a:latin typeface="Courier New" pitchFamily="49" charset="0"/>
+                  <a:cs typeface="Courier New" pitchFamily="49" charset="0"/>
+                </a:rPr>
+                <a:t>_ {1, 6};</a:t>
+              </a:r>
+            </a:p>
+            <a:p>
+              <a:pPr lvl="0">
+                <a:defRPr/>
+              </a:pPr>
+              <a:r>
+                <a:rPr lang="en-US" dirty="0">
+                  <a:solidFill>
+                    <a:prstClr val="black"/>
+                  </a:solidFill>
+                  <a:latin typeface="Courier New" pitchFamily="49" charset="0"/>
+                  <a:cs typeface="Courier New" pitchFamily="49" charset="0"/>
+                </a:rPr>
+                <a:t>        Distribution </a:t>
+              </a:r>
+              <a:r>
+                <a:rPr lang="en-US" dirty="0" err="1">
+                  <a:solidFill>
+                    <a:prstClr val="black"/>
+                  </a:solidFill>
+                  <a:latin typeface="Courier New" pitchFamily="49" charset="0"/>
+                  <a:cs typeface="Courier New" pitchFamily="49" charset="0"/>
+                </a:rPr>
+                <a:t>throw_distr</a:t>
+              </a:r>
+              <a:r>
+                <a:rPr lang="en-US" dirty="0">
+                  <a:solidFill>
+                    <a:prstClr val="black"/>
+                  </a:solidFill>
+                  <a:latin typeface="Courier New" pitchFamily="49" charset="0"/>
+                  <a:cs typeface="Courier New" pitchFamily="49" charset="0"/>
+                </a:rPr>
+                <a:t>_ = {0};</a:t>
+              </a:r>
+            </a:p>
+            <a:p>
+              <a:pPr lvl="0">
+                <a:defRPr/>
+              </a:pPr>
+              <a:r>
+                <a:rPr lang="en-US" dirty="0">
+                  <a:solidFill>
+                    <a:prstClr val="black"/>
+                  </a:solidFill>
+                  <a:latin typeface="Courier New" pitchFamily="49" charset="0"/>
+                  <a:cs typeface="Courier New" pitchFamily="49" charset="0"/>
+                </a:rPr>
+                <a:t>    public:</a:t>
+              </a:r>
+            </a:p>
+            <a:p>
+              <a:pPr lvl="0">
+                <a:defRPr/>
+              </a:pPr>
+              <a:r>
+                <a:rPr lang="en-US" dirty="0">
+                  <a:solidFill>
+                    <a:prstClr val="black"/>
+                  </a:solidFill>
+                  <a:latin typeface="Courier New" pitchFamily="49" charset="0"/>
+                  <a:cs typeface="Courier New" pitchFamily="49" charset="0"/>
+                </a:rPr>
+                <a:t>        void seed(const std::</a:t>
+              </a:r>
+              <a:r>
+                <a:rPr lang="en-US" dirty="0" err="1">
+                  <a:solidFill>
+                    <a:prstClr val="black"/>
+                  </a:solidFill>
+                  <a:latin typeface="Courier New" pitchFamily="49" charset="0"/>
+                  <a:cs typeface="Courier New" pitchFamily="49" charset="0"/>
+                </a:rPr>
+                <a:t>size_t</a:t>
+              </a:r>
+              <a:r>
+                <a:rPr lang="en-US" dirty="0">
+                  <a:solidFill>
+                    <a:prstClr val="black"/>
+                  </a:solidFill>
+                  <a:latin typeface="Courier New" pitchFamily="49" charset="0"/>
+                  <a:cs typeface="Courier New" pitchFamily="49" charset="0"/>
+                </a:rPr>
+                <a:t> </a:t>
+              </a:r>
+              <a:r>
+                <a:rPr lang="en-US" dirty="0" err="1">
+                  <a:solidFill>
+                    <a:prstClr val="black"/>
+                  </a:solidFill>
+                  <a:latin typeface="Courier New" pitchFamily="49" charset="0"/>
+                  <a:cs typeface="Courier New" pitchFamily="49" charset="0"/>
+                </a:rPr>
+                <a:t>seed_value</a:t>
+              </a:r>
+              <a:r>
+                <a:rPr lang="en-US" dirty="0">
+                  <a:solidFill>
+                    <a:prstClr val="black"/>
+                  </a:solidFill>
+                  <a:latin typeface="Courier New" pitchFamily="49" charset="0"/>
+                  <a:cs typeface="Courier New" pitchFamily="49" charset="0"/>
+                </a:rPr>
+                <a:t>) { </a:t>
+              </a:r>
+              <a:r>
+                <a:rPr lang="en-US" dirty="0" err="1">
+                  <a:solidFill>
+                    <a:prstClr val="black"/>
+                  </a:solidFill>
+                  <a:latin typeface="Courier New" pitchFamily="49" charset="0"/>
+                  <a:cs typeface="Courier New" pitchFamily="49" charset="0"/>
+                </a:rPr>
+                <a:t>engine_.seed</a:t>
+              </a:r>
+              <a:r>
+                <a:rPr lang="en-US" dirty="0">
+                  <a:solidFill>
+                    <a:prstClr val="black"/>
+                  </a:solidFill>
+                  <a:latin typeface="Courier New" pitchFamily="49" charset="0"/>
+                  <a:cs typeface="Courier New" pitchFamily="49" charset="0"/>
+                </a:rPr>
+                <a:t>(</a:t>
+              </a:r>
+              <a:r>
+                <a:rPr lang="en-US" dirty="0" err="1">
+                  <a:solidFill>
+                    <a:prstClr val="black"/>
+                  </a:solidFill>
+                  <a:latin typeface="Courier New" pitchFamily="49" charset="0"/>
+                  <a:cs typeface="Courier New" pitchFamily="49" charset="0"/>
+                </a:rPr>
+                <a:t>seed_value</a:t>
+              </a:r>
+              <a:r>
+                <a:rPr lang="en-US" dirty="0">
+                  <a:solidFill>
+                    <a:prstClr val="black"/>
+                  </a:solidFill>
+                  <a:latin typeface="Courier New" pitchFamily="49" charset="0"/>
+                  <a:cs typeface="Courier New" pitchFamily="49" charset="0"/>
+                </a:rPr>
+                <a:t>); }</a:t>
+              </a:r>
+            </a:p>
+            <a:p>
+              <a:pPr lvl="0">
+                <a:defRPr/>
+              </a:pPr>
+              <a:r>
+                <a:rPr lang="en-US" dirty="0">
+                  <a:solidFill>
+                    <a:prstClr val="black"/>
+                  </a:solidFill>
+                  <a:latin typeface="Courier New" pitchFamily="49" charset="0"/>
+                  <a:cs typeface="Courier New" pitchFamily="49" charset="0"/>
+                </a:rPr>
+                <a:t>        void </a:t>
+              </a:r>
+              <a:r>
+                <a:rPr lang="en-US" b="1" dirty="0" err="1">
+                  <a:solidFill>
+                    <a:srgbClr val="FF0000"/>
+                  </a:solidFill>
+                  <a:latin typeface="Courier New" pitchFamily="49" charset="0"/>
+                  <a:cs typeface="Courier New" pitchFamily="49" charset="0"/>
+                </a:rPr>
+                <a:t>step_implementation</a:t>
+              </a:r>
+              <a:r>
+                <a:rPr lang="en-US" dirty="0">
+                  <a:solidFill>
+                    <a:prstClr val="black"/>
+                  </a:solidFill>
+                  <a:latin typeface="Courier New" pitchFamily="49" charset="0"/>
+                  <a:cs typeface="Courier New" pitchFamily="49" charset="0"/>
+                </a:rPr>
+                <a:t>() {</a:t>
+              </a:r>
+            </a:p>
+            <a:p>
+              <a:pPr lvl="0">
+                <a:defRPr/>
+              </a:pPr>
+              <a:r>
+                <a:rPr lang="en-US" dirty="0">
+                  <a:solidFill>
+                    <a:prstClr val="black"/>
+                  </a:solidFill>
+                  <a:latin typeface="Courier New" pitchFamily="49" charset="0"/>
+                  <a:cs typeface="Courier New" pitchFamily="49" charset="0"/>
+                </a:rPr>
+                <a:t>            </a:t>
+              </a:r>
+              <a:r>
+                <a:rPr lang="en-US" dirty="0" err="1">
+                  <a:solidFill>
+                    <a:prstClr val="black"/>
+                  </a:solidFill>
+                  <a:latin typeface="Courier New" pitchFamily="49" charset="0"/>
+                  <a:cs typeface="Courier New" pitchFamily="49" charset="0"/>
+                </a:rPr>
+                <a:t>throw_distr</a:t>
+              </a:r>
+              <a:r>
+                <a:rPr lang="en-US" dirty="0">
+                  <a:solidFill>
+                    <a:prstClr val="black"/>
+                  </a:solidFill>
+                  <a:latin typeface="Courier New" pitchFamily="49" charset="0"/>
+                  <a:cs typeface="Courier New" pitchFamily="49" charset="0"/>
+                </a:rPr>
+                <a:t>_[</a:t>
+              </a:r>
+              <a:r>
+                <a:rPr lang="en-US" dirty="0" err="1">
+                  <a:solidFill>
+                    <a:prstClr val="black"/>
+                  </a:solidFill>
+                  <a:latin typeface="Courier New" pitchFamily="49" charset="0"/>
+                  <a:cs typeface="Courier New" pitchFamily="49" charset="0"/>
+                </a:rPr>
+                <a:t>distr</a:t>
+              </a:r>
+              <a:r>
+                <a:rPr lang="en-US" dirty="0">
+                  <a:solidFill>
+                    <a:prstClr val="black"/>
+                  </a:solidFill>
+                  <a:latin typeface="Courier New" pitchFamily="49" charset="0"/>
+                  <a:cs typeface="Courier New" pitchFamily="49" charset="0"/>
+                </a:rPr>
+                <a:t>_(engine_) - 1]++;</a:t>
+              </a:r>
+            </a:p>
+            <a:p>
+              <a:pPr lvl="0">
+                <a:defRPr/>
+              </a:pPr>
+              <a:r>
+                <a:rPr lang="en-US" dirty="0">
+                  <a:solidFill>
+                    <a:prstClr val="black"/>
+                  </a:solidFill>
+                  <a:latin typeface="Courier New" pitchFamily="49" charset="0"/>
+                  <a:cs typeface="Courier New" pitchFamily="49" charset="0"/>
+                </a:rPr>
+                <a:t>        };</a:t>
+              </a:r>
+            </a:p>
+            <a:p>
+              <a:pPr lvl="0">
+                <a:defRPr/>
+              </a:pPr>
+              <a:r>
+                <a:rPr lang="en-US" dirty="0">
+                  <a:solidFill>
+                    <a:prstClr val="black"/>
+                  </a:solidFill>
+                  <a:latin typeface="Courier New" pitchFamily="49" charset="0"/>
+                  <a:cs typeface="Courier New" pitchFamily="49" charset="0"/>
+                </a:rPr>
+                <a:t>        const Distribution&amp; distribution() const { return </a:t>
+              </a:r>
+              <a:r>
+                <a:rPr lang="en-US" dirty="0" err="1">
+                  <a:solidFill>
+                    <a:prstClr val="black"/>
+                  </a:solidFill>
+                  <a:latin typeface="Courier New" pitchFamily="49" charset="0"/>
+                  <a:cs typeface="Courier New" pitchFamily="49" charset="0"/>
+                </a:rPr>
+                <a:t>throw_distr</a:t>
+              </a:r>
+              <a:r>
+                <a:rPr lang="en-US" dirty="0">
+                  <a:solidFill>
+                    <a:prstClr val="black"/>
+                  </a:solidFill>
+                  <a:latin typeface="Courier New" pitchFamily="49" charset="0"/>
+                  <a:cs typeface="Courier New" pitchFamily="49" charset="0"/>
+                </a:rPr>
+                <a:t>_; }</a:t>
+              </a:r>
+            </a:p>
+            <a:p>
+              <a:pPr lvl="0">
+                <a:defRPr/>
+              </a:pPr>
+              <a:r>
+                <a:rPr lang="en-US" dirty="0">
+                  <a:solidFill>
+                    <a:prstClr val="black"/>
+                  </a:solidFill>
+                  <a:latin typeface="Courier New" pitchFamily="49" charset="0"/>
+                  <a:cs typeface="Courier New" pitchFamily="49" charset="0"/>
+                </a:rPr>
+                <a:t>};</a:t>
+              </a:r>
+              <a:endParaRPr kumimoji="0" lang="en-US" sz="1800" b="0" i="0" u="none" strike="noStrike" kern="1200" cap="none" spc="0" normalizeH="0" baseline="0" noProof="0" dirty="0">
+                <a:ln>
+                  <a:noFill/>
+                </a:ln>
+                <a:solidFill>
+                  <a:prstClr val="black"/>
+                </a:solidFill>
+                <a:effectLst/>
+                <a:uLnTx/>
+                <a:uFillTx/>
+                <a:latin typeface="Courier New" pitchFamily="49" charset="0"/>
+                <a:ea typeface="+mn-ea"/>
+                <a:cs typeface="Courier New" pitchFamily="49" charset="0"/>
+              </a:endParaRPr>
+            </a:p>
+          </p:txBody>
+        </p:sp>
+        <p:sp>
+          <p:nvSpPr>
+            <p:cNvPr id="7" name="TextBox 6">
+              <a:extLst>
+                <a:ext uri="{FF2B5EF4-FFF2-40B4-BE49-F238E27FC236}">
+                  <a16:creationId xmlns:a16="http://schemas.microsoft.com/office/drawing/2014/main" id="{4C007B6B-E184-723B-1236-E1C0C51E9351}"/>
+                </a:ext>
+              </a:extLst>
+            </p:cNvPr>
+            <p:cNvSpPr txBox="1"/>
+            <p:nvPr/>
+          </p:nvSpPr>
+          <p:spPr>
+            <a:xfrm>
+              <a:off x="8566729" y="1569488"/>
+              <a:ext cx="2776722" cy="338554"/>
+            </a:xfrm>
+            <a:prstGeom prst="rect">
+              <a:avLst/>
+            </a:prstGeom>
+            <a:solidFill>
+              <a:schemeClr val="bg1"/>
+            </a:solidFill>
+            <a:ln>
+              <a:solidFill>
+                <a:schemeClr val="tx1"/>
+              </a:solidFill>
+            </a:ln>
+          </p:spPr>
+          <p:txBody>
+            <a:bodyPr wrap="none" rtlCol="0">
+              <a:spAutoFit/>
+            </a:bodyPr>
+            <a:lstStyle/>
+            <a:p>
+              <a:r>
+                <a:rPr lang="en-US" sz="1600" dirty="0" err="1">
+                  <a:latin typeface="Courier New" panose="02070309020205020404" pitchFamily="49" charset="0"/>
+                  <a:cs typeface="Courier New" panose="02070309020205020404" pitchFamily="49" charset="0"/>
+                </a:rPr>
+                <a:t>dice_avg_simulation.h</a:t>
+              </a:r>
+              <a:endParaRPr lang="LID4096" sz="1600" dirty="0">
+                <a:latin typeface="Courier New" panose="02070309020205020404" pitchFamily="49" charset="0"/>
+                <a:cs typeface="Courier New" panose="02070309020205020404" pitchFamily="49" charset="0"/>
+              </a:endParaRPr>
+            </a:p>
+          </p:txBody>
+        </p:sp>
+      </p:grpSp>
+    </p:spTree>
+    <p:extLst>
+      <p:ext uri="{BB962C8B-B14F-4D97-AF65-F5344CB8AC3E}">
+        <p14:creationId xmlns:p14="http://schemas.microsoft.com/office/powerpoint/2010/main" val="2362631166"/>
+      </p:ext>
+    </p:extLst>
+  </p:cSld>
+  <p:clrMapOvr>
+    <a:masterClrMapping/>
+  </p:clrMapOvr>
+</p:sld>
+</file>
+
+<file path=ppt/slides/slide45.xml><?xml version="1.0" encoding="utf-8"?>
+<p:sld xmlns:a="http://schemas.openxmlformats.org/drawingml/2006/main" xmlns:r="http://schemas.openxmlformats.org/officeDocument/2006/relationships" xmlns:p="http://schemas.openxmlformats.org/presentationml/2006/main">
+  <p:cSld>
+    <p:spTree>
+      <p:nvGrpSpPr>
+        <p:cNvPr id="1" name=""/>
+        <p:cNvGrpSpPr/>
+        <p:nvPr/>
+      </p:nvGrpSpPr>
+      <p:grpSpPr>
+        <a:xfrm>
+          <a:off x="0" y="0"/>
+          <a:ext cx="0" cy="0"/>
+          <a:chOff x="0" y="0"/>
+          <a:chExt cx="0" cy="0"/>
+        </a:xfrm>
+      </p:grpSpPr>
+      <p:sp>
+        <p:nvSpPr>
+          <p:cNvPr id="2" name="Title 1">
+            <a:extLst>
+              <a:ext uri="{FF2B5EF4-FFF2-40B4-BE49-F238E27FC236}">
+                <a16:creationId xmlns:a16="http://schemas.microsoft.com/office/drawing/2014/main" id="{F744603A-1F27-3EED-2E6A-C27A51F7357A}"/>
+              </a:ext>
+            </a:extLst>
+          </p:cNvPr>
+          <p:cNvSpPr>
+            <a:spLocks noGrp="1"/>
+          </p:cNvSpPr>
+          <p:nvPr>
+            <p:ph type="title"/>
+          </p:nvPr>
+        </p:nvSpPr>
+        <p:spPr/>
+        <p:txBody>
+          <a:bodyPr/>
+          <a:lstStyle/>
+          <a:p>
+            <a:r>
+              <a:rPr lang="en-US" dirty="0"/>
+              <a:t>CRTP: usage</a:t>
+            </a:r>
+            <a:endParaRPr lang="LID4096" dirty="0"/>
+          </a:p>
+        </p:txBody>
+      </p:sp>
+      <p:sp>
+        <p:nvSpPr>
+          <p:cNvPr id="3" name="Slide Number Placeholder 2">
+            <a:extLst>
+              <a:ext uri="{FF2B5EF4-FFF2-40B4-BE49-F238E27FC236}">
+                <a16:creationId xmlns:a16="http://schemas.microsoft.com/office/drawing/2014/main" id="{E0D2256B-CB94-D51D-DB6F-45881B04579F}"/>
+              </a:ext>
+            </a:extLst>
+          </p:cNvPr>
+          <p:cNvSpPr>
+            <a:spLocks noGrp="1"/>
+          </p:cNvSpPr>
+          <p:nvPr>
+            <p:ph type="sldNum" sz="quarter" idx="12"/>
+          </p:nvPr>
+        </p:nvSpPr>
+        <p:spPr/>
+        <p:txBody>
+          <a:bodyPr/>
+          <a:lstStyle/>
+          <a:p>
+            <a:fld id="{FDB1AA33-DFBB-49AC-8CEE-23FFECEB5648}" type="slidenum">
+              <a:rPr lang="LID4096" smtClean="0"/>
+              <a:t>45</a:t>
+            </a:fld>
+            <a:endParaRPr lang="LID4096"/>
+          </a:p>
+        </p:txBody>
+      </p:sp>
+      <p:grpSp>
+        <p:nvGrpSpPr>
+          <p:cNvPr id="5" name="Group 4">
+            <a:extLst>
+              <a:ext uri="{FF2B5EF4-FFF2-40B4-BE49-F238E27FC236}">
+                <a16:creationId xmlns:a16="http://schemas.microsoft.com/office/drawing/2014/main" id="{38534744-3258-DB34-866B-761699A9A246}"/>
+              </a:ext>
+            </a:extLst>
+          </p:cNvPr>
+          <p:cNvGrpSpPr/>
+          <p:nvPr/>
+        </p:nvGrpSpPr>
+        <p:grpSpPr>
+          <a:xfrm>
+            <a:off x="533400" y="1997839"/>
+            <a:ext cx="10918372" cy="2585323"/>
+            <a:chOff x="435429" y="1569488"/>
+            <a:chExt cx="10918372" cy="2585323"/>
+          </a:xfrm>
+        </p:grpSpPr>
+        <p:sp>
+          <p:nvSpPr>
+            <p:cNvPr id="6" name="TextBox 5">
+              <a:extLst>
+                <a:ext uri="{FF2B5EF4-FFF2-40B4-BE49-F238E27FC236}">
+                  <a16:creationId xmlns:a16="http://schemas.microsoft.com/office/drawing/2014/main" id="{9FB38179-30D7-CD6C-1A2C-713D34181C14}"/>
+                </a:ext>
+              </a:extLst>
+            </p:cNvPr>
+            <p:cNvSpPr txBox="1"/>
+            <p:nvPr/>
+          </p:nvSpPr>
+          <p:spPr>
+            <a:xfrm>
+              <a:off x="435429" y="1569488"/>
+              <a:ext cx="10918372" cy="2585323"/>
+            </a:xfrm>
+            <a:prstGeom prst="rect">
+              <a:avLst/>
+            </a:prstGeom>
+            <a:solidFill>
+              <a:schemeClr val="bg1">
+                <a:lumMod val="85000"/>
+              </a:schemeClr>
+            </a:solidFill>
+            <a:ln>
+              <a:solidFill>
+                <a:schemeClr val="tx1"/>
+              </a:solidFill>
+            </a:ln>
+          </p:spPr>
+          <p:txBody>
+            <a:bodyPr wrap="square" rtlCol="0">
+              <a:spAutoFit/>
+            </a:bodyPr>
+            <a:lstStyle/>
+            <a:p>
+              <a:pPr lvl="0">
+                <a:defRPr/>
+              </a:pPr>
+              <a:r>
+                <a:rPr lang="en-US" dirty="0">
+                  <a:solidFill>
+                    <a:prstClr val="black"/>
+                  </a:solidFill>
+                  <a:latin typeface="Courier New" pitchFamily="49" charset="0"/>
+                  <a:cs typeface="Courier New" pitchFamily="49" charset="0"/>
+                  <a:sym typeface="Symbol" panose="05050102010706020507" pitchFamily="18" charset="2"/>
+                </a:rPr>
+                <a:t></a:t>
+              </a:r>
+              <a:endParaRPr lang="en-US" dirty="0">
+                <a:solidFill>
+                  <a:prstClr val="black"/>
+                </a:solidFill>
+                <a:latin typeface="Courier New" pitchFamily="49" charset="0"/>
+                <a:cs typeface="Courier New" pitchFamily="49" charset="0"/>
+              </a:endParaRPr>
+            </a:p>
+            <a:p>
+              <a:pPr lvl="0">
+                <a:defRPr/>
+              </a:pPr>
+              <a:r>
+                <a:rPr lang="en-US" dirty="0">
+                  <a:solidFill>
+                    <a:prstClr val="black"/>
+                  </a:solidFill>
+                  <a:latin typeface="Courier New" pitchFamily="49" charset="0"/>
+                  <a:cs typeface="Courier New" pitchFamily="49" charset="0"/>
+                </a:rPr>
+                <a:t>#include "</a:t>
+              </a:r>
+              <a:r>
+                <a:rPr lang="en-US" dirty="0" err="1">
+                  <a:solidFill>
+                    <a:prstClr val="black"/>
+                  </a:solidFill>
+                  <a:latin typeface="Courier New" pitchFamily="49" charset="0"/>
+                  <a:cs typeface="Courier New" pitchFamily="49" charset="0"/>
+                </a:rPr>
+                <a:t>dice_simulation.h</a:t>
+              </a:r>
+              <a:r>
+                <a:rPr lang="en-US" dirty="0">
+                  <a:solidFill>
+                    <a:prstClr val="black"/>
+                  </a:solidFill>
+                  <a:latin typeface="Courier New" pitchFamily="49" charset="0"/>
+                  <a:cs typeface="Courier New" pitchFamily="49" charset="0"/>
+                </a:rPr>
+                <a:t>"</a:t>
+              </a:r>
+            </a:p>
+            <a:p>
+              <a:pPr lvl="0">
+                <a:defRPr/>
+              </a:pPr>
+              <a:endParaRPr lang="en-US" dirty="0">
+                <a:solidFill>
+                  <a:prstClr val="black"/>
+                </a:solidFill>
+                <a:latin typeface="Courier New" pitchFamily="49" charset="0"/>
+                <a:cs typeface="Courier New" pitchFamily="49" charset="0"/>
+              </a:endParaRPr>
+            </a:p>
+            <a:p>
+              <a:pPr lvl="0">
+                <a:defRPr/>
+              </a:pPr>
+              <a:r>
+                <a:rPr lang="en-US" dirty="0">
+                  <a:solidFill>
+                    <a:prstClr val="black"/>
+                  </a:solidFill>
+                  <a:latin typeface="Courier New" pitchFamily="49" charset="0"/>
+                  <a:cs typeface="Courier New" pitchFamily="49" charset="0"/>
+                </a:rPr>
+                <a:t>int main() {</a:t>
+              </a:r>
+            </a:p>
+            <a:p>
+              <a:pPr lvl="0">
+                <a:defRPr/>
+              </a:pPr>
+              <a:r>
+                <a:rPr lang="en-US" dirty="0">
+                  <a:solidFill>
+                    <a:prstClr val="black"/>
+                  </a:solidFill>
+                  <a:latin typeface="Courier New" pitchFamily="49" charset="0"/>
+                  <a:cs typeface="Courier New" pitchFamily="49" charset="0"/>
+                </a:rPr>
+                <a:t>    </a:t>
+              </a:r>
+              <a:r>
+                <a:rPr lang="en-US" dirty="0" err="1">
+                  <a:solidFill>
+                    <a:prstClr val="black"/>
+                  </a:solidFill>
+                  <a:latin typeface="Courier New" pitchFamily="49" charset="0"/>
+                  <a:cs typeface="Courier New" pitchFamily="49" charset="0"/>
+                </a:rPr>
+                <a:t>DiceSimulation</a:t>
+              </a:r>
+              <a:r>
+                <a:rPr lang="en-US" dirty="0">
+                  <a:solidFill>
+                    <a:prstClr val="black"/>
+                  </a:solidFill>
+                  <a:latin typeface="Courier New" pitchFamily="49" charset="0"/>
+                  <a:cs typeface="Courier New" pitchFamily="49" charset="0"/>
+                </a:rPr>
+                <a:t> simulation;</a:t>
+              </a:r>
+            </a:p>
+            <a:p>
+              <a:pPr lvl="0">
+                <a:defRPr/>
+              </a:pPr>
+              <a:r>
+                <a:rPr lang="en-US" dirty="0">
+                  <a:solidFill>
+                    <a:prstClr val="black"/>
+                  </a:solidFill>
+                  <a:latin typeface="Courier New" pitchFamily="49" charset="0"/>
+                  <a:cs typeface="Courier New" pitchFamily="49" charset="0"/>
+                </a:rPr>
+                <a:t>    </a:t>
+              </a:r>
+              <a:r>
+                <a:rPr lang="en-US" dirty="0" err="1">
+                  <a:solidFill>
+                    <a:prstClr val="black"/>
+                  </a:solidFill>
+                  <a:latin typeface="Courier New" pitchFamily="49" charset="0"/>
+                  <a:cs typeface="Courier New" pitchFamily="49" charset="0"/>
+                </a:rPr>
+                <a:t>simulation.seed</a:t>
+              </a:r>
+              <a:r>
+                <a:rPr lang="en-US" dirty="0">
+                  <a:solidFill>
+                    <a:prstClr val="black"/>
+                  </a:solidFill>
+                  <a:latin typeface="Courier New" pitchFamily="49" charset="0"/>
+                  <a:cs typeface="Courier New" pitchFamily="49" charset="0"/>
+                </a:rPr>
+                <a:t>(1234);</a:t>
+              </a:r>
+            </a:p>
+            <a:p>
+              <a:pPr lvl="0">
+                <a:defRPr/>
+              </a:pPr>
+              <a:r>
+                <a:rPr lang="en-US" dirty="0">
+                  <a:solidFill>
+                    <a:prstClr val="black"/>
+                  </a:solidFill>
+                  <a:latin typeface="Courier New" pitchFamily="49" charset="0"/>
+                  <a:cs typeface="Courier New" pitchFamily="49" charset="0"/>
+                </a:rPr>
+                <a:t>    </a:t>
+              </a:r>
+              <a:r>
+                <a:rPr lang="en-US" dirty="0" err="1">
+                  <a:solidFill>
+                    <a:prstClr val="black"/>
+                  </a:solidFill>
+                  <a:latin typeface="Courier New" pitchFamily="49" charset="0"/>
+                  <a:cs typeface="Courier New" pitchFamily="49" charset="0"/>
+                </a:rPr>
+                <a:t>simulation.run</a:t>
+              </a:r>
+              <a:r>
+                <a:rPr lang="en-US" dirty="0">
+                  <a:solidFill>
+                    <a:prstClr val="black"/>
+                  </a:solidFill>
+                  <a:latin typeface="Courier New" pitchFamily="49" charset="0"/>
+                  <a:cs typeface="Courier New" pitchFamily="49" charset="0"/>
+                </a:rPr>
+                <a:t>(10);</a:t>
+              </a:r>
+            </a:p>
+            <a:p>
+              <a:pPr lvl="0">
+                <a:defRPr/>
+              </a:pPr>
+              <a:r>
+                <a:rPr lang="en-US" dirty="0">
+                  <a:solidFill>
+                    <a:prstClr val="black"/>
+                  </a:solidFill>
+                  <a:latin typeface="Courier New" pitchFamily="49" charset="0"/>
+                  <a:cs typeface="Courier New" pitchFamily="49" charset="0"/>
+                </a:rPr>
+                <a:t>    return 0;</a:t>
+              </a:r>
+            </a:p>
+            <a:p>
+              <a:pPr lvl="0">
+                <a:defRPr/>
+              </a:pPr>
+              <a:r>
+                <a:rPr lang="en-US" dirty="0">
+                  <a:solidFill>
+                    <a:prstClr val="black"/>
+                  </a:solidFill>
+                  <a:latin typeface="Courier New" pitchFamily="49" charset="0"/>
+                  <a:cs typeface="Courier New" pitchFamily="49" charset="0"/>
+                </a:rPr>
+                <a:t>}</a:t>
+              </a:r>
+            </a:p>
+          </p:txBody>
+        </p:sp>
+        <p:sp>
+          <p:nvSpPr>
+            <p:cNvPr id="7" name="TextBox 6">
+              <a:extLst>
+                <a:ext uri="{FF2B5EF4-FFF2-40B4-BE49-F238E27FC236}">
+                  <a16:creationId xmlns:a16="http://schemas.microsoft.com/office/drawing/2014/main" id="{ED07F3CC-91D8-8B6B-F98C-5BAF30813DAB}"/>
+                </a:ext>
+              </a:extLst>
+            </p:cNvPr>
+            <p:cNvSpPr txBox="1"/>
+            <p:nvPr/>
+          </p:nvSpPr>
+          <p:spPr>
+            <a:xfrm>
+              <a:off x="9557327" y="1569488"/>
+              <a:ext cx="1789272" cy="338554"/>
+            </a:xfrm>
+            <a:prstGeom prst="rect">
+              <a:avLst/>
+            </a:prstGeom>
+            <a:solidFill>
+              <a:schemeClr val="bg1"/>
+            </a:solidFill>
+            <a:ln>
+              <a:solidFill>
+                <a:schemeClr val="tx1"/>
+              </a:solidFill>
+            </a:ln>
+          </p:spPr>
+          <p:txBody>
+            <a:bodyPr wrap="none" rtlCol="0">
+              <a:spAutoFit/>
+            </a:bodyPr>
+            <a:lstStyle/>
+            <a:p>
+              <a:r>
+                <a:rPr lang="en-US" sz="1600" dirty="0">
+                  <a:latin typeface="Courier New" panose="02070309020205020404" pitchFamily="49" charset="0"/>
+                  <a:cs typeface="Courier New" panose="02070309020205020404" pitchFamily="49" charset="0"/>
+                </a:rPr>
+                <a:t>main_dice.cpp</a:t>
+              </a:r>
+              <a:endParaRPr lang="LID4096" sz="1600" dirty="0">
+                <a:latin typeface="Courier New" panose="02070309020205020404" pitchFamily="49" charset="0"/>
+                <a:cs typeface="Courier New" panose="02070309020205020404" pitchFamily="49" charset="0"/>
+              </a:endParaRPr>
+            </a:p>
+          </p:txBody>
+        </p:sp>
+      </p:grpSp>
+    </p:spTree>
+    <p:extLst>
+      <p:ext uri="{BB962C8B-B14F-4D97-AF65-F5344CB8AC3E}">
+        <p14:creationId xmlns:p14="http://schemas.microsoft.com/office/powerpoint/2010/main" val="542009304"/>
+      </p:ext>
+    </p:extLst>
+  </p:cSld>
+  <p:clrMapOvr>
+    <a:masterClrMapping/>
+  </p:clrMapOvr>
 </p:sld>
 </file>
 

</xml_diff>

<commit_message>
Update references to illustrations of functional approaches
</commit_message>
<xml_diff>
--- a/cpp_software_engineering.pptx
+++ b/cpp_software_engineering.pptx
@@ -5,7 +5,7 @@
     <p:sldMasterId id="2147483648" r:id="rId1"/>
   </p:sldMasterIdLst>
   <p:notesMasterIdLst>
-    <p:notesMasterId r:id="rId47"/>
+    <p:notesMasterId r:id="rId48"/>
   </p:notesMasterIdLst>
   <p:sldIdLst>
     <p:sldId id="257" r:id="rId2"/>
@@ -45,14 +45,15 @@
     <p:sldId id="388" r:id="rId36"/>
     <p:sldId id="389" r:id="rId37"/>
     <p:sldId id="390" r:id="rId38"/>
-    <p:sldId id="391" r:id="rId39"/>
-    <p:sldId id="392" r:id="rId40"/>
-    <p:sldId id="393" r:id="rId41"/>
-    <p:sldId id="394" r:id="rId42"/>
-    <p:sldId id="395" r:id="rId43"/>
-    <p:sldId id="396" r:id="rId44"/>
-    <p:sldId id="398" r:id="rId45"/>
-    <p:sldId id="397" r:id="rId46"/>
+    <p:sldId id="399" r:id="rId39"/>
+    <p:sldId id="394" r:id="rId40"/>
+    <p:sldId id="395" r:id="rId41"/>
+    <p:sldId id="396" r:id="rId42"/>
+    <p:sldId id="398" r:id="rId43"/>
+    <p:sldId id="397" r:id="rId44"/>
+    <p:sldId id="391" r:id="rId45"/>
+    <p:sldId id="392" r:id="rId46"/>
+    <p:sldId id="393" r:id="rId47"/>
   </p:sldIdLst>
   <p:sldSz cx="12192000" cy="6858000"/>
   <p:notesSz cx="6858000" cy="9144000"/>
@@ -217,6 +218,12 @@
             <p14:sldId id="388"/>
             <p14:sldId id="389"/>
             <p14:sldId id="390"/>
+            <p14:sldId id="399"/>
+            <p14:sldId id="394"/>
+            <p14:sldId id="395"/>
+            <p14:sldId id="396"/>
+            <p14:sldId id="398"/>
+            <p14:sldId id="397"/>
             <p14:sldId id="391"/>
           </p14:sldIdLst>
         </p14:section>
@@ -224,11 +231,6 @@
           <p14:sldIdLst>
             <p14:sldId id="392"/>
             <p14:sldId id="393"/>
-            <p14:sldId id="394"/>
-            <p14:sldId id="395"/>
-            <p14:sldId id="396"/>
-            <p14:sldId id="398"/>
-            <p14:sldId id="397"/>
           </p14:sldIdLst>
         </p14:section>
       </p14:sectionLst>
@@ -17099,7 +17101,13 @@
       </p:grpSpPr>
       <p:sp>
         <p:nvSpPr>
-          <p:cNvPr id="2" name="Title 1"/>
+          <p:cNvPr id="2" name="Title 1">
+            <a:extLst>
+              <a:ext uri="{FF2B5EF4-FFF2-40B4-BE49-F238E27FC236}">
+                <a16:creationId xmlns:a16="http://schemas.microsoft.com/office/drawing/2014/main" id="{04B1C173-33AC-1DCA-ED63-D52D701FC426}"/>
+              </a:ext>
+            </a:extLst>
+          </p:cNvPr>
           <p:cNvSpPr>
             <a:spLocks noGrp="1"/>
           </p:cNvSpPr>
@@ -17114,15 +17122,21 @@
           <a:p>
             <a:r>
               <a:rPr lang="en-US" dirty="0"/>
-              <a:t>Further reading</a:t>
-            </a:r>
-            <a:endParaRPr lang="nl-BE" dirty="0"/>
+              <a:t>C++ specific patterns</a:t>
+            </a:r>
+            <a:endParaRPr lang="LID4096" dirty="0"/>
           </a:p>
         </p:txBody>
       </p:sp>
       <p:sp>
         <p:nvSpPr>
-          <p:cNvPr id="3" name="Content Placeholder 2"/>
+          <p:cNvPr id="3" name="Content Placeholder 2">
+            <a:extLst>
+              <a:ext uri="{FF2B5EF4-FFF2-40B4-BE49-F238E27FC236}">
+                <a16:creationId xmlns:a16="http://schemas.microsoft.com/office/drawing/2014/main" id="{B66B5779-A74C-52C0-DAF9-FC542132634A}"/>
+              </a:ext>
+            </a:extLst>
+          </p:cNvPr>
           <p:cNvSpPr>
             <a:spLocks noGrp="1"/>
           </p:cNvSpPr>
@@ -17137,37 +17151,41 @@
           <a:p>
             <a:r>
               <a:rPr lang="en-US" dirty="0"/>
-              <a:t>Erich Gamma, Richard Helm, Ralph Johnson and John </a:t>
+              <a:t>Curiously Repeating Template Pattern (CRTP)</a:t>
+            </a:r>
+          </a:p>
+          <a:p>
+            <a:r>
+              <a:rPr lang="en-US" dirty="0"/>
+              <a:t>Type erasure</a:t>
+            </a:r>
+          </a:p>
+          <a:p>
+            <a:r>
+              <a:rPr lang="en-US" dirty="0"/>
+              <a:t>Pointer to </a:t>
             </a:r>
             <a:r>
               <a:rPr lang="en-US" dirty="0" err="1"/>
-              <a:t>Vlissides</a:t>
+              <a:t>IMPLementation</a:t>
             </a:r>
             <a:r>
               <a:rPr lang="en-US" dirty="0"/>
-              <a:t> (1994) </a:t>
-            </a:r>
-            <a:r>
-              <a:rPr lang="en-US" i="1" dirty="0"/>
-              <a:t>Design patterns: elements of reusable object-oriented software</a:t>
-            </a:r>
-            <a:r>
-              <a:rPr lang="en-US" dirty="0"/>
-              <a:t>, Addison-Wesley</a:t>
-            </a:r>
-            <a:endParaRPr lang="en-US" sz="2800" dirty="0"/>
-          </a:p>
-          <a:p>
-            <a:endParaRPr lang="en-US" sz="2800" dirty="0"/>
-          </a:p>
-          <a:p>
-            <a:endParaRPr lang="nl-BE" dirty="0"/>
+              <a:t> (PIMPL)</a:t>
+            </a:r>
+            <a:endParaRPr lang="LID4096" dirty="0"/>
           </a:p>
         </p:txBody>
       </p:sp>
       <p:sp>
         <p:nvSpPr>
-          <p:cNvPr id="4" name="Slide Number Placeholder 3"/>
+          <p:cNvPr id="4" name="Slide Number Placeholder 3">
+            <a:extLst>
+              <a:ext uri="{FF2B5EF4-FFF2-40B4-BE49-F238E27FC236}">
+                <a16:creationId xmlns:a16="http://schemas.microsoft.com/office/drawing/2014/main" id="{396482FC-4A8B-74E1-56FE-EFDCEEF1C5E8}"/>
+              </a:ext>
+            </a:extLst>
+          </p:cNvPr>
           <p:cNvSpPr>
             <a:spLocks noGrp="1"/>
           </p:cNvSpPr>
@@ -17180,39 +17198,155 @@
           <a:bodyPr/>
           <a:lstStyle/>
           <a:p>
-            <a:fld id="{5A209D72-2E9D-49B0-8977-41DCCC66C0BB}" type="slidenum">
-              <a:rPr lang="nl-BE">
-                <a:solidFill>
-                  <a:prstClr val="black">
-                    <a:tint val="75000"/>
-                  </a:prstClr>
-                </a:solidFill>
-                <a:latin typeface="Calibri"/>
-              </a:rPr>
-              <a:pPr/>
+            <a:fld id="{FDB1AA33-DFBB-49AC-8CEE-23FFECEB5648}" type="slidenum">
+              <a:rPr lang="LID4096" smtClean="0"/>
               <a:t>38</a:t>
             </a:fld>
-            <a:endParaRPr lang="nl-BE">
-              <a:solidFill>
-                <a:prstClr val="black">
-                  <a:tint val="75000"/>
-                </a:prstClr>
-              </a:solidFill>
-              <a:latin typeface="Calibri"/>
-            </a:endParaRPr>
+            <a:endParaRPr lang="LID4096"/>
+          </a:p>
+        </p:txBody>
+      </p:sp>
+      <p:sp>
+        <p:nvSpPr>
+          <p:cNvPr id="5" name="TextBox 4">
+            <a:extLst>
+              <a:ext uri="{FF2B5EF4-FFF2-40B4-BE49-F238E27FC236}">
+                <a16:creationId xmlns:a16="http://schemas.microsoft.com/office/drawing/2014/main" id="{DE65696A-5112-7F9A-EB86-7820DE1B9B54}"/>
+              </a:ext>
+            </a:extLst>
+          </p:cNvPr>
+          <p:cNvSpPr txBox="1"/>
+          <p:nvPr/>
+        </p:nvSpPr>
+        <p:spPr>
+          <a:xfrm>
+            <a:off x="608437" y="5084258"/>
+            <a:ext cx="9022535" cy="646331"/>
+          </a:xfrm>
+          <a:prstGeom prst="rect">
+            <a:avLst/>
+          </a:prstGeom>
+          <a:noFill/>
+          <a:ln>
+            <a:solidFill>
+              <a:schemeClr val="tx1"/>
+            </a:solidFill>
+          </a:ln>
+        </p:spPr>
+        <p:txBody>
+          <a:bodyPr wrap="none" rtlCol="0">
+            <a:spAutoFit/>
+          </a:bodyPr>
+          <a:lstStyle/>
+          <a:p>
+            <a:r>
+              <a:rPr lang="en-US" sz="2000" dirty="0"/>
+              <a:t>See</a:t>
+            </a:r>
+          </a:p>
+          <a:p>
+            <a:r>
+              <a:rPr lang="en-US" sz="1600" dirty="0">
+                <a:hlinkClick r:id="rId2"/>
+              </a:rPr>
+              <a:t>https://github.com/gjbex/C-plus-plus-software-engineering/tree/main/source-code/design-patterns</a:t>
+            </a:r>
+            <a:r>
+              <a:rPr lang="en-US" sz="1600" dirty="0"/>
+              <a:t> </a:t>
+            </a:r>
+            <a:endParaRPr lang="LID4096" sz="1600" dirty="0"/>
           </a:p>
         </p:txBody>
       </p:sp>
     </p:spTree>
     <p:extLst>
       <p:ext uri="{BB962C8B-B14F-4D97-AF65-F5344CB8AC3E}">
-        <p14:creationId xmlns:p14="http://schemas.microsoft.com/office/powerpoint/2010/main" val="4100769943"/>
+        <p14:creationId xmlns:p14="http://schemas.microsoft.com/office/powerpoint/2010/main" val="3340427051"/>
       </p:ext>
     </p:extLst>
   </p:cSld>
   <p:clrMapOvr>
     <a:masterClrMapping/>
   </p:clrMapOvr>
+  <p:timing>
+    <p:tnLst>
+      <p:par>
+        <p:cTn id="1" dur="indefinite" restart="never" nodeType="tmRoot">
+          <p:childTnLst>
+            <p:seq concurrent="1" nextAc="seek">
+              <p:cTn id="2" dur="indefinite" nodeType="mainSeq">
+                <p:childTnLst>
+                  <p:par>
+                    <p:cTn id="3" fill="hold">
+                      <p:stCondLst>
+                        <p:cond delay="indefinite"/>
+                      </p:stCondLst>
+                      <p:childTnLst>
+                        <p:par>
+                          <p:cTn id="4" fill="hold">
+                            <p:stCondLst>
+                              <p:cond delay="0"/>
+                            </p:stCondLst>
+                            <p:childTnLst>
+                              <p:par>
+                                <p:cTn id="5" presetID="1" presetClass="entr" presetSubtype="0" fill="hold" grpId="0" nodeType="clickEffect">
+                                  <p:stCondLst>
+                                    <p:cond delay="0"/>
+                                  </p:stCondLst>
+                                  <p:childTnLst>
+                                    <p:set>
+                                      <p:cBhvr>
+                                        <p:cTn id="6" dur="1" fill="hold">
+                                          <p:stCondLst>
+                                            <p:cond delay="0"/>
+                                          </p:stCondLst>
+                                        </p:cTn>
+                                        <p:tgtEl>
+                                          <p:spTgt spid="5"/>
+                                        </p:tgtEl>
+                                        <p:attrNameLst>
+                                          <p:attrName>style.visibility</p:attrName>
+                                        </p:attrNameLst>
+                                      </p:cBhvr>
+                                      <p:to>
+                                        <p:strVal val="visible"/>
+                                      </p:to>
+                                    </p:set>
+                                  </p:childTnLst>
+                                </p:cTn>
+                              </p:par>
+                            </p:childTnLst>
+                          </p:cTn>
+                        </p:par>
+                      </p:childTnLst>
+                    </p:cTn>
+                  </p:par>
+                </p:childTnLst>
+              </p:cTn>
+              <p:prevCondLst>
+                <p:cond evt="onPrev" delay="0">
+                  <p:tgtEl>
+                    <p:sldTgt/>
+                  </p:tgtEl>
+                </p:cond>
+              </p:prevCondLst>
+              <p:nextCondLst>
+                <p:cond evt="onNext" delay="0">
+                  <p:tgtEl>
+                    <p:sldTgt/>
+                  </p:tgtEl>
+                </p:cond>
+              </p:nextCondLst>
+            </p:seq>
+          </p:childTnLst>
+        </p:cTn>
+      </p:par>
+    </p:tnLst>
+    <p:bldLst>
+      <p:bldP spid="5" grpId="0" animBg="1"/>
+    </p:bldLst>
+  </p:timing>
 </p:sld>
 </file>
 
@@ -17235,10 +17369,10 @@
       </p:grpSpPr>
       <p:sp>
         <p:nvSpPr>
-          <p:cNvPr id="5" name="Title 4">
+          <p:cNvPr id="2" name="Title 1">
             <a:extLst>
               <a:ext uri="{FF2B5EF4-FFF2-40B4-BE49-F238E27FC236}">
-                <a16:creationId xmlns:a16="http://schemas.microsoft.com/office/drawing/2014/main" id="{B047AC09-4137-6264-6757-2F13914ACA28}"/>
+                <a16:creationId xmlns:a16="http://schemas.microsoft.com/office/drawing/2014/main" id="{96A48829-0721-1480-5994-E855FF935E6E}"/>
               </a:ext>
             </a:extLst>
           </p:cNvPr>
@@ -17256,7 +17390,7 @@
           <a:p>
             <a:r>
               <a:rPr lang="en-US" dirty="0"/>
-              <a:t>Functional approach</a:t>
+              <a:t>Curiously, Repeating Template Pattern (CRTP)</a:t>
             </a:r>
             <a:endParaRPr lang="LID4096" dirty="0"/>
           </a:p>
@@ -17264,10 +17398,10 @@
       </p:sp>
       <p:sp>
         <p:nvSpPr>
-          <p:cNvPr id="6" name="Text Placeholder 5">
+          <p:cNvPr id="3" name="Content Placeholder 2">
             <a:extLst>
               <a:ext uri="{FF2B5EF4-FFF2-40B4-BE49-F238E27FC236}">
-                <a16:creationId xmlns:a16="http://schemas.microsoft.com/office/drawing/2014/main" id="{482D214C-4E56-C7D6-335F-9FBD13AF24C6}"/>
+                <a16:creationId xmlns:a16="http://schemas.microsoft.com/office/drawing/2014/main" id="{9BB61A49-5C18-EB0F-3E0D-D280F9E302A4}"/>
               </a:ext>
             </a:extLst>
           </p:cNvPr>
@@ -17275,15 +17409,38 @@
             <a:spLocks noGrp="1"/>
           </p:cNvSpPr>
           <p:nvPr>
-            <p:ph type="body" idx="1"/>
+            <p:ph idx="1"/>
           </p:nvPr>
         </p:nvSpPr>
         <p:spPr/>
         <p:txBody>
-          <a:bodyPr/>
+          <a:bodyPr>
+            <a:normAutofit/>
+          </a:bodyPr>
           <a:lstStyle/>
           <a:p>
-            <a:endParaRPr lang="LID4096"/>
+            <a:r>
+              <a:rPr lang="en-US" dirty="0"/>
+              <a:t>Avoid virtual function overhead</a:t>
+            </a:r>
+          </a:p>
+          <a:p>
+            <a:r>
+              <a:rPr lang="en-US" dirty="0"/>
+              <a:t>Enforce compile time interface constraints</a:t>
+            </a:r>
+          </a:p>
+          <a:p>
+            <a:r>
+              <a:rPr lang="en-US" dirty="0"/>
+              <a:t>Code reuse without dynamic polymorphism</a:t>
+            </a:r>
+          </a:p>
+          <a:p>
+            <a:r>
+              <a:rPr lang="en-US" dirty="0"/>
+              <a:t>Static  polymorphism</a:t>
+            </a:r>
           </a:p>
         </p:txBody>
       </p:sp>
@@ -17292,7 +17449,7 @@
           <p:cNvPr id="4" name="Slide Number Placeholder 3">
             <a:extLst>
               <a:ext uri="{FF2B5EF4-FFF2-40B4-BE49-F238E27FC236}">
-                <a16:creationId xmlns:a16="http://schemas.microsoft.com/office/drawing/2014/main" id="{B66B75E1-EA21-65CD-B316-C1D421486EE7}"/>
+                <a16:creationId xmlns:a16="http://schemas.microsoft.com/office/drawing/2014/main" id="{0D8837DD-4DFF-B3FC-6690-1408C5CBE0FA}"/>
               </a:ext>
             </a:extLst>
           </p:cNvPr>
@@ -17319,7 +17476,7 @@
     </p:spTree>
     <p:extLst>
       <p:ext uri="{BB962C8B-B14F-4D97-AF65-F5344CB8AC3E}">
-        <p14:creationId xmlns:p14="http://schemas.microsoft.com/office/powerpoint/2010/main" val="4080926898"/>
+        <p14:creationId xmlns:p14="http://schemas.microsoft.com/office/powerpoint/2010/main" val="2948353845"/>
       </p:ext>
     </p:extLst>
   </p:cSld>
@@ -18674,408 +18831,6 @@
           <p:cNvPr id="2" name="Title 1">
             <a:extLst>
               <a:ext uri="{FF2B5EF4-FFF2-40B4-BE49-F238E27FC236}">
-                <a16:creationId xmlns:a16="http://schemas.microsoft.com/office/drawing/2014/main" id="{8F06986E-3696-7561-EFEC-42A2474822BD}"/>
-              </a:ext>
-            </a:extLst>
-          </p:cNvPr>
-          <p:cNvSpPr>
-            <a:spLocks noGrp="1"/>
-          </p:cNvSpPr>
-          <p:nvPr>
-            <p:ph type="title"/>
-          </p:nvPr>
-        </p:nvSpPr>
-        <p:spPr/>
-        <p:txBody>
-          <a:bodyPr/>
-          <a:lstStyle/>
-          <a:p>
-            <a:r>
-              <a:rPr lang="en-US" dirty="0"/>
-              <a:t>Functional features in C++</a:t>
-            </a:r>
-            <a:endParaRPr lang="LID4096" dirty="0"/>
-          </a:p>
-        </p:txBody>
-      </p:sp>
-      <p:sp>
-        <p:nvSpPr>
-          <p:cNvPr id="3" name="Content Placeholder 2">
-            <a:extLst>
-              <a:ext uri="{FF2B5EF4-FFF2-40B4-BE49-F238E27FC236}">
-                <a16:creationId xmlns:a16="http://schemas.microsoft.com/office/drawing/2014/main" id="{0CDB4156-11FC-1770-3D00-44985A46E102}"/>
-              </a:ext>
-            </a:extLst>
-          </p:cNvPr>
-          <p:cNvSpPr>
-            <a:spLocks noGrp="1"/>
-          </p:cNvSpPr>
-          <p:nvPr>
-            <p:ph idx="1"/>
-          </p:nvPr>
-        </p:nvSpPr>
-        <p:spPr/>
-        <p:txBody>
-          <a:bodyPr/>
-          <a:lstStyle/>
-          <a:p>
-            <a:r>
-              <a:rPr lang="en-US" dirty="0"/>
-              <a:t>Lambda functions</a:t>
-            </a:r>
-          </a:p>
-          <a:p>
-            <a:r>
-              <a:rPr lang="en-US" dirty="0"/>
-              <a:t>STL algorithms</a:t>
-            </a:r>
-          </a:p>
-          <a:p>
-            <a:r>
-              <a:rPr lang="en-US" dirty="0"/>
-              <a:t>STL ranges/views</a:t>
-            </a:r>
-          </a:p>
-          <a:p>
-            <a:r>
-              <a:rPr lang="en-US" dirty="0"/>
-              <a:t>STL generators</a:t>
-            </a:r>
-            <a:endParaRPr lang="LID4096" dirty="0"/>
-          </a:p>
-        </p:txBody>
-      </p:sp>
-      <p:sp>
-        <p:nvSpPr>
-          <p:cNvPr id="4" name="Slide Number Placeholder 3">
-            <a:extLst>
-              <a:ext uri="{FF2B5EF4-FFF2-40B4-BE49-F238E27FC236}">
-                <a16:creationId xmlns:a16="http://schemas.microsoft.com/office/drawing/2014/main" id="{DA0FD79C-C1CA-A2C6-29B6-1118C6206C43}"/>
-              </a:ext>
-            </a:extLst>
-          </p:cNvPr>
-          <p:cNvSpPr>
-            <a:spLocks noGrp="1"/>
-          </p:cNvSpPr>
-          <p:nvPr>
-            <p:ph type="sldNum" sz="quarter" idx="12"/>
-          </p:nvPr>
-        </p:nvSpPr>
-        <p:spPr/>
-        <p:txBody>
-          <a:bodyPr/>
-          <a:lstStyle/>
-          <a:p>
-            <a:fld id="{FDB1AA33-DFBB-49AC-8CEE-23FFECEB5648}" type="slidenum">
-              <a:rPr lang="LID4096" smtClean="0"/>
-              <a:t>40</a:t>
-            </a:fld>
-            <a:endParaRPr lang="LID4096"/>
-          </a:p>
-        </p:txBody>
-      </p:sp>
-      <p:sp>
-        <p:nvSpPr>
-          <p:cNvPr id="5" name="TextBox 4">
-            <a:extLst>
-              <a:ext uri="{FF2B5EF4-FFF2-40B4-BE49-F238E27FC236}">
-                <a16:creationId xmlns:a16="http://schemas.microsoft.com/office/drawing/2014/main" id="{C8E6E66E-0B41-F167-E211-1131037E0EC2}"/>
-              </a:ext>
-            </a:extLst>
-          </p:cNvPr>
-          <p:cNvSpPr txBox="1"/>
-          <p:nvPr/>
-        </p:nvSpPr>
-        <p:spPr>
-          <a:xfrm>
-            <a:off x="838200" y="4561744"/>
-            <a:ext cx="6652655" cy="646331"/>
-          </a:xfrm>
-          <a:prstGeom prst="rect">
-            <a:avLst/>
-          </a:prstGeom>
-          <a:noFill/>
-          <a:ln>
-            <a:solidFill>
-              <a:schemeClr val="tx1"/>
-            </a:solidFill>
-          </a:ln>
-        </p:spPr>
-        <p:txBody>
-          <a:bodyPr wrap="none" rtlCol="0">
-            <a:spAutoFit/>
-          </a:bodyPr>
-          <a:lstStyle/>
-          <a:p>
-            <a:r>
-              <a:rPr lang="en-US" sz="2000" dirty="0"/>
-              <a:t>See</a:t>
-            </a:r>
-          </a:p>
-          <a:p>
-            <a:r>
-              <a:rPr lang="en-US" sz="1600" dirty="0">
-                <a:hlinkClick r:id="rId2"/>
-              </a:rPr>
-              <a:t>https://github.com/gjbex/Scientific-C-plus-plus/tree/master/source-code</a:t>
-            </a:r>
-            <a:r>
-              <a:rPr lang="en-US" sz="1600" dirty="0"/>
-              <a:t> </a:t>
-            </a:r>
-            <a:endParaRPr lang="LID4096" sz="1600" dirty="0"/>
-          </a:p>
-        </p:txBody>
-      </p:sp>
-    </p:spTree>
-    <p:extLst>
-      <p:ext uri="{BB962C8B-B14F-4D97-AF65-F5344CB8AC3E}">
-        <p14:creationId xmlns:p14="http://schemas.microsoft.com/office/powerpoint/2010/main" val="1848637771"/>
-      </p:ext>
-    </p:extLst>
-  </p:cSld>
-  <p:clrMapOvr>
-    <a:masterClrMapping/>
-  </p:clrMapOvr>
-  <p:timing>
-    <p:tnLst>
-      <p:par>
-        <p:cTn id="1" dur="indefinite" restart="never" nodeType="tmRoot">
-          <p:childTnLst>
-            <p:seq concurrent="1" nextAc="seek">
-              <p:cTn id="2" dur="indefinite" nodeType="mainSeq">
-                <p:childTnLst>
-                  <p:par>
-                    <p:cTn id="3" fill="hold">
-                      <p:stCondLst>
-                        <p:cond delay="indefinite"/>
-                      </p:stCondLst>
-                      <p:childTnLst>
-                        <p:par>
-                          <p:cTn id="4" fill="hold">
-                            <p:stCondLst>
-                              <p:cond delay="0"/>
-                            </p:stCondLst>
-                            <p:childTnLst>
-                              <p:par>
-                                <p:cTn id="5" presetID="1" presetClass="entr" presetSubtype="0" fill="hold" grpId="0" nodeType="clickEffect">
-                                  <p:stCondLst>
-                                    <p:cond delay="0"/>
-                                  </p:stCondLst>
-                                  <p:childTnLst>
-                                    <p:set>
-                                      <p:cBhvr>
-                                        <p:cTn id="6" dur="1" fill="hold">
-                                          <p:stCondLst>
-                                            <p:cond delay="0"/>
-                                          </p:stCondLst>
-                                        </p:cTn>
-                                        <p:tgtEl>
-                                          <p:spTgt spid="5"/>
-                                        </p:tgtEl>
-                                        <p:attrNameLst>
-                                          <p:attrName>style.visibility</p:attrName>
-                                        </p:attrNameLst>
-                                      </p:cBhvr>
-                                      <p:to>
-                                        <p:strVal val="visible"/>
-                                      </p:to>
-                                    </p:set>
-                                  </p:childTnLst>
-                                </p:cTn>
-                              </p:par>
-                            </p:childTnLst>
-                          </p:cTn>
-                        </p:par>
-                      </p:childTnLst>
-                    </p:cTn>
-                  </p:par>
-                </p:childTnLst>
-              </p:cTn>
-              <p:prevCondLst>
-                <p:cond evt="onPrev" delay="0">
-                  <p:tgtEl>
-                    <p:sldTgt/>
-                  </p:tgtEl>
-                </p:cond>
-              </p:prevCondLst>
-              <p:nextCondLst>
-                <p:cond evt="onNext" delay="0">
-                  <p:tgtEl>
-                    <p:sldTgt/>
-                  </p:tgtEl>
-                </p:cond>
-              </p:nextCondLst>
-            </p:seq>
-          </p:childTnLst>
-        </p:cTn>
-      </p:par>
-    </p:tnLst>
-    <p:bldLst>
-      <p:bldP spid="5" grpId="0" animBg="1"/>
-    </p:bldLst>
-  </p:timing>
-</p:sld>
-</file>
-
-<file path=ppt/slides/slide41.xml><?xml version="1.0" encoding="utf-8"?>
-<p:sld xmlns:a="http://schemas.openxmlformats.org/drawingml/2006/main" xmlns:r="http://schemas.openxmlformats.org/officeDocument/2006/relationships" xmlns:p="http://schemas.openxmlformats.org/presentationml/2006/main">
-  <p:cSld>
-    <p:spTree>
-      <p:nvGrpSpPr>
-        <p:cNvPr id="1" name=""/>
-        <p:cNvGrpSpPr/>
-        <p:nvPr/>
-      </p:nvGrpSpPr>
-      <p:grpSpPr>
-        <a:xfrm>
-          <a:off x="0" y="0"/>
-          <a:ext cx="0" cy="0"/>
-          <a:chOff x="0" y="0"/>
-          <a:chExt cx="0" cy="0"/>
-        </a:xfrm>
-      </p:grpSpPr>
-      <p:sp>
-        <p:nvSpPr>
-          <p:cNvPr id="2" name="Title 1">
-            <a:extLst>
-              <a:ext uri="{FF2B5EF4-FFF2-40B4-BE49-F238E27FC236}">
-                <a16:creationId xmlns:a16="http://schemas.microsoft.com/office/drawing/2014/main" id="{96A48829-0721-1480-5994-E855FF935E6E}"/>
-              </a:ext>
-            </a:extLst>
-          </p:cNvPr>
-          <p:cNvSpPr>
-            <a:spLocks noGrp="1"/>
-          </p:cNvSpPr>
-          <p:nvPr>
-            <p:ph type="title"/>
-          </p:nvPr>
-        </p:nvSpPr>
-        <p:spPr/>
-        <p:txBody>
-          <a:bodyPr/>
-          <a:lstStyle/>
-          <a:p>
-            <a:r>
-              <a:rPr lang="en-US" dirty="0"/>
-              <a:t>Curiously, Repeating Template Pattern (CRTP)</a:t>
-            </a:r>
-            <a:endParaRPr lang="LID4096" dirty="0"/>
-          </a:p>
-        </p:txBody>
-      </p:sp>
-      <p:sp>
-        <p:nvSpPr>
-          <p:cNvPr id="3" name="Content Placeholder 2">
-            <a:extLst>
-              <a:ext uri="{FF2B5EF4-FFF2-40B4-BE49-F238E27FC236}">
-                <a16:creationId xmlns:a16="http://schemas.microsoft.com/office/drawing/2014/main" id="{9BB61A49-5C18-EB0F-3E0D-D280F9E302A4}"/>
-              </a:ext>
-            </a:extLst>
-          </p:cNvPr>
-          <p:cNvSpPr>
-            <a:spLocks noGrp="1"/>
-          </p:cNvSpPr>
-          <p:nvPr>
-            <p:ph idx="1"/>
-          </p:nvPr>
-        </p:nvSpPr>
-        <p:spPr/>
-        <p:txBody>
-          <a:bodyPr>
-            <a:normAutofit/>
-          </a:bodyPr>
-          <a:lstStyle/>
-          <a:p>
-            <a:r>
-              <a:rPr lang="en-US" dirty="0"/>
-              <a:t>Avoid virtual function overhead</a:t>
-            </a:r>
-          </a:p>
-          <a:p>
-            <a:r>
-              <a:rPr lang="en-US" dirty="0"/>
-              <a:t>Enforce compile time interface constraints</a:t>
-            </a:r>
-          </a:p>
-          <a:p>
-            <a:r>
-              <a:rPr lang="en-US" dirty="0"/>
-              <a:t>Code reuse without dynamic polymorphism</a:t>
-            </a:r>
-          </a:p>
-          <a:p>
-            <a:r>
-              <a:rPr lang="en-US" dirty="0"/>
-              <a:t>Static  polymorphism</a:t>
-            </a:r>
-          </a:p>
-        </p:txBody>
-      </p:sp>
-      <p:sp>
-        <p:nvSpPr>
-          <p:cNvPr id="4" name="Slide Number Placeholder 3">
-            <a:extLst>
-              <a:ext uri="{FF2B5EF4-FFF2-40B4-BE49-F238E27FC236}">
-                <a16:creationId xmlns:a16="http://schemas.microsoft.com/office/drawing/2014/main" id="{0D8837DD-4DFF-B3FC-6690-1408C5CBE0FA}"/>
-              </a:ext>
-            </a:extLst>
-          </p:cNvPr>
-          <p:cNvSpPr>
-            <a:spLocks noGrp="1"/>
-          </p:cNvSpPr>
-          <p:nvPr>
-            <p:ph type="sldNum" sz="quarter" idx="12"/>
-          </p:nvPr>
-        </p:nvSpPr>
-        <p:spPr/>
-        <p:txBody>
-          <a:bodyPr/>
-          <a:lstStyle/>
-          <a:p>
-            <a:fld id="{FDB1AA33-DFBB-49AC-8CEE-23FFECEB5648}" type="slidenum">
-              <a:rPr lang="LID4096" smtClean="0"/>
-              <a:t>41</a:t>
-            </a:fld>
-            <a:endParaRPr lang="LID4096"/>
-          </a:p>
-        </p:txBody>
-      </p:sp>
-    </p:spTree>
-    <p:extLst>
-      <p:ext uri="{BB962C8B-B14F-4D97-AF65-F5344CB8AC3E}">
-        <p14:creationId xmlns:p14="http://schemas.microsoft.com/office/powerpoint/2010/main" val="1803633621"/>
-      </p:ext>
-    </p:extLst>
-  </p:cSld>
-  <p:clrMapOvr>
-    <a:masterClrMapping/>
-  </p:clrMapOvr>
-</p:sld>
-</file>
-
-<file path=ppt/slides/slide42.xml><?xml version="1.0" encoding="utf-8"?>
-<p:sld xmlns:a="http://schemas.openxmlformats.org/drawingml/2006/main" xmlns:r="http://schemas.openxmlformats.org/officeDocument/2006/relationships" xmlns:p="http://schemas.openxmlformats.org/presentationml/2006/main">
-  <p:cSld>
-    <p:spTree>
-      <p:nvGrpSpPr>
-        <p:cNvPr id="1" name=""/>
-        <p:cNvGrpSpPr/>
-        <p:nvPr/>
-      </p:nvGrpSpPr>
-      <p:grpSpPr>
-        <a:xfrm>
-          <a:off x="0" y="0"/>
-          <a:ext cx="0" cy="0"/>
-          <a:chOff x="0" y="0"/>
-          <a:chExt cx="0" cy="0"/>
-        </a:xfrm>
-      </p:grpSpPr>
-      <p:sp>
-        <p:nvSpPr>
-          <p:cNvPr id="2" name="Title 1">
-            <a:extLst>
-              <a:ext uri="{FF2B5EF4-FFF2-40B4-BE49-F238E27FC236}">
                 <a16:creationId xmlns:a16="http://schemas.microsoft.com/office/drawing/2014/main" id="{08C9A350-282A-80DC-C746-795502250CAE}"/>
               </a:ext>
             </a:extLst>
@@ -19123,7 +18878,7 @@
           <a:p>
             <a:fld id="{FDB1AA33-DFBB-49AC-8CEE-23FFECEB5648}" type="slidenum">
               <a:rPr lang="LID4096" smtClean="0"/>
-              <a:t>42</a:t>
+              <a:t>40</a:t>
             </a:fld>
             <a:endParaRPr lang="LID4096"/>
           </a:p>
@@ -19890,7 +19645,7 @@
     </p:spTree>
     <p:extLst>
       <p:ext uri="{BB962C8B-B14F-4D97-AF65-F5344CB8AC3E}">
-        <p14:creationId xmlns:p14="http://schemas.microsoft.com/office/powerpoint/2010/main" val="3866999852"/>
+        <p14:creationId xmlns:p14="http://schemas.microsoft.com/office/powerpoint/2010/main" val="3081757082"/>
       </p:ext>
     </p:extLst>
   </p:cSld>
@@ -19900,7 +19655,7 @@
 </p:sld>
 </file>
 
-<file path=ppt/slides/slide43.xml><?xml version="1.0" encoding="utf-8"?>
+<file path=ppt/slides/slide41.xml><?xml version="1.0" encoding="utf-8"?>
 <p:sld xmlns:a="http://schemas.openxmlformats.org/drawingml/2006/main" xmlns:r="http://schemas.openxmlformats.org/officeDocument/2006/relationships" xmlns:p="http://schemas.openxmlformats.org/presentationml/2006/main">
   <p:cSld>
     <p:spTree>
@@ -19969,7 +19724,7 @@
           <a:p>
             <a:fld id="{FDB1AA33-DFBB-49AC-8CEE-23FFECEB5648}" type="slidenum">
               <a:rPr lang="LID4096" smtClean="0"/>
-              <a:t>43</a:t>
+              <a:t>41</a:t>
             </a:fld>
             <a:endParaRPr lang="LID4096"/>
           </a:p>
@@ -20523,7 +20278,7 @@
     </p:spTree>
     <p:extLst>
       <p:ext uri="{BB962C8B-B14F-4D97-AF65-F5344CB8AC3E}">
-        <p14:creationId xmlns:p14="http://schemas.microsoft.com/office/powerpoint/2010/main" val="4020257836"/>
+        <p14:creationId xmlns:p14="http://schemas.microsoft.com/office/powerpoint/2010/main" val="1364277500"/>
       </p:ext>
     </p:extLst>
   </p:cSld>
@@ -20533,7 +20288,7 @@
 </p:sld>
 </file>
 
-<file path=ppt/slides/slide44.xml><?xml version="1.0" encoding="utf-8"?>
+<file path=ppt/slides/slide42.xml><?xml version="1.0" encoding="utf-8"?>
 <p:sld xmlns:a="http://schemas.openxmlformats.org/drawingml/2006/main" xmlns:r="http://schemas.openxmlformats.org/officeDocument/2006/relationships" xmlns:p="http://schemas.openxmlformats.org/presentationml/2006/main">
   <p:cSld>
     <p:spTree>
@@ -20602,7 +20357,7 @@
           <a:p>
             <a:fld id="{FDB1AA33-DFBB-49AC-8CEE-23FFECEB5648}" type="slidenum">
               <a:rPr lang="LID4096" smtClean="0"/>
-              <a:t>44</a:t>
+              <a:t>42</a:t>
             </a:fld>
             <a:endParaRPr lang="LID4096"/>
           </a:p>
@@ -21310,7 +21065,7 @@
     </p:spTree>
     <p:extLst>
       <p:ext uri="{BB962C8B-B14F-4D97-AF65-F5344CB8AC3E}">
-        <p14:creationId xmlns:p14="http://schemas.microsoft.com/office/powerpoint/2010/main" val="2362631166"/>
+        <p14:creationId xmlns:p14="http://schemas.microsoft.com/office/powerpoint/2010/main" val="1839378383"/>
       </p:ext>
     </p:extLst>
   </p:cSld>
@@ -21320,7 +21075,7 @@
 </p:sld>
 </file>
 
-<file path=ppt/slides/slide45.xml><?xml version="1.0" encoding="utf-8"?>
+<file path=ppt/slides/slide43.xml><?xml version="1.0" encoding="utf-8"?>
 <p:sld xmlns:a="http://schemas.openxmlformats.org/drawingml/2006/main" xmlns:r="http://schemas.openxmlformats.org/officeDocument/2006/relationships" xmlns:p="http://schemas.openxmlformats.org/presentationml/2006/main">
   <p:cSld>
     <p:spTree>
@@ -21389,7 +21144,7 @@
           <a:p>
             <a:fld id="{FDB1AA33-DFBB-49AC-8CEE-23FFECEB5648}" type="slidenum">
               <a:rPr lang="LID4096" smtClean="0"/>
-              <a:t>45</a:t>
+              <a:t>43</a:t>
             </a:fld>
             <a:endParaRPr lang="LID4096"/>
           </a:p>
@@ -21726,13 +21481,549 @@
     </p:spTree>
     <p:extLst>
       <p:ext uri="{BB962C8B-B14F-4D97-AF65-F5344CB8AC3E}">
-        <p14:creationId xmlns:p14="http://schemas.microsoft.com/office/powerpoint/2010/main" val="542009304"/>
+        <p14:creationId xmlns:p14="http://schemas.microsoft.com/office/powerpoint/2010/main" val="3759116655"/>
       </p:ext>
     </p:extLst>
   </p:cSld>
   <p:clrMapOvr>
     <a:masterClrMapping/>
   </p:clrMapOvr>
+</p:sld>
+</file>
+
+<file path=ppt/slides/slide44.xml><?xml version="1.0" encoding="utf-8"?>
+<p:sld xmlns:a="http://schemas.openxmlformats.org/drawingml/2006/main" xmlns:r="http://schemas.openxmlformats.org/officeDocument/2006/relationships" xmlns:p="http://schemas.openxmlformats.org/presentationml/2006/main">
+  <p:cSld>
+    <p:spTree>
+      <p:nvGrpSpPr>
+        <p:cNvPr id="1" name=""/>
+        <p:cNvGrpSpPr/>
+        <p:nvPr/>
+      </p:nvGrpSpPr>
+      <p:grpSpPr>
+        <a:xfrm>
+          <a:off x="0" y="0"/>
+          <a:ext cx="0" cy="0"/>
+          <a:chOff x="0" y="0"/>
+          <a:chExt cx="0" cy="0"/>
+        </a:xfrm>
+      </p:grpSpPr>
+      <p:sp>
+        <p:nvSpPr>
+          <p:cNvPr id="2" name="Title 1"/>
+          <p:cNvSpPr>
+            <a:spLocks noGrp="1"/>
+          </p:cNvSpPr>
+          <p:nvPr>
+            <p:ph type="title"/>
+          </p:nvPr>
+        </p:nvSpPr>
+        <p:spPr/>
+        <p:txBody>
+          <a:bodyPr/>
+          <a:lstStyle/>
+          <a:p>
+            <a:r>
+              <a:rPr lang="en-US" dirty="0"/>
+              <a:t>Further reading</a:t>
+            </a:r>
+            <a:endParaRPr lang="nl-BE" dirty="0"/>
+          </a:p>
+        </p:txBody>
+      </p:sp>
+      <p:sp>
+        <p:nvSpPr>
+          <p:cNvPr id="3" name="Content Placeholder 2"/>
+          <p:cNvSpPr>
+            <a:spLocks noGrp="1"/>
+          </p:cNvSpPr>
+          <p:nvPr>
+            <p:ph idx="1"/>
+          </p:nvPr>
+        </p:nvSpPr>
+        <p:spPr/>
+        <p:txBody>
+          <a:bodyPr/>
+          <a:lstStyle/>
+          <a:p>
+            <a:r>
+              <a:rPr lang="en-US" dirty="0"/>
+              <a:t>Erich Gamma, Richard Helm, Ralph Johnson and John </a:t>
+            </a:r>
+            <a:r>
+              <a:rPr lang="en-US" dirty="0" err="1"/>
+              <a:t>Vlissides</a:t>
+            </a:r>
+            <a:r>
+              <a:rPr lang="en-US" dirty="0"/>
+              <a:t> (1994) </a:t>
+            </a:r>
+            <a:r>
+              <a:rPr lang="en-US" i="1" dirty="0"/>
+              <a:t>Design patterns: elements of reusable object-oriented software</a:t>
+            </a:r>
+            <a:r>
+              <a:rPr lang="en-US" dirty="0"/>
+              <a:t>, Addison-Wesley</a:t>
+            </a:r>
+            <a:endParaRPr lang="en-US" sz="2800" dirty="0"/>
+          </a:p>
+          <a:p>
+            <a:endParaRPr lang="en-US" sz="2800" dirty="0"/>
+          </a:p>
+          <a:p>
+            <a:endParaRPr lang="nl-BE" dirty="0"/>
+          </a:p>
+        </p:txBody>
+      </p:sp>
+      <p:sp>
+        <p:nvSpPr>
+          <p:cNvPr id="4" name="Slide Number Placeholder 3"/>
+          <p:cNvSpPr>
+            <a:spLocks noGrp="1"/>
+          </p:cNvSpPr>
+          <p:nvPr>
+            <p:ph type="sldNum" sz="quarter" idx="12"/>
+          </p:nvPr>
+        </p:nvSpPr>
+        <p:spPr/>
+        <p:txBody>
+          <a:bodyPr/>
+          <a:lstStyle/>
+          <a:p>
+            <a:fld id="{5A209D72-2E9D-49B0-8977-41DCCC66C0BB}" type="slidenum">
+              <a:rPr lang="nl-BE">
+                <a:solidFill>
+                  <a:prstClr val="black">
+                    <a:tint val="75000"/>
+                  </a:prstClr>
+                </a:solidFill>
+                <a:latin typeface="Calibri"/>
+              </a:rPr>
+              <a:pPr/>
+              <a:t>44</a:t>
+            </a:fld>
+            <a:endParaRPr lang="nl-BE">
+              <a:solidFill>
+                <a:prstClr val="black">
+                  <a:tint val="75000"/>
+                </a:prstClr>
+              </a:solidFill>
+              <a:latin typeface="Calibri"/>
+            </a:endParaRPr>
+          </a:p>
+        </p:txBody>
+      </p:sp>
+    </p:spTree>
+    <p:extLst>
+      <p:ext uri="{BB962C8B-B14F-4D97-AF65-F5344CB8AC3E}">
+        <p14:creationId xmlns:p14="http://schemas.microsoft.com/office/powerpoint/2010/main" val="4100769943"/>
+      </p:ext>
+    </p:extLst>
+  </p:cSld>
+  <p:clrMapOvr>
+    <a:masterClrMapping/>
+  </p:clrMapOvr>
+</p:sld>
+</file>
+
+<file path=ppt/slides/slide45.xml><?xml version="1.0" encoding="utf-8"?>
+<p:sld xmlns:a="http://schemas.openxmlformats.org/drawingml/2006/main" xmlns:r="http://schemas.openxmlformats.org/officeDocument/2006/relationships" xmlns:p="http://schemas.openxmlformats.org/presentationml/2006/main">
+  <p:cSld>
+    <p:spTree>
+      <p:nvGrpSpPr>
+        <p:cNvPr id="1" name=""/>
+        <p:cNvGrpSpPr/>
+        <p:nvPr/>
+      </p:nvGrpSpPr>
+      <p:grpSpPr>
+        <a:xfrm>
+          <a:off x="0" y="0"/>
+          <a:ext cx="0" cy="0"/>
+          <a:chOff x="0" y="0"/>
+          <a:chExt cx="0" cy="0"/>
+        </a:xfrm>
+      </p:grpSpPr>
+      <p:sp>
+        <p:nvSpPr>
+          <p:cNvPr id="5" name="Title 4">
+            <a:extLst>
+              <a:ext uri="{FF2B5EF4-FFF2-40B4-BE49-F238E27FC236}">
+                <a16:creationId xmlns:a16="http://schemas.microsoft.com/office/drawing/2014/main" id="{B047AC09-4137-6264-6757-2F13914ACA28}"/>
+              </a:ext>
+            </a:extLst>
+          </p:cNvPr>
+          <p:cNvSpPr>
+            <a:spLocks noGrp="1"/>
+          </p:cNvSpPr>
+          <p:nvPr>
+            <p:ph type="title"/>
+          </p:nvPr>
+        </p:nvSpPr>
+        <p:spPr/>
+        <p:txBody>
+          <a:bodyPr/>
+          <a:lstStyle/>
+          <a:p>
+            <a:r>
+              <a:rPr lang="en-US" dirty="0"/>
+              <a:t>Functional approach</a:t>
+            </a:r>
+            <a:endParaRPr lang="LID4096" dirty="0"/>
+          </a:p>
+        </p:txBody>
+      </p:sp>
+      <p:sp>
+        <p:nvSpPr>
+          <p:cNvPr id="6" name="Text Placeholder 5">
+            <a:extLst>
+              <a:ext uri="{FF2B5EF4-FFF2-40B4-BE49-F238E27FC236}">
+                <a16:creationId xmlns:a16="http://schemas.microsoft.com/office/drawing/2014/main" id="{482D214C-4E56-C7D6-335F-9FBD13AF24C6}"/>
+              </a:ext>
+            </a:extLst>
+          </p:cNvPr>
+          <p:cNvSpPr>
+            <a:spLocks noGrp="1"/>
+          </p:cNvSpPr>
+          <p:nvPr>
+            <p:ph type="body" idx="1"/>
+          </p:nvPr>
+        </p:nvSpPr>
+        <p:spPr/>
+        <p:txBody>
+          <a:bodyPr/>
+          <a:lstStyle/>
+          <a:p>
+            <a:endParaRPr lang="LID4096"/>
+          </a:p>
+        </p:txBody>
+      </p:sp>
+      <p:sp>
+        <p:nvSpPr>
+          <p:cNvPr id="4" name="Slide Number Placeholder 3">
+            <a:extLst>
+              <a:ext uri="{FF2B5EF4-FFF2-40B4-BE49-F238E27FC236}">
+                <a16:creationId xmlns:a16="http://schemas.microsoft.com/office/drawing/2014/main" id="{B66B75E1-EA21-65CD-B316-C1D421486EE7}"/>
+              </a:ext>
+            </a:extLst>
+          </p:cNvPr>
+          <p:cNvSpPr>
+            <a:spLocks noGrp="1"/>
+          </p:cNvSpPr>
+          <p:nvPr>
+            <p:ph type="sldNum" sz="quarter" idx="12"/>
+          </p:nvPr>
+        </p:nvSpPr>
+        <p:spPr/>
+        <p:txBody>
+          <a:bodyPr/>
+          <a:lstStyle/>
+          <a:p>
+            <a:fld id="{FDB1AA33-DFBB-49AC-8CEE-23FFECEB5648}" type="slidenum">
+              <a:rPr lang="LID4096" smtClean="0"/>
+              <a:t>45</a:t>
+            </a:fld>
+            <a:endParaRPr lang="LID4096"/>
+          </a:p>
+        </p:txBody>
+      </p:sp>
+    </p:spTree>
+    <p:extLst>
+      <p:ext uri="{BB962C8B-B14F-4D97-AF65-F5344CB8AC3E}">
+        <p14:creationId xmlns:p14="http://schemas.microsoft.com/office/powerpoint/2010/main" val="4080926898"/>
+      </p:ext>
+    </p:extLst>
+  </p:cSld>
+  <p:clrMapOvr>
+    <a:masterClrMapping/>
+  </p:clrMapOvr>
+</p:sld>
+</file>
+
+<file path=ppt/slides/slide46.xml><?xml version="1.0" encoding="utf-8"?>
+<p:sld xmlns:a="http://schemas.openxmlformats.org/drawingml/2006/main" xmlns:r="http://schemas.openxmlformats.org/officeDocument/2006/relationships" xmlns:p="http://schemas.openxmlformats.org/presentationml/2006/main">
+  <p:cSld>
+    <p:spTree>
+      <p:nvGrpSpPr>
+        <p:cNvPr id="1" name=""/>
+        <p:cNvGrpSpPr/>
+        <p:nvPr/>
+      </p:nvGrpSpPr>
+      <p:grpSpPr>
+        <a:xfrm>
+          <a:off x="0" y="0"/>
+          <a:ext cx="0" cy="0"/>
+          <a:chOff x="0" y="0"/>
+          <a:chExt cx="0" cy="0"/>
+        </a:xfrm>
+      </p:grpSpPr>
+      <p:sp>
+        <p:nvSpPr>
+          <p:cNvPr id="2" name="Title 1">
+            <a:extLst>
+              <a:ext uri="{FF2B5EF4-FFF2-40B4-BE49-F238E27FC236}">
+                <a16:creationId xmlns:a16="http://schemas.microsoft.com/office/drawing/2014/main" id="{8F06986E-3696-7561-EFEC-42A2474822BD}"/>
+              </a:ext>
+            </a:extLst>
+          </p:cNvPr>
+          <p:cNvSpPr>
+            <a:spLocks noGrp="1"/>
+          </p:cNvSpPr>
+          <p:nvPr>
+            <p:ph type="title"/>
+          </p:nvPr>
+        </p:nvSpPr>
+        <p:spPr/>
+        <p:txBody>
+          <a:bodyPr/>
+          <a:lstStyle/>
+          <a:p>
+            <a:r>
+              <a:rPr lang="en-US" dirty="0"/>
+              <a:t>Functional features in C++</a:t>
+            </a:r>
+            <a:endParaRPr lang="LID4096" dirty="0"/>
+          </a:p>
+        </p:txBody>
+      </p:sp>
+      <p:sp>
+        <p:nvSpPr>
+          <p:cNvPr id="3" name="Content Placeholder 2">
+            <a:extLst>
+              <a:ext uri="{FF2B5EF4-FFF2-40B4-BE49-F238E27FC236}">
+                <a16:creationId xmlns:a16="http://schemas.microsoft.com/office/drawing/2014/main" id="{0CDB4156-11FC-1770-3D00-44985A46E102}"/>
+              </a:ext>
+            </a:extLst>
+          </p:cNvPr>
+          <p:cNvSpPr>
+            <a:spLocks noGrp="1"/>
+          </p:cNvSpPr>
+          <p:nvPr>
+            <p:ph idx="1"/>
+          </p:nvPr>
+        </p:nvSpPr>
+        <p:spPr/>
+        <p:txBody>
+          <a:bodyPr/>
+          <a:lstStyle/>
+          <a:p>
+            <a:r>
+              <a:rPr lang="en-US" dirty="0"/>
+              <a:t>Lambda functions</a:t>
+            </a:r>
+          </a:p>
+          <a:p>
+            <a:r>
+              <a:rPr lang="en-US" dirty="0"/>
+              <a:t>STL algorithms</a:t>
+            </a:r>
+          </a:p>
+          <a:p>
+            <a:r>
+              <a:rPr lang="en-US" dirty="0"/>
+              <a:t>STL ranges/views</a:t>
+            </a:r>
+          </a:p>
+          <a:p>
+            <a:r>
+              <a:rPr lang="en-US" dirty="0"/>
+              <a:t>STL generators</a:t>
+            </a:r>
+            <a:endParaRPr lang="LID4096" dirty="0"/>
+          </a:p>
+        </p:txBody>
+      </p:sp>
+      <p:sp>
+        <p:nvSpPr>
+          <p:cNvPr id="4" name="Slide Number Placeholder 3">
+            <a:extLst>
+              <a:ext uri="{FF2B5EF4-FFF2-40B4-BE49-F238E27FC236}">
+                <a16:creationId xmlns:a16="http://schemas.microsoft.com/office/drawing/2014/main" id="{DA0FD79C-C1CA-A2C6-29B6-1118C6206C43}"/>
+              </a:ext>
+            </a:extLst>
+          </p:cNvPr>
+          <p:cNvSpPr>
+            <a:spLocks noGrp="1"/>
+          </p:cNvSpPr>
+          <p:nvPr>
+            <p:ph type="sldNum" sz="quarter" idx="12"/>
+          </p:nvPr>
+        </p:nvSpPr>
+        <p:spPr/>
+        <p:txBody>
+          <a:bodyPr/>
+          <a:lstStyle/>
+          <a:p>
+            <a:fld id="{FDB1AA33-DFBB-49AC-8CEE-23FFECEB5648}" type="slidenum">
+              <a:rPr lang="LID4096" smtClean="0"/>
+              <a:t>46</a:t>
+            </a:fld>
+            <a:endParaRPr lang="LID4096"/>
+          </a:p>
+        </p:txBody>
+      </p:sp>
+      <p:sp>
+        <p:nvSpPr>
+          <p:cNvPr id="5" name="TextBox 4">
+            <a:extLst>
+              <a:ext uri="{FF2B5EF4-FFF2-40B4-BE49-F238E27FC236}">
+                <a16:creationId xmlns:a16="http://schemas.microsoft.com/office/drawing/2014/main" id="{C8E6E66E-0B41-F167-E211-1131037E0EC2}"/>
+              </a:ext>
+            </a:extLst>
+          </p:cNvPr>
+          <p:cNvSpPr txBox="1"/>
+          <p:nvPr/>
+        </p:nvSpPr>
+        <p:spPr>
+          <a:xfrm>
+            <a:off x="838200" y="4561744"/>
+            <a:ext cx="7669535" cy="1138773"/>
+          </a:xfrm>
+          <a:prstGeom prst="rect">
+            <a:avLst/>
+          </a:prstGeom>
+          <a:noFill/>
+          <a:ln>
+            <a:solidFill>
+              <a:schemeClr val="tx1"/>
+            </a:solidFill>
+          </a:ln>
+        </p:spPr>
+        <p:txBody>
+          <a:bodyPr wrap="none" rtlCol="0">
+            <a:spAutoFit/>
+          </a:bodyPr>
+          <a:lstStyle/>
+          <a:p>
+            <a:r>
+              <a:rPr lang="en-US" sz="2000" dirty="0"/>
+              <a:t>See</a:t>
+            </a:r>
+          </a:p>
+          <a:p>
+            <a:r>
+              <a:rPr lang="en-US" sz="1600" dirty="0">
+                <a:hlinkClick r:id="rId2"/>
+              </a:rPr>
+              <a:t>https://github.com/gjbex/Scientific-C-plus-plus/tree/master/source-code/Functional</a:t>
+            </a:r>
+            <a:endParaRPr lang="en-US" sz="1600" dirty="0"/>
+          </a:p>
+          <a:p>
+            <a:r>
+              <a:rPr lang="en-US" sz="1600" dirty="0">
+                <a:hlinkClick r:id="rId3"/>
+              </a:rPr>
+              <a:t>https://github.com/gjbex/Scientific-C-plus-plus/tree/master/source-code/Algorithms</a:t>
+            </a:r>
+            <a:r>
+              <a:rPr lang="en-US" sz="1600" dirty="0"/>
+              <a:t> </a:t>
+            </a:r>
+          </a:p>
+          <a:p>
+            <a:r>
+              <a:rPr lang="en-US" sz="1600" dirty="0">
+                <a:hlinkClick r:id="rId4"/>
+              </a:rPr>
+              <a:t>https://github.com/gjbex/Scientific-C-plus-plus/tree/master/source-code/Ranges</a:t>
+            </a:r>
+            <a:r>
+              <a:rPr lang="en-US" sz="1600" dirty="0"/>
+              <a:t> </a:t>
+            </a:r>
+            <a:endParaRPr lang="LID4096" sz="1600" dirty="0"/>
+          </a:p>
+        </p:txBody>
+      </p:sp>
+    </p:spTree>
+    <p:extLst>
+      <p:ext uri="{BB962C8B-B14F-4D97-AF65-F5344CB8AC3E}">
+        <p14:creationId xmlns:p14="http://schemas.microsoft.com/office/powerpoint/2010/main" val="1848637771"/>
+      </p:ext>
+    </p:extLst>
+  </p:cSld>
+  <p:clrMapOvr>
+    <a:masterClrMapping/>
+  </p:clrMapOvr>
+  <p:timing>
+    <p:tnLst>
+      <p:par>
+        <p:cTn id="1" dur="indefinite" restart="never" nodeType="tmRoot">
+          <p:childTnLst>
+            <p:seq concurrent="1" nextAc="seek">
+              <p:cTn id="2" dur="indefinite" nodeType="mainSeq">
+                <p:childTnLst>
+                  <p:par>
+                    <p:cTn id="3" fill="hold">
+                      <p:stCondLst>
+                        <p:cond delay="indefinite"/>
+                      </p:stCondLst>
+                      <p:childTnLst>
+                        <p:par>
+                          <p:cTn id="4" fill="hold">
+                            <p:stCondLst>
+                              <p:cond delay="0"/>
+                            </p:stCondLst>
+                            <p:childTnLst>
+                              <p:par>
+                                <p:cTn id="5" presetID="1" presetClass="entr" presetSubtype="0" fill="hold" grpId="0" nodeType="clickEffect">
+                                  <p:stCondLst>
+                                    <p:cond delay="0"/>
+                                  </p:stCondLst>
+                                  <p:childTnLst>
+                                    <p:set>
+                                      <p:cBhvr>
+                                        <p:cTn id="6" dur="1" fill="hold">
+                                          <p:stCondLst>
+                                            <p:cond delay="0"/>
+                                          </p:stCondLst>
+                                        </p:cTn>
+                                        <p:tgtEl>
+                                          <p:spTgt spid="5"/>
+                                        </p:tgtEl>
+                                        <p:attrNameLst>
+                                          <p:attrName>style.visibility</p:attrName>
+                                        </p:attrNameLst>
+                                      </p:cBhvr>
+                                      <p:to>
+                                        <p:strVal val="visible"/>
+                                      </p:to>
+                                    </p:set>
+                                  </p:childTnLst>
+                                </p:cTn>
+                              </p:par>
+                            </p:childTnLst>
+                          </p:cTn>
+                        </p:par>
+                      </p:childTnLst>
+                    </p:cTn>
+                  </p:par>
+                </p:childTnLst>
+              </p:cTn>
+              <p:prevCondLst>
+                <p:cond evt="onPrev" delay="0">
+                  <p:tgtEl>
+                    <p:sldTgt/>
+                  </p:tgtEl>
+                </p:cond>
+              </p:prevCondLst>
+              <p:nextCondLst>
+                <p:cond evt="onNext" delay="0">
+                  <p:tgtEl>
+                    <p:sldTgt/>
+                  </p:tgtEl>
+                </p:cond>
+              </p:nextCondLst>
+            </p:seq>
+          </p:childTnLst>
+        </p:cTn>
+      </p:par>
+    </p:tnLst>
+    <p:bldLst>
+      <p:bldP spid="5" grpId="0" animBg="1"/>
+    </p:bldLst>
+  </p:timing>
 </p:sld>
 </file>
 

</xml_diff>

<commit_message>
Add UML diagrams for design patters
</commit_message>
<xml_diff>
--- a/cpp_software_engineering.pptx
+++ b/cpp_software_engineering.pptx
@@ -5,7 +5,7 @@
     <p:sldMasterId id="2147483648" r:id="rId1"/>
   </p:sldMasterIdLst>
   <p:notesMasterIdLst>
-    <p:notesMasterId r:id="rId48"/>
+    <p:notesMasterId r:id="rId51"/>
   </p:notesMasterIdLst>
   <p:sldIdLst>
     <p:sldId id="257" r:id="rId2"/>
@@ -45,15 +45,18 @@
     <p:sldId id="388" r:id="rId36"/>
     <p:sldId id="389" r:id="rId37"/>
     <p:sldId id="390" r:id="rId38"/>
-    <p:sldId id="399" r:id="rId39"/>
-    <p:sldId id="394" r:id="rId40"/>
-    <p:sldId id="395" r:id="rId41"/>
-    <p:sldId id="396" r:id="rId42"/>
-    <p:sldId id="398" r:id="rId43"/>
-    <p:sldId id="397" r:id="rId44"/>
-    <p:sldId id="391" r:id="rId45"/>
-    <p:sldId id="392" r:id="rId46"/>
-    <p:sldId id="393" r:id="rId47"/>
+    <p:sldId id="400" r:id="rId39"/>
+    <p:sldId id="401" r:id="rId40"/>
+    <p:sldId id="402" r:id="rId41"/>
+    <p:sldId id="399" r:id="rId42"/>
+    <p:sldId id="394" r:id="rId43"/>
+    <p:sldId id="395" r:id="rId44"/>
+    <p:sldId id="396" r:id="rId45"/>
+    <p:sldId id="398" r:id="rId46"/>
+    <p:sldId id="397" r:id="rId47"/>
+    <p:sldId id="391" r:id="rId48"/>
+    <p:sldId id="392" r:id="rId49"/>
+    <p:sldId id="393" r:id="rId50"/>
   </p:sldIdLst>
   <p:sldSz cx="12192000" cy="6858000"/>
   <p:notesSz cx="6858000" cy="9144000"/>
@@ -218,6 +221,9 @@
             <p14:sldId id="388"/>
             <p14:sldId id="389"/>
             <p14:sldId id="390"/>
+            <p14:sldId id="400"/>
+            <p14:sldId id="401"/>
+            <p14:sldId id="402"/>
             <p14:sldId id="399"/>
             <p14:sldId id="394"/>
             <p14:sldId id="395"/>
@@ -392,7 +398,7 @@
           <a:p>
             <a:fld id="{75E18316-3541-442E-8E76-B95A0AF605E0}" type="datetimeFigureOut">
               <a:rPr lang="LID4096" smtClean="0"/>
-              <a:t>04/08/2025</a:t>
+              <a:t>04/09/2025</a:t>
             </a:fld>
             <a:endParaRPr lang="LID4096"/>
           </a:p>
@@ -809,7 +815,7 @@
           <a:p>
             <a:fld id="{D4CCEB0E-618E-45C7-A579-AD180C33220D}" type="datetime1">
               <a:rPr lang="LID4096" smtClean="0"/>
-              <a:t>04/08/2025</a:t>
+              <a:t>04/09/2025</a:t>
             </a:fld>
             <a:endParaRPr lang="LID4096"/>
           </a:p>
@@ -1009,7 +1015,7 @@
           <a:p>
             <a:fld id="{8F9B0D5F-347B-4B69-9FE7-43363B46D130}" type="datetime1">
               <a:rPr lang="LID4096" smtClean="0"/>
-              <a:t>04/08/2025</a:t>
+              <a:t>04/09/2025</a:t>
             </a:fld>
             <a:endParaRPr lang="LID4096"/>
           </a:p>
@@ -1219,7 +1225,7 @@
           <a:p>
             <a:fld id="{A72936A9-07CF-4428-8F68-9DB53105CCBE}" type="datetime1">
               <a:rPr lang="LID4096" smtClean="0"/>
-              <a:t>04/08/2025</a:t>
+              <a:t>04/09/2025</a:t>
             </a:fld>
             <a:endParaRPr lang="LID4096"/>
           </a:p>
@@ -1419,7 +1425,7 @@
           <a:p>
             <a:fld id="{136170E8-8909-47C9-AECF-C7A110A9E262}" type="datetime1">
               <a:rPr lang="LID4096" smtClean="0"/>
-              <a:t>04/08/2025</a:t>
+              <a:t>04/09/2025</a:t>
             </a:fld>
             <a:endParaRPr lang="LID4096"/>
           </a:p>
@@ -1695,7 +1701,7 @@
           <a:p>
             <a:fld id="{D37C590D-7973-43C9-B207-04F7CE471508}" type="datetime1">
               <a:rPr lang="LID4096" smtClean="0"/>
-              <a:t>04/08/2025</a:t>
+              <a:t>04/09/2025</a:t>
             </a:fld>
             <a:endParaRPr lang="LID4096"/>
           </a:p>
@@ -1963,7 +1969,7 @@
           <a:p>
             <a:fld id="{D8E041D7-7EA6-423B-88A0-A217731AA946}" type="datetime1">
               <a:rPr lang="LID4096" smtClean="0"/>
-              <a:t>04/08/2025</a:t>
+              <a:t>04/09/2025</a:t>
             </a:fld>
             <a:endParaRPr lang="LID4096"/>
           </a:p>
@@ -2378,7 +2384,7 @@
           <a:p>
             <a:fld id="{1BDF2A55-FD61-4AC5-A515-ED3F1E80F296}" type="datetime1">
               <a:rPr lang="LID4096" smtClean="0"/>
-              <a:t>04/08/2025</a:t>
+              <a:t>04/09/2025</a:t>
             </a:fld>
             <a:endParaRPr lang="LID4096"/>
           </a:p>
@@ -2520,7 +2526,7 @@
           <a:p>
             <a:fld id="{AAED7C0E-94F0-4D14-8F58-6D25D315F3DC}" type="datetime1">
               <a:rPr lang="LID4096" smtClean="0"/>
-              <a:t>04/08/2025</a:t>
+              <a:t>04/09/2025</a:t>
             </a:fld>
             <a:endParaRPr lang="LID4096"/>
           </a:p>
@@ -2633,7 +2639,7 @@
           <a:p>
             <a:fld id="{2888AB77-1B4E-4D00-8D86-8CBF03A7E13C}" type="datetime1">
               <a:rPr lang="LID4096" smtClean="0"/>
-              <a:t>04/08/2025</a:t>
+              <a:t>04/09/2025</a:t>
             </a:fld>
             <a:endParaRPr lang="LID4096"/>
           </a:p>
@@ -2946,7 +2952,7 @@
           <a:p>
             <a:fld id="{013C0D7F-F788-458A-93D6-DCF4C7F29636}" type="datetime1">
               <a:rPr lang="LID4096" smtClean="0"/>
-              <a:t>04/08/2025</a:t>
+              <a:t>04/09/2025</a:t>
             </a:fld>
             <a:endParaRPr lang="LID4096"/>
           </a:p>
@@ -3235,7 +3241,7 @@
           <a:p>
             <a:fld id="{EEC7CCBC-154E-498D-B8FD-669CE3C64250}" type="datetime1">
               <a:rPr lang="LID4096" smtClean="0"/>
-              <a:t>04/08/2025</a:t>
+              <a:t>04/09/2025</a:t>
             </a:fld>
             <a:endParaRPr lang="LID4096"/>
           </a:p>
@@ -3478,7 +3484,7 @@
           <a:p>
             <a:fld id="{161B14D2-6539-4609-80C5-044F9B782269}" type="datetime1">
               <a:rPr lang="LID4096" smtClean="0"/>
-              <a:t>04/08/2025</a:t>
+              <a:t>04/09/2025</a:t>
             </a:fld>
             <a:endParaRPr lang="LID4096"/>
           </a:p>
@@ -16827,7 +16833,7 @@
           <a:p>
             <a:r>
               <a:rPr lang="en-US" dirty="0"/>
-              <a:t>Patterns</a:t>
+              <a:t>Design patterns</a:t>
             </a:r>
           </a:p>
         </p:txBody>
@@ -17104,7 +17110,7 @@
           <p:cNvPr id="2" name="Title 1">
             <a:extLst>
               <a:ext uri="{FF2B5EF4-FFF2-40B4-BE49-F238E27FC236}">
-                <a16:creationId xmlns:a16="http://schemas.microsoft.com/office/drawing/2014/main" id="{04B1C173-33AC-1DCA-ED63-D52D701FC426}"/>
+                <a16:creationId xmlns:a16="http://schemas.microsoft.com/office/drawing/2014/main" id="{6D22119F-79EC-4E00-B9D9-0B2587606086}"/>
               </a:ext>
             </a:extLst>
           </p:cNvPr>
@@ -17122,56 +17128,7 @@
           <a:p>
             <a:r>
               <a:rPr lang="en-US" dirty="0"/>
-              <a:t>C++ specific patterns</a:t>
-            </a:r>
-            <a:endParaRPr lang="LID4096" dirty="0"/>
-          </a:p>
-        </p:txBody>
-      </p:sp>
-      <p:sp>
-        <p:nvSpPr>
-          <p:cNvPr id="3" name="Content Placeholder 2">
-            <a:extLst>
-              <a:ext uri="{FF2B5EF4-FFF2-40B4-BE49-F238E27FC236}">
-                <a16:creationId xmlns:a16="http://schemas.microsoft.com/office/drawing/2014/main" id="{B66B5779-A74C-52C0-DAF9-FC542132634A}"/>
-              </a:ext>
-            </a:extLst>
-          </p:cNvPr>
-          <p:cNvSpPr>
-            <a:spLocks noGrp="1"/>
-          </p:cNvSpPr>
-          <p:nvPr>
-            <p:ph idx="1"/>
-          </p:nvPr>
-        </p:nvSpPr>
-        <p:spPr/>
-        <p:txBody>
-          <a:bodyPr/>
-          <a:lstStyle/>
-          <a:p>
-            <a:r>
-              <a:rPr lang="en-US" dirty="0"/>
-              <a:t>Curiously Repeating Template Pattern (CRTP)</a:t>
-            </a:r>
-          </a:p>
-          <a:p>
-            <a:r>
-              <a:rPr lang="en-US" dirty="0"/>
-              <a:t>Type erasure</a:t>
-            </a:r>
-          </a:p>
-          <a:p>
-            <a:r>
-              <a:rPr lang="en-US" dirty="0"/>
-              <a:t>Pointer to </a:t>
-            </a:r>
-            <a:r>
-              <a:rPr lang="en-US" dirty="0" err="1"/>
-              <a:t>IMPLementation</a:t>
-            </a:r>
-            <a:r>
-              <a:rPr lang="en-US" dirty="0"/>
-              <a:t> (PIMPL)</a:t>
+              <a:t>Builder design pattern</a:t>
             </a:r>
             <a:endParaRPr lang="LID4096" dirty="0"/>
           </a:p>
@@ -17182,7 +17139,7 @@
           <p:cNvPr id="4" name="Slide Number Placeholder 3">
             <a:extLst>
               <a:ext uri="{FF2B5EF4-FFF2-40B4-BE49-F238E27FC236}">
-                <a16:creationId xmlns:a16="http://schemas.microsoft.com/office/drawing/2014/main" id="{396482FC-4A8B-74E1-56FE-EFDCEEF1C5E8}"/>
+                <a16:creationId xmlns:a16="http://schemas.microsoft.com/office/drawing/2014/main" id="{DFF0D69E-6CD4-B5FE-C976-9D928F3B0DE9}"/>
               </a:ext>
             </a:extLst>
           </p:cNvPr>
@@ -17206,147 +17163,52 @@
           </a:p>
         </p:txBody>
       </p:sp>
-      <p:sp>
-        <p:nvSpPr>
-          <p:cNvPr id="5" name="TextBox 4">
+      <p:pic>
+        <p:nvPicPr>
+          <p:cNvPr id="6" name="Picture 5" descr="A diagram of a diagram&#10;&#10;AI-generated content may be incorrect.">
             <a:extLst>
               <a:ext uri="{FF2B5EF4-FFF2-40B4-BE49-F238E27FC236}">
-                <a16:creationId xmlns:a16="http://schemas.microsoft.com/office/drawing/2014/main" id="{DE65696A-5112-7F9A-EB86-7820DE1B9B54}"/>
+                <a16:creationId xmlns:a16="http://schemas.microsoft.com/office/drawing/2014/main" id="{D7E34681-6E5E-22EF-801F-FCFC18F408CF}"/>
               </a:ext>
             </a:extLst>
           </p:cNvPr>
-          <p:cNvSpPr txBox="1"/>
+          <p:cNvPicPr>
+            <a:picLocks noChangeAspect="1"/>
+          </p:cNvPicPr>
           <p:nvPr/>
-        </p:nvSpPr>
+        </p:nvPicPr>
+        <p:blipFill>
+          <a:blip r:embed="rId2">
+            <a:extLst>
+              <a:ext uri="{28A0092B-C50C-407E-A947-70E740481C1C}">
+                <a14:useLocalDpi xmlns:a14="http://schemas.microsoft.com/office/drawing/2010/main" val="0"/>
+              </a:ext>
+            </a:extLst>
+          </a:blip>
+          <a:stretch>
+            <a:fillRect/>
+          </a:stretch>
+        </p:blipFill>
         <p:spPr>
           <a:xfrm>
-            <a:off x="608437" y="5084258"/>
-            <a:ext cx="9022535" cy="646331"/>
+            <a:off x="838200" y="1611085"/>
+            <a:ext cx="10318750" cy="3537857"/>
           </a:xfrm>
           <a:prstGeom prst="rect">
             <a:avLst/>
           </a:prstGeom>
-          <a:noFill/>
-          <a:ln>
-            <a:solidFill>
-              <a:schemeClr val="tx1"/>
-            </a:solidFill>
-          </a:ln>
         </p:spPr>
-        <p:txBody>
-          <a:bodyPr wrap="none" rtlCol="0">
-            <a:spAutoFit/>
-          </a:bodyPr>
-          <a:lstStyle/>
-          <a:p>
-            <a:r>
-              <a:rPr lang="en-US" sz="2000" dirty="0"/>
-              <a:t>See</a:t>
-            </a:r>
-          </a:p>
-          <a:p>
-            <a:r>
-              <a:rPr lang="en-US" sz="1600" dirty="0">
-                <a:hlinkClick r:id="rId2"/>
-              </a:rPr>
-              <a:t>https://github.com/gjbex/C-plus-plus-software-engineering/tree/main/source-code/design-patterns</a:t>
-            </a:r>
-            <a:r>
-              <a:rPr lang="en-US" sz="1600" dirty="0"/>
-              <a:t> </a:t>
-            </a:r>
-            <a:endParaRPr lang="LID4096" sz="1600" dirty="0"/>
-          </a:p>
-        </p:txBody>
-      </p:sp>
+      </p:pic>
     </p:spTree>
     <p:extLst>
       <p:ext uri="{BB962C8B-B14F-4D97-AF65-F5344CB8AC3E}">
-        <p14:creationId xmlns:p14="http://schemas.microsoft.com/office/powerpoint/2010/main" val="3340427051"/>
+        <p14:creationId xmlns:p14="http://schemas.microsoft.com/office/powerpoint/2010/main" val="1803765814"/>
       </p:ext>
     </p:extLst>
   </p:cSld>
   <p:clrMapOvr>
     <a:masterClrMapping/>
   </p:clrMapOvr>
-  <p:timing>
-    <p:tnLst>
-      <p:par>
-        <p:cTn id="1" dur="indefinite" restart="never" nodeType="tmRoot">
-          <p:childTnLst>
-            <p:seq concurrent="1" nextAc="seek">
-              <p:cTn id="2" dur="indefinite" nodeType="mainSeq">
-                <p:childTnLst>
-                  <p:par>
-                    <p:cTn id="3" fill="hold">
-                      <p:stCondLst>
-                        <p:cond delay="indefinite"/>
-                      </p:stCondLst>
-                      <p:childTnLst>
-                        <p:par>
-                          <p:cTn id="4" fill="hold">
-                            <p:stCondLst>
-                              <p:cond delay="0"/>
-                            </p:stCondLst>
-                            <p:childTnLst>
-                              <p:par>
-                                <p:cTn id="5" presetID="1" presetClass="entr" presetSubtype="0" fill="hold" grpId="0" nodeType="clickEffect">
-                                  <p:stCondLst>
-                                    <p:cond delay="0"/>
-                                  </p:stCondLst>
-                                  <p:childTnLst>
-                                    <p:set>
-                                      <p:cBhvr>
-                                        <p:cTn id="6" dur="1" fill="hold">
-                                          <p:stCondLst>
-                                            <p:cond delay="0"/>
-                                          </p:stCondLst>
-                                        </p:cTn>
-                                        <p:tgtEl>
-                                          <p:spTgt spid="5"/>
-                                        </p:tgtEl>
-                                        <p:attrNameLst>
-                                          <p:attrName>style.visibility</p:attrName>
-                                        </p:attrNameLst>
-                                      </p:cBhvr>
-                                      <p:to>
-                                        <p:strVal val="visible"/>
-                                      </p:to>
-                                    </p:set>
-                                  </p:childTnLst>
-                                </p:cTn>
-                              </p:par>
-                            </p:childTnLst>
-                          </p:cTn>
-                        </p:par>
-                      </p:childTnLst>
-                    </p:cTn>
-                  </p:par>
-                </p:childTnLst>
-              </p:cTn>
-              <p:prevCondLst>
-                <p:cond evt="onPrev" delay="0">
-                  <p:tgtEl>
-                    <p:sldTgt/>
-                  </p:tgtEl>
-                </p:cond>
-              </p:prevCondLst>
-              <p:nextCondLst>
-                <p:cond evt="onNext" delay="0">
-                  <p:tgtEl>
-                    <p:sldTgt/>
-                  </p:tgtEl>
-                </p:cond>
-              </p:nextCondLst>
-            </p:seq>
-          </p:childTnLst>
-        </p:cTn>
-      </p:par>
-    </p:tnLst>
-    <p:bldLst>
-      <p:bldP spid="5" grpId="0" animBg="1"/>
-    </p:bldLst>
-  </p:timing>
 </p:sld>
 </file>
 
@@ -17372,7 +17234,7 @@
           <p:cNvPr id="2" name="Title 1">
             <a:extLst>
               <a:ext uri="{FF2B5EF4-FFF2-40B4-BE49-F238E27FC236}">
-                <a16:creationId xmlns:a16="http://schemas.microsoft.com/office/drawing/2014/main" id="{96A48829-0721-1480-5994-E855FF935E6E}"/>
+                <a16:creationId xmlns:a16="http://schemas.microsoft.com/office/drawing/2014/main" id="{27C65591-8615-7E00-CFBB-3B18270922B4}"/>
               </a:ext>
             </a:extLst>
           </p:cNvPr>
@@ -17390,7 +17252,7 @@
           <a:p>
             <a:r>
               <a:rPr lang="en-US" dirty="0"/>
-              <a:t>Curiously, Repeating Template Pattern (CRTP)</a:t>
+              <a:t>Factory design pattern</a:t>
             </a:r>
             <a:endParaRPr lang="LID4096" dirty="0"/>
           </a:p>
@@ -17398,58 +17260,10 @@
       </p:sp>
       <p:sp>
         <p:nvSpPr>
-          <p:cNvPr id="3" name="Content Placeholder 2">
+          <p:cNvPr id="3" name="Slide Number Placeholder 2">
             <a:extLst>
               <a:ext uri="{FF2B5EF4-FFF2-40B4-BE49-F238E27FC236}">
-                <a16:creationId xmlns:a16="http://schemas.microsoft.com/office/drawing/2014/main" id="{9BB61A49-5C18-EB0F-3E0D-D280F9E302A4}"/>
-              </a:ext>
-            </a:extLst>
-          </p:cNvPr>
-          <p:cNvSpPr>
-            <a:spLocks noGrp="1"/>
-          </p:cNvSpPr>
-          <p:nvPr>
-            <p:ph idx="1"/>
-          </p:nvPr>
-        </p:nvSpPr>
-        <p:spPr/>
-        <p:txBody>
-          <a:bodyPr>
-            <a:normAutofit/>
-          </a:bodyPr>
-          <a:lstStyle/>
-          <a:p>
-            <a:r>
-              <a:rPr lang="en-US" dirty="0"/>
-              <a:t>Avoid virtual function overhead</a:t>
-            </a:r>
-          </a:p>
-          <a:p>
-            <a:r>
-              <a:rPr lang="en-US" dirty="0"/>
-              <a:t>Enforce compile time interface constraints</a:t>
-            </a:r>
-          </a:p>
-          <a:p>
-            <a:r>
-              <a:rPr lang="en-US" dirty="0"/>
-              <a:t>Code reuse without dynamic polymorphism</a:t>
-            </a:r>
-          </a:p>
-          <a:p>
-            <a:r>
-              <a:rPr lang="en-US" dirty="0"/>
-              <a:t>Static  polymorphism</a:t>
-            </a:r>
-          </a:p>
-        </p:txBody>
-      </p:sp>
-      <p:sp>
-        <p:nvSpPr>
-          <p:cNvPr id="4" name="Slide Number Placeholder 3">
-            <a:extLst>
-              <a:ext uri="{FF2B5EF4-FFF2-40B4-BE49-F238E27FC236}">
-                <a16:creationId xmlns:a16="http://schemas.microsoft.com/office/drawing/2014/main" id="{0D8837DD-4DFF-B3FC-6690-1408C5CBE0FA}"/>
+                <a16:creationId xmlns:a16="http://schemas.microsoft.com/office/drawing/2014/main" id="{749C0292-7B1E-9B21-4614-155BA8F29F21}"/>
               </a:ext>
             </a:extLst>
           </p:cNvPr>
@@ -17473,10 +17287,46 @@
           </a:p>
         </p:txBody>
       </p:sp>
+      <p:pic>
+        <p:nvPicPr>
+          <p:cNvPr id="5" name="Picture 4" descr="A diagram of a product&#10;&#10;AI-generated content may be incorrect.">
+            <a:extLst>
+              <a:ext uri="{FF2B5EF4-FFF2-40B4-BE49-F238E27FC236}">
+                <a16:creationId xmlns:a16="http://schemas.microsoft.com/office/drawing/2014/main" id="{BBE229AF-EE3A-58FD-5C44-F9FB310063A8}"/>
+              </a:ext>
+            </a:extLst>
+          </p:cNvPr>
+          <p:cNvPicPr>
+            <a:picLocks noChangeAspect="1"/>
+          </p:cNvPicPr>
+          <p:nvPr/>
+        </p:nvPicPr>
+        <p:blipFill>
+          <a:blip r:embed="rId2">
+            <a:extLst>
+              <a:ext uri="{28A0092B-C50C-407E-A947-70E740481C1C}">
+                <a14:useLocalDpi xmlns:a14="http://schemas.microsoft.com/office/drawing/2010/main" val="0"/>
+              </a:ext>
+            </a:extLst>
+          </a:blip>
+          <a:stretch>
+            <a:fillRect/>
+          </a:stretch>
+        </p:blipFill>
+        <p:spPr>
+          <a:xfrm>
+            <a:off x="2216149" y="1690688"/>
+            <a:ext cx="8821965" cy="4234543"/>
+          </a:xfrm>
+          <a:prstGeom prst="rect">
+            <a:avLst/>
+          </a:prstGeom>
+        </p:spPr>
+      </p:pic>
     </p:spTree>
     <p:extLst>
       <p:ext uri="{BB962C8B-B14F-4D97-AF65-F5344CB8AC3E}">
-        <p14:creationId xmlns:p14="http://schemas.microsoft.com/office/powerpoint/2010/main" val="2948353845"/>
+        <p14:creationId xmlns:p14="http://schemas.microsoft.com/office/powerpoint/2010/main" val="298727713"/>
       </p:ext>
     </p:extLst>
   </p:cSld>
@@ -18831,6 +18681,534 @@
           <p:cNvPr id="2" name="Title 1">
             <a:extLst>
               <a:ext uri="{FF2B5EF4-FFF2-40B4-BE49-F238E27FC236}">
+                <a16:creationId xmlns:a16="http://schemas.microsoft.com/office/drawing/2014/main" id="{3461A7F5-2B05-C3D6-543A-A394B3B45442}"/>
+              </a:ext>
+            </a:extLst>
+          </p:cNvPr>
+          <p:cNvSpPr>
+            <a:spLocks noGrp="1"/>
+          </p:cNvSpPr>
+          <p:nvPr>
+            <p:ph type="title"/>
+          </p:nvPr>
+        </p:nvSpPr>
+        <p:spPr/>
+        <p:txBody>
+          <a:bodyPr/>
+          <a:lstStyle/>
+          <a:p>
+            <a:r>
+              <a:rPr lang="en-US" dirty="0"/>
+              <a:t>Strategy design pattern</a:t>
+            </a:r>
+            <a:endParaRPr lang="LID4096" dirty="0"/>
+          </a:p>
+        </p:txBody>
+      </p:sp>
+      <p:sp>
+        <p:nvSpPr>
+          <p:cNvPr id="3" name="Slide Number Placeholder 2">
+            <a:extLst>
+              <a:ext uri="{FF2B5EF4-FFF2-40B4-BE49-F238E27FC236}">
+                <a16:creationId xmlns:a16="http://schemas.microsoft.com/office/drawing/2014/main" id="{93BF2698-8B5C-02E9-CF1F-D8F75C69959C}"/>
+              </a:ext>
+            </a:extLst>
+          </p:cNvPr>
+          <p:cNvSpPr>
+            <a:spLocks noGrp="1"/>
+          </p:cNvSpPr>
+          <p:nvPr>
+            <p:ph type="sldNum" sz="quarter" idx="12"/>
+          </p:nvPr>
+        </p:nvSpPr>
+        <p:spPr/>
+        <p:txBody>
+          <a:bodyPr/>
+          <a:lstStyle/>
+          <a:p>
+            <a:fld id="{FDB1AA33-DFBB-49AC-8CEE-23FFECEB5648}" type="slidenum">
+              <a:rPr lang="LID4096" smtClean="0"/>
+              <a:t>40</a:t>
+            </a:fld>
+            <a:endParaRPr lang="LID4096"/>
+          </a:p>
+        </p:txBody>
+      </p:sp>
+      <p:pic>
+        <p:nvPicPr>
+          <p:cNvPr id="5" name="Picture 4" descr="A diagram of a strategy&#10;&#10;AI-generated content may be incorrect.">
+            <a:extLst>
+              <a:ext uri="{FF2B5EF4-FFF2-40B4-BE49-F238E27FC236}">
+                <a16:creationId xmlns:a16="http://schemas.microsoft.com/office/drawing/2014/main" id="{D211B979-B94C-AE2D-9433-33FECD2261C3}"/>
+              </a:ext>
+            </a:extLst>
+          </p:cNvPr>
+          <p:cNvPicPr>
+            <a:picLocks noChangeAspect="1"/>
+          </p:cNvPicPr>
+          <p:nvPr/>
+        </p:nvPicPr>
+        <p:blipFill>
+          <a:blip r:embed="rId2">
+            <a:extLst>
+              <a:ext uri="{28A0092B-C50C-407E-A947-70E740481C1C}">
+                <a14:useLocalDpi xmlns:a14="http://schemas.microsoft.com/office/drawing/2010/main" val="0"/>
+              </a:ext>
+            </a:extLst>
+          </a:blip>
+          <a:stretch>
+            <a:fillRect/>
+          </a:stretch>
+        </p:blipFill>
+        <p:spPr>
+          <a:xfrm>
+            <a:off x="445407" y="1690688"/>
+            <a:ext cx="11301186" cy="4172746"/>
+          </a:xfrm>
+          <a:prstGeom prst="rect">
+            <a:avLst/>
+          </a:prstGeom>
+        </p:spPr>
+      </p:pic>
+    </p:spTree>
+    <p:extLst>
+      <p:ext uri="{BB962C8B-B14F-4D97-AF65-F5344CB8AC3E}">
+        <p14:creationId xmlns:p14="http://schemas.microsoft.com/office/powerpoint/2010/main" val="4061975628"/>
+      </p:ext>
+    </p:extLst>
+  </p:cSld>
+  <p:clrMapOvr>
+    <a:masterClrMapping/>
+  </p:clrMapOvr>
+</p:sld>
+</file>
+
+<file path=ppt/slides/slide41.xml><?xml version="1.0" encoding="utf-8"?>
+<p:sld xmlns:a="http://schemas.openxmlformats.org/drawingml/2006/main" xmlns:r="http://schemas.openxmlformats.org/officeDocument/2006/relationships" xmlns:p="http://schemas.openxmlformats.org/presentationml/2006/main">
+  <p:cSld>
+    <p:spTree>
+      <p:nvGrpSpPr>
+        <p:cNvPr id="1" name=""/>
+        <p:cNvGrpSpPr/>
+        <p:nvPr/>
+      </p:nvGrpSpPr>
+      <p:grpSpPr>
+        <a:xfrm>
+          <a:off x="0" y="0"/>
+          <a:ext cx="0" cy="0"/>
+          <a:chOff x="0" y="0"/>
+          <a:chExt cx="0" cy="0"/>
+        </a:xfrm>
+      </p:grpSpPr>
+      <p:sp>
+        <p:nvSpPr>
+          <p:cNvPr id="2" name="Title 1">
+            <a:extLst>
+              <a:ext uri="{FF2B5EF4-FFF2-40B4-BE49-F238E27FC236}">
+                <a16:creationId xmlns:a16="http://schemas.microsoft.com/office/drawing/2014/main" id="{04B1C173-33AC-1DCA-ED63-D52D701FC426}"/>
+              </a:ext>
+            </a:extLst>
+          </p:cNvPr>
+          <p:cNvSpPr>
+            <a:spLocks noGrp="1"/>
+          </p:cNvSpPr>
+          <p:nvPr>
+            <p:ph type="title"/>
+          </p:nvPr>
+        </p:nvSpPr>
+        <p:spPr/>
+        <p:txBody>
+          <a:bodyPr/>
+          <a:lstStyle/>
+          <a:p>
+            <a:r>
+              <a:rPr lang="en-US" dirty="0"/>
+              <a:t>C++ specific patterns</a:t>
+            </a:r>
+            <a:endParaRPr lang="LID4096" dirty="0"/>
+          </a:p>
+        </p:txBody>
+      </p:sp>
+      <p:sp>
+        <p:nvSpPr>
+          <p:cNvPr id="3" name="Content Placeholder 2">
+            <a:extLst>
+              <a:ext uri="{FF2B5EF4-FFF2-40B4-BE49-F238E27FC236}">
+                <a16:creationId xmlns:a16="http://schemas.microsoft.com/office/drawing/2014/main" id="{B66B5779-A74C-52C0-DAF9-FC542132634A}"/>
+              </a:ext>
+            </a:extLst>
+          </p:cNvPr>
+          <p:cNvSpPr>
+            <a:spLocks noGrp="1"/>
+          </p:cNvSpPr>
+          <p:nvPr>
+            <p:ph idx="1"/>
+          </p:nvPr>
+        </p:nvSpPr>
+        <p:spPr/>
+        <p:txBody>
+          <a:bodyPr/>
+          <a:lstStyle/>
+          <a:p>
+            <a:r>
+              <a:rPr lang="en-US" dirty="0"/>
+              <a:t>Curiously Repeating Template Pattern (CRTP)</a:t>
+            </a:r>
+          </a:p>
+          <a:p>
+            <a:r>
+              <a:rPr lang="en-US" dirty="0"/>
+              <a:t>Type erasure</a:t>
+            </a:r>
+          </a:p>
+          <a:p>
+            <a:r>
+              <a:rPr lang="en-US" dirty="0"/>
+              <a:t>Pointer to </a:t>
+            </a:r>
+            <a:r>
+              <a:rPr lang="en-US" dirty="0" err="1"/>
+              <a:t>IMPLementation</a:t>
+            </a:r>
+            <a:r>
+              <a:rPr lang="en-US" dirty="0"/>
+              <a:t> (PIMPL)</a:t>
+            </a:r>
+            <a:endParaRPr lang="LID4096" dirty="0"/>
+          </a:p>
+        </p:txBody>
+      </p:sp>
+      <p:sp>
+        <p:nvSpPr>
+          <p:cNvPr id="4" name="Slide Number Placeholder 3">
+            <a:extLst>
+              <a:ext uri="{FF2B5EF4-FFF2-40B4-BE49-F238E27FC236}">
+                <a16:creationId xmlns:a16="http://schemas.microsoft.com/office/drawing/2014/main" id="{396482FC-4A8B-74E1-56FE-EFDCEEF1C5E8}"/>
+              </a:ext>
+            </a:extLst>
+          </p:cNvPr>
+          <p:cNvSpPr>
+            <a:spLocks noGrp="1"/>
+          </p:cNvSpPr>
+          <p:nvPr>
+            <p:ph type="sldNum" sz="quarter" idx="12"/>
+          </p:nvPr>
+        </p:nvSpPr>
+        <p:spPr/>
+        <p:txBody>
+          <a:bodyPr/>
+          <a:lstStyle/>
+          <a:p>
+            <a:fld id="{FDB1AA33-DFBB-49AC-8CEE-23FFECEB5648}" type="slidenum">
+              <a:rPr lang="LID4096" smtClean="0"/>
+              <a:t>41</a:t>
+            </a:fld>
+            <a:endParaRPr lang="LID4096"/>
+          </a:p>
+        </p:txBody>
+      </p:sp>
+      <p:sp>
+        <p:nvSpPr>
+          <p:cNvPr id="5" name="TextBox 4">
+            <a:extLst>
+              <a:ext uri="{FF2B5EF4-FFF2-40B4-BE49-F238E27FC236}">
+                <a16:creationId xmlns:a16="http://schemas.microsoft.com/office/drawing/2014/main" id="{DE65696A-5112-7F9A-EB86-7820DE1B9B54}"/>
+              </a:ext>
+            </a:extLst>
+          </p:cNvPr>
+          <p:cNvSpPr txBox="1"/>
+          <p:nvPr/>
+        </p:nvSpPr>
+        <p:spPr>
+          <a:xfrm>
+            <a:off x="608437" y="5084258"/>
+            <a:ext cx="9022535" cy="646331"/>
+          </a:xfrm>
+          <a:prstGeom prst="rect">
+            <a:avLst/>
+          </a:prstGeom>
+          <a:noFill/>
+          <a:ln>
+            <a:solidFill>
+              <a:schemeClr val="tx1"/>
+            </a:solidFill>
+          </a:ln>
+        </p:spPr>
+        <p:txBody>
+          <a:bodyPr wrap="none" rtlCol="0">
+            <a:spAutoFit/>
+          </a:bodyPr>
+          <a:lstStyle/>
+          <a:p>
+            <a:r>
+              <a:rPr lang="en-US" sz="2000" dirty="0"/>
+              <a:t>See</a:t>
+            </a:r>
+          </a:p>
+          <a:p>
+            <a:r>
+              <a:rPr lang="en-US" sz="1600" dirty="0">
+                <a:hlinkClick r:id="rId2"/>
+              </a:rPr>
+              <a:t>https://github.com/gjbex/C-plus-plus-software-engineering/tree/main/source-code/design-patterns</a:t>
+            </a:r>
+            <a:r>
+              <a:rPr lang="en-US" sz="1600" dirty="0"/>
+              <a:t> </a:t>
+            </a:r>
+            <a:endParaRPr lang="LID4096" sz="1600" dirty="0"/>
+          </a:p>
+        </p:txBody>
+      </p:sp>
+    </p:spTree>
+    <p:extLst>
+      <p:ext uri="{BB962C8B-B14F-4D97-AF65-F5344CB8AC3E}">
+        <p14:creationId xmlns:p14="http://schemas.microsoft.com/office/powerpoint/2010/main" val="3340427051"/>
+      </p:ext>
+    </p:extLst>
+  </p:cSld>
+  <p:clrMapOvr>
+    <a:masterClrMapping/>
+  </p:clrMapOvr>
+  <p:timing>
+    <p:tnLst>
+      <p:par>
+        <p:cTn id="1" dur="indefinite" restart="never" nodeType="tmRoot">
+          <p:childTnLst>
+            <p:seq concurrent="1" nextAc="seek">
+              <p:cTn id="2" dur="indefinite" nodeType="mainSeq">
+                <p:childTnLst>
+                  <p:par>
+                    <p:cTn id="3" fill="hold">
+                      <p:stCondLst>
+                        <p:cond delay="indefinite"/>
+                      </p:stCondLst>
+                      <p:childTnLst>
+                        <p:par>
+                          <p:cTn id="4" fill="hold">
+                            <p:stCondLst>
+                              <p:cond delay="0"/>
+                            </p:stCondLst>
+                            <p:childTnLst>
+                              <p:par>
+                                <p:cTn id="5" presetID="1" presetClass="entr" presetSubtype="0" fill="hold" grpId="0" nodeType="clickEffect">
+                                  <p:stCondLst>
+                                    <p:cond delay="0"/>
+                                  </p:stCondLst>
+                                  <p:childTnLst>
+                                    <p:set>
+                                      <p:cBhvr>
+                                        <p:cTn id="6" dur="1" fill="hold">
+                                          <p:stCondLst>
+                                            <p:cond delay="0"/>
+                                          </p:stCondLst>
+                                        </p:cTn>
+                                        <p:tgtEl>
+                                          <p:spTgt spid="5"/>
+                                        </p:tgtEl>
+                                        <p:attrNameLst>
+                                          <p:attrName>style.visibility</p:attrName>
+                                        </p:attrNameLst>
+                                      </p:cBhvr>
+                                      <p:to>
+                                        <p:strVal val="visible"/>
+                                      </p:to>
+                                    </p:set>
+                                  </p:childTnLst>
+                                </p:cTn>
+                              </p:par>
+                            </p:childTnLst>
+                          </p:cTn>
+                        </p:par>
+                      </p:childTnLst>
+                    </p:cTn>
+                  </p:par>
+                </p:childTnLst>
+              </p:cTn>
+              <p:prevCondLst>
+                <p:cond evt="onPrev" delay="0">
+                  <p:tgtEl>
+                    <p:sldTgt/>
+                  </p:tgtEl>
+                </p:cond>
+              </p:prevCondLst>
+              <p:nextCondLst>
+                <p:cond evt="onNext" delay="0">
+                  <p:tgtEl>
+                    <p:sldTgt/>
+                  </p:tgtEl>
+                </p:cond>
+              </p:nextCondLst>
+            </p:seq>
+          </p:childTnLst>
+        </p:cTn>
+      </p:par>
+    </p:tnLst>
+    <p:bldLst>
+      <p:bldP spid="5" grpId="0" animBg="1"/>
+    </p:bldLst>
+  </p:timing>
+</p:sld>
+</file>
+
+<file path=ppt/slides/slide42.xml><?xml version="1.0" encoding="utf-8"?>
+<p:sld xmlns:a="http://schemas.openxmlformats.org/drawingml/2006/main" xmlns:r="http://schemas.openxmlformats.org/officeDocument/2006/relationships" xmlns:p="http://schemas.openxmlformats.org/presentationml/2006/main">
+  <p:cSld>
+    <p:spTree>
+      <p:nvGrpSpPr>
+        <p:cNvPr id="1" name=""/>
+        <p:cNvGrpSpPr/>
+        <p:nvPr/>
+      </p:nvGrpSpPr>
+      <p:grpSpPr>
+        <a:xfrm>
+          <a:off x="0" y="0"/>
+          <a:ext cx="0" cy="0"/>
+          <a:chOff x="0" y="0"/>
+          <a:chExt cx="0" cy="0"/>
+        </a:xfrm>
+      </p:grpSpPr>
+      <p:sp>
+        <p:nvSpPr>
+          <p:cNvPr id="2" name="Title 1">
+            <a:extLst>
+              <a:ext uri="{FF2B5EF4-FFF2-40B4-BE49-F238E27FC236}">
+                <a16:creationId xmlns:a16="http://schemas.microsoft.com/office/drawing/2014/main" id="{96A48829-0721-1480-5994-E855FF935E6E}"/>
+              </a:ext>
+            </a:extLst>
+          </p:cNvPr>
+          <p:cNvSpPr>
+            <a:spLocks noGrp="1"/>
+          </p:cNvSpPr>
+          <p:nvPr>
+            <p:ph type="title"/>
+          </p:nvPr>
+        </p:nvSpPr>
+        <p:spPr/>
+        <p:txBody>
+          <a:bodyPr/>
+          <a:lstStyle/>
+          <a:p>
+            <a:r>
+              <a:rPr lang="en-US" dirty="0"/>
+              <a:t>Curiously, Repeating Template Pattern (CRTP)</a:t>
+            </a:r>
+            <a:endParaRPr lang="LID4096" dirty="0"/>
+          </a:p>
+        </p:txBody>
+      </p:sp>
+      <p:sp>
+        <p:nvSpPr>
+          <p:cNvPr id="3" name="Content Placeholder 2">
+            <a:extLst>
+              <a:ext uri="{FF2B5EF4-FFF2-40B4-BE49-F238E27FC236}">
+                <a16:creationId xmlns:a16="http://schemas.microsoft.com/office/drawing/2014/main" id="{9BB61A49-5C18-EB0F-3E0D-D280F9E302A4}"/>
+              </a:ext>
+            </a:extLst>
+          </p:cNvPr>
+          <p:cNvSpPr>
+            <a:spLocks noGrp="1"/>
+          </p:cNvSpPr>
+          <p:nvPr>
+            <p:ph idx="1"/>
+          </p:nvPr>
+        </p:nvSpPr>
+        <p:spPr/>
+        <p:txBody>
+          <a:bodyPr>
+            <a:normAutofit/>
+          </a:bodyPr>
+          <a:lstStyle/>
+          <a:p>
+            <a:r>
+              <a:rPr lang="en-US" dirty="0"/>
+              <a:t>Avoid virtual function overhead</a:t>
+            </a:r>
+          </a:p>
+          <a:p>
+            <a:r>
+              <a:rPr lang="en-US" dirty="0"/>
+              <a:t>Enforce compile time interface constraints</a:t>
+            </a:r>
+          </a:p>
+          <a:p>
+            <a:r>
+              <a:rPr lang="en-US" dirty="0"/>
+              <a:t>Code reuse without dynamic polymorphism</a:t>
+            </a:r>
+          </a:p>
+          <a:p>
+            <a:r>
+              <a:rPr lang="en-US" dirty="0"/>
+              <a:t>Static  polymorphism</a:t>
+            </a:r>
+          </a:p>
+        </p:txBody>
+      </p:sp>
+      <p:sp>
+        <p:nvSpPr>
+          <p:cNvPr id="4" name="Slide Number Placeholder 3">
+            <a:extLst>
+              <a:ext uri="{FF2B5EF4-FFF2-40B4-BE49-F238E27FC236}">
+                <a16:creationId xmlns:a16="http://schemas.microsoft.com/office/drawing/2014/main" id="{0D8837DD-4DFF-B3FC-6690-1408C5CBE0FA}"/>
+              </a:ext>
+            </a:extLst>
+          </p:cNvPr>
+          <p:cNvSpPr>
+            <a:spLocks noGrp="1"/>
+          </p:cNvSpPr>
+          <p:nvPr>
+            <p:ph type="sldNum" sz="quarter" idx="12"/>
+          </p:nvPr>
+        </p:nvSpPr>
+        <p:spPr/>
+        <p:txBody>
+          <a:bodyPr/>
+          <a:lstStyle/>
+          <a:p>
+            <a:fld id="{FDB1AA33-DFBB-49AC-8CEE-23FFECEB5648}" type="slidenum">
+              <a:rPr lang="LID4096" smtClean="0"/>
+              <a:t>42</a:t>
+            </a:fld>
+            <a:endParaRPr lang="LID4096"/>
+          </a:p>
+        </p:txBody>
+      </p:sp>
+    </p:spTree>
+    <p:extLst>
+      <p:ext uri="{BB962C8B-B14F-4D97-AF65-F5344CB8AC3E}">
+        <p14:creationId xmlns:p14="http://schemas.microsoft.com/office/powerpoint/2010/main" val="2948353845"/>
+      </p:ext>
+    </p:extLst>
+  </p:cSld>
+  <p:clrMapOvr>
+    <a:masterClrMapping/>
+  </p:clrMapOvr>
+</p:sld>
+</file>
+
+<file path=ppt/slides/slide43.xml><?xml version="1.0" encoding="utf-8"?>
+<p:sld xmlns:a="http://schemas.openxmlformats.org/drawingml/2006/main" xmlns:r="http://schemas.openxmlformats.org/officeDocument/2006/relationships" xmlns:p="http://schemas.openxmlformats.org/presentationml/2006/main">
+  <p:cSld>
+    <p:spTree>
+      <p:nvGrpSpPr>
+        <p:cNvPr id="1" name=""/>
+        <p:cNvGrpSpPr/>
+        <p:nvPr/>
+      </p:nvGrpSpPr>
+      <p:grpSpPr>
+        <a:xfrm>
+          <a:off x="0" y="0"/>
+          <a:ext cx="0" cy="0"/>
+          <a:chOff x="0" y="0"/>
+          <a:chExt cx="0" cy="0"/>
+        </a:xfrm>
+      </p:grpSpPr>
+      <p:sp>
+        <p:nvSpPr>
+          <p:cNvPr id="2" name="Title 1">
+            <a:extLst>
+              <a:ext uri="{FF2B5EF4-FFF2-40B4-BE49-F238E27FC236}">
                 <a16:creationId xmlns:a16="http://schemas.microsoft.com/office/drawing/2014/main" id="{08C9A350-282A-80DC-C746-795502250CAE}"/>
               </a:ext>
             </a:extLst>
@@ -18878,7 +19256,7 @@
           <a:p>
             <a:fld id="{FDB1AA33-DFBB-49AC-8CEE-23FFECEB5648}" type="slidenum">
               <a:rPr lang="LID4096" smtClean="0"/>
-              <a:t>40</a:t>
+              <a:t>43</a:t>
             </a:fld>
             <a:endParaRPr lang="LID4096"/>
           </a:p>
@@ -19655,7 +20033,7 @@
 </p:sld>
 </file>
 
-<file path=ppt/slides/slide41.xml><?xml version="1.0" encoding="utf-8"?>
+<file path=ppt/slides/slide44.xml><?xml version="1.0" encoding="utf-8"?>
 <p:sld xmlns:a="http://schemas.openxmlformats.org/drawingml/2006/main" xmlns:r="http://schemas.openxmlformats.org/officeDocument/2006/relationships" xmlns:p="http://schemas.openxmlformats.org/presentationml/2006/main">
   <p:cSld>
     <p:spTree>
@@ -19724,7 +20102,7 @@
           <a:p>
             <a:fld id="{FDB1AA33-DFBB-49AC-8CEE-23FFECEB5648}" type="slidenum">
               <a:rPr lang="LID4096" smtClean="0"/>
-              <a:t>41</a:t>
+              <a:t>44</a:t>
             </a:fld>
             <a:endParaRPr lang="LID4096"/>
           </a:p>
@@ -20288,7 +20666,7 @@
 </p:sld>
 </file>
 
-<file path=ppt/slides/slide42.xml><?xml version="1.0" encoding="utf-8"?>
+<file path=ppt/slides/slide45.xml><?xml version="1.0" encoding="utf-8"?>
 <p:sld xmlns:a="http://schemas.openxmlformats.org/drawingml/2006/main" xmlns:r="http://schemas.openxmlformats.org/officeDocument/2006/relationships" xmlns:p="http://schemas.openxmlformats.org/presentationml/2006/main">
   <p:cSld>
     <p:spTree>
@@ -20357,7 +20735,7 @@
           <a:p>
             <a:fld id="{FDB1AA33-DFBB-49AC-8CEE-23FFECEB5648}" type="slidenum">
               <a:rPr lang="LID4096" smtClean="0"/>
-              <a:t>42</a:t>
+              <a:t>45</a:t>
             </a:fld>
             <a:endParaRPr lang="LID4096"/>
           </a:p>
@@ -21075,7 +21453,7 @@
 </p:sld>
 </file>
 
-<file path=ppt/slides/slide43.xml><?xml version="1.0" encoding="utf-8"?>
+<file path=ppt/slides/slide46.xml><?xml version="1.0" encoding="utf-8"?>
 <p:sld xmlns:a="http://schemas.openxmlformats.org/drawingml/2006/main" xmlns:r="http://schemas.openxmlformats.org/officeDocument/2006/relationships" xmlns:p="http://schemas.openxmlformats.org/presentationml/2006/main">
   <p:cSld>
     <p:spTree>
@@ -21144,7 +21522,7 @@
           <a:p>
             <a:fld id="{FDB1AA33-DFBB-49AC-8CEE-23FFECEB5648}" type="slidenum">
               <a:rPr lang="LID4096" smtClean="0"/>
-              <a:t>43</a:t>
+              <a:t>46</a:t>
             </a:fld>
             <a:endParaRPr lang="LID4096"/>
           </a:p>
@@ -21491,7 +21869,7 @@
 </p:sld>
 </file>
 
-<file path=ppt/slides/slide44.xml><?xml version="1.0" encoding="utf-8"?>
+<file path=ppt/slides/slide47.xml><?xml version="1.0" encoding="utf-8"?>
 <p:sld xmlns:a="http://schemas.openxmlformats.org/drawingml/2006/main" xmlns:r="http://schemas.openxmlformats.org/officeDocument/2006/relationships" xmlns:p="http://schemas.openxmlformats.org/presentationml/2006/main">
   <p:cSld>
     <p:spTree>
@@ -21601,7 +21979,7 @@
                 <a:latin typeface="Calibri"/>
               </a:rPr>
               <a:pPr/>
-              <a:t>44</a:t>
+              <a:t>47</a:t>
             </a:fld>
             <a:endParaRPr lang="nl-BE">
               <a:solidFill>
@@ -21627,7 +22005,7 @@
 </p:sld>
 </file>
 
-<file path=ppt/slides/slide45.xml><?xml version="1.0" encoding="utf-8"?>
+<file path=ppt/slides/slide48.xml><?xml version="1.0" encoding="utf-8"?>
 <p:sld xmlns:a="http://schemas.openxmlformats.org/drawingml/2006/main" xmlns:r="http://schemas.openxmlformats.org/officeDocument/2006/relationships" xmlns:p="http://schemas.openxmlformats.org/presentationml/2006/main">
   <p:cSld>
     <p:spTree>
@@ -21721,7 +22099,7 @@
           <a:p>
             <a:fld id="{FDB1AA33-DFBB-49AC-8CEE-23FFECEB5648}" type="slidenum">
               <a:rPr lang="LID4096" smtClean="0"/>
-              <a:t>45</a:t>
+              <a:t>48</a:t>
             </a:fld>
             <a:endParaRPr lang="LID4096"/>
           </a:p>
@@ -21740,7 +22118,7 @@
 </p:sld>
 </file>
 
-<file path=ppt/slides/slide46.xml><?xml version="1.0" encoding="utf-8"?>
+<file path=ppt/slides/slide49.xml><?xml version="1.0" encoding="utf-8"?>
 <p:sld xmlns:a="http://schemas.openxmlformats.org/drawingml/2006/main" xmlns:r="http://schemas.openxmlformats.org/officeDocument/2006/relationships" xmlns:p="http://schemas.openxmlformats.org/presentationml/2006/main">
   <p:cSld>
     <p:spTree>
@@ -21856,7 +22234,7 @@
           <a:p>
             <a:fld id="{FDB1AA33-DFBB-49AC-8CEE-23FFECEB5648}" type="slidenum">
               <a:rPr lang="LID4096" smtClean="0"/>
-              <a:t>46</a:t>
+              <a:t>49</a:t>
             </a:fld>
             <a:endParaRPr lang="LID4096"/>
           </a:p>

</xml_diff>

<commit_message>
Add slide on Law of Demeter
</commit_message>
<xml_diff>
--- a/cpp_software_engineering.pptx
+++ b/cpp_software_engineering.pptx
@@ -5,7 +5,7 @@
     <p:sldMasterId id="2147483648" r:id="rId1"/>
   </p:sldMasterIdLst>
   <p:notesMasterIdLst>
-    <p:notesMasterId r:id="rId60"/>
+    <p:notesMasterId r:id="rId61"/>
   </p:notesMasterIdLst>
   <p:sldIdLst>
     <p:sldId id="257" r:id="rId2"/>
@@ -49,23 +49,24 @@
     <p:sldId id="407" r:id="rId40"/>
     <p:sldId id="408" r:id="rId41"/>
     <p:sldId id="409" r:id="rId42"/>
-    <p:sldId id="410" r:id="rId43"/>
-    <p:sldId id="388" r:id="rId44"/>
-    <p:sldId id="389" r:id="rId45"/>
-    <p:sldId id="390" r:id="rId46"/>
-    <p:sldId id="400" r:id="rId47"/>
-    <p:sldId id="401" r:id="rId48"/>
-    <p:sldId id="402" r:id="rId49"/>
-    <p:sldId id="411" r:id="rId50"/>
-    <p:sldId id="399" r:id="rId51"/>
-    <p:sldId id="394" r:id="rId52"/>
-    <p:sldId id="395" r:id="rId53"/>
-    <p:sldId id="396" r:id="rId54"/>
-    <p:sldId id="398" r:id="rId55"/>
-    <p:sldId id="397" r:id="rId56"/>
-    <p:sldId id="391" r:id="rId57"/>
-    <p:sldId id="392" r:id="rId58"/>
-    <p:sldId id="393" r:id="rId59"/>
+    <p:sldId id="412" r:id="rId43"/>
+    <p:sldId id="410" r:id="rId44"/>
+    <p:sldId id="388" r:id="rId45"/>
+    <p:sldId id="389" r:id="rId46"/>
+    <p:sldId id="390" r:id="rId47"/>
+    <p:sldId id="400" r:id="rId48"/>
+    <p:sldId id="401" r:id="rId49"/>
+    <p:sldId id="402" r:id="rId50"/>
+    <p:sldId id="411" r:id="rId51"/>
+    <p:sldId id="399" r:id="rId52"/>
+    <p:sldId id="394" r:id="rId53"/>
+    <p:sldId id="395" r:id="rId54"/>
+    <p:sldId id="396" r:id="rId55"/>
+    <p:sldId id="398" r:id="rId56"/>
+    <p:sldId id="397" r:id="rId57"/>
+    <p:sldId id="391" r:id="rId58"/>
+    <p:sldId id="392" r:id="rId59"/>
+    <p:sldId id="393" r:id="rId60"/>
   </p:sldIdLst>
   <p:sldSz cx="12192000" cy="6858000"/>
   <p:notesSz cx="6858000" cy="9144000"/>
@@ -234,6 +235,7 @@
             <p14:sldId id="407"/>
             <p14:sldId id="408"/>
             <p14:sldId id="409"/>
+            <p14:sldId id="412"/>
             <p14:sldId id="410"/>
           </p14:sldIdLst>
         </p14:section>
@@ -19055,7 +19057,7 @@
           <a:lstStyle/>
           <a:p>
             <a:r>
-              <a:rPr lang="en-US" sz="2800" dirty="0"/>
+              <a:rPr lang="en-US" sz="2800" i="1" dirty="0"/>
               <a:t>“Favor multiple small interfaces"</a:t>
             </a:r>
           </a:p>
@@ -19259,7 +19261,7 @@
           <a:lstStyle/>
           <a:p>
             <a:r>
-              <a:rPr lang="en-US" sz="2800" dirty="0"/>
+              <a:rPr lang="en-US" sz="2800" i="1" dirty="0"/>
               <a:t>“Depend on abstractions, not concretions"</a:t>
             </a:r>
           </a:p>
@@ -19279,6 +19281,207 @@
 </file>
 
 <file path=ppt/slides/slide42.xml><?xml version="1.0" encoding="utf-8"?>
+<p:sld xmlns:a="http://schemas.openxmlformats.org/drawingml/2006/main" xmlns:r="http://schemas.openxmlformats.org/officeDocument/2006/relationships" xmlns:p="http://schemas.openxmlformats.org/presentationml/2006/main">
+  <p:cSld>
+    <p:spTree>
+      <p:nvGrpSpPr>
+        <p:cNvPr id="1" name=""/>
+        <p:cNvGrpSpPr/>
+        <p:nvPr/>
+      </p:nvGrpSpPr>
+      <p:grpSpPr>
+        <a:xfrm>
+          <a:off x="0" y="0"/>
+          <a:ext cx="0" cy="0"/>
+          <a:chOff x="0" y="0"/>
+          <a:chExt cx="0" cy="0"/>
+        </a:xfrm>
+      </p:grpSpPr>
+      <p:sp>
+        <p:nvSpPr>
+          <p:cNvPr id="2" name="Title 1">
+            <a:extLst>
+              <a:ext uri="{FF2B5EF4-FFF2-40B4-BE49-F238E27FC236}">
+                <a16:creationId xmlns:a16="http://schemas.microsoft.com/office/drawing/2014/main" id="{E345F046-03E8-3287-6100-CF100F5770AA}"/>
+              </a:ext>
+            </a:extLst>
+          </p:cNvPr>
+          <p:cNvSpPr>
+            <a:spLocks noGrp="1"/>
+          </p:cNvSpPr>
+          <p:nvPr>
+            <p:ph type="title"/>
+          </p:nvPr>
+        </p:nvSpPr>
+        <p:spPr/>
+        <p:txBody>
+          <a:bodyPr/>
+          <a:lstStyle/>
+          <a:p>
+            <a:r>
+              <a:rPr lang="en-US" dirty="0"/>
+              <a:t>Law of Demeter</a:t>
+            </a:r>
+            <a:endParaRPr lang="LID4096" dirty="0"/>
+          </a:p>
+        </p:txBody>
+      </p:sp>
+      <p:sp>
+        <p:nvSpPr>
+          <p:cNvPr id="3" name="Content Placeholder 2">
+            <a:extLst>
+              <a:ext uri="{FF2B5EF4-FFF2-40B4-BE49-F238E27FC236}">
+                <a16:creationId xmlns:a16="http://schemas.microsoft.com/office/drawing/2014/main" id="{40637969-887A-4388-5B5F-3A24C77277DF}"/>
+              </a:ext>
+            </a:extLst>
+          </p:cNvPr>
+          <p:cNvSpPr>
+            <a:spLocks noGrp="1"/>
+          </p:cNvSpPr>
+          <p:nvPr>
+            <p:ph idx="1"/>
+          </p:nvPr>
+        </p:nvSpPr>
+        <p:spPr/>
+        <p:txBody>
+          <a:bodyPr/>
+          <a:lstStyle/>
+          <a:p>
+            <a:r>
+              <a:rPr lang="en-US" dirty="0"/>
+              <a:t>modules should not "know" about the internal details of the objects it interacts with</a:t>
+            </a:r>
+          </a:p>
+          <a:p>
+            <a:endParaRPr lang="en-US" dirty="0"/>
+          </a:p>
+          <a:p>
+            <a:endParaRPr lang="en-US" dirty="0"/>
+          </a:p>
+          <a:p>
+            <a:r>
+              <a:rPr lang="en-US" dirty="0"/>
+              <a:t>Law of Demeter helps enforce SOLID</a:t>
+            </a:r>
+          </a:p>
+          <a:p>
+            <a:pPr lvl="1"/>
+            <a:r>
+              <a:rPr lang="en-US" dirty="0"/>
+              <a:t>Helps enforce Single Responsibility Principle</a:t>
+            </a:r>
+          </a:p>
+          <a:p>
+            <a:pPr lvl="1"/>
+            <a:r>
+              <a:rPr lang="en-US" dirty="0"/>
+              <a:t>Reduces ripple effect of change (open-closed principle)</a:t>
+            </a:r>
+          </a:p>
+          <a:p>
+            <a:pPr lvl="1"/>
+            <a:r>
+              <a:rPr lang="en-US" dirty="0"/>
+              <a:t>Encourages smaller </a:t>
+            </a:r>
+            <a:r>
+              <a:rPr lang="en-US" dirty="0" err="1"/>
+              <a:t>intervaces</a:t>
+            </a:r>
+            <a:r>
+              <a:rPr lang="en-US" dirty="0"/>
+              <a:t> (Interface segregation principle)</a:t>
+            </a:r>
+          </a:p>
+          <a:p>
+            <a:pPr lvl="1"/>
+            <a:endParaRPr lang="LID4096" dirty="0"/>
+          </a:p>
+        </p:txBody>
+      </p:sp>
+      <p:sp>
+        <p:nvSpPr>
+          <p:cNvPr id="4" name="Slide Number Placeholder 3">
+            <a:extLst>
+              <a:ext uri="{FF2B5EF4-FFF2-40B4-BE49-F238E27FC236}">
+                <a16:creationId xmlns:a16="http://schemas.microsoft.com/office/drawing/2014/main" id="{B7B33C54-A2C7-38A8-32C4-37C006B52194}"/>
+              </a:ext>
+            </a:extLst>
+          </p:cNvPr>
+          <p:cNvSpPr>
+            <a:spLocks noGrp="1"/>
+          </p:cNvSpPr>
+          <p:nvPr>
+            <p:ph type="sldNum" sz="quarter" idx="12"/>
+          </p:nvPr>
+        </p:nvSpPr>
+        <p:spPr/>
+        <p:txBody>
+          <a:bodyPr/>
+          <a:lstStyle/>
+          <a:p>
+            <a:fld id="{FDB1AA33-DFBB-49AC-8CEE-23FFECEB5648}" type="slidenum">
+              <a:rPr lang="LID4096" smtClean="0"/>
+              <a:t>42</a:t>
+            </a:fld>
+            <a:endParaRPr lang="LID4096"/>
+          </a:p>
+        </p:txBody>
+      </p:sp>
+      <p:sp>
+        <p:nvSpPr>
+          <p:cNvPr id="5" name="TextBox 4">
+            <a:extLst>
+              <a:ext uri="{FF2B5EF4-FFF2-40B4-BE49-F238E27FC236}">
+                <a16:creationId xmlns:a16="http://schemas.microsoft.com/office/drawing/2014/main" id="{500EFF76-E597-7C9F-3C3D-A7C83002931D}"/>
+              </a:ext>
+            </a:extLst>
+          </p:cNvPr>
+          <p:cNvSpPr txBox="1"/>
+          <p:nvPr/>
+        </p:nvSpPr>
+        <p:spPr>
+          <a:xfrm>
+            <a:off x="2493916" y="2825387"/>
+            <a:ext cx="5828455" cy="523220"/>
+          </a:xfrm>
+          <a:prstGeom prst="rect">
+            <a:avLst/>
+          </a:prstGeom>
+          <a:noFill/>
+          <a:ln>
+            <a:solidFill>
+              <a:schemeClr val="tx1"/>
+            </a:solidFill>
+          </a:ln>
+        </p:spPr>
+        <p:txBody>
+          <a:bodyPr wrap="none" rtlCol="0">
+            <a:spAutoFit/>
+          </a:bodyPr>
+          <a:lstStyle/>
+          <a:p>
+            <a:r>
+              <a:rPr lang="en-US" sz="2800" i="1" dirty="0"/>
+              <a:t>"Only talk to your immediate friends"</a:t>
+            </a:r>
+          </a:p>
+        </p:txBody>
+      </p:sp>
+    </p:spTree>
+    <p:extLst>
+      <p:ext uri="{BB962C8B-B14F-4D97-AF65-F5344CB8AC3E}">
+        <p14:creationId xmlns:p14="http://schemas.microsoft.com/office/powerpoint/2010/main" val="2179805701"/>
+      </p:ext>
+    </p:extLst>
+  </p:cSld>
+  <p:clrMapOvr>
+    <a:masterClrMapping/>
+  </p:clrMapOvr>
+</p:sld>
+</file>
+
+<file path=ppt/slides/slide43.xml><?xml version="1.0" encoding="utf-8"?>
 <p:sld xmlns:a="http://schemas.openxmlformats.org/drawingml/2006/main" xmlns:r="http://schemas.openxmlformats.org/officeDocument/2006/relationships" xmlns:p="http://schemas.openxmlformats.org/presentationml/2006/main">
   <p:cSld>
     <p:spTree>
@@ -19390,7 +19593,7 @@
           <a:p>
             <a:fld id="{FDB1AA33-DFBB-49AC-8CEE-23FFECEB5648}" type="slidenum">
               <a:rPr lang="LID4096" smtClean="0"/>
-              <a:t>42</a:t>
+              <a:t>43</a:t>
             </a:fld>
             <a:endParaRPr lang="LID4096"/>
           </a:p>
@@ -19400,119 +19603,6 @@
     <p:extLst>
       <p:ext uri="{BB962C8B-B14F-4D97-AF65-F5344CB8AC3E}">
         <p14:creationId xmlns:p14="http://schemas.microsoft.com/office/powerpoint/2010/main" val="2527627142"/>
-      </p:ext>
-    </p:extLst>
-  </p:cSld>
-  <p:clrMapOvr>
-    <a:masterClrMapping/>
-  </p:clrMapOvr>
-</p:sld>
-</file>
-
-<file path=ppt/slides/slide43.xml><?xml version="1.0" encoding="utf-8"?>
-<p:sld xmlns:a="http://schemas.openxmlformats.org/drawingml/2006/main" xmlns:r="http://schemas.openxmlformats.org/officeDocument/2006/relationships" xmlns:p="http://schemas.openxmlformats.org/presentationml/2006/main">
-  <p:cSld>
-    <p:spTree>
-      <p:nvGrpSpPr>
-        <p:cNvPr id="1" name=""/>
-        <p:cNvGrpSpPr/>
-        <p:nvPr/>
-      </p:nvGrpSpPr>
-      <p:grpSpPr>
-        <a:xfrm>
-          <a:off x="0" y="0"/>
-          <a:ext cx="0" cy="0"/>
-          <a:chOff x="0" y="0"/>
-          <a:chExt cx="0" cy="0"/>
-        </a:xfrm>
-      </p:grpSpPr>
-      <p:sp>
-        <p:nvSpPr>
-          <p:cNvPr id="2" name="Title 1">
-            <a:extLst>
-              <a:ext uri="{FF2B5EF4-FFF2-40B4-BE49-F238E27FC236}">
-                <a16:creationId xmlns:a16="http://schemas.microsoft.com/office/drawing/2014/main" id="{22DA9DDC-00AC-C65F-BAB9-D666A4911419}"/>
-              </a:ext>
-            </a:extLst>
-          </p:cNvPr>
-          <p:cNvSpPr>
-            <a:spLocks noGrp="1"/>
-          </p:cNvSpPr>
-          <p:nvPr>
-            <p:ph type="title"/>
-          </p:nvPr>
-        </p:nvSpPr>
-        <p:spPr/>
-        <p:txBody>
-          <a:bodyPr/>
-          <a:lstStyle/>
-          <a:p>
-            <a:r>
-              <a:rPr lang="en-US" dirty="0"/>
-              <a:t>Design patterns</a:t>
-            </a:r>
-            <a:endParaRPr lang="LID4096" dirty="0"/>
-          </a:p>
-        </p:txBody>
-      </p:sp>
-      <p:sp>
-        <p:nvSpPr>
-          <p:cNvPr id="3" name="Text Placeholder 2">
-            <a:extLst>
-              <a:ext uri="{FF2B5EF4-FFF2-40B4-BE49-F238E27FC236}">
-                <a16:creationId xmlns:a16="http://schemas.microsoft.com/office/drawing/2014/main" id="{9A3CC304-7A54-167F-627F-941E46AB2D0A}"/>
-              </a:ext>
-            </a:extLst>
-          </p:cNvPr>
-          <p:cNvSpPr>
-            <a:spLocks noGrp="1"/>
-          </p:cNvSpPr>
-          <p:nvPr>
-            <p:ph type="body" idx="1"/>
-          </p:nvPr>
-        </p:nvSpPr>
-        <p:spPr/>
-        <p:txBody>
-          <a:bodyPr/>
-          <a:lstStyle/>
-          <a:p>
-            <a:endParaRPr lang="LID4096"/>
-          </a:p>
-        </p:txBody>
-      </p:sp>
-      <p:sp>
-        <p:nvSpPr>
-          <p:cNvPr id="4" name="Slide Number Placeholder 3">
-            <a:extLst>
-              <a:ext uri="{FF2B5EF4-FFF2-40B4-BE49-F238E27FC236}">
-                <a16:creationId xmlns:a16="http://schemas.microsoft.com/office/drawing/2014/main" id="{22A889D4-CBB4-A356-9FBF-17C5A6AB3E9C}"/>
-              </a:ext>
-            </a:extLst>
-          </p:cNvPr>
-          <p:cNvSpPr>
-            <a:spLocks noGrp="1"/>
-          </p:cNvSpPr>
-          <p:nvPr>
-            <p:ph type="sldNum" sz="quarter" idx="12"/>
-          </p:nvPr>
-        </p:nvSpPr>
-        <p:spPr/>
-        <p:txBody>
-          <a:bodyPr/>
-          <a:lstStyle/>
-          <a:p>
-            <a:fld id="{FDB1AA33-DFBB-49AC-8CEE-23FFECEB5648}" type="slidenum">
-              <a:rPr lang="LID4096" smtClean="0"/>
-              <a:t>43</a:t>
-            </a:fld>
-            <a:endParaRPr lang="LID4096"/>
-          </a:p>
-        </p:txBody>
-      </p:sp>
-    </p:spTree>
-    <p:extLst>
-      <p:ext uri="{BB962C8B-B14F-4D97-AF65-F5344CB8AC3E}">
-        <p14:creationId xmlns:p14="http://schemas.microsoft.com/office/powerpoint/2010/main" val="2812671867"/>
       </p:ext>
     </p:extLst>
   </p:cSld>
@@ -19544,7 +19634,7 @@
           <p:cNvPr id="2" name="Title 1">
             <a:extLst>
               <a:ext uri="{FF2B5EF4-FFF2-40B4-BE49-F238E27FC236}">
-                <a16:creationId xmlns:a16="http://schemas.microsoft.com/office/drawing/2014/main" id="{0CDE1B04-6F71-4330-B666-5B7B430C7C40}"/>
+                <a16:creationId xmlns:a16="http://schemas.microsoft.com/office/drawing/2014/main" id="{22DA9DDC-00AC-C65F-BAB9-D666A4911419}"/>
               </a:ext>
             </a:extLst>
           </p:cNvPr>
@@ -19562,17 +19652,18 @@
           <a:p>
             <a:r>
               <a:rPr lang="en-US" dirty="0"/>
-              <a:t>Motivation</a:t>
-            </a:r>
-          </a:p>
-        </p:txBody>
-      </p:sp>
-      <p:sp>
-        <p:nvSpPr>
-          <p:cNvPr id="3" name="Content Placeholder 2">
+              <a:t>Design patterns</a:t>
+            </a:r>
+            <a:endParaRPr lang="LID4096" dirty="0"/>
+          </a:p>
+        </p:txBody>
+      </p:sp>
+      <p:sp>
+        <p:nvSpPr>
+          <p:cNvPr id="3" name="Text Placeholder 2">
             <a:extLst>
               <a:ext uri="{FF2B5EF4-FFF2-40B4-BE49-F238E27FC236}">
-                <a16:creationId xmlns:a16="http://schemas.microsoft.com/office/drawing/2014/main" id="{CC98AEC1-1A7F-4251-B837-4A655C9DC61E}"/>
+                <a16:creationId xmlns:a16="http://schemas.microsoft.com/office/drawing/2014/main" id="{9A3CC304-7A54-167F-627F-941E46AB2D0A}"/>
               </a:ext>
             </a:extLst>
           </p:cNvPr>
@@ -19580,7 +19671,7 @@
             <a:spLocks noGrp="1"/>
           </p:cNvSpPr>
           <p:nvPr>
-            <p:ph idx="1"/>
+            <p:ph type="body" idx="1"/>
           </p:nvPr>
         </p:nvSpPr>
         <p:spPr/>
@@ -19588,23 +19679,7 @@
           <a:bodyPr/>
           <a:lstStyle/>
           <a:p>
-            <a:r>
-              <a:rPr lang="en-US" dirty="0"/>
-              <a:t>Observation: patterns in problems to solve</a:t>
-            </a:r>
-          </a:p>
-          <a:p>
-            <a:r>
-              <a:rPr lang="en-US" dirty="0"/>
-              <a:t>Design pattern = recipe for software design</a:t>
-            </a:r>
-          </a:p>
-          <a:p>
-            <a:pPr lvl="1"/>
-            <a:r>
-              <a:rPr lang="en-US" dirty="0"/>
-              <a:t>Don’t reinvent the wheel</a:t>
-            </a:r>
+            <a:endParaRPr lang="LID4096"/>
           </a:p>
         </p:txBody>
       </p:sp>
@@ -19613,7 +19688,7 @@
           <p:cNvPr id="4" name="Slide Number Placeholder 3">
             <a:extLst>
               <a:ext uri="{FF2B5EF4-FFF2-40B4-BE49-F238E27FC236}">
-                <a16:creationId xmlns:a16="http://schemas.microsoft.com/office/drawing/2014/main" id="{9F31908B-C8B8-481C-9414-BA9B8EAA880A}"/>
+                <a16:creationId xmlns:a16="http://schemas.microsoft.com/office/drawing/2014/main" id="{22A889D4-CBB4-A356-9FBF-17C5A6AB3E9C}"/>
               </a:ext>
             </a:extLst>
           </p:cNvPr>
@@ -19629,18 +19704,18 @@
           <a:bodyPr/>
           <a:lstStyle/>
           <a:p>
-            <a:fld id="{5A209D72-2E9D-49B0-8977-41DCCC66C0BB}" type="slidenum">
-              <a:rPr lang="nl-BE" smtClean="0"/>
+            <a:fld id="{FDB1AA33-DFBB-49AC-8CEE-23FFECEB5648}" type="slidenum">
+              <a:rPr lang="LID4096" smtClean="0"/>
               <a:t>44</a:t>
             </a:fld>
-            <a:endParaRPr lang="nl-BE"/>
+            <a:endParaRPr lang="LID4096"/>
           </a:p>
         </p:txBody>
       </p:sp>
     </p:spTree>
     <p:extLst>
       <p:ext uri="{BB962C8B-B14F-4D97-AF65-F5344CB8AC3E}">
-        <p14:creationId xmlns:p14="http://schemas.microsoft.com/office/powerpoint/2010/main" val="3503158207"/>
+        <p14:creationId xmlns:p14="http://schemas.microsoft.com/office/powerpoint/2010/main" val="2812671867"/>
       </p:ext>
     </p:extLst>
   </p:cSld>
@@ -19672,7 +19747,7 @@
           <p:cNvPr id="2" name="Title 1">
             <a:extLst>
               <a:ext uri="{FF2B5EF4-FFF2-40B4-BE49-F238E27FC236}">
-                <a16:creationId xmlns:a16="http://schemas.microsoft.com/office/drawing/2014/main" id="{AA5E72B2-61DF-4F7D-A226-9483D7C44016}"/>
+                <a16:creationId xmlns:a16="http://schemas.microsoft.com/office/drawing/2014/main" id="{0CDE1B04-6F71-4330-B666-5B7B430C7C40}"/>
               </a:ext>
             </a:extLst>
           </p:cNvPr>
@@ -19690,7 +19765,7 @@
           <a:p>
             <a:r>
               <a:rPr lang="en-US" dirty="0"/>
-              <a:t>Design patterns</a:t>
+              <a:t>Motivation</a:t>
             </a:r>
           </a:p>
         </p:txBody>
@@ -19700,7 +19775,7 @@
           <p:cNvPr id="3" name="Content Placeholder 2">
             <a:extLst>
               <a:ext uri="{FF2B5EF4-FFF2-40B4-BE49-F238E27FC236}">
-                <a16:creationId xmlns:a16="http://schemas.microsoft.com/office/drawing/2014/main" id="{D04ABB18-0664-4863-B217-DD2E149B55F2}"/>
+                <a16:creationId xmlns:a16="http://schemas.microsoft.com/office/drawing/2014/main" id="{CC98AEC1-1A7F-4251-B837-4A655C9DC61E}"/>
               </a:ext>
             </a:extLst>
           </p:cNvPr>
@@ -19718,56 +19793,20 @@
           <a:p>
             <a:r>
               <a:rPr lang="en-US" dirty="0"/>
-              <a:t>Quite a lot (23 originally)</a:t>
+              <a:t>Observation: patterns in problems to solve</a:t>
+            </a:r>
+          </a:p>
+          <a:p>
+            <a:r>
+              <a:rPr lang="en-US" dirty="0"/>
+              <a:t>Design pattern = recipe for software design</a:t>
             </a:r>
           </a:p>
           <a:p>
             <a:pPr lvl="1"/>
             <a:r>
               <a:rPr lang="en-US" dirty="0"/>
-              <a:t>Creational patterns</a:t>
-            </a:r>
-          </a:p>
-          <a:p>
-            <a:pPr lvl="2"/>
-            <a:r>
-              <a:rPr lang="en-US" dirty="0"/>
-              <a:t>E.g., builder, factory</a:t>
-            </a:r>
-          </a:p>
-          <a:p>
-            <a:pPr lvl="1"/>
-            <a:r>
-              <a:rPr lang="en-US" dirty="0"/>
-              <a:t>Structural patterns</a:t>
-            </a:r>
-          </a:p>
-          <a:p>
-            <a:pPr lvl="2"/>
-            <a:r>
-              <a:rPr lang="en-US" dirty="0"/>
-              <a:t>E.g., decorator</a:t>
-            </a:r>
-          </a:p>
-          <a:p>
-            <a:pPr lvl="1"/>
-            <a:r>
-              <a:rPr lang="en-US" dirty="0"/>
-              <a:t>Behavioral patterns</a:t>
-            </a:r>
-          </a:p>
-          <a:p>
-            <a:pPr lvl="2"/>
-            <a:r>
-              <a:rPr lang="en-US" dirty="0"/>
-              <a:t>E.g., state, strategy</a:t>
-            </a:r>
-          </a:p>
-          <a:p>
-            <a:pPr lvl="1"/>
-            <a:r>
-              <a:rPr lang="en-US" dirty="0"/>
-              <a:t>Parallel patterns</a:t>
+              <a:t>Don’t reinvent the wheel</a:t>
             </a:r>
           </a:p>
         </p:txBody>
@@ -19777,7 +19816,7 @@
           <p:cNvPr id="4" name="Slide Number Placeholder 3">
             <a:extLst>
               <a:ext uri="{FF2B5EF4-FFF2-40B4-BE49-F238E27FC236}">
-                <a16:creationId xmlns:a16="http://schemas.microsoft.com/office/drawing/2014/main" id="{6CAD0D00-276F-449C-8ED3-67B7F75E2EF3}"/>
+                <a16:creationId xmlns:a16="http://schemas.microsoft.com/office/drawing/2014/main" id="{9F31908B-C8B8-481C-9414-BA9B8EAA880A}"/>
               </a:ext>
             </a:extLst>
           </p:cNvPr>
@@ -19796,6 +19835,170 @@
             <a:fld id="{5A209D72-2E9D-49B0-8977-41DCCC66C0BB}" type="slidenum">
               <a:rPr lang="nl-BE" smtClean="0"/>
               <a:t>45</a:t>
+            </a:fld>
+            <a:endParaRPr lang="nl-BE"/>
+          </a:p>
+        </p:txBody>
+      </p:sp>
+    </p:spTree>
+    <p:extLst>
+      <p:ext uri="{BB962C8B-B14F-4D97-AF65-F5344CB8AC3E}">
+        <p14:creationId xmlns:p14="http://schemas.microsoft.com/office/powerpoint/2010/main" val="3503158207"/>
+      </p:ext>
+    </p:extLst>
+  </p:cSld>
+  <p:clrMapOvr>
+    <a:masterClrMapping/>
+  </p:clrMapOvr>
+</p:sld>
+</file>
+
+<file path=ppt/slides/slide46.xml><?xml version="1.0" encoding="utf-8"?>
+<p:sld xmlns:a="http://schemas.openxmlformats.org/drawingml/2006/main" xmlns:r="http://schemas.openxmlformats.org/officeDocument/2006/relationships" xmlns:p="http://schemas.openxmlformats.org/presentationml/2006/main">
+  <p:cSld>
+    <p:spTree>
+      <p:nvGrpSpPr>
+        <p:cNvPr id="1" name=""/>
+        <p:cNvGrpSpPr/>
+        <p:nvPr/>
+      </p:nvGrpSpPr>
+      <p:grpSpPr>
+        <a:xfrm>
+          <a:off x="0" y="0"/>
+          <a:ext cx="0" cy="0"/>
+          <a:chOff x="0" y="0"/>
+          <a:chExt cx="0" cy="0"/>
+        </a:xfrm>
+      </p:grpSpPr>
+      <p:sp>
+        <p:nvSpPr>
+          <p:cNvPr id="2" name="Title 1">
+            <a:extLst>
+              <a:ext uri="{FF2B5EF4-FFF2-40B4-BE49-F238E27FC236}">
+                <a16:creationId xmlns:a16="http://schemas.microsoft.com/office/drawing/2014/main" id="{AA5E72B2-61DF-4F7D-A226-9483D7C44016}"/>
+              </a:ext>
+            </a:extLst>
+          </p:cNvPr>
+          <p:cNvSpPr>
+            <a:spLocks noGrp="1"/>
+          </p:cNvSpPr>
+          <p:nvPr>
+            <p:ph type="title"/>
+          </p:nvPr>
+        </p:nvSpPr>
+        <p:spPr/>
+        <p:txBody>
+          <a:bodyPr/>
+          <a:lstStyle/>
+          <a:p>
+            <a:r>
+              <a:rPr lang="en-US" dirty="0"/>
+              <a:t>Design patterns</a:t>
+            </a:r>
+          </a:p>
+        </p:txBody>
+      </p:sp>
+      <p:sp>
+        <p:nvSpPr>
+          <p:cNvPr id="3" name="Content Placeholder 2">
+            <a:extLst>
+              <a:ext uri="{FF2B5EF4-FFF2-40B4-BE49-F238E27FC236}">
+                <a16:creationId xmlns:a16="http://schemas.microsoft.com/office/drawing/2014/main" id="{D04ABB18-0664-4863-B217-DD2E149B55F2}"/>
+              </a:ext>
+            </a:extLst>
+          </p:cNvPr>
+          <p:cNvSpPr>
+            <a:spLocks noGrp="1"/>
+          </p:cNvSpPr>
+          <p:nvPr>
+            <p:ph idx="1"/>
+          </p:nvPr>
+        </p:nvSpPr>
+        <p:spPr/>
+        <p:txBody>
+          <a:bodyPr/>
+          <a:lstStyle/>
+          <a:p>
+            <a:r>
+              <a:rPr lang="en-US" dirty="0"/>
+              <a:t>Quite a lot (23 originally)</a:t>
+            </a:r>
+          </a:p>
+          <a:p>
+            <a:pPr lvl="1"/>
+            <a:r>
+              <a:rPr lang="en-US" dirty="0"/>
+              <a:t>Creational patterns</a:t>
+            </a:r>
+          </a:p>
+          <a:p>
+            <a:pPr lvl="2"/>
+            <a:r>
+              <a:rPr lang="en-US" dirty="0"/>
+              <a:t>E.g., builder, factory</a:t>
+            </a:r>
+          </a:p>
+          <a:p>
+            <a:pPr lvl="1"/>
+            <a:r>
+              <a:rPr lang="en-US" dirty="0"/>
+              <a:t>Structural patterns</a:t>
+            </a:r>
+          </a:p>
+          <a:p>
+            <a:pPr lvl="2"/>
+            <a:r>
+              <a:rPr lang="en-US" dirty="0"/>
+              <a:t>E.g., decorator</a:t>
+            </a:r>
+          </a:p>
+          <a:p>
+            <a:pPr lvl="1"/>
+            <a:r>
+              <a:rPr lang="en-US" dirty="0"/>
+              <a:t>Behavioral patterns</a:t>
+            </a:r>
+          </a:p>
+          <a:p>
+            <a:pPr lvl="2"/>
+            <a:r>
+              <a:rPr lang="en-US" dirty="0"/>
+              <a:t>E.g., state, strategy</a:t>
+            </a:r>
+          </a:p>
+          <a:p>
+            <a:pPr lvl="1"/>
+            <a:r>
+              <a:rPr lang="en-US" dirty="0"/>
+              <a:t>Parallel patterns</a:t>
+            </a:r>
+          </a:p>
+        </p:txBody>
+      </p:sp>
+      <p:sp>
+        <p:nvSpPr>
+          <p:cNvPr id="4" name="Slide Number Placeholder 3">
+            <a:extLst>
+              <a:ext uri="{FF2B5EF4-FFF2-40B4-BE49-F238E27FC236}">
+                <a16:creationId xmlns:a16="http://schemas.microsoft.com/office/drawing/2014/main" id="{6CAD0D00-276F-449C-8ED3-67B7F75E2EF3}"/>
+              </a:ext>
+            </a:extLst>
+          </p:cNvPr>
+          <p:cNvSpPr>
+            <a:spLocks noGrp="1"/>
+          </p:cNvSpPr>
+          <p:nvPr>
+            <p:ph type="sldNum" sz="quarter" idx="12"/>
+          </p:nvPr>
+        </p:nvSpPr>
+        <p:spPr/>
+        <p:txBody>
+          <a:bodyPr/>
+          <a:lstStyle/>
+          <a:p>
+            <a:fld id="{5A209D72-2E9D-49B0-8977-41DCCC66C0BB}" type="slidenum">
+              <a:rPr lang="nl-BE" smtClean="0"/>
+              <a:t>46</a:t>
             </a:fld>
             <a:endParaRPr lang="nl-BE"/>
           </a:p>
@@ -19945,7 +20148,7 @@
 </p:sld>
 </file>
 
-<file path=ppt/slides/slide46.xml><?xml version="1.0" encoding="utf-8"?>
+<file path=ppt/slides/slide47.xml><?xml version="1.0" encoding="utf-8"?>
 <p:sld xmlns:a="http://schemas.openxmlformats.org/drawingml/2006/main" xmlns:r="http://schemas.openxmlformats.org/officeDocument/2006/relationships" xmlns:p="http://schemas.openxmlformats.org/presentationml/2006/main">
   <p:cSld>
     <p:spTree>
@@ -20014,7 +20217,7 @@
           <a:p>
             <a:fld id="{FDB1AA33-DFBB-49AC-8CEE-23FFECEB5648}" type="slidenum">
               <a:rPr lang="LID4096" smtClean="0"/>
-              <a:t>46</a:t>
+              <a:t>47</a:t>
             </a:fld>
             <a:endParaRPr lang="LID4096"/>
           </a:p>
@@ -20199,273 +20402,6 @@
 </p:sld>
 </file>
 
-<file path=ppt/slides/slide47.xml><?xml version="1.0" encoding="utf-8"?>
-<p:sld xmlns:a="http://schemas.openxmlformats.org/drawingml/2006/main" xmlns:r="http://schemas.openxmlformats.org/officeDocument/2006/relationships" xmlns:p="http://schemas.openxmlformats.org/presentationml/2006/main">
-  <p:cSld>
-    <p:spTree>
-      <p:nvGrpSpPr>
-        <p:cNvPr id="1" name=""/>
-        <p:cNvGrpSpPr/>
-        <p:nvPr/>
-      </p:nvGrpSpPr>
-      <p:grpSpPr>
-        <a:xfrm>
-          <a:off x="0" y="0"/>
-          <a:ext cx="0" cy="0"/>
-          <a:chOff x="0" y="0"/>
-          <a:chExt cx="0" cy="0"/>
-        </a:xfrm>
-      </p:grpSpPr>
-      <p:sp>
-        <p:nvSpPr>
-          <p:cNvPr id="2" name="Title 1">
-            <a:extLst>
-              <a:ext uri="{FF2B5EF4-FFF2-40B4-BE49-F238E27FC236}">
-                <a16:creationId xmlns:a16="http://schemas.microsoft.com/office/drawing/2014/main" id="{27C65591-8615-7E00-CFBB-3B18270922B4}"/>
-              </a:ext>
-            </a:extLst>
-          </p:cNvPr>
-          <p:cNvSpPr>
-            <a:spLocks noGrp="1"/>
-          </p:cNvSpPr>
-          <p:nvPr>
-            <p:ph type="title"/>
-          </p:nvPr>
-        </p:nvSpPr>
-        <p:spPr/>
-        <p:txBody>
-          <a:bodyPr/>
-          <a:lstStyle/>
-          <a:p>
-            <a:r>
-              <a:rPr lang="en-US" dirty="0"/>
-              <a:t>Factory design pattern</a:t>
-            </a:r>
-            <a:endParaRPr lang="LID4096" dirty="0"/>
-          </a:p>
-        </p:txBody>
-      </p:sp>
-      <p:sp>
-        <p:nvSpPr>
-          <p:cNvPr id="3" name="Slide Number Placeholder 2">
-            <a:extLst>
-              <a:ext uri="{FF2B5EF4-FFF2-40B4-BE49-F238E27FC236}">
-                <a16:creationId xmlns:a16="http://schemas.microsoft.com/office/drawing/2014/main" id="{749C0292-7B1E-9B21-4614-155BA8F29F21}"/>
-              </a:ext>
-            </a:extLst>
-          </p:cNvPr>
-          <p:cNvSpPr>
-            <a:spLocks noGrp="1"/>
-          </p:cNvSpPr>
-          <p:nvPr>
-            <p:ph type="sldNum" sz="quarter" idx="12"/>
-          </p:nvPr>
-        </p:nvSpPr>
-        <p:spPr/>
-        <p:txBody>
-          <a:bodyPr/>
-          <a:lstStyle/>
-          <a:p>
-            <a:fld id="{FDB1AA33-DFBB-49AC-8CEE-23FFECEB5648}" type="slidenum">
-              <a:rPr lang="LID4096" smtClean="0"/>
-              <a:t>47</a:t>
-            </a:fld>
-            <a:endParaRPr lang="LID4096"/>
-          </a:p>
-        </p:txBody>
-      </p:sp>
-      <p:pic>
-        <p:nvPicPr>
-          <p:cNvPr id="5" name="Picture 4" descr="A diagram of a product&#10;&#10;AI-generated content may be incorrect.">
-            <a:extLst>
-              <a:ext uri="{FF2B5EF4-FFF2-40B4-BE49-F238E27FC236}">
-                <a16:creationId xmlns:a16="http://schemas.microsoft.com/office/drawing/2014/main" id="{BBE229AF-EE3A-58FD-5C44-F9FB310063A8}"/>
-              </a:ext>
-            </a:extLst>
-          </p:cNvPr>
-          <p:cNvPicPr>
-            <a:picLocks noChangeAspect="1"/>
-          </p:cNvPicPr>
-          <p:nvPr/>
-        </p:nvPicPr>
-        <p:blipFill>
-          <a:blip r:embed="rId2">
-            <a:extLst>
-              <a:ext uri="{28A0092B-C50C-407E-A947-70E740481C1C}">
-                <a14:useLocalDpi xmlns:a14="http://schemas.microsoft.com/office/drawing/2010/main" val="0"/>
-              </a:ext>
-            </a:extLst>
-          </a:blip>
-          <a:stretch>
-            <a:fillRect/>
-          </a:stretch>
-        </p:blipFill>
-        <p:spPr>
-          <a:xfrm>
-            <a:off x="2216149" y="1690688"/>
-            <a:ext cx="8821965" cy="4234543"/>
-          </a:xfrm>
-          <a:prstGeom prst="rect">
-            <a:avLst/>
-          </a:prstGeom>
-        </p:spPr>
-      </p:pic>
-      <p:sp>
-        <p:nvSpPr>
-          <p:cNvPr id="4" name="TextBox 3">
-            <a:extLst>
-              <a:ext uri="{FF2B5EF4-FFF2-40B4-BE49-F238E27FC236}">
-                <a16:creationId xmlns:a16="http://schemas.microsoft.com/office/drawing/2014/main" id="{A3AE771F-B92C-A5F6-80B5-1C6B4577A404}"/>
-              </a:ext>
-            </a:extLst>
-          </p:cNvPr>
-          <p:cNvSpPr txBox="1"/>
-          <p:nvPr/>
-        </p:nvSpPr>
-        <p:spPr>
-          <a:xfrm>
-            <a:off x="499580" y="5791830"/>
-            <a:ext cx="9752413" cy="892552"/>
-          </a:xfrm>
-          <a:prstGeom prst="rect">
-            <a:avLst/>
-          </a:prstGeom>
-          <a:noFill/>
-          <a:ln>
-            <a:solidFill>
-              <a:schemeClr val="tx1"/>
-            </a:solidFill>
-          </a:ln>
-        </p:spPr>
-        <p:txBody>
-          <a:bodyPr wrap="none" rtlCol="0">
-            <a:spAutoFit/>
-          </a:bodyPr>
-          <a:lstStyle/>
-          <a:p>
-            <a:r>
-              <a:rPr lang="en-US" sz="2000" dirty="0"/>
-              <a:t>See</a:t>
-            </a:r>
-          </a:p>
-          <a:p>
-            <a:r>
-              <a:rPr lang="en-US" sz="1600" dirty="0">
-                <a:hlinkClick r:id="rId3"/>
-              </a:rPr>
-              <a:t>https://github.com/gjbex/Scientific-C-plus-plus/tree/master/source-code/DesignPatterns/FactoryPattern</a:t>
-            </a:r>
-            <a:r>
-              <a:rPr lang="en-US" sz="1600" dirty="0"/>
-              <a:t> </a:t>
-            </a:r>
-            <a:br>
-              <a:rPr lang="en-US" sz="2000" dirty="0"/>
-            </a:br>
-            <a:r>
-              <a:rPr lang="en-US" sz="1600" dirty="0">
-                <a:hlinkClick r:id="rId4"/>
-              </a:rPr>
-              <a:t>https://github.com/gjbex/Scientific-C-plus-plus/tree/master/source-code/DesignPatterns/CellularAutomata</a:t>
-            </a:r>
-            <a:r>
-              <a:rPr lang="en-US" sz="1600" dirty="0"/>
-              <a:t> </a:t>
-            </a:r>
-          </a:p>
-        </p:txBody>
-      </p:sp>
-    </p:spTree>
-    <p:extLst>
-      <p:ext uri="{BB962C8B-B14F-4D97-AF65-F5344CB8AC3E}">
-        <p14:creationId xmlns:p14="http://schemas.microsoft.com/office/powerpoint/2010/main" val="298727713"/>
-      </p:ext>
-    </p:extLst>
-  </p:cSld>
-  <p:clrMapOvr>
-    <a:masterClrMapping/>
-  </p:clrMapOvr>
-  <p:timing>
-    <p:tnLst>
-      <p:par>
-        <p:cTn id="1" dur="indefinite" restart="never" nodeType="tmRoot">
-          <p:childTnLst>
-            <p:seq concurrent="1" nextAc="seek">
-              <p:cTn id="2" dur="indefinite" nodeType="mainSeq">
-                <p:childTnLst>
-                  <p:par>
-                    <p:cTn id="3" fill="hold">
-                      <p:stCondLst>
-                        <p:cond delay="indefinite"/>
-                      </p:stCondLst>
-                      <p:childTnLst>
-                        <p:par>
-                          <p:cTn id="4" fill="hold">
-                            <p:stCondLst>
-                              <p:cond delay="0"/>
-                            </p:stCondLst>
-                            <p:childTnLst>
-                              <p:par>
-                                <p:cTn id="5" presetID="1" presetClass="entr" presetSubtype="0" fill="hold" grpId="0" nodeType="clickEffect">
-                                  <p:stCondLst>
-                                    <p:cond delay="0"/>
-                                  </p:stCondLst>
-                                  <p:childTnLst>
-                                    <p:set>
-                                      <p:cBhvr>
-                                        <p:cTn id="6" dur="1" fill="hold">
-                                          <p:stCondLst>
-                                            <p:cond delay="0"/>
-                                          </p:stCondLst>
-                                        </p:cTn>
-                                        <p:tgtEl>
-                                          <p:spTgt spid="4"/>
-                                        </p:tgtEl>
-                                        <p:attrNameLst>
-                                          <p:attrName>style.visibility</p:attrName>
-                                        </p:attrNameLst>
-                                      </p:cBhvr>
-                                      <p:to>
-                                        <p:strVal val="visible"/>
-                                      </p:to>
-                                    </p:set>
-                                  </p:childTnLst>
-                                </p:cTn>
-                              </p:par>
-                            </p:childTnLst>
-                          </p:cTn>
-                        </p:par>
-                      </p:childTnLst>
-                    </p:cTn>
-                  </p:par>
-                </p:childTnLst>
-              </p:cTn>
-              <p:prevCondLst>
-                <p:cond evt="onPrev" delay="0">
-                  <p:tgtEl>
-                    <p:sldTgt/>
-                  </p:tgtEl>
-                </p:cond>
-              </p:prevCondLst>
-              <p:nextCondLst>
-                <p:cond evt="onNext" delay="0">
-                  <p:tgtEl>
-                    <p:sldTgt/>
-                  </p:tgtEl>
-                </p:cond>
-              </p:nextCondLst>
-            </p:seq>
-          </p:childTnLst>
-        </p:cTn>
-      </p:par>
-    </p:tnLst>
-    <p:bldLst>
-      <p:bldP spid="4" grpId="0" animBg="1"/>
-    </p:bldLst>
-  </p:timing>
-</p:sld>
-</file>
-
 <file path=ppt/slides/slide48.xml><?xml version="1.0" encoding="utf-8"?>
 <p:sld xmlns:a="http://schemas.openxmlformats.org/drawingml/2006/main" xmlns:r="http://schemas.openxmlformats.org/officeDocument/2006/relationships" xmlns:p="http://schemas.openxmlformats.org/presentationml/2006/main">
   <p:cSld>
@@ -20488,7 +20424,7 @@
           <p:cNvPr id="2" name="Title 1">
             <a:extLst>
               <a:ext uri="{FF2B5EF4-FFF2-40B4-BE49-F238E27FC236}">
-                <a16:creationId xmlns:a16="http://schemas.microsoft.com/office/drawing/2014/main" id="{3461A7F5-2B05-C3D6-543A-A394B3B45442}"/>
+                <a16:creationId xmlns:a16="http://schemas.microsoft.com/office/drawing/2014/main" id="{27C65591-8615-7E00-CFBB-3B18270922B4}"/>
               </a:ext>
             </a:extLst>
           </p:cNvPr>
@@ -20506,7 +20442,7 @@
           <a:p>
             <a:r>
               <a:rPr lang="en-US" dirty="0"/>
-              <a:t>Strategy design pattern</a:t>
+              <a:t>Factory design pattern</a:t>
             </a:r>
             <a:endParaRPr lang="LID4096" dirty="0"/>
           </a:p>
@@ -20517,7 +20453,7 @@
           <p:cNvPr id="3" name="Slide Number Placeholder 2">
             <a:extLst>
               <a:ext uri="{FF2B5EF4-FFF2-40B4-BE49-F238E27FC236}">
-                <a16:creationId xmlns:a16="http://schemas.microsoft.com/office/drawing/2014/main" id="{93BF2698-8B5C-02E9-CF1F-D8F75C69959C}"/>
+                <a16:creationId xmlns:a16="http://schemas.microsoft.com/office/drawing/2014/main" id="{749C0292-7B1E-9B21-4614-155BA8F29F21}"/>
               </a:ext>
             </a:extLst>
           </p:cNvPr>
@@ -20543,10 +20479,10 @@
       </p:sp>
       <p:pic>
         <p:nvPicPr>
-          <p:cNvPr id="5" name="Picture 4" descr="A diagram of a strategy&#10;&#10;AI-generated content may be incorrect.">
+          <p:cNvPr id="5" name="Picture 4" descr="A diagram of a product&#10;&#10;AI-generated content may be incorrect.">
             <a:extLst>
               <a:ext uri="{FF2B5EF4-FFF2-40B4-BE49-F238E27FC236}">
-                <a16:creationId xmlns:a16="http://schemas.microsoft.com/office/drawing/2014/main" id="{D211B979-B94C-AE2D-9433-33FECD2261C3}"/>
+                <a16:creationId xmlns:a16="http://schemas.microsoft.com/office/drawing/2014/main" id="{BBE229AF-EE3A-58FD-5C44-F9FB310063A8}"/>
               </a:ext>
             </a:extLst>
           </p:cNvPr>
@@ -20569,8 +20505,8 @@
         </p:blipFill>
         <p:spPr>
           <a:xfrm>
-            <a:off x="445407" y="1690688"/>
-            <a:ext cx="11301186" cy="4172746"/>
+            <a:off x="2216149" y="1690688"/>
+            <a:ext cx="8821965" cy="4234543"/>
           </a:xfrm>
           <a:prstGeom prst="rect">
             <a:avLst/>
@@ -20582,7 +20518,7 @@
           <p:cNvPr id="4" name="TextBox 3">
             <a:extLst>
               <a:ext uri="{FF2B5EF4-FFF2-40B4-BE49-F238E27FC236}">
-                <a16:creationId xmlns:a16="http://schemas.microsoft.com/office/drawing/2014/main" id="{9A043FF5-1E32-01EF-A4BE-A3BD95E2D17C}"/>
+                <a16:creationId xmlns:a16="http://schemas.microsoft.com/office/drawing/2014/main" id="{A3AE771F-B92C-A5F6-80B5-1C6B4577A404}"/>
               </a:ext>
             </a:extLst>
           </p:cNvPr>
@@ -20614,22 +20550,21 @@
               <a:rPr lang="en-US" sz="2000" dirty="0"/>
               <a:t>See</a:t>
             </a:r>
+          </a:p>
+          <a:p>
+            <a:r>
+              <a:rPr lang="en-US" sz="1600" dirty="0">
+                <a:hlinkClick r:id="rId3"/>
+              </a:rPr>
+              <a:t>https://github.com/gjbex/Scientific-C-plus-plus/tree/master/source-code/DesignPatterns/FactoryPattern</a:t>
+            </a:r>
+            <a:r>
+              <a:rPr lang="en-US" sz="1600" dirty="0"/>
+              <a:t> </a:t>
+            </a:r>
             <a:br>
               <a:rPr lang="en-US" sz="2000" dirty="0"/>
             </a:br>
-            <a:r>
-              <a:rPr lang="en-US" sz="1600" dirty="0">
-                <a:hlinkClick r:id="rId3"/>
-              </a:rPr>
-              <a:t>https://github.com/gjbex/Scientific-C-plus-plus/tree/master/source-code/DesignPatterns/StrategyPattern</a:t>
-            </a:r>
-            <a:r>
-              <a:rPr lang="en-US" sz="1600" dirty="0"/>
-              <a:t> </a:t>
-            </a:r>
-            <a:endParaRPr lang="en-US" sz="2000" dirty="0"/>
-          </a:p>
-          <a:p>
             <a:r>
               <a:rPr lang="en-US" sz="1600" dirty="0">
                 <a:hlinkClick r:id="rId4"/>
@@ -20646,7 +20581,7 @@
     </p:spTree>
     <p:extLst>
       <p:ext uri="{BB962C8B-B14F-4D97-AF65-F5344CB8AC3E}">
-        <p14:creationId xmlns:p14="http://schemas.microsoft.com/office/powerpoint/2010/main" val="4061975628"/>
+        <p14:creationId xmlns:p14="http://schemas.microsoft.com/office/powerpoint/2010/main" val="298727713"/>
       </p:ext>
     </p:extLst>
   </p:cSld>
@@ -20756,7 +20691,7 @@
           <p:cNvPr id="2" name="Title 1">
             <a:extLst>
               <a:ext uri="{FF2B5EF4-FFF2-40B4-BE49-F238E27FC236}">
-                <a16:creationId xmlns:a16="http://schemas.microsoft.com/office/drawing/2014/main" id="{7FB23902-4673-FD84-A438-AC235282E2BD}"/>
+                <a16:creationId xmlns:a16="http://schemas.microsoft.com/office/drawing/2014/main" id="{3461A7F5-2B05-C3D6-543A-A394B3B45442}"/>
               </a:ext>
             </a:extLst>
           </p:cNvPr>
@@ -20774,7 +20709,7 @@
           <a:p>
             <a:r>
               <a:rPr lang="en-US" dirty="0"/>
-              <a:t>Decorator pattern</a:t>
+              <a:t>Strategy design pattern</a:t>
             </a:r>
             <a:endParaRPr lang="LID4096" dirty="0"/>
           </a:p>
@@ -20785,7 +20720,7 @@
           <p:cNvPr id="3" name="Slide Number Placeholder 2">
             <a:extLst>
               <a:ext uri="{FF2B5EF4-FFF2-40B4-BE49-F238E27FC236}">
-                <a16:creationId xmlns:a16="http://schemas.microsoft.com/office/drawing/2014/main" id="{A78D1F06-39E4-F97D-EF30-466A89D65C12}"/>
+                <a16:creationId xmlns:a16="http://schemas.microsoft.com/office/drawing/2014/main" id="{93BF2698-8B5C-02E9-CF1F-D8F75C69959C}"/>
               </a:ext>
             </a:extLst>
           </p:cNvPr>
@@ -20811,10 +20746,10 @@
       </p:sp>
       <p:pic>
         <p:nvPicPr>
-          <p:cNvPr id="5" name="Graphic 4">
+          <p:cNvPr id="5" name="Picture 4" descr="A diagram of a strategy&#10;&#10;AI-generated content may be incorrect.">
             <a:extLst>
               <a:ext uri="{FF2B5EF4-FFF2-40B4-BE49-F238E27FC236}">
-                <a16:creationId xmlns:a16="http://schemas.microsoft.com/office/drawing/2014/main" id="{54786055-7602-0DE3-36B7-1F30D4A6576C}"/>
+                <a16:creationId xmlns:a16="http://schemas.microsoft.com/office/drawing/2014/main" id="{D211B979-B94C-AE2D-9433-33FECD2261C3}"/>
               </a:ext>
             </a:extLst>
           </p:cNvPr>
@@ -20826,8 +20761,8 @@
         <p:blipFill>
           <a:blip r:embed="rId2">
             <a:extLst>
-              <a:ext uri="{96DAC541-7B7A-43D3-8B79-37D633B846F1}">
-                <asvg:svgBlip xmlns:asvg="http://schemas.microsoft.com/office/drawing/2016/SVG/main" r:embed="rId3"/>
+              <a:ext uri="{28A0092B-C50C-407E-A947-70E740481C1C}">
+                <a14:useLocalDpi xmlns:a14="http://schemas.microsoft.com/office/drawing/2010/main" val="0"/>
               </a:ext>
             </a:extLst>
           </a:blip>
@@ -20837,8 +20772,8 @@
         </p:blipFill>
         <p:spPr>
           <a:xfrm>
-            <a:off x="4484915" y="1309007"/>
-            <a:ext cx="5486400" cy="4343400"/>
+            <a:off x="445407" y="1690688"/>
+            <a:ext cx="11301186" cy="4172746"/>
           </a:xfrm>
           <a:prstGeom prst="rect">
             <a:avLst/>
@@ -20847,10 +20782,10 @@
       </p:pic>
       <p:sp>
         <p:nvSpPr>
-          <p:cNvPr id="6" name="TextBox 5">
+          <p:cNvPr id="4" name="TextBox 3">
             <a:extLst>
               <a:ext uri="{FF2B5EF4-FFF2-40B4-BE49-F238E27FC236}">
-                <a16:creationId xmlns:a16="http://schemas.microsoft.com/office/drawing/2014/main" id="{131BC909-6E38-C6E1-B1D7-DFDEAACD242A}"/>
+                <a16:creationId xmlns:a16="http://schemas.microsoft.com/office/drawing/2014/main" id="{9A043FF5-1E32-01EF-A4BE-A3BD95E2D17C}"/>
               </a:ext>
             </a:extLst>
           </p:cNvPr>
@@ -20860,7 +20795,7 @@
         <p:spPr>
           <a:xfrm>
             <a:off x="499580" y="5791830"/>
-            <a:ext cx="9752413" cy="646331"/>
+            <a:ext cx="9752413" cy="892552"/>
           </a:xfrm>
           <a:prstGeom prst="rect">
             <a:avLst/>
@@ -20887,6 +20822,19 @@
             </a:br>
             <a:r>
               <a:rPr lang="en-US" sz="1600" dirty="0">
+                <a:hlinkClick r:id="rId3"/>
+              </a:rPr>
+              <a:t>https://github.com/gjbex/Scientific-C-plus-plus/tree/master/source-code/DesignPatterns/StrategyPattern</a:t>
+            </a:r>
+            <a:r>
+              <a:rPr lang="en-US" sz="1600" dirty="0"/>
+              <a:t> </a:t>
+            </a:r>
+            <a:endParaRPr lang="en-US" sz="2000" dirty="0"/>
+          </a:p>
+          <a:p>
+            <a:r>
+              <a:rPr lang="en-US" sz="1600" dirty="0">
                 <a:hlinkClick r:id="rId4"/>
               </a:rPr>
               <a:t>https://github.com/gjbex/Scientific-C-plus-plus/tree/master/source-code/DesignPatterns/CellularAutomata</a:t>
@@ -20901,7 +20849,7 @@
     </p:spTree>
     <p:extLst>
       <p:ext uri="{BB962C8B-B14F-4D97-AF65-F5344CB8AC3E}">
-        <p14:creationId xmlns:p14="http://schemas.microsoft.com/office/powerpoint/2010/main" val="958888166"/>
+        <p14:creationId xmlns:p14="http://schemas.microsoft.com/office/powerpoint/2010/main" val="4061975628"/>
       </p:ext>
     </p:extLst>
   </p:cSld>
@@ -20942,7 +20890,7 @@
                                           </p:stCondLst>
                                         </p:cTn>
                                         <p:tgtEl>
-                                          <p:spTgt spid="6"/>
+                                          <p:spTgt spid="4"/>
                                         </p:tgtEl>
                                         <p:attrNameLst>
                                           <p:attrName>style.visibility</p:attrName>
@@ -20983,7 +20931,7 @@
       </p:par>
     </p:tnLst>
     <p:bldLst>
-      <p:bldP spid="6" grpId="0" animBg="1"/>
+      <p:bldP spid="4" grpId="0" animBg="1"/>
     </p:bldLst>
   </p:timing>
 </p:sld>
@@ -21351,7 +21299,7 @@
           <p:cNvPr id="2" name="Title 1">
             <a:extLst>
               <a:ext uri="{FF2B5EF4-FFF2-40B4-BE49-F238E27FC236}">
-                <a16:creationId xmlns:a16="http://schemas.microsoft.com/office/drawing/2014/main" id="{04B1C173-33AC-1DCA-ED63-D52D701FC426}"/>
+                <a16:creationId xmlns:a16="http://schemas.microsoft.com/office/drawing/2014/main" id="{7FB23902-4673-FD84-A438-AC235282E2BD}"/>
               </a:ext>
             </a:extLst>
           </p:cNvPr>
@@ -21369,7 +21317,7 @@
           <a:p>
             <a:r>
               <a:rPr lang="en-US" dirty="0"/>
-              <a:t>C++ specific patterns</a:t>
+              <a:t>Decorator pattern</a:t>
             </a:r>
             <a:endParaRPr lang="LID4096" dirty="0"/>
           </a:p>
@@ -21377,59 +21325,10 @@
       </p:sp>
       <p:sp>
         <p:nvSpPr>
-          <p:cNvPr id="3" name="Content Placeholder 2">
+          <p:cNvPr id="3" name="Slide Number Placeholder 2">
             <a:extLst>
               <a:ext uri="{FF2B5EF4-FFF2-40B4-BE49-F238E27FC236}">
-                <a16:creationId xmlns:a16="http://schemas.microsoft.com/office/drawing/2014/main" id="{B66B5779-A74C-52C0-DAF9-FC542132634A}"/>
-              </a:ext>
-            </a:extLst>
-          </p:cNvPr>
-          <p:cNvSpPr>
-            <a:spLocks noGrp="1"/>
-          </p:cNvSpPr>
-          <p:nvPr>
-            <p:ph idx="1"/>
-          </p:nvPr>
-        </p:nvSpPr>
-        <p:spPr/>
-        <p:txBody>
-          <a:bodyPr/>
-          <a:lstStyle/>
-          <a:p>
-            <a:r>
-              <a:rPr lang="en-US" dirty="0"/>
-              <a:t>Curiously Repeating Template Pattern (CRTP)</a:t>
-            </a:r>
-          </a:p>
-          <a:p>
-            <a:r>
-              <a:rPr lang="en-US" dirty="0"/>
-              <a:t>Type erasure</a:t>
-            </a:r>
-          </a:p>
-          <a:p>
-            <a:r>
-              <a:rPr lang="en-US" dirty="0"/>
-              <a:t>Pointer to </a:t>
-            </a:r>
-            <a:r>
-              <a:rPr lang="en-US" dirty="0" err="1"/>
-              <a:t>IMPLementation</a:t>
-            </a:r>
-            <a:r>
-              <a:rPr lang="en-US" dirty="0"/>
-              <a:t> (PIMPL)</a:t>
-            </a:r>
-            <a:endParaRPr lang="LID4096" dirty="0"/>
-          </a:p>
-        </p:txBody>
-      </p:sp>
-      <p:sp>
-        <p:nvSpPr>
-          <p:cNvPr id="4" name="Slide Number Placeholder 3">
-            <a:extLst>
-              <a:ext uri="{FF2B5EF4-FFF2-40B4-BE49-F238E27FC236}">
-                <a16:creationId xmlns:a16="http://schemas.microsoft.com/office/drawing/2014/main" id="{396482FC-4A8B-74E1-56FE-EFDCEEF1C5E8}"/>
+                <a16:creationId xmlns:a16="http://schemas.microsoft.com/office/drawing/2014/main" id="{A78D1F06-39E4-F97D-EF30-466A89D65C12}"/>
               </a:ext>
             </a:extLst>
           </p:cNvPr>
@@ -21453,12 +21352,48 @@
           </a:p>
         </p:txBody>
       </p:sp>
+      <p:pic>
+        <p:nvPicPr>
+          <p:cNvPr id="5" name="Graphic 4">
+            <a:extLst>
+              <a:ext uri="{FF2B5EF4-FFF2-40B4-BE49-F238E27FC236}">
+                <a16:creationId xmlns:a16="http://schemas.microsoft.com/office/drawing/2014/main" id="{54786055-7602-0DE3-36B7-1F30D4A6576C}"/>
+              </a:ext>
+            </a:extLst>
+          </p:cNvPr>
+          <p:cNvPicPr>
+            <a:picLocks noChangeAspect="1"/>
+          </p:cNvPicPr>
+          <p:nvPr/>
+        </p:nvPicPr>
+        <p:blipFill>
+          <a:blip r:embed="rId2">
+            <a:extLst>
+              <a:ext uri="{96DAC541-7B7A-43D3-8B79-37D633B846F1}">
+                <asvg:svgBlip xmlns:asvg="http://schemas.microsoft.com/office/drawing/2016/SVG/main" r:embed="rId3"/>
+              </a:ext>
+            </a:extLst>
+          </a:blip>
+          <a:stretch>
+            <a:fillRect/>
+          </a:stretch>
+        </p:blipFill>
+        <p:spPr>
+          <a:xfrm>
+            <a:off x="4484915" y="1309007"/>
+            <a:ext cx="5486400" cy="4343400"/>
+          </a:xfrm>
+          <a:prstGeom prst="rect">
+            <a:avLst/>
+          </a:prstGeom>
+        </p:spPr>
+      </p:pic>
       <p:sp>
         <p:nvSpPr>
           <p:cNvPr id="6" name="TextBox 5">
             <a:extLst>
               <a:ext uri="{FF2B5EF4-FFF2-40B4-BE49-F238E27FC236}">
-                <a16:creationId xmlns:a16="http://schemas.microsoft.com/office/drawing/2014/main" id="{09807A64-9623-A9A7-9103-8BC8C59D7960}"/>
+                <a16:creationId xmlns:a16="http://schemas.microsoft.com/office/drawing/2014/main" id="{131BC909-6E38-C6E1-B1D7-DFDEAACD242A}"/>
               </a:ext>
             </a:extLst>
           </p:cNvPr>
@@ -21468,7 +21403,7 @@
         <p:spPr>
           <a:xfrm>
             <a:off x="499580" y="5791830"/>
-            <a:ext cx="8980856" cy="646331"/>
+            <a:ext cx="9752413" cy="646331"/>
           </a:xfrm>
           <a:prstGeom prst="rect">
             <a:avLst/>
@@ -21490,22 +21425,26 @@
               <a:rPr lang="en-US" sz="2000" dirty="0"/>
               <a:t>See</a:t>
             </a:r>
-          </a:p>
-          <a:p>
+            <a:br>
+              <a:rPr lang="en-US" sz="2000" dirty="0"/>
+            </a:br>
             <a:r>
               <a:rPr lang="en-US" sz="1600" dirty="0">
-                <a:hlinkClick r:id="rId2"/>
+                <a:hlinkClick r:id="rId4"/>
               </a:rPr>
-              <a:t>https://github.com/gjbex/C-plus-plus-software-engineering/tree/main/source-code/design-patterns</a:t>
-            </a:r>
-            <a:endParaRPr lang="en-US" sz="1600" dirty="0"/>
+              <a:t>https://github.com/gjbex/Scientific-C-plus-plus/tree/master/source-code/DesignPatterns/CellularAutomata</a:t>
+            </a:r>
+            <a:r>
+              <a:rPr lang="en-US" sz="1600" dirty="0"/>
+              <a:t> </a:t>
+            </a:r>
           </a:p>
         </p:txBody>
       </p:sp>
     </p:spTree>
     <p:extLst>
       <p:ext uri="{BB962C8B-B14F-4D97-AF65-F5344CB8AC3E}">
-        <p14:creationId xmlns:p14="http://schemas.microsoft.com/office/powerpoint/2010/main" val="3340427051"/>
+        <p14:creationId xmlns:p14="http://schemas.microsoft.com/office/powerpoint/2010/main" val="958888166"/>
       </p:ext>
     </p:extLst>
   </p:cSld>
@@ -21615,7 +21554,7 @@
           <p:cNvPr id="2" name="Title 1">
             <a:extLst>
               <a:ext uri="{FF2B5EF4-FFF2-40B4-BE49-F238E27FC236}">
-                <a16:creationId xmlns:a16="http://schemas.microsoft.com/office/drawing/2014/main" id="{96A48829-0721-1480-5994-E855FF935E6E}"/>
+                <a16:creationId xmlns:a16="http://schemas.microsoft.com/office/drawing/2014/main" id="{04B1C173-33AC-1DCA-ED63-D52D701FC426}"/>
               </a:ext>
             </a:extLst>
           </p:cNvPr>
@@ -21633,7 +21572,7 @@
           <a:p>
             <a:r>
               <a:rPr lang="en-US" dirty="0"/>
-              <a:t>Curiously, Repeating Template Pattern (CRTP)</a:t>
+              <a:t>C++ specific patterns</a:t>
             </a:r>
             <a:endParaRPr lang="LID4096" dirty="0"/>
           </a:p>
@@ -21644,7 +21583,7 @@
           <p:cNvPr id="3" name="Content Placeholder 2">
             <a:extLst>
               <a:ext uri="{FF2B5EF4-FFF2-40B4-BE49-F238E27FC236}">
-                <a16:creationId xmlns:a16="http://schemas.microsoft.com/office/drawing/2014/main" id="{9BB61A49-5C18-EB0F-3E0D-D280F9E302A4}"/>
+                <a16:creationId xmlns:a16="http://schemas.microsoft.com/office/drawing/2014/main" id="{B66B5779-A74C-52C0-DAF9-FC542132634A}"/>
               </a:ext>
             </a:extLst>
           </p:cNvPr>
@@ -21657,33 +21596,34 @@
         </p:nvSpPr>
         <p:spPr/>
         <p:txBody>
-          <a:bodyPr>
-            <a:normAutofit/>
-          </a:bodyPr>
+          <a:bodyPr/>
           <a:lstStyle/>
           <a:p>
             <a:r>
               <a:rPr lang="en-US" dirty="0"/>
-              <a:t>Avoid virtual function overhead</a:t>
-            </a:r>
-          </a:p>
-          <a:p>
-            <a:r>
-              <a:rPr lang="en-US" dirty="0"/>
-              <a:t>Enforce compile time interface constraints</a:t>
-            </a:r>
-          </a:p>
-          <a:p>
-            <a:r>
-              <a:rPr lang="en-US" dirty="0"/>
-              <a:t>Code reuse without dynamic polymorphism</a:t>
-            </a:r>
-          </a:p>
-          <a:p>
-            <a:r>
-              <a:rPr lang="en-US" dirty="0"/>
-              <a:t>Static  polymorphism</a:t>
-            </a:r>
+              <a:t>Curiously Repeating Template Pattern (CRTP)</a:t>
+            </a:r>
+          </a:p>
+          <a:p>
+            <a:r>
+              <a:rPr lang="en-US" dirty="0"/>
+              <a:t>Type erasure</a:t>
+            </a:r>
+          </a:p>
+          <a:p>
+            <a:r>
+              <a:rPr lang="en-US" dirty="0"/>
+              <a:t>Pointer to </a:t>
+            </a:r>
+            <a:r>
+              <a:rPr lang="en-US" dirty="0" err="1"/>
+              <a:t>IMPLementation</a:t>
+            </a:r>
+            <a:r>
+              <a:rPr lang="en-US" dirty="0"/>
+              <a:t> (PIMPL)</a:t>
+            </a:r>
+            <a:endParaRPr lang="LID4096" dirty="0"/>
           </a:p>
         </p:txBody>
       </p:sp>
@@ -21692,7 +21632,7 @@
           <p:cNvPr id="4" name="Slide Number Placeholder 3">
             <a:extLst>
               <a:ext uri="{FF2B5EF4-FFF2-40B4-BE49-F238E27FC236}">
-                <a16:creationId xmlns:a16="http://schemas.microsoft.com/office/drawing/2014/main" id="{0D8837DD-4DFF-B3FC-6690-1408C5CBE0FA}"/>
+                <a16:creationId xmlns:a16="http://schemas.microsoft.com/office/drawing/2014/main" id="{396482FC-4A8B-74E1-56FE-EFDCEEF1C5E8}"/>
               </a:ext>
             </a:extLst>
           </p:cNvPr>
@@ -21719,7 +21659,7 @@
     </p:spTree>
     <p:extLst>
       <p:ext uri="{BB962C8B-B14F-4D97-AF65-F5344CB8AC3E}">
-        <p14:creationId xmlns:p14="http://schemas.microsoft.com/office/powerpoint/2010/main" val="2948353845"/>
+        <p14:creationId xmlns:p14="http://schemas.microsoft.com/office/powerpoint/2010/main" val="3340427051"/>
       </p:ext>
     </p:extLst>
   </p:cSld>
@@ -21751,7 +21691,7 @@
           <p:cNvPr id="2" name="Title 1">
             <a:extLst>
               <a:ext uri="{FF2B5EF4-FFF2-40B4-BE49-F238E27FC236}">
-                <a16:creationId xmlns:a16="http://schemas.microsoft.com/office/drawing/2014/main" id="{08C9A350-282A-80DC-C746-795502250CAE}"/>
+                <a16:creationId xmlns:a16="http://schemas.microsoft.com/office/drawing/2014/main" id="{96A48829-0721-1480-5994-E855FF935E6E}"/>
               </a:ext>
             </a:extLst>
           </p:cNvPr>
@@ -21769,7 +21709,7 @@
           <a:p>
             <a:r>
               <a:rPr lang="en-US" dirty="0"/>
-              <a:t>CRTP: base class</a:t>
+              <a:t>Curiously, Repeating Template Pattern (CRTP)</a:t>
             </a:r>
             <a:endParaRPr lang="LID4096" dirty="0"/>
           </a:p>
@@ -21777,10 +21717,58 @@
       </p:sp>
       <p:sp>
         <p:nvSpPr>
+          <p:cNvPr id="3" name="Content Placeholder 2">
+            <a:extLst>
+              <a:ext uri="{FF2B5EF4-FFF2-40B4-BE49-F238E27FC236}">
+                <a16:creationId xmlns:a16="http://schemas.microsoft.com/office/drawing/2014/main" id="{9BB61A49-5C18-EB0F-3E0D-D280F9E302A4}"/>
+              </a:ext>
+            </a:extLst>
+          </p:cNvPr>
+          <p:cNvSpPr>
+            <a:spLocks noGrp="1"/>
+          </p:cNvSpPr>
+          <p:nvPr>
+            <p:ph idx="1"/>
+          </p:nvPr>
+        </p:nvSpPr>
+        <p:spPr/>
+        <p:txBody>
+          <a:bodyPr>
+            <a:normAutofit/>
+          </a:bodyPr>
+          <a:lstStyle/>
+          <a:p>
+            <a:r>
+              <a:rPr lang="en-US" dirty="0"/>
+              <a:t>Avoid virtual function overhead</a:t>
+            </a:r>
+          </a:p>
+          <a:p>
+            <a:r>
+              <a:rPr lang="en-US" dirty="0"/>
+              <a:t>Enforce compile time interface constraints</a:t>
+            </a:r>
+          </a:p>
+          <a:p>
+            <a:r>
+              <a:rPr lang="en-US" dirty="0"/>
+              <a:t>Code reuse without dynamic polymorphism</a:t>
+            </a:r>
+          </a:p>
+          <a:p>
+            <a:r>
+              <a:rPr lang="en-US" dirty="0"/>
+              <a:t>Static  polymorphism</a:t>
+            </a:r>
+          </a:p>
+        </p:txBody>
+      </p:sp>
+      <p:sp>
+        <p:nvSpPr>
           <p:cNvPr id="4" name="Slide Number Placeholder 3">
             <a:extLst>
               <a:ext uri="{FF2B5EF4-FFF2-40B4-BE49-F238E27FC236}">
-                <a16:creationId xmlns:a16="http://schemas.microsoft.com/office/drawing/2014/main" id="{2B59DEA4-516B-75F2-1733-1B9E7DD26F95}"/>
+                <a16:creationId xmlns:a16="http://schemas.microsoft.com/office/drawing/2014/main" id="{0D8837DD-4DFF-B3FC-6690-1408C5CBE0FA}"/>
               </a:ext>
             </a:extLst>
           </p:cNvPr>
@@ -21799,6 +21787,221 @@
             <a:fld id="{FDB1AA33-DFBB-49AC-8CEE-23FFECEB5648}" type="slidenum">
               <a:rPr lang="LID4096" smtClean="0"/>
               <a:t>52</a:t>
+            </a:fld>
+            <a:endParaRPr lang="LID4096"/>
+          </a:p>
+        </p:txBody>
+      </p:sp>
+      <p:sp>
+        <p:nvSpPr>
+          <p:cNvPr id="6" name="TextBox 5">
+            <a:extLst>
+              <a:ext uri="{FF2B5EF4-FFF2-40B4-BE49-F238E27FC236}">
+                <a16:creationId xmlns:a16="http://schemas.microsoft.com/office/drawing/2014/main" id="{09807A64-9623-A9A7-9103-8BC8C59D7960}"/>
+              </a:ext>
+            </a:extLst>
+          </p:cNvPr>
+          <p:cNvSpPr txBox="1"/>
+          <p:nvPr/>
+        </p:nvSpPr>
+        <p:spPr>
+          <a:xfrm>
+            <a:off x="499580" y="5791830"/>
+            <a:ext cx="8980856" cy="646331"/>
+          </a:xfrm>
+          <a:prstGeom prst="rect">
+            <a:avLst/>
+          </a:prstGeom>
+          <a:noFill/>
+          <a:ln>
+            <a:solidFill>
+              <a:schemeClr val="tx1"/>
+            </a:solidFill>
+          </a:ln>
+        </p:spPr>
+        <p:txBody>
+          <a:bodyPr wrap="none" rtlCol="0">
+            <a:spAutoFit/>
+          </a:bodyPr>
+          <a:lstStyle/>
+          <a:p>
+            <a:r>
+              <a:rPr lang="en-US" sz="2000" dirty="0"/>
+              <a:t>See</a:t>
+            </a:r>
+          </a:p>
+          <a:p>
+            <a:r>
+              <a:rPr lang="en-US" sz="1600" dirty="0">
+                <a:hlinkClick r:id="rId2"/>
+              </a:rPr>
+              <a:t>https://github.com/gjbex/C-plus-plus-software-engineering/tree/main/source-code/design-patterns</a:t>
+            </a:r>
+            <a:endParaRPr lang="en-US" sz="1600" dirty="0"/>
+          </a:p>
+        </p:txBody>
+      </p:sp>
+    </p:spTree>
+    <p:extLst>
+      <p:ext uri="{BB962C8B-B14F-4D97-AF65-F5344CB8AC3E}">
+        <p14:creationId xmlns:p14="http://schemas.microsoft.com/office/powerpoint/2010/main" val="2948353845"/>
+      </p:ext>
+    </p:extLst>
+  </p:cSld>
+  <p:clrMapOvr>
+    <a:masterClrMapping/>
+  </p:clrMapOvr>
+  <p:timing>
+    <p:tnLst>
+      <p:par>
+        <p:cTn id="1" dur="indefinite" restart="never" nodeType="tmRoot">
+          <p:childTnLst>
+            <p:seq concurrent="1" nextAc="seek">
+              <p:cTn id="2" dur="indefinite" nodeType="mainSeq">
+                <p:childTnLst>
+                  <p:par>
+                    <p:cTn id="3" fill="hold">
+                      <p:stCondLst>
+                        <p:cond delay="indefinite"/>
+                      </p:stCondLst>
+                      <p:childTnLst>
+                        <p:par>
+                          <p:cTn id="4" fill="hold">
+                            <p:stCondLst>
+                              <p:cond delay="0"/>
+                            </p:stCondLst>
+                            <p:childTnLst>
+                              <p:par>
+                                <p:cTn id="5" presetID="1" presetClass="entr" presetSubtype="0" fill="hold" grpId="0" nodeType="clickEffect">
+                                  <p:stCondLst>
+                                    <p:cond delay="0"/>
+                                  </p:stCondLst>
+                                  <p:childTnLst>
+                                    <p:set>
+                                      <p:cBhvr>
+                                        <p:cTn id="6" dur="1" fill="hold">
+                                          <p:stCondLst>
+                                            <p:cond delay="0"/>
+                                          </p:stCondLst>
+                                        </p:cTn>
+                                        <p:tgtEl>
+                                          <p:spTgt spid="6"/>
+                                        </p:tgtEl>
+                                        <p:attrNameLst>
+                                          <p:attrName>style.visibility</p:attrName>
+                                        </p:attrNameLst>
+                                      </p:cBhvr>
+                                      <p:to>
+                                        <p:strVal val="visible"/>
+                                      </p:to>
+                                    </p:set>
+                                  </p:childTnLst>
+                                </p:cTn>
+                              </p:par>
+                            </p:childTnLst>
+                          </p:cTn>
+                        </p:par>
+                      </p:childTnLst>
+                    </p:cTn>
+                  </p:par>
+                </p:childTnLst>
+              </p:cTn>
+              <p:prevCondLst>
+                <p:cond evt="onPrev" delay="0">
+                  <p:tgtEl>
+                    <p:sldTgt/>
+                  </p:tgtEl>
+                </p:cond>
+              </p:prevCondLst>
+              <p:nextCondLst>
+                <p:cond evt="onNext" delay="0">
+                  <p:tgtEl>
+                    <p:sldTgt/>
+                  </p:tgtEl>
+                </p:cond>
+              </p:nextCondLst>
+            </p:seq>
+          </p:childTnLst>
+        </p:cTn>
+      </p:par>
+    </p:tnLst>
+    <p:bldLst>
+      <p:bldP spid="6" grpId="0" animBg="1"/>
+    </p:bldLst>
+  </p:timing>
+</p:sld>
+</file>
+
+<file path=ppt/slides/slide53.xml><?xml version="1.0" encoding="utf-8"?>
+<p:sld xmlns:a="http://schemas.openxmlformats.org/drawingml/2006/main" xmlns:r="http://schemas.openxmlformats.org/officeDocument/2006/relationships" xmlns:p="http://schemas.openxmlformats.org/presentationml/2006/main">
+  <p:cSld>
+    <p:spTree>
+      <p:nvGrpSpPr>
+        <p:cNvPr id="1" name=""/>
+        <p:cNvGrpSpPr/>
+        <p:nvPr/>
+      </p:nvGrpSpPr>
+      <p:grpSpPr>
+        <a:xfrm>
+          <a:off x="0" y="0"/>
+          <a:ext cx="0" cy="0"/>
+          <a:chOff x="0" y="0"/>
+          <a:chExt cx="0" cy="0"/>
+        </a:xfrm>
+      </p:grpSpPr>
+      <p:sp>
+        <p:nvSpPr>
+          <p:cNvPr id="2" name="Title 1">
+            <a:extLst>
+              <a:ext uri="{FF2B5EF4-FFF2-40B4-BE49-F238E27FC236}">
+                <a16:creationId xmlns:a16="http://schemas.microsoft.com/office/drawing/2014/main" id="{08C9A350-282A-80DC-C746-795502250CAE}"/>
+              </a:ext>
+            </a:extLst>
+          </p:cNvPr>
+          <p:cNvSpPr>
+            <a:spLocks noGrp="1"/>
+          </p:cNvSpPr>
+          <p:nvPr>
+            <p:ph type="title"/>
+          </p:nvPr>
+        </p:nvSpPr>
+        <p:spPr/>
+        <p:txBody>
+          <a:bodyPr/>
+          <a:lstStyle/>
+          <a:p>
+            <a:r>
+              <a:rPr lang="en-US" dirty="0"/>
+              <a:t>CRTP: base class</a:t>
+            </a:r>
+            <a:endParaRPr lang="LID4096" dirty="0"/>
+          </a:p>
+        </p:txBody>
+      </p:sp>
+      <p:sp>
+        <p:nvSpPr>
+          <p:cNvPr id="4" name="Slide Number Placeholder 3">
+            <a:extLst>
+              <a:ext uri="{FF2B5EF4-FFF2-40B4-BE49-F238E27FC236}">
+                <a16:creationId xmlns:a16="http://schemas.microsoft.com/office/drawing/2014/main" id="{2B59DEA4-516B-75F2-1733-1B9E7DD26F95}"/>
+              </a:ext>
+            </a:extLst>
+          </p:cNvPr>
+          <p:cNvSpPr>
+            <a:spLocks noGrp="1"/>
+          </p:cNvSpPr>
+          <p:nvPr>
+            <p:ph type="sldNum" sz="quarter" idx="12"/>
+          </p:nvPr>
+        </p:nvSpPr>
+        <p:spPr/>
+        <p:txBody>
+          <a:bodyPr/>
+          <a:lstStyle/>
+          <a:p>
+            <a:fld id="{FDB1AA33-DFBB-49AC-8CEE-23FFECEB5648}" type="slidenum">
+              <a:rPr lang="LID4096" smtClean="0"/>
+              <a:t>53</a:t>
             </a:fld>
             <a:endParaRPr lang="LID4096"/>
           </a:p>
@@ -22575,7 +22778,7 @@
 </p:sld>
 </file>
 
-<file path=ppt/slides/slide53.xml><?xml version="1.0" encoding="utf-8"?>
+<file path=ppt/slides/slide54.xml><?xml version="1.0" encoding="utf-8"?>
 <p:sld xmlns:a="http://schemas.openxmlformats.org/drawingml/2006/main" xmlns:r="http://schemas.openxmlformats.org/officeDocument/2006/relationships" xmlns:p="http://schemas.openxmlformats.org/presentationml/2006/main">
   <p:cSld>
     <p:spTree>
@@ -22644,7 +22847,7 @@
           <a:p>
             <a:fld id="{FDB1AA33-DFBB-49AC-8CEE-23FFECEB5648}" type="slidenum">
               <a:rPr lang="LID4096" smtClean="0"/>
-              <a:t>53</a:t>
+              <a:t>54</a:t>
             </a:fld>
             <a:endParaRPr lang="LID4096"/>
           </a:p>
@@ -23208,7 +23411,7 @@
 </p:sld>
 </file>
 
-<file path=ppt/slides/slide54.xml><?xml version="1.0" encoding="utf-8"?>
+<file path=ppt/slides/slide55.xml><?xml version="1.0" encoding="utf-8"?>
 <p:sld xmlns:a="http://schemas.openxmlformats.org/drawingml/2006/main" xmlns:r="http://schemas.openxmlformats.org/officeDocument/2006/relationships" xmlns:p="http://schemas.openxmlformats.org/presentationml/2006/main">
   <p:cSld>
     <p:spTree>
@@ -23277,7 +23480,7 @@
           <a:p>
             <a:fld id="{FDB1AA33-DFBB-49AC-8CEE-23FFECEB5648}" type="slidenum">
               <a:rPr lang="LID4096" smtClean="0"/>
-              <a:t>54</a:t>
+              <a:t>55</a:t>
             </a:fld>
             <a:endParaRPr lang="LID4096"/>
           </a:p>
@@ -23995,7 +24198,7 @@
 </p:sld>
 </file>
 
-<file path=ppt/slides/slide55.xml><?xml version="1.0" encoding="utf-8"?>
+<file path=ppt/slides/slide56.xml><?xml version="1.0" encoding="utf-8"?>
 <p:sld xmlns:a="http://schemas.openxmlformats.org/drawingml/2006/main" xmlns:r="http://schemas.openxmlformats.org/officeDocument/2006/relationships" xmlns:p="http://schemas.openxmlformats.org/presentationml/2006/main">
   <p:cSld>
     <p:spTree>
@@ -24064,7 +24267,7 @@
           <a:p>
             <a:fld id="{FDB1AA33-DFBB-49AC-8CEE-23FFECEB5648}" type="slidenum">
               <a:rPr lang="LID4096" smtClean="0"/>
-              <a:t>55</a:t>
+              <a:t>56</a:t>
             </a:fld>
             <a:endParaRPr lang="LID4096"/>
           </a:p>
@@ -24411,142 +24614,6 @@
 </p:sld>
 </file>
 
-<file path=ppt/slides/slide56.xml><?xml version="1.0" encoding="utf-8"?>
-<p:sld xmlns:a="http://schemas.openxmlformats.org/drawingml/2006/main" xmlns:r="http://schemas.openxmlformats.org/officeDocument/2006/relationships" xmlns:p="http://schemas.openxmlformats.org/presentationml/2006/main">
-  <p:cSld>
-    <p:spTree>
-      <p:nvGrpSpPr>
-        <p:cNvPr id="1" name=""/>
-        <p:cNvGrpSpPr/>
-        <p:nvPr/>
-      </p:nvGrpSpPr>
-      <p:grpSpPr>
-        <a:xfrm>
-          <a:off x="0" y="0"/>
-          <a:ext cx="0" cy="0"/>
-          <a:chOff x="0" y="0"/>
-          <a:chExt cx="0" cy="0"/>
-        </a:xfrm>
-      </p:grpSpPr>
-      <p:sp>
-        <p:nvSpPr>
-          <p:cNvPr id="2" name="Title 1"/>
-          <p:cNvSpPr>
-            <a:spLocks noGrp="1"/>
-          </p:cNvSpPr>
-          <p:nvPr>
-            <p:ph type="title"/>
-          </p:nvPr>
-        </p:nvSpPr>
-        <p:spPr/>
-        <p:txBody>
-          <a:bodyPr/>
-          <a:lstStyle/>
-          <a:p>
-            <a:r>
-              <a:rPr lang="en-US" dirty="0"/>
-              <a:t>Further reading</a:t>
-            </a:r>
-            <a:endParaRPr lang="nl-BE" dirty="0"/>
-          </a:p>
-        </p:txBody>
-      </p:sp>
-      <p:sp>
-        <p:nvSpPr>
-          <p:cNvPr id="3" name="Content Placeholder 2"/>
-          <p:cNvSpPr>
-            <a:spLocks noGrp="1"/>
-          </p:cNvSpPr>
-          <p:nvPr>
-            <p:ph idx="1"/>
-          </p:nvPr>
-        </p:nvSpPr>
-        <p:spPr/>
-        <p:txBody>
-          <a:bodyPr/>
-          <a:lstStyle/>
-          <a:p>
-            <a:r>
-              <a:rPr lang="en-US" dirty="0"/>
-              <a:t>Erich Gamma, Richard Helm, Ralph Johnson and John </a:t>
-            </a:r>
-            <a:r>
-              <a:rPr lang="en-US" dirty="0" err="1"/>
-              <a:t>Vlissides</a:t>
-            </a:r>
-            <a:r>
-              <a:rPr lang="en-US" dirty="0"/>
-              <a:t> (1994) </a:t>
-            </a:r>
-            <a:r>
-              <a:rPr lang="en-US" i="1" dirty="0"/>
-              <a:t>Design patterns: elements of reusable object-oriented software</a:t>
-            </a:r>
-            <a:r>
-              <a:rPr lang="en-US" dirty="0"/>
-              <a:t>, Addison-Wesley</a:t>
-            </a:r>
-            <a:endParaRPr lang="en-US" sz="2800" dirty="0"/>
-          </a:p>
-          <a:p>
-            <a:endParaRPr lang="en-US" sz="2800" dirty="0"/>
-          </a:p>
-          <a:p>
-            <a:endParaRPr lang="nl-BE" dirty="0"/>
-          </a:p>
-        </p:txBody>
-      </p:sp>
-      <p:sp>
-        <p:nvSpPr>
-          <p:cNvPr id="4" name="Slide Number Placeholder 3"/>
-          <p:cNvSpPr>
-            <a:spLocks noGrp="1"/>
-          </p:cNvSpPr>
-          <p:nvPr>
-            <p:ph type="sldNum" sz="quarter" idx="12"/>
-          </p:nvPr>
-        </p:nvSpPr>
-        <p:spPr/>
-        <p:txBody>
-          <a:bodyPr/>
-          <a:lstStyle/>
-          <a:p>
-            <a:fld id="{5A209D72-2E9D-49B0-8977-41DCCC66C0BB}" type="slidenum">
-              <a:rPr lang="nl-BE">
-                <a:solidFill>
-                  <a:prstClr val="black">
-                    <a:tint val="75000"/>
-                  </a:prstClr>
-                </a:solidFill>
-                <a:latin typeface="Calibri"/>
-              </a:rPr>
-              <a:pPr/>
-              <a:t>56</a:t>
-            </a:fld>
-            <a:endParaRPr lang="nl-BE">
-              <a:solidFill>
-                <a:prstClr val="black">
-                  <a:tint val="75000"/>
-                </a:prstClr>
-              </a:solidFill>
-              <a:latin typeface="Calibri"/>
-            </a:endParaRPr>
-          </a:p>
-        </p:txBody>
-      </p:sp>
-    </p:spTree>
-    <p:extLst>
-      <p:ext uri="{BB962C8B-B14F-4D97-AF65-F5344CB8AC3E}">
-        <p14:creationId xmlns:p14="http://schemas.microsoft.com/office/powerpoint/2010/main" val="4100769943"/>
-      </p:ext>
-    </p:extLst>
-  </p:cSld>
-  <p:clrMapOvr>
-    <a:masterClrMapping/>
-  </p:clrMapOvr>
-</p:sld>
-</file>
-
 <file path=ppt/slides/slide57.xml><?xml version="1.0" encoding="utf-8"?>
 <p:sld xmlns:a="http://schemas.openxmlformats.org/drawingml/2006/main" xmlns:r="http://schemas.openxmlformats.org/officeDocument/2006/relationships" xmlns:p="http://schemas.openxmlformats.org/presentationml/2006/main">
   <p:cSld>
@@ -24566,13 +24633,7 @@
       </p:grpSpPr>
       <p:sp>
         <p:nvSpPr>
-          <p:cNvPr id="5" name="Title 4">
-            <a:extLst>
-              <a:ext uri="{FF2B5EF4-FFF2-40B4-BE49-F238E27FC236}">
-                <a16:creationId xmlns:a16="http://schemas.microsoft.com/office/drawing/2014/main" id="{B047AC09-4137-6264-6757-2F13914ACA28}"/>
-              </a:ext>
-            </a:extLst>
-          </p:cNvPr>
+          <p:cNvPr id="2" name="Title 1"/>
           <p:cNvSpPr>
             <a:spLocks noGrp="1"/>
           </p:cNvSpPr>
@@ -24587,26 +24648,20 @@
           <a:p>
             <a:r>
               <a:rPr lang="en-US" dirty="0"/>
-              <a:t>Functional approach</a:t>
-            </a:r>
-            <a:endParaRPr lang="LID4096" dirty="0"/>
-          </a:p>
-        </p:txBody>
-      </p:sp>
-      <p:sp>
-        <p:nvSpPr>
-          <p:cNvPr id="6" name="Text Placeholder 5">
-            <a:extLst>
-              <a:ext uri="{FF2B5EF4-FFF2-40B4-BE49-F238E27FC236}">
-                <a16:creationId xmlns:a16="http://schemas.microsoft.com/office/drawing/2014/main" id="{482D214C-4E56-C7D6-335F-9FBD13AF24C6}"/>
-              </a:ext>
-            </a:extLst>
-          </p:cNvPr>
+              <a:t>Further reading</a:t>
+            </a:r>
+            <a:endParaRPr lang="nl-BE" dirty="0"/>
+          </a:p>
+        </p:txBody>
+      </p:sp>
+      <p:sp>
+        <p:nvSpPr>
+          <p:cNvPr id="3" name="Content Placeholder 2"/>
           <p:cNvSpPr>
             <a:spLocks noGrp="1"/>
           </p:cNvSpPr>
           <p:nvPr>
-            <p:ph type="body" idx="1"/>
+            <p:ph idx="1"/>
           </p:nvPr>
         </p:nvSpPr>
         <p:spPr/>
@@ -24614,19 +24669,39 @@
           <a:bodyPr/>
           <a:lstStyle/>
           <a:p>
-            <a:endParaRPr lang="LID4096"/>
-          </a:p>
-        </p:txBody>
-      </p:sp>
-      <p:sp>
-        <p:nvSpPr>
-          <p:cNvPr id="4" name="Slide Number Placeholder 3">
-            <a:extLst>
-              <a:ext uri="{FF2B5EF4-FFF2-40B4-BE49-F238E27FC236}">
-                <a16:creationId xmlns:a16="http://schemas.microsoft.com/office/drawing/2014/main" id="{B66B75E1-EA21-65CD-B316-C1D421486EE7}"/>
-              </a:ext>
-            </a:extLst>
-          </p:cNvPr>
+            <a:r>
+              <a:rPr lang="en-US" dirty="0"/>
+              <a:t>Erich Gamma, Richard Helm, Ralph Johnson and John </a:t>
+            </a:r>
+            <a:r>
+              <a:rPr lang="en-US" dirty="0" err="1"/>
+              <a:t>Vlissides</a:t>
+            </a:r>
+            <a:r>
+              <a:rPr lang="en-US" dirty="0"/>
+              <a:t> (1994) </a:t>
+            </a:r>
+            <a:r>
+              <a:rPr lang="en-US" i="1" dirty="0"/>
+              <a:t>Design patterns: elements of reusable object-oriented software</a:t>
+            </a:r>
+            <a:r>
+              <a:rPr lang="en-US" dirty="0"/>
+              <a:t>, Addison-Wesley</a:t>
+            </a:r>
+            <a:endParaRPr lang="en-US" sz="2800" dirty="0"/>
+          </a:p>
+          <a:p>
+            <a:endParaRPr lang="en-US" sz="2800" dirty="0"/>
+          </a:p>
+          <a:p>
+            <a:endParaRPr lang="nl-BE" dirty="0"/>
+          </a:p>
+        </p:txBody>
+      </p:sp>
+      <p:sp>
+        <p:nvSpPr>
+          <p:cNvPr id="4" name="Slide Number Placeholder 3"/>
           <p:cNvSpPr>
             <a:spLocks noGrp="1"/>
           </p:cNvSpPr>
@@ -24639,18 +24714,33 @@
           <a:bodyPr/>
           <a:lstStyle/>
           <a:p>
-            <a:fld id="{FDB1AA33-DFBB-49AC-8CEE-23FFECEB5648}" type="slidenum">
-              <a:rPr lang="LID4096" smtClean="0"/>
+            <a:fld id="{5A209D72-2E9D-49B0-8977-41DCCC66C0BB}" type="slidenum">
+              <a:rPr lang="nl-BE">
+                <a:solidFill>
+                  <a:prstClr val="black">
+                    <a:tint val="75000"/>
+                  </a:prstClr>
+                </a:solidFill>
+                <a:latin typeface="Calibri"/>
+              </a:rPr>
+              <a:pPr/>
               <a:t>57</a:t>
             </a:fld>
-            <a:endParaRPr lang="LID4096"/>
+            <a:endParaRPr lang="nl-BE">
+              <a:solidFill>
+                <a:prstClr val="black">
+                  <a:tint val="75000"/>
+                </a:prstClr>
+              </a:solidFill>
+              <a:latin typeface="Calibri"/>
+            </a:endParaRPr>
           </a:p>
         </p:txBody>
       </p:sp>
     </p:spTree>
     <p:extLst>
       <p:ext uri="{BB962C8B-B14F-4D97-AF65-F5344CB8AC3E}">
-        <p14:creationId xmlns:p14="http://schemas.microsoft.com/office/powerpoint/2010/main" val="4080926898"/>
+        <p14:creationId xmlns:p14="http://schemas.microsoft.com/office/powerpoint/2010/main" val="4100769943"/>
       </p:ext>
     </p:extLst>
   </p:cSld>
@@ -24679,10 +24769,10 @@
       </p:grpSpPr>
       <p:sp>
         <p:nvSpPr>
-          <p:cNvPr id="2" name="Title 1">
+          <p:cNvPr id="5" name="Title 4">
             <a:extLst>
               <a:ext uri="{FF2B5EF4-FFF2-40B4-BE49-F238E27FC236}">
-                <a16:creationId xmlns:a16="http://schemas.microsoft.com/office/drawing/2014/main" id="{8F06986E-3696-7561-EFEC-42A2474822BD}"/>
+                <a16:creationId xmlns:a16="http://schemas.microsoft.com/office/drawing/2014/main" id="{B047AC09-4137-6264-6757-2F13914ACA28}"/>
               </a:ext>
             </a:extLst>
           </p:cNvPr>
@@ -24700,6 +24790,119 @@
           <a:p>
             <a:r>
               <a:rPr lang="en-US" dirty="0"/>
+              <a:t>Functional approach</a:t>
+            </a:r>
+            <a:endParaRPr lang="LID4096" dirty="0"/>
+          </a:p>
+        </p:txBody>
+      </p:sp>
+      <p:sp>
+        <p:nvSpPr>
+          <p:cNvPr id="6" name="Text Placeholder 5">
+            <a:extLst>
+              <a:ext uri="{FF2B5EF4-FFF2-40B4-BE49-F238E27FC236}">
+                <a16:creationId xmlns:a16="http://schemas.microsoft.com/office/drawing/2014/main" id="{482D214C-4E56-C7D6-335F-9FBD13AF24C6}"/>
+              </a:ext>
+            </a:extLst>
+          </p:cNvPr>
+          <p:cNvSpPr>
+            <a:spLocks noGrp="1"/>
+          </p:cNvSpPr>
+          <p:nvPr>
+            <p:ph type="body" idx="1"/>
+          </p:nvPr>
+        </p:nvSpPr>
+        <p:spPr/>
+        <p:txBody>
+          <a:bodyPr/>
+          <a:lstStyle/>
+          <a:p>
+            <a:endParaRPr lang="LID4096"/>
+          </a:p>
+        </p:txBody>
+      </p:sp>
+      <p:sp>
+        <p:nvSpPr>
+          <p:cNvPr id="4" name="Slide Number Placeholder 3">
+            <a:extLst>
+              <a:ext uri="{FF2B5EF4-FFF2-40B4-BE49-F238E27FC236}">
+                <a16:creationId xmlns:a16="http://schemas.microsoft.com/office/drawing/2014/main" id="{B66B75E1-EA21-65CD-B316-C1D421486EE7}"/>
+              </a:ext>
+            </a:extLst>
+          </p:cNvPr>
+          <p:cNvSpPr>
+            <a:spLocks noGrp="1"/>
+          </p:cNvSpPr>
+          <p:nvPr>
+            <p:ph type="sldNum" sz="quarter" idx="12"/>
+          </p:nvPr>
+        </p:nvSpPr>
+        <p:spPr/>
+        <p:txBody>
+          <a:bodyPr/>
+          <a:lstStyle/>
+          <a:p>
+            <a:fld id="{FDB1AA33-DFBB-49AC-8CEE-23FFECEB5648}" type="slidenum">
+              <a:rPr lang="LID4096" smtClean="0"/>
+              <a:t>58</a:t>
+            </a:fld>
+            <a:endParaRPr lang="LID4096"/>
+          </a:p>
+        </p:txBody>
+      </p:sp>
+    </p:spTree>
+    <p:extLst>
+      <p:ext uri="{BB962C8B-B14F-4D97-AF65-F5344CB8AC3E}">
+        <p14:creationId xmlns:p14="http://schemas.microsoft.com/office/powerpoint/2010/main" val="4080926898"/>
+      </p:ext>
+    </p:extLst>
+  </p:cSld>
+  <p:clrMapOvr>
+    <a:masterClrMapping/>
+  </p:clrMapOvr>
+</p:sld>
+</file>
+
+<file path=ppt/slides/slide59.xml><?xml version="1.0" encoding="utf-8"?>
+<p:sld xmlns:a="http://schemas.openxmlformats.org/drawingml/2006/main" xmlns:r="http://schemas.openxmlformats.org/officeDocument/2006/relationships" xmlns:p="http://schemas.openxmlformats.org/presentationml/2006/main">
+  <p:cSld>
+    <p:spTree>
+      <p:nvGrpSpPr>
+        <p:cNvPr id="1" name=""/>
+        <p:cNvGrpSpPr/>
+        <p:nvPr/>
+      </p:nvGrpSpPr>
+      <p:grpSpPr>
+        <a:xfrm>
+          <a:off x="0" y="0"/>
+          <a:ext cx="0" cy="0"/>
+          <a:chOff x="0" y="0"/>
+          <a:chExt cx="0" cy="0"/>
+        </a:xfrm>
+      </p:grpSpPr>
+      <p:sp>
+        <p:nvSpPr>
+          <p:cNvPr id="2" name="Title 1">
+            <a:extLst>
+              <a:ext uri="{FF2B5EF4-FFF2-40B4-BE49-F238E27FC236}">
+                <a16:creationId xmlns:a16="http://schemas.microsoft.com/office/drawing/2014/main" id="{8F06986E-3696-7561-EFEC-42A2474822BD}"/>
+              </a:ext>
+            </a:extLst>
+          </p:cNvPr>
+          <p:cNvSpPr>
+            <a:spLocks noGrp="1"/>
+          </p:cNvSpPr>
+          <p:nvPr>
+            <p:ph type="title"/>
+          </p:nvPr>
+        </p:nvSpPr>
+        <p:spPr/>
+        <p:txBody>
+          <a:bodyPr/>
+          <a:lstStyle/>
+          <a:p>
+            <a:r>
+              <a:rPr lang="en-US" dirty="0"/>
               <a:t>Functional features in C++</a:t>
             </a:r>
             <a:endParaRPr lang="LID4096" dirty="0"/>
@@ -24776,7 +24979,7 @@
           <a:p>
             <a:fld id="{FDB1AA33-DFBB-49AC-8CEE-23FFECEB5648}" type="slidenum">
               <a:rPr lang="LID4096" smtClean="0"/>
-              <a:t>58</a:t>
+              <a:t>59</a:t>
             </a:fld>
             <a:endParaRPr lang="LID4096"/>
           </a:p>

</xml_diff>

<commit_message>
Add slide on dependency injection
</commit_message>
<xml_diff>
--- a/cpp_software_engineering.pptx
+++ b/cpp_software_engineering.pptx
@@ -5,7 +5,7 @@
     <p:sldMasterId id="2147483648" r:id="rId1"/>
   </p:sldMasterIdLst>
   <p:notesMasterIdLst>
-    <p:notesMasterId r:id="rId61"/>
+    <p:notesMasterId r:id="rId62"/>
   </p:notesMasterIdLst>
   <p:sldIdLst>
     <p:sldId id="257" r:id="rId2"/>
@@ -58,15 +58,16 @@
     <p:sldId id="401" r:id="rId49"/>
     <p:sldId id="402" r:id="rId50"/>
     <p:sldId id="411" r:id="rId51"/>
-    <p:sldId id="399" r:id="rId52"/>
-    <p:sldId id="394" r:id="rId53"/>
-    <p:sldId id="395" r:id="rId54"/>
-    <p:sldId id="396" r:id="rId55"/>
-    <p:sldId id="398" r:id="rId56"/>
-    <p:sldId id="397" r:id="rId57"/>
-    <p:sldId id="391" r:id="rId58"/>
-    <p:sldId id="392" r:id="rId59"/>
-    <p:sldId id="393" r:id="rId60"/>
+    <p:sldId id="413" r:id="rId52"/>
+    <p:sldId id="399" r:id="rId53"/>
+    <p:sldId id="394" r:id="rId54"/>
+    <p:sldId id="395" r:id="rId55"/>
+    <p:sldId id="396" r:id="rId56"/>
+    <p:sldId id="398" r:id="rId57"/>
+    <p:sldId id="397" r:id="rId58"/>
+    <p:sldId id="391" r:id="rId59"/>
+    <p:sldId id="392" r:id="rId60"/>
+    <p:sldId id="393" r:id="rId61"/>
   </p:sldIdLst>
   <p:sldSz cx="12192000" cy="6858000"/>
   <p:notesSz cx="6858000" cy="9144000"/>
@@ -248,6 +249,7 @@
             <p14:sldId id="401"/>
             <p14:sldId id="402"/>
             <p14:sldId id="411"/>
+            <p14:sldId id="413"/>
             <p14:sldId id="399"/>
             <p14:sldId id="394"/>
             <p14:sldId id="395"/>
@@ -19395,6 +19397,13 @@
           </a:p>
           <a:p>
             <a:pPr lvl="1"/>
+            <a:r>
+              <a:rPr lang="en-US" dirty="0"/>
+              <a:t>Encourages to</a:t>
+            </a:r>
+          </a:p>
+          <a:p>
+            <a:pPr lvl="1"/>
             <a:endParaRPr lang="LID4096" dirty="0"/>
           </a:p>
         </p:txBody>
@@ -19468,6 +19477,58 @@
           </a:p>
         </p:txBody>
       </p:sp>
+      <p:sp>
+        <p:nvSpPr>
+          <p:cNvPr id="6" name="TextBox 5">
+            <a:extLst>
+              <a:ext uri="{FF2B5EF4-FFF2-40B4-BE49-F238E27FC236}">
+                <a16:creationId xmlns:a16="http://schemas.microsoft.com/office/drawing/2014/main" id="{C5B72816-B7CB-C7BC-4D3A-251BBE8E5A92}"/>
+              </a:ext>
+            </a:extLst>
+          </p:cNvPr>
+          <p:cNvSpPr txBox="1"/>
+          <p:nvPr/>
+        </p:nvSpPr>
+        <p:spPr>
+          <a:xfrm>
+            <a:off x="499580" y="5944234"/>
+            <a:ext cx="9752413" cy="646331"/>
+          </a:xfrm>
+          <a:prstGeom prst="rect">
+            <a:avLst/>
+          </a:prstGeom>
+          <a:noFill/>
+          <a:ln>
+            <a:solidFill>
+              <a:schemeClr val="tx1"/>
+            </a:solidFill>
+          </a:ln>
+        </p:spPr>
+        <p:txBody>
+          <a:bodyPr wrap="none" rtlCol="0">
+            <a:spAutoFit/>
+          </a:bodyPr>
+          <a:lstStyle/>
+          <a:p>
+            <a:r>
+              <a:rPr lang="en-US" sz="2000" dirty="0"/>
+              <a:t>See</a:t>
+            </a:r>
+          </a:p>
+          <a:p>
+            <a:r>
+              <a:rPr lang="en-US" sz="1600" dirty="0">
+                <a:hlinkClick r:id="rId2"/>
+              </a:rPr>
+              <a:t>https://github.com/gjbex/Scientific-C-plus-plus/tree/master/source-code/DesignPatterns/CellularAutomata</a:t>
+            </a:r>
+            <a:r>
+              <a:rPr lang="en-US" sz="1600" dirty="0"/>
+              <a:t> </a:t>
+            </a:r>
+          </a:p>
+        </p:txBody>
+      </p:sp>
     </p:spTree>
     <p:extLst>
       <p:ext uri="{BB962C8B-B14F-4D97-AF65-F5344CB8AC3E}">
@@ -19478,6 +19539,84 @@
   <p:clrMapOvr>
     <a:masterClrMapping/>
   </p:clrMapOvr>
+  <p:timing>
+    <p:tnLst>
+      <p:par>
+        <p:cTn id="1" dur="indefinite" restart="never" nodeType="tmRoot">
+          <p:childTnLst>
+            <p:seq concurrent="1" nextAc="seek">
+              <p:cTn id="2" dur="indefinite" nodeType="mainSeq">
+                <p:childTnLst>
+                  <p:par>
+                    <p:cTn id="3" fill="hold">
+                      <p:stCondLst>
+                        <p:cond delay="indefinite"/>
+                      </p:stCondLst>
+                      <p:childTnLst>
+                        <p:par>
+                          <p:cTn id="4" fill="hold">
+                            <p:stCondLst>
+                              <p:cond delay="0"/>
+                            </p:stCondLst>
+                            <p:childTnLst>
+                              <p:par>
+                                <p:cTn id="5" presetID="1" presetClass="entr" presetSubtype="0" fill="hold" grpId="0" nodeType="clickEffect">
+                                  <p:stCondLst>
+                                    <p:cond delay="0"/>
+                                  </p:stCondLst>
+                                  <p:childTnLst>
+                                    <p:set>
+                                      <p:cBhvr>
+                                        <p:cTn id="6" dur="1" fill="hold">
+                                          <p:stCondLst>
+                                            <p:cond delay="0"/>
+                                          </p:stCondLst>
+                                        </p:cTn>
+                                        <p:tgtEl>
+                                          <p:spTgt spid="6"/>
+                                        </p:tgtEl>
+                                        <p:attrNameLst>
+                                          <p:attrName>style.visibility</p:attrName>
+                                        </p:attrNameLst>
+                                      </p:cBhvr>
+                                      <p:to>
+                                        <p:strVal val="visible"/>
+                                      </p:to>
+                                    </p:set>
+                                  </p:childTnLst>
+                                </p:cTn>
+                              </p:par>
+                            </p:childTnLst>
+                          </p:cTn>
+                        </p:par>
+                      </p:childTnLst>
+                    </p:cTn>
+                  </p:par>
+                </p:childTnLst>
+              </p:cTn>
+              <p:prevCondLst>
+                <p:cond evt="onPrev" delay="0">
+                  <p:tgtEl>
+                    <p:sldTgt/>
+                  </p:tgtEl>
+                </p:cond>
+              </p:prevCondLst>
+              <p:nextCondLst>
+                <p:cond evt="onNext" delay="0">
+                  <p:tgtEl>
+                    <p:sldTgt/>
+                  </p:tgtEl>
+                </p:cond>
+              </p:nextCondLst>
+            </p:seq>
+          </p:childTnLst>
+        </p:cTn>
+      </p:par>
+    </p:tnLst>
+    <p:bldLst>
+      <p:bldP spid="6" grpId="0" animBg="1"/>
+    </p:bldLst>
+  </p:timing>
 </p:sld>
 </file>
 
@@ -21554,7 +21693,7 @@
           <p:cNvPr id="2" name="Title 1">
             <a:extLst>
               <a:ext uri="{FF2B5EF4-FFF2-40B4-BE49-F238E27FC236}">
-                <a16:creationId xmlns:a16="http://schemas.microsoft.com/office/drawing/2014/main" id="{04B1C173-33AC-1DCA-ED63-D52D701FC426}"/>
+                <a16:creationId xmlns:a16="http://schemas.microsoft.com/office/drawing/2014/main" id="{A1156F76-E2A6-A963-7759-6045B7CAEF8B}"/>
               </a:ext>
             </a:extLst>
           </p:cNvPr>
@@ -21572,7 +21711,7 @@
           <a:p>
             <a:r>
               <a:rPr lang="en-US" dirty="0"/>
-              <a:t>C++ specific patterns</a:t>
+              <a:t>Dependency injection</a:t>
             </a:r>
             <a:endParaRPr lang="LID4096" dirty="0"/>
           </a:p>
@@ -21580,59 +21719,10 @@
       </p:sp>
       <p:sp>
         <p:nvSpPr>
-          <p:cNvPr id="3" name="Content Placeholder 2">
-            <a:extLst>
-              <a:ext uri="{FF2B5EF4-FFF2-40B4-BE49-F238E27FC236}">
-                <a16:creationId xmlns:a16="http://schemas.microsoft.com/office/drawing/2014/main" id="{B66B5779-A74C-52C0-DAF9-FC542132634A}"/>
-              </a:ext>
-            </a:extLst>
-          </p:cNvPr>
-          <p:cNvSpPr>
-            <a:spLocks noGrp="1"/>
-          </p:cNvSpPr>
-          <p:nvPr>
-            <p:ph idx="1"/>
-          </p:nvPr>
-        </p:nvSpPr>
-        <p:spPr/>
-        <p:txBody>
-          <a:bodyPr/>
-          <a:lstStyle/>
-          <a:p>
-            <a:r>
-              <a:rPr lang="en-US" dirty="0"/>
-              <a:t>Curiously Repeating Template Pattern (CRTP)</a:t>
-            </a:r>
-          </a:p>
-          <a:p>
-            <a:r>
-              <a:rPr lang="en-US" dirty="0"/>
-              <a:t>Type erasure</a:t>
-            </a:r>
-          </a:p>
-          <a:p>
-            <a:r>
-              <a:rPr lang="en-US" dirty="0"/>
-              <a:t>Pointer to </a:t>
-            </a:r>
-            <a:r>
-              <a:rPr lang="en-US" dirty="0" err="1"/>
-              <a:t>IMPLementation</a:t>
-            </a:r>
-            <a:r>
-              <a:rPr lang="en-US" dirty="0"/>
-              <a:t> (PIMPL)</a:t>
-            </a:r>
-            <a:endParaRPr lang="LID4096" dirty="0"/>
-          </a:p>
-        </p:txBody>
-      </p:sp>
-      <p:sp>
-        <p:nvSpPr>
-          <p:cNvPr id="4" name="Slide Number Placeholder 3">
-            <a:extLst>
-              <a:ext uri="{FF2B5EF4-FFF2-40B4-BE49-F238E27FC236}">
-                <a16:creationId xmlns:a16="http://schemas.microsoft.com/office/drawing/2014/main" id="{396482FC-4A8B-74E1-56FE-EFDCEEF1C5E8}"/>
+          <p:cNvPr id="3" name="Slide Number Placeholder 2">
+            <a:extLst>
+              <a:ext uri="{FF2B5EF4-FFF2-40B4-BE49-F238E27FC236}">
+                <a16:creationId xmlns:a16="http://schemas.microsoft.com/office/drawing/2014/main" id="{8DC703F9-488C-5BEB-BB24-2CBEB1CDFDAC}"/>
               </a:ext>
             </a:extLst>
           </p:cNvPr>
@@ -21656,16 +21746,242 @@
           </a:p>
         </p:txBody>
       </p:sp>
+      <p:pic>
+        <p:nvPicPr>
+          <p:cNvPr id="1026" name="Picture 2" descr="UML diagram">
+            <a:extLst>
+              <a:ext uri="{FF2B5EF4-FFF2-40B4-BE49-F238E27FC236}">
+                <a16:creationId xmlns:a16="http://schemas.microsoft.com/office/drawing/2014/main" id="{7209C035-6C34-F821-291F-B226965F1DA1}"/>
+              </a:ext>
+            </a:extLst>
+          </p:cNvPr>
+          <p:cNvPicPr>
+            <a:picLocks noChangeAspect="1" noChangeArrowheads="1"/>
+          </p:cNvPicPr>
+          <p:nvPr/>
+        </p:nvPicPr>
+        <p:blipFill>
+          <a:blip r:embed="rId2">
+            <a:extLst>
+              <a:ext uri="{28A0092B-C50C-407E-A947-70E740481C1C}">
+                <a14:useLocalDpi xmlns:a14="http://schemas.microsoft.com/office/drawing/2010/main" val="0"/>
+              </a:ext>
+            </a:extLst>
+          </a:blip>
+          <a:srcRect/>
+          <a:stretch>
+            <a:fillRect/>
+          </a:stretch>
+        </p:blipFill>
+        <p:spPr bwMode="auto">
+          <a:xfrm>
+            <a:off x="4897211" y="1450521"/>
+            <a:ext cx="5619750" cy="4152900"/>
+          </a:xfrm>
+          <a:prstGeom prst="rect">
+            <a:avLst/>
+          </a:prstGeom>
+          <a:noFill/>
+          <a:extLst>
+            <a:ext uri="{909E8E84-426E-40DD-AFC4-6F175D3DCCD1}">
+              <a14:hiddenFill xmlns:a14="http://schemas.microsoft.com/office/drawing/2010/main">
+                <a:solidFill>
+                  <a:srgbClr val="FFFFFF"/>
+                </a:solidFill>
+              </a14:hiddenFill>
+            </a:ext>
+          </a:extLst>
+        </p:spPr>
+      </p:pic>
+      <p:sp>
+        <p:nvSpPr>
+          <p:cNvPr id="4" name="TextBox 3">
+            <a:extLst>
+              <a:ext uri="{FF2B5EF4-FFF2-40B4-BE49-F238E27FC236}">
+                <a16:creationId xmlns:a16="http://schemas.microsoft.com/office/drawing/2014/main" id="{B8085CCE-3CDA-B126-B537-C43EF80DCE3D}"/>
+              </a:ext>
+            </a:extLst>
+          </p:cNvPr>
+          <p:cNvSpPr txBox="1"/>
+          <p:nvPr/>
+        </p:nvSpPr>
+        <p:spPr>
+          <a:xfrm>
+            <a:off x="499580" y="5791830"/>
+            <a:ext cx="9752413" cy="646331"/>
+          </a:xfrm>
+          <a:prstGeom prst="rect">
+            <a:avLst/>
+          </a:prstGeom>
+          <a:noFill/>
+          <a:ln>
+            <a:solidFill>
+              <a:schemeClr val="tx1"/>
+            </a:solidFill>
+          </a:ln>
+        </p:spPr>
+        <p:txBody>
+          <a:bodyPr wrap="none" rtlCol="0">
+            <a:spAutoFit/>
+          </a:bodyPr>
+          <a:lstStyle/>
+          <a:p>
+            <a:r>
+              <a:rPr lang="en-US" sz="2000" dirty="0"/>
+              <a:t>See</a:t>
+            </a:r>
+            <a:br>
+              <a:rPr lang="en-US" sz="2000" dirty="0"/>
+            </a:br>
+            <a:r>
+              <a:rPr lang="en-US" sz="1600" dirty="0">
+                <a:hlinkClick r:id="rId3"/>
+              </a:rPr>
+              <a:t>https://github.com/gjbex/Scientific-C-plus-plus/tree/master/source-code/DesignPatterns/CellularAutomata</a:t>
+            </a:r>
+            <a:r>
+              <a:rPr lang="en-US" sz="1600" dirty="0"/>
+              <a:t> </a:t>
+            </a:r>
+          </a:p>
+        </p:txBody>
+      </p:sp>
+      <p:sp>
+        <p:nvSpPr>
+          <p:cNvPr id="5" name="TextBox 4">
+            <a:extLst>
+              <a:ext uri="{FF2B5EF4-FFF2-40B4-BE49-F238E27FC236}">
+                <a16:creationId xmlns:a16="http://schemas.microsoft.com/office/drawing/2014/main" id="{D737242C-17F9-57AC-1F6B-A363CDB72E48}"/>
+              </a:ext>
+            </a:extLst>
+          </p:cNvPr>
+          <p:cNvSpPr txBox="1"/>
+          <p:nvPr/>
+        </p:nvSpPr>
+        <p:spPr>
+          <a:xfrm>
+            <a:off x="1208315" y="4097486"/>
+            <a:ext cx="4328173" cy="830997"/>
+          </a:xfrm>
+          <a:prstGeom prst="rect">
+            <a:avLst/>
+          </a:prstGeom>
+          <a:noFill/>
+          <a:ln>
+            <a:solidFill>
+              <a:schemeClr val="tx1"/>
+            </a:solidFill>
+          </a:ln>
+        </p:spPr>
+        <p:txBody>
+          <a:bodyPr wrap="none" rtlCol="0">
+            <a:spAutoFit/>
+          </a:bodyPr>
+          <a:lstStyle/>
+          <a:p>
+            <a:r>
+              <a:rPr lang="en-US" sz="2400" dirty="0"/>
+              <a:t>Supports</a:t>
+            </a:r>
+            <a:br>
+              <a:rPr lang="en-US" sz="2400" dirty="0"/>
+            </a:br>
+            <a:r>
+              <a:rPr lang="en-US" sz="2400" dirty="0"/>
+              <a:t>dependency inversion principle</a:t>
+            </a:r>
+            <a:endParaRPr lang="LID4096" sz="2400" dirty="0"/>
+          </a:p>
+        </p:txBody>
+      </p:sp>
     </p:spTree>
     <p:extLst>
       <p:ext uri="{BB962C8B-B14F-4D97-AF65-F5344CB8AC3E}">
-        <p14:creationId xmlns:p14="http://schemas.microsoft.com/office/powerpoint/2010/main" val="3340427051"/>
+        <p14:creationId xmlns:p14="http://schemas.microsoft.com/office/powerpoint/2010/main" val="2031152274"/>
       </p:ext>
     </p:extLst>
   </p:cSld>
   <p:clrMapOvr>
     <a:masterClrMapping/>
   </p:clrMapOvr>
+  <p:timing>
+    <p:tnLst>
+      <p:par>
+        <p:cTn id="1" dur="indefinite" restart="never" nodeType="tmRoot">
+          <p:childTnLst>
+            <p:seq concurrent="1" nextAc="seek">
+              <p:cTn id="2" dur="indefinite" nodeType="mainSeq">
+                <p:childTnLst>
+                  <p:par>
+                    <p:cTn id="3" fill="hold">
+                      <p:stCondLst>
+                        <p:cond delay="indefinite"/>
+                      </p:stCondLst>
+                      <p:childTnLst>
+                        <p:par>
+                          <p:cTn id="4" fill="hold">
+                            <p:stCondLst>
+                              <p:cond delay="0"/>
+                            </p:stCondLst>
+                            <p:childTnLst>
+                              <p:par>
+                                <p:cTn id="5" presetID="1" presetClass="entr" presetSubtype="0" fill="hold" grpId="0" nodeType="clickEffect">
+                                  <p:stCondLst>
+                                    <p:cond delay="0"/>
+                                  </p:stCondLst>
+                                  <p:childTnLst>
+                                    <p:set>
+                                      <p:cBhvr>
+                                        <p:cTn id="6" dur="1" fill="hold">
+                                          <p:stCondLst>
+                                            <p:cond delay="0"/>
+                                          </p:stCondLst>
+                                        </p:cTn>
+                                        <p:tgtEl>
+                                          <p:spTgt spid="4"/>
+                                        </p:tgtEl>
+                                        <p:attrNameLst>
+                                          <p:attrName>style.visibility</p:attrName>
+                                        </p:attrNameLst>
+                                      </p:cBhvr>
+                                      <p:to>
+                                        <p:strVal val="visible"/>
+                                      </p:to>
+                                    </p:set>
+                                  </p:childTnLst>
+                                </p:cTn>
+                              </p:par>
+                            </p:childTnLst>
+                          </p:cTn>
+                        </p:par>
+                      </p:childTnLst>
+                    </p:cTn>
+                  </p:par>
+                </p:childTnLst>
+              </p:cTn>
+              <p:prevCondLst>
+                <p:cond evt="onPrev" delay="0">
+                  <p:tgtEl>
+                    <p:sldTgt/>
+                  </p:tgtEl>
+                </p:cond>
+              </p:prevCondLst>
+              <p:nextCondLst>
+                <p:cond evt="onNext" delay="0">
+                  <p:tgtEl>
+                    <p:sldTgt/>
+                  </p:tgtEl>
+                </p:cond>
+              </p:nextCondLst>
+            </p:seq>
+          </p:childTnLst>
+        </p:cTn>
+      </p:par>
+    </p:tnLst>
+    <p:bldLst>
+      <p:bldP spid="4" grpId="0" animBg="1"/>
+    </p:bldLst>
+  </p:timing>
 </p:sld>
 </file>
 
@@ -21691,7 +22007,7 @@
           <p:cNvPr id="2" name="Title 1">
             <a:extLst>
               <a:ext uri="{FF2B5EF4-FFF2-40B4-BE49-F238E27FC236}">
-                <a16:creationId xmlns:a16="http://schemas.microsoft.com/office/drawing/2014/main" id="{96A48829-0721-1480-5994-E855FF935E6E}"/>
+                <a16:creationId xmlns:a16="http://schemas.microsoft.com/office/drawing/2014/main" id="{04B1C173-33AC-1DCA-ED63-D52D701FC426}"/>
               </a:ext>
             </a:extLst>
           </p:cNvPr>
@@ -21709,7 +22025,7 @@
           <a:p>
             <a:r>
               <a:rPr lang="en-US" dirty="0"/>
-              <a:t>Curiously, Repeating Template Pattern (CRTP)</a:t>
+              <a:t>C++ specific patterns</a:t>
             </a:r>
             <a:endParaRPr lang="LID4096" dirty="0"/>
           </a:p>
@@ -21720,7 +22036,7 @@
           <p:cNvPr id="3" name="Content Placeholder 2">
             <a:extLst>
               <a:ext uri="{FF2B5EF4-FFF2-40B4-BE49-F238E27FC236}">
-                <a16:creationId xmlns:a16="http://schemas.microsoft.com/office/drawing/2014/main" id="{9BB61A49-5C18-EB0F-3E0D-D280F9E302A4}"/>
+                <a16:creationId xmlns:a16="http://schemas.microsoft.com/office/drawing/2014/main" id="{B66B5779-A74C-52C0-DAF9-FC542132634A}"/>
               </a:ext>
             </a:extLst>
           </p:cNvPr>
@@ -21733,33 +22049,34 @@
         </p:nvSpPr>
         <p:spPr/>
         <p:txBody>
-          <a:bodyPr>
-            <a:normAutofit/>
-          </a:bodyPr>
+          <a:bodyPr/>
           <a:lstStyle/>
           <a:p>
             <a:r>
               <a:rPr lang="en-US" dirty="0"/>
-              <a:t>Avoid virtual function overhead</a:t>
-            </a:r>
-          </a:p>
-          <a:p>
-            <a:r>
-              <a:rPr lang="en-US" dirty="0"/>
-              <a:t>Enforce compile time interface constraints</a:t>
-            </a:r>
-          </a:p>
-          <a:p>
-            <a:r>
-              <a:rPr lang="en-US" dirty="0"/>
-              <a:t>Code reuse without dynamic polymorphism</a:t>
-            </a:r>
-          </a:p>
-          <a:p>
-            <a:r>
-              <a:rPr lang="en-US" dirty="0"/>
-              <a:t>Static  polymorphism</a:t>
-            </a:r>
+              <a:t>Curiously Repeating Template Pattern (CRTP)</a:t>
+            </a:r>
+          </a:p>
+          <a:p>
+            <a:r>
+              <a:rPr lang="en-US" dirty="0"/>
+              <a:t>Type erasure</a:t>
+            </a:r>
+          </a:p>
+          <a:p>
+            <a:r>
+              <a:rPr lang="en-US" dirty="0"/>
+              <a:t>Pointer to </a:t>
+            </a:r>
+            <a:r>
+              <a:rPr lang="en-US" dirty="0" err="1"/>
+              <a:t>IMPLementation</a:t>
+            </a:r>
+            <a:r>
+              <a:rPr lang="en-US" dirty="0"/>
+              <a:t> (PIMPL)</a:t>
+            </a:r>
+            <a:endParaRPr lang="LID4096" dirty="0"/>
           </a:p>
         </p:txBody>
       </p:sp>
@@ -21768,7 +22085,7 @@
           <p:cNvPr id="4" name="Slide Number Placeholder 3">
             <a:extLst>
               <a:ext uri="{FF2B5EF4-FFF2-40B4-BE49-F238E27FC236}">
-                <a16:creationId xmlns:a16="http://schemas.microsoft.com/office/drawing/2014/main" id="{0D8837DD-4DFF-B3FC-6690-1408C5CBE0FA}"/>
+                <a16:creationId xmlns:a16="http://schemas.microsoft.com/office/drawing/2014/main" id="{396482FC-4A8B-74E1-56FE-EFDCEEF1C5E8}"/>
               </a:ext>
             </a:extLst>
           </p:cNvPr>
@@ -21787,6 +22104,142 @@
             <a:fld id="{FDB1AA33-DFBB-49AC-8CEE-23FFECEB5648}" type="slidenum">
               <a:rPr lang="LID4096" smtClean="0"/>
               <a:t>52</a:t>
+            </a:fld>
+            <a:endParaRPr lang="LID4096"/>
+          </a:p>
+        </p:txBody>
+      </p:sp>
+    </p:spTree>
+    <p:extLst>
+      <p:ext uri="{BB962C8B-B14F-4D97-AF65-F5344CB8AC3E}">
+        <p14:creationId xmlns:p14="http://schemas.microsoft.com/office/powerpoint/2010/main" val="3340427051"/>
+      </p:ext>
+    </p:extLst>
+  </p:cSld>
+  <p:clrMapOvr>
+    <a:masterClrMapping/>
+  </p:clrMapOvr>
+</p:sld>
+</file>
+
+<file path=ppt/slides/slide53.xml><?xml version="1.0" encoding="utf-8"?>
+<p:sld xmlns:a="http://schemas.openxmlformats.org/drawingml/2006/main" xmlns:r="http://schemas.openxmlformats.org/officeDocument/2006/relationships" xmlns:p="http://schemas.openxmlformats.org/presentationml/2006/main">
+  <p:cSld>
+    <p:spTree>
+      <p:nvGrpSpPr>
+        <p:cNvPr id="1" name=""/>
+        <p:cNvGrpSpPr/>
+        <p:nvPr/>
+      </p:nvGrpSpPr>
+      <p:grpSpPr>
+        <a:xfrm>
+          <a:off x="0" y="0"/>
+          <a:ext cx="0" cy="0"/>
+          <a:chOff x="0" y="0"/>
+          <a:chExt cx="0" cy="0"/>
+        </a:xfrm>
+      </p:grpSpPr>
+      <p:sp>
+        <p:nvSpPr>
+          <p:cNvPr id="2" name="Title 1">
+            <a:extLst>
+              <a:ext uri="{FF2B5EF4-FFF2-40B4-BE49-F238E27FC236}">
+                <a16:creationId xmlns:a16="http://schemas.microsoft.com/office/drawing/2014/main" id="{96A48829-0721-1480-5994-E855FF935E6E}"/>
+              </a:ext>
+            </a:extLst>
+          </p:cNvPr>
+          <p:cNvSpPr>
+            <a:spLocks noGrp="1"/>
+          </p:cNvSpPr>
+          <p:nvPr>
+            <p:ph type="title"/>
+          </p:nvPr>
+        </p:nvSpPr>
+        <p:spPr/>
+        <p:txBody>
+          <a:bodyPr/>
+          <a:lstStyle/>
+          <a:p>
+            <a:r>
+              <a:rPr lang="en-US" dirty="0"/>
+              <a:t>Curiously, Repeating Template Pattern (CRTP)</a:t>
+            </a:r>
+            <a:endParaRPr lang="LID4096" dirty="0"/>
+          </a:p>
+        </p:txBody>
+      </p:sp>
+      <p:sp>
+        <p:nvSpPr>
+          <p:cNvPr id="3" name="Content Placeholder 2">
+            <a:extLst>
+              <a:ext uri="{FF2B5EF4-FFF2-40B4-BE49-F238E27FC236}">
+                <a16:creationId xmlns:a16="http://schemas.microsoft.com/office/drawing/2014/main" id="{9BB61A49-5C18-EB0F-3E0D-D280F9E302A4}"/>
+              </a:ext>
+            </a:extLst>
+          </p:cNvPr>
+          <p:cNvSpPr>
+            <a:spLocks noGrp="1"/>
+          </p:cNvSpPr>
+          <p:nvPr>
+            <p:ph idx="1"/>
+          </p:nvPr>
+        </p:nvSpPr>
+        <p:spPr/>
+        <p:txBody>
+          <a:bodyPr>
+            <a:normAutofit/>
+          </a:bodyPr>
+          <a:lstStyle/>
+          <a:p>
+            <a:r>
+              <a:rPr lang="en-US" dirty="0"/>
+              <a:t>Avoid virtual function overhead</a:t>
+            </a:r>
+          </a:p>
+          <a:p>
+            <a:r>
+              <a:rPr lang="en-US" dirty="0"/>
+              <a:t>Enforce compile time interface constraints</a:t>
+            </a:r>
+          </a:p>
+          <a:p>
+            <a:r>
+              <a:rPr lang="en-US" dirty="0"/>
+              <a:t>Code reuse without dynamic polymorphism</a:t>
+            </a:r>
+          </a:p>
+          <a:p>
+            <a:r>
+              <a:rPr lang="en-US" dirty="0"/>
+              <a:t>Static  polymorphism</a:t>
+            </a:r>
+          </a:p>
+        </p:txBody>
+      </p:sp>
+      <p:sp>
+        <p:nvSpPr>
+          <p:cNvPr id="4" name="Slide Number Placeholder 3">
+            <a:extLst>
+              <a:ext uri="{FF2B5EF4-FFF2-40B4-BE49-F238E27FC236}">
+                <a16:creationId xmlns:a16="http://schemas.microsoft.com/office/drawing/2014/main" id="{0D8837DD-4DFF-B3FC-6690-1408C5CBE0FA}"/>
+              </a:ext>
+            </a:extLst>
+          </p:cNvPr>
+          <p:cNvSpPr>
+            <a:spLocks noGrp="1"/>
+          </p:cNvSpPr>
+          <p:nvPr>
+            <p:ph type="sldNum" sz="quarter" idx="12"/>
+          </p:nvPr>
+        </p:nvSpPr>
+        <p:spPr/>
+        <p:txBody>
+          <a:bodyPr/>
+          <a:lstStyle/>
+          <a:p>
+            <a:fld id="{FDB1AA33-DFBB-49AC-8CEE-23FFECEB5648}" type="slidenum">
+              <a:rPr lang="LID4096" smtClean="0"/>
+              <a:t>53</a:t>
             </a:fld>
             <a:endParaRPr lang="LID4096"/>
           </a:p>
@@ -21932,7 +22385,7 @@
 </p:sld>
 </file>
 
-<file path=ppt/slides/slide53.xml><?xml version="1.0" encoding="utf-8"?>
+<file path=ppt/slides/slide54.xml><?xml version="1.0" encoding="utf-8"?>
 <p:sld xmlns:a="http://schemas.openxmlformats.org/drawingml/2006/main" xmlns:r="http://schemas.openxmlformats.org/officeDocument/2006/relationships" xmlns:p="http://schemas.openxmlformats.org/presentationml/2006/main">
   <p:cSld>
     <p:spTree>
@@ -22001,7 +22454,7 @@
           <a:p>
             <a:fld id="{FDB1AA33-DFBB-49AC-8CEE-23FFECEB5648}" type="slidenum">
               <a:rPr lang="LID4096" smtClean="0"/>
-              <a:t>53</a:t>
+              <a:t>54</a:t>
             </a:fld>
             <a:endParaRPr lang="LID4096"/>
           </a:p>
@@ -22778,7 +23231,7 @@
 </p:sld>
 </file>
 
-<file path=ppt/slides/slide54.xml><?xml version="1.0" encoding="utf-8"?>
+<file path=ppt/slides/slide55.xml><?xml version="1.0" encoding="utf-8"?>
 <p:sld xmlns:a="http://schemas.openxmlformats.org/drawingml/2006/main" xmlns:r="http://schemas.openxmlformats.org/officeDocument/2006/relationships" xmlns:p="http://schemas.openxmlformats.org/presentationml/2006/main">
   <p:cSld>
     <p:spTree>
@@ -22847,7 +23300,7 @@
           <a:p>
             <a:fld id="{FDB1AA33-DFBB-49AC-8CEE-23FFECEB5648}" type="slidenum">
               <a:rPr lang="LID4096" smtClean="0"/>
-              <a:t>54</a:t>
+              <a:t>55</a:t>
             </a:fld>
             <a:endParaRPr lang="LID4096"/>
           </a:p>
@@ -23411,7 +23864,7 @@
 </p:sld>
 </file>
 
-<file path=ppt/slides/slide55.xml><?xml version="1.0" encoding="utf-8"?>
+<file path=ppt/slides/slide56.xml><?xml version="1.0" encoding="utf-8"?>
 <p:sld xmlns:a="http://schemas.openxmlformats.org/drawingml/2006/main" xmlns:r="http://schemas.openxmlformats.org/officeDocument/2006/relationships" xmlns:p="http://schemas.openxmlformats.org/presentationml/2006/main">
   <p:cSld>
     <p:spTree>
@@ -23480,7 +23933,7 @@
           <a:p>
             <a:fld id="{FDB1AA33-DFBB-49AC-8CEE-23FFECEB5648}" type="slidenum">
               <a:rPr lang="LID4096" smtClean="0"/>
-              <a:t>55</a:t>
+              <a:t>56</a:t>
             </a:fld>
             <a:endParaRPr lang="LID4096"/>
           </a:p>
@@ -24198,7 +24651,7 @@
 </p:sld>
 </file>
 
-<file path=ppt/slides/slide56.xml><?xml version="1.0" encoding="utf-8"?>
+<file path=ppt/slides/slide57.xml><?xml version="1.0" encoding="utf-8"?>
 <p:sld xmlns:a="http://schemas.openxmlformats.org/drawingml/2006/main" xmlns:r="http://schemas.openxmlformats.org/officeDocument/2006/relationships" xmlns:p="http://schemas.openxmlformats.org/presentationml/2006/main">
   <p:cSld>
     <p:spTree>
@@ -24267,7 +24720,7 @@
           <a:p>
             <a:fld id="{FDB1AA33-DFBB-49AC-8CEE-23FFECEB5648}" type="slidenum">
               <a:rPr lang="LID4096" smtClean="0"/>
-              <a:t>56</a:t>
+              <a:t>57</a:t>
             </a:fld>
             <a:endParaRPr lang="LID4096"/>
           </a:p>
@@ -24614,142 +25067,6 @@
 </p:sld>
 </file>
 
-<file path=ppt/slides/slide57.xml><?xml version="1.0" encoding="utf-8"?>
-<p:sld xmlns:a="http://schemas.openxmlformats.org/drawingml/2006/main" xmlns:r="http://schemas.openxmlformats.org/officeDocument/2006/relationships" xmlns:p="http://schemas.openxmlformats.org/presentationml/2006/main">
-  <p:cSld>
-    <p:spTree>
-      <p:nvGrpSpPr>
-        <p:cNvPr id="1" name=""/>
-        <p:cNvGrpSpPr/>
-        <p:nvPr/>
-      </p:nvGrpSpPr>
-      <p:grpSpPr>
-        <a:xfrm>
-          <a:off x="0" y="0"/>
-          <a:ext cx="0" cy="0"/>
-          <a:chOff x="0" y="0"/>
-          <a:chExt cx="0" cy="0"/>
-        </a:xfrm>
-      </p:grpSpPr>
-      <p:sp>
-        <p:nvSpPr>
-          <p:cNvPr id="2" name="Title 1"/>
-          <p:cNvSpPr>
-            <a:spLocks noGrp="1"/>
-          </p:cNvSpPr>
-          <p:nvPr>
-            <p:ph type="title"/>
-          </p:nvPr>
-        </p:nvSpPr>
-        <p:spPr/>
-        <p:txBody>
-          <a:bodyPr/>
-          <a:lstStyle/>
-          <a:p>
-            <a:r>
-              <a:rPr lang="en-US" dirty="0"/>
-              <a:t>Further reading</a:t>
-            </a:r>
-            <a:endParaRPr lang="nl-BE" dirty="0"/>
-          </a:p>
-        </p:txBody>
-      </p:sp>
-      <p:sp>
-        <p:nvSpPr>
-          <p:cNvPr id="3" name="Content Placeholder 2"/>
-          <p:cNvSpPr>
-            <a:spLocks noGrp="1"/>
-          </p:cNvSpPr>
-          <p:nvPr>
-            <p:ph idx="1"/>
-          </p:nvPr>
-        </p:nvSpPr>
-        <p:spPr/>
-        <p:txBody>
-          <a:bodyPr/>
-          <a:lstStyle/>
-          <a:p>
-            <a:r>
-              <a:rPr lang="en-US" dirty="0"/>
-              <a:t>Erich Gamma, Richard Helm, Ralph Johnson and John </a:t>
-            </a:r>
-            <a:r>
-              <a:rPr lang="en-US" dirty="0" err="1"/>
-              <a:t>Vlissides</a:t>
-            </a:r>
-            <a:r>
-              <a:rPr lang="en-US" dirty="0"/>
-              <a:t> (1994) </a:t>
-            </a:r>
-            <a:r>
-              <a:rPr lang="en-US" i="1" dirty="0"/>
-              <a:t>Design patterns: elements of reusable object-oriented software</a:t>
-            </a:r>
-            <a:r>
-              <a:rPr lang="en-US" dirty="0"/>
-              <a:t>, Addison-Wesley</a:t>
-            </a:r>
-            <a:endParaRPr lang="en-US" sz="2800" dirty="0"/>
-          </a:p>
-          <a:p>
-            <a:endParaRPr lang="en-US" sz="2800" dirty="0"/>
-          </a:p>
-          <a:p>
-            <a:endParaRPr lang="nl-BE" dirty="0"/>
-          </a:p>
-        </p:txBody>
-      </p:sp>
-      <p:sp>
-        <p:nvSpPr>
-          <p:cNvPr id="4" name="Slide Number Placeholder 3"/>
-          <p:cNvSpPr>
-            <a:spLocks noGrp="1"/>
-          </p:cNvSpPr>
-          <p:nvPr>
-            <p:ph type="sldNum" sz="quarter" idx="12"/>
-          </p:nvPr>
-        </p:nvSpPr>
-        <p:spPr/>
-        <p:txBody>
-          <a:bodyPr/>
-          <a:lstStyle/>
-          <a:p>
-            <a:fld id="{5A209D72-2E9D-49B0-8977-41DCCC66C0BB}" type="slidenum">
-              <a:rPr lang="nl-BE">
-                <a:solidFill>
-                  <a:prstClr val="black">
-                    <a:tint val="75000"/>
-                  </a:prstClr>
-                </a:solidFill>
-                <a:latin typeface="Calibri"/>
-              </a:rPr>
-              <a:pPr/>
-              <a:t>57</a:t>
-            </a:fld>
-            <a:endParaRPr lang="nl-BE">
-              <a:solidFill>
-                <a:prstClr val="black">
-                  <a:tint val="75000"/>
-                </a:prstClr>
-              </a:solidFill>
-              <a:latin typeface="Calibri"/>
-            </a:endParaRPr>
-          </a:p>
-        </p:txBody>
-      </p:sp>
-    </p:spTree>
-    <p:extLst>
-      <p:ext uri="{BB962C8B-B14F-4D97-AF65-F5344CB8AC3E}">
-        <p14:creationId xmlns:p14="http://schemas.microsoft.com/office/powerpoint/2010/main" val="4100769943"/>
-      </p:ext>
-    </p:extLst>
-  </p:cSld>
-  <p:clrMapOvr>
-    <a:masterClrMapping/>
-  </p:clrMapOvr>
-</p:sld>
-</file>
-
 <file path=ppt/slides/slide58.xml><?xml version="1.0" encoding="utf-8"?>
 <p:sld xmlns:a="http://schemas.openxmlformats.org/drawingml/2006/main" xmlns:r="http://schemas.openxmlformats.org/officeDocument/2006/relationships" xmlns:p="http://schemas.openxmlformats.org/presentationml/2006/main">
   <p:cSld>
@@ -24769,13 +25086,7 @@
       </p:grpSpPr>
       <p:sp>
         <p:nvSpPr>
-          <p:cNvPr id="5" name="Title 4">
-            <a:extLst>
-              <a:ext uri="{FF2B5EF4-FFF2-40B4-BE49-F238E27FC236}">
-                <a16:creationId xmlns:a16="http://schemas.microsoft.com/office/drawing/2014/main" id="{B047AC09-4137-6264-6757-2F13914ACA28}"/>
-              </a:ext>
-            </a:extLst>
-          </p:cNvPr>
+          <p:cNvPr id="2" name="Title 1"/>
           <p:cNvSpPr>
             <a:spLocks noGrp="1"/>
           </p:cNvSpPr>
@@ -24790,26 +25101,20 @@
           <a:p>
             <a:r>
               <a:rPr lang="en-US" dirty="0"/>
-              <a:t>Functional approach</a:t>
-            </a:r>
-            <a:endParaRPr lang="LID4096" dirty="0"/>
-          </a:p>
-        </p:txBody>
-      </p:sp>
-      <p:sp>
-        <p:nvSpPr>
-          <p:cNvPr id="6" name="Text Placeholder 5">
-            <a:extLst>
-              <a:ext uri="{FF2B5EF4-FFF2-40B4-BE49-F238E27FC236}">
-                <a16:creationId xmlns:a16="http://schemas.microsoft.com/office/drawing/2014/main" id="{482D214C-4E56-C7D6-335F-9FBD13AF24C6}"/>
-              </a:ext>
-            </a:extLst>
-          </p:cNvPr>
+              <a:t>Further reading</a:t>
+            </a:r>
+            <a:endParaRPr lang="nl-BE" dirty="0"/>
+          </a:p>
+        </p:txBody>
+      </p:sp>
+      <p:sp>
+        <p:nvSpPr>
+          <p:cNvPr id="3" name="Content Placeholder 2"/>
           <p:cNvSpPr>
             <a:spLocks noGrp="1"/>
           </p:cNvSpPr>
           <p:nvPr>
-            <p:ph type="body" idx="1"/>
+            <p:ph idx="1"/>
           </p:nvPr>
         </p:nvSpPr>
         <p:spPr/>
@@ -24817,19 +25122,39 @@
           <a:bodyPr/>
           <a:lstStyle/>
           <a:p>
-            <a:endParaRPr lang="LID4096"/>
-          </a:p>
-        </p:txBody>
-      </p:sp>
-      <p:sp>
-        <p:nvSpPr>
-          <p:cNvPr id="4" name="Slide Number Placeholder 3">
-            <a:extLst>
-              <a:ext uri="{FF2B5EF4-FFF2-40B4-BE49-F238E27FC236}">
-                <a16:creationId xmlns:a16="http://schemas.microsoft.com/office/drawing/2014/main" id="{B66B75E1-EA21-65CD-B316-C1D421486EE7}"/>
-              </a:ext>
-            </a:extLst>
-          </p:cNvPr>
+            <a:r>
+              <a:rPr lang="en-US" dirty="0"/>
+              <a:t>Erich Gamma, Richard Helm, Ralph Johnson and John </a:t>
+            </a:r>
+            <a:r>
+              <a:rPr lang="en-US" dirty="0" err="1"/>
+              <a:t>Vlissides</a:t>
+            </a:r>
+            <a:r>
+              <a:rPr lang="en-US" dirty="0"/>
+              <a:t> (1994) </a:t>
+            </a:r>
+            <a:r>
+              <a:rPr lang="en-US" i="1" dirty="0"/>
+              <a:t>Design patterns: elements of reusable object-oriented software</a:t>
+            </a:r>
+            <a:r>
+              <a:rPr lang="en-US" dirty="0"/>
+              <a:t>, Addison-Wesley</a:t>
+            </a:r>
+            <a:endParaRPr lang="en-US" sz="2800" dirty="0"/>
+          </a:p>
+          <a:p>
+            <a:endParaRPr lang="en-US" sz="2800" dirty="0"/>
+          </a:p>
+          <a:p>
+            <a:endParaRPr lang="nl-BE" dirty="0"/>
+          </a:p>
+        </p:txBody>
+      </p:sp>
+      <p:sp>
+        <p:nvSpPr>
+          <p:cNvPr id="4" name="Slide Number Placeholder 3"/>
           <p:cNvSpPr>
             <a:spLocks noGrp="1"/>
           </p:cNvSpPr>
@@ -24842,18 +25167,33 @@
           <a:bodyPr/>
           <a:lstStyle/>
           <a:p>
-            <a:fld id="{FDB1AA33-DFBB-49AC-8CEE-23FFECEB5648}" type="slidenum">
-              <a:rPr lang="LID4096" smtClean="0"/>
+            <a:fld id="{5A209D72-2E9D-49B0-8977-41DCCC66C0BB}" type="slidenum">
+              <a:rPr lang="nl-BE">
+                <a:solidFill>
+                  <a:prstClr val="black">
+                    <a:tint val="75000"/>
+                  </a:prstClr>
+                </a:solidFill>
+                <a:latin typeface="Calibri"/>
+              </a:rPr>
+              <a:pPr/>
               <a:t>58</a:t>
             </a:fld>
-            <a:endParaRPr lang="LID4096"/>
+            <a:endParaRPr lang="nl-BE">
+              <a:solidFill>
+                <a:prstClr val="black">
+                  <a:tint val="75000"/>
+                </a:prstClr>
+              </a:solidFill>
+              <a:latin typeface="Calibri"/>
+            </a:endParaRPr>
           </a:p>
         </p:txBody>
       </p:sp>
     </p:spTree>
     <p:extLst>
       <p:ext uri="{BB962C8B-B14F-4D97-AF65-F5344CB8AC3E}">
-        <p14:creationId xmlns:p14="http://schemas.microsoft.com/office/powerpoint/2010/main" val="4080926898"/>
+        <p14:creationId xmlns:p14="http://schemas.microsoft.com/office/powerpoint/2010/main" val="4100769943"/>
       </p:ext>
     </p:extLst>
   </p:cSld>
@@ -24882,10 +25222,10 @@
       </p:grpSpPr>
       <p:sp>
         <p:nvSpPr>
-          <p:cNvPr id="2" name="Title 1">
-            <a:extLst>
-              <a:ext uri="{FF2B5EF4-FFF2-40B4-BE49-F238E27FC236}">
-                <a16:creationId xmlns:a16="http://schemas.microsoft.com/office/drawing/2014/main" id="{8F06986E-3696-7561-EFEC-42A2474822BD}"/>
+          <p:cNvPr id="5" name="Title 4">
+            <a:extLst>
+              <a:ext uri="{FF2B5EF4-FFF2-40B4-BE49-F238E27FC236}">
+                <a16:creationId xmlns:a16="http://schemas.microsoft.com/office/drawing/2014/main" id="{B047AC09-4137-6264-6757-2F13914ACA28}"/>
               </a:ext>
             </a:extLst>
           </p:cNvPr>
@@ -24903,6 +25243,231 @@
           <a:p>
             <a:r>
               <a:rPr lang="en-US" dirty="0"/>
+              <a:t>Functional approach</a:t>
+            </a:r>
+            <a:endParaRPr lang="LID4096" dirty="0"/>
+          </a:p>
+        </p:txBody>
+      </p:sp>
+      <p:sp>
+        <p:nvSpPr>
+          <p:cNvPr id="6" name="Text Placeholder 5">
+            <a:extLst>
+              <a:ext uri="{FF2B5EF4-FFF2-40B4-BE49-F238E27FC236}">
+                <a16:creationId xmlns:a16="http://schemas.microsoft.com/office/drawing/2014/main" id="{482D214C-4E56-C7D6-335F-9FBD13AF24C6}"/>
+              </a:ext>
+            </a:extLst>
+          </p:cNvPr>
+          <p:cNvSpPr>
+            <a:spLocks noGrp="1"/>
+          </p:cNvSpPr>
+          <p:nvPr>
+            <p:ph type="body" idx="1"/>
+          </p:nvPr>
+        </p:nvSpPr>
+        <p:spPr/>
+        <p:txBody>
+          <a:bodyPr/>
+          <a:lstStyle/>
+          <a:p>
+            <a:endParaRPr lang="LID4096"/>
+          </a:p>
+        </p:txBody>
+      </p:sp>
+      <p:sp>
+        <p:nvSpPr>
+          <p:cNvPr id="4" name="Slide Number Placeholder 3">
+            <a:extLst>
+              <a:ext uri="{FF2B5EF4-FFF2-40B4-BE49-F238E27FC236}">
+                <a16:creationId xmlns:a16="http://schemas.microsoft.com/office/drawing/2014/main" id="{B66B75E1-EA21-65CD-B316-C1D421486EE7}"/>
+              </a:ext>
+            </a:extLst>
+          </p:cNvPr>
+          <p:cNvSpPr>
+            <a:spLocks noGrp="1"/>
+          </p:cNvSpPr>
+          <p:nvPr>
+            <p:ph type="sldNum" sz="quarter" idx="12"/>
+          </p:nvPr>
+        </p:nvSpPr>
+        <p:spPr/>
+        <p:txBody>
+          <a:bodyPr/>
+          <a:lstStyle/>
+          <a:p>
+            <a:fld id="{FDB1AA33-DFBB-49AC-8CEE-23FFECEB5648}" type="slidenum">
+              <a:rPr lang="LID4096" smtClean="0"/>
+              <a:t>59</a:t>
+            </a:fld>
+            <a:endParaRPr lang="LID4096"/>
+          </a:p>
+        </p:txBody>
+      </p:sp>
+    </p:spTree>
+    <p:extLst>
+      <p:ext uri="{BB962C8B-B14F-4D97-AF65-F5344CB8AC3E}">
+        <p14:creationId xmlns:p14="http://schemas.microsoft.com/office/powerpoint/2010/main" val="4080926898"/>
+      </p:ext>
+    </p:extLst>
+  </p:cSld>
+  <p:clrMapOvr>
+    <a:masterClrMapping/>
+  </p:clrMapOvr>
+</p:sld>
+</file>
+
+<file path=ppt/slides/slide6.xml><?xml version="1.0" encoding="utf-8"?>
+<p:sld xmlns:a="http://schemas.openxmlformats.org/drawingml/2006/main" xmlns:r="http://schemas.openxmlformats.org/officeDocument/2006/relationships" xmlns:p="http://schemas.openxmlformats.org/presentationml/2006/main">
+  <p:cSld>
+    <p:spTree>
+      <p:nvGrpSpPr>
+        <p:cNvPr id="1" name=""/>
+        <p:cNvGrpSpPr/>
+        <p:nvPr/>
+      </p:nvGrpSpPr>
+      <p:grpSpPr>
+        <a:xfrm>
+          <a:off x="0" y="0"/>
+          <a:ext cx="0" cy="0"/>
+          <a:chOff x="0" y="0"/>
+          <a:chExt cx="0" cy="0"/>
+        </a:xfrm>
+      </p:grpSpPr>
+      <p:sp>
+        <p:nvSpPr>
+          <p:cNvPr id="2" name="Title 1">
+            <a:extLst>
+              <a:ext uri="{FF2B5EF4-FFF2-40B4-BE49-F238E27FC236}">
+                <a16:creationId xmlns:a16="http://schemas.microsoft.com/office/drawing/2014/main" id="{CD8A5471-A4D8-4F5E-B450-200A4C371BE2}"/>
+              </a:ext>
+            </a:extLst>
+          </p:cNvPr>
+          <p:cNvSpPr>
+            <a:spLocks noGrp="1"/>
+          </p:cNvSpPr>
+          <p:nvPr>
+            <p:ph type="title"/>
+          </p:nvPr>
+        </p:nvSpPr>
+        <p:spPr/>
+        <p:txBody>
+          <a:bodyPr/>
+          <a:lstStyle/>
+          <a:p>
+            <a:r>
+              <a:rPr lang="en-US" dirty="0"/>
+              <a:t>Best practices</a:t>
+            </a:r>
+          </a:p>
+        </p:txBody>
+      </p:sp>
+      <p:sp>
+        <p:nvSpPr>
+          <p:cNvPr id="3" name="Text Placeholder 2">
+            <a:extLst>
+              <a:ext uri="{FF2B5EF4-FFF2-40B4-BE49-F238E27FC236}">
+                <a16:creationId xmlns:a16="http://schemas.microsoft.com/office/drawing/2014/main" id="{46302BE0-A82A-4DCE-87F1-E8BD131C79CD}"/>
+              </a:ext>
+            </a:extLst>
+          </p:cNvPr>
+          <p:cNvSpPr>
+            <a:spLocks noGrp="1"/>
+          </p:cNvSpPr>
+          <p:nvPr>
+            <p:ph type="body" idx="1"/>
+          </p:nvPr>
+        </p:nvSpPr>
+        <p:spPr/>
+        <p:txBody>
+          <a:bodyPr/>
+          <a:lstStyle/>
+          <a:p>
+            <a:endParaRPr lang="en-US"/>
+          </a:p>
+        </p:txBody>
+      </p:sp>
+      <p:sp>
+        <p:nvSpPr>
+          <p:cNvPr id="4" name="Slide Number Placeholder 3">
+            <a:extLst>
+              <a:ext uri="{FF2B5EF4-FFF2-40B4-BE49-F238E27FC236}">
+                <a16:creationId xmlns:a16="http://schemas.microsoft.com/office/drawing/2014/main" id="{D678DF20-6449-4B12-9A41-DCB2C682E0F0}"/>
+              </a:ext>
+            </a:extLst>
+          </p:cNvPr>
+          <p:cNvSpPr>
+            <a:spLocks noGrp="1"/>
+          </p:cNvSpPr>
+          <p:nvPr>
+            <p:ph type="sldNum" sz="quarter" idx="12"/>
+          </p:nvPr>
+        </p:nvSpPr>
+        <p:spPr/>
+        <p:txBody>
+          <a:bodyPr/>
+          <a:lstStyle/>
+          <a:p>
+            <a:fld id="{5A209D72-2E9D-49B0-8977-41DCCC66C0BB}" type="slidenum">
+              <a:rPr lang="nl-BE" smtClean="0"/>
+              <a:t>6</a:t>
+            </a:fld>
+            <a:endParaRPr lang="nl-BE"/>
+          </a:p>
+        </p:txBody>
+      </p:sp>
+    </p:spTree>
+    <p:extLst>
+      <p:ext uri="{BB962C8B-B14F-4D97-AF65-F5344CB8AC3E}">
+        <p14:creationId xmlns:p14="http://schemas.microsoft.com/office/powerpoint/2010/main" val="2154523888"/>
+      </p:ext>
+    </p:extLst>
+  </p:cSld>
+  <p:clrMapOvr>
+    <a:masterClrMapping/>
+  </p:clrMapOvr>
+</p:sld>
+</file>
+
+<file path=ppt/slides/slide60.xml><?xml version="1.0" encoding="utf-8"?>
+<p:sld xmlns:a="http://schemas.openxmlformats.org/drawingml/2006/main" xmlns:r="http://schemas.openxmlformats.org/officeDocument/2006/relationships" xmlns:p="http://schemas.openxmlformats.org/presentationml/2006/main">
+  <p:cSld>
+    <p:spTree>
+      <p:nvGrpSpPr>
+        <p:cNvPr id="1" name=""/>
+        <p:cNvGrpSpPr/>
+        <p:nvPr/>
+      </p:nvGrpSpPr>
+      <p:grpSpPr>
+        <a:xfrm>
+          <a:off x="0" y="0"/>
+          <a:ext cx="0" cy="0"/>
+          <a:chOff x="0" y="0"/>
+          <a:chExt cx="0" cy="0"/>
+        </a:xfrm>
+      </p:grpSpPr>
+      <p:sp>
+        <p:nvSpPr>
+          <p:cNvPr id="2" name="Title 1">
+            <a:extLst>
+              <a:ext uri="{FF2B5EF4-FFF2-40B4-BE49-F238E27FC236}">
+                <a16:creationId xmlns:a16="http://schemas.microsoft.com/office/drawing/2014/main" id="{8F06986E-3696-7561-EFEC-42A2474822BD}"/>
+              </a:ext>
+            </a:extLst>
+          </p:cNvPr>
+          <p:cNvSpPr>
+            <a:spLocks noGrp="1"/>
+          </p:cNvSpPr>
+          <p:nvPr>
+            <p:ph type="title"/>
+          </p:nvPr>
+        </p:nvSpPr>
+        <p:spPr/>
+        <p:txBody>
+          <a:bodyPr/>
+          <a:lstStyle/>
+          <a:p>
+            <a:r>
+              <a:rPr lang="en-US" dirty="0"/>
               <a:t>Functional features in C++</a:t>
             </a:r>
             <a:endParaRPr lang="LID4096" dirty="0"/>
@@ -24979,7 +25544,7 @@
           <a:p>
             <a:fld id="{FDB1AA33-DFBB-49AC-8CEE-23FFECEB5648}" type="slidenum">
               <a:rPr lang="LID4096" smtClean="0"/>
-              <a:t>59</a:t>
+              <a:t>60</a:t>
             </a:fld>
             <a:endParaRPr lang="LID4096"/>
           </a:p>
@@ -25147,118 +25712,6 @@
       <p:bldP spid="5" grpId="0" animBg="1"/>
     </p:bldLst>
   </p:timing>
-</p:sld>
-</file>
-
-<file path=ppt/slides/slide6.xml><?xml version="1.0" encoding="utf-8"?>
-<p:sld xmlns:a="http://schemas.openxmlformats.org/drawingml/2006/main" xmlns:r="http://schemas.openxmlformats.org/officeDocument/2006/relationships" xmlns:p="http://schemas.openxmlformats.org/presentationml/2006/main">
-  <p:cSld>
-    <p:spTree>
-      <p:nvGrpSpPr>
-        <p:cNvPr id="1" name=""/>
-        <p:cNvGrpSpPr/>
-        <p:nvPr/>
-      </p:nvGrpSpPr>
-      <p:grpSpPr>
-        <a:xfrm>
-          <a:off x="0" y="0"/>
-          <a:ext cx="0" cy="0"/>
-          <a:chOff x="0" y="0"/>
-          <a:chExt cx="0" cy="0"/>
-        </a:xfrm>
-      </p:grpSpPr>
-      <p:sp>
-        <p:nvSpPr>
-          <p:cNvPr id="2" name="Title 1">
-            <a:extLst>
-              <a:ext uri="{FF2B5EF4-FFF2-40B4-BE49-F238E27FC236}">
-                <a16:creationId xmlns:a16="http://schemas.microsoft.com/office/drawing/2014/main" id="{CD8A5471-A4D8-4F5E-B450-200A4C371BE2}"/>
-              </a:ext>
-            </a:extLst>
-          </p:cNvPr>
-          <p:cNvSpPr>
-            <a:spLocks noGrp="1"/>
-          </p:cNvSpPr>
-          <p:nvPr>
-            <p:ph type="title"/>
-          </p:nvPr>
-        </p:nvSpPr>
-        <p:spPr/>
-        <p:txBody>
-          <a:bodyPr/>
-          <a:lstStyle/>
-          <a:p>
-            <a:r>
-              <a:rPr lang="en-US" dirty="0"/>
-              <a:t>Best practices</a:t>
-            </a:r>
-          </a:p>
-        </p:txBody>
-      </p:sp>
-      <p:sp>
-        <p:nvSpPr>
-          <p:cNvPr id="3" name="Text Placeholder 2">
-            <a:extLst>
-              <a:ext uri="{FF2B5EF4-FFF2-40B4-BE49-F238E27FC236}">
-                <a16:creationId xmlns:a16="http://schemas.microsoft.com/office/drawing/2014/main" id="{46302BE0-A82A-4DCE-87F1-E8BD131C79CD}"/>
-              </a:ext>
-            </a:extLst>
-          </p:cNvPr>
-          <p:cNvSpPr>
-            <a:spLocks noGrp="1"/>
-          </p:cNvSpPr>
-          <p:nvPr>
-            <p:ph type="body" idx="1"/>
-          </p:nvPr>
-        </p:nvSpPr>
-        <p:spPr/>
-        <p:txBody>
-          <a:bodyPr/>
-          <a:lstStyle/>
-          <a:p>
-            <a:endParaRPr lang="en-US"/>
-          </a:p>
-        </p:txBody>
-      </p:sp>
-      <p:sp>
-        <p:nvSpPr>
-          <p:cNvPr id="4" name="Slide Number Placeholder 3">
-            <a:extLst>
-              <a:ext uri="{FF2B5EF4-FFF2-40B4-BE49-F238E27FC236}">
-                <a16:creationId xmlns:a16="http://schemas.microsoft.com/office/drawing/2014/main" id="{D678DF20-6449-4B12-9A41-DCB2C682E0F0}"/>
-              </a:ext>
-            </a:extLst>
-          </p:cNvPr>
-          <p:cNvSpPr>
-            <a:spLocks noGrp="1"/>
-          </p:cNvSpPr>
-          <p:nvPr>
-            <p:ph type="sldNum" sz="quarter" idx="12"/>
-          </p:nvPr>
-        </p:nvSpPr>
-        <p:spPr/>
-        <p:txBody>
-          <a:bodyPr/>
-          <a:lstStyle/>
-          <a:p>
-            <a:fld id="{5A209D72-2E9D-49B0-8977-41DCCC66C0BB}" type="slidenum">
-              <a:rPr lang="nl-BE" smtClean="0"/>
-              <a:t>6</a:t>
-            </a:fld>
-            <a:endParaRPr lang="nl-BE"/>
-          </a:p>
-        </p:txBody>
-      </p:sp>
-    </p:spTree>
-    <p:extLst>
-      <p:ext uri="{BB962C8B-B14F-4D97-AF65-F5344CB8AC3E}">
-        <p14:creationId xmlns:p14="http://schemas.microsoft.com/office/powerpoint/2010/main" val="2154523888"/>
-      </p:ext>
-    </p:extLst>
-  </p:cSld>
-  <p:clrMapOvr>
-    <a:masterClrMapping/>
-  </p:clrMapOvr>
 </p:sld>
 </file>
 

</xml_diff>